<commit_message>
Added the config loader module.
</commit_message>
<xml_diff>
--- a/doc/designDoc.pptx
+++ b/doc/designDoc.pptx
@@ -5,16 +5,17 @@
     <p:sldMasterId id="2147483648" r:id="rId1"/>
   </p:sldMasterIdLst>
   <p:notesMasterIdLst>
-    <p:notesMasterId r:id="rId9"/>
+    <p:notesMasterId r:id="rId10"/>
   </p:notesMasterIdLst>
   <p:sldIdLst>
     <p:sldId id="262" r:id="rId2"/>
     <p:sldId id="256" r:id="rId3"/>
     <p:sldId id="257" r:id="rId4"/>
     <p:sldId id="261" r:id="rId5"/>
-    <p:sldId id="258" r:id="rId6"/>
-    <p:sldId id="259" r:id="rId7"/>
-    <p:sldId id="260" r:id="rId8"/>
+    <p:sldId id="294" r:id="rId6"/>
+    <p:sldId id="258" r:id="rId7"/>
+    <p:sldId id="259" r:id="rId8"/>
+    <p:sldId id="260" r:id="rId9"/>
   </p:sldIdLst>
   <p:sldSz cx="12192000" cy="6858000"/>
   <p:notesSz cx="6858000" cy="9144000"/>
@@ -203,7 +204,7 @@
           <a:p>
             <a:fld id="{2BA6DB02-48BF-406A-9449-0BBAAE1D3FCC}" type="datetimeFigureOut">
               <a:rPr lang="en-SG" smtClean="0"/>
-              <a:t>27/1/2023</a:t>
+              <a:t>30/1/2023</a:t>
             </a:fld>
             <a:endParaRPr lang="en-SG" dirty="0"/>
           </a:p>
@@ -536,7 +537,7 @@
           <a:p>
             <a:fld id="{3B0C630E-0CE8-4915-8E08-22247CA7F11A}" type="slidenum">
               <a:rPr lang="en-SG" smtClean="0"/>
-              <a:t>5</a:t>
+              <a:t>6</a:t>
             </a:fld>
             <a:endParaRPr lang="en-SG" dirty="0"/>
           </a:p>
@@ -704,7 +705,7 @@
           <a:p>
             <a:fld id="{568D23B1-6EF9-4DFF-A006-F22E70A73051}" type="datetimeFigureOut">
               <a:rPr lang="en-SG" smtClean="0"/>
-              <a:t>27/1/2023</a:t>
+              <a:t>30/1/2023</a:t>
             </a:fld>
             <a:endParaRPr lang="en-SG" dirty="0"/>
           </a:p>
@@ -904,7 +905,7 @@
           <a:p>
             <a:fld id="{568D23B1-6EF9-4DFF-A006-F22E70A73051}" type="datetimeFigureOut">
               <a:rPr lang="en-SG" smtClean="0"/>
-              <a:t>27/1/2023</a:t>
+              <a:t>30/1/2023</a:t>
             </a:fld>
             <a:endParaRPr lang="en-SG" dirty="0"/>
           </a:p>
@@ -1114,7 +1115,7 @@
           <a:p>
             <a:fld id="{568D23B1-6EF9-4DFF-A006-F22E70A73051}" type="datetimeFigureOut">
               <a:rPr lang="en-SG" smtClean="0"/>
-              <a:t>27/1/2023</a:t>
+              <a:t>30/1/2023</a:t>
             </a:fld>
             <a:endParaRPr lang="en-SG" dirty="0"/>
           </a:p>
@@ -1314,7 +1315,7 @@
           <a:p>
             <a:fld id="{568D23B1-6EF9-4DFF-A006-F22E70A73051}" type="datetimeFigureOut">
               <a:rPr lang="en-SG" smtClean="0"/>
-              <a:t>27/1/2023</a:t>
+              <a:t>30/1/2023</a:t>
             </a:fld>
             <a:endParaRPr lang="en-SG" dirty="0"/>
           </a:p>
@@ -1590,7 +1591,7 @@
           <a:p>
             <a:fld id="{568D23B1-6EF9-4DFF-A006-F22E70A73051}" type="datetimeFigureOut">
               <a:rPr lang="en-SG" smtClean="0"/>
-              <a:t>27/1/2023</a:t>
+              <a:t>30/1/2023</a:t>
             </a:fld>
             <a:endParaRPr lang="en-SG" dirty="0"/>
           </a:p>
@@ -1858,7 +1859,7 @@
           <a:p>
             <a:fld id="{568D23B1-6EF9-4DFF-A006-F22E70A73051}" type="datetimeFigureOut">
               <a:rPr lang="en-SG" smtClean="0"/>
-              <a:t>27/1/2023</a:t>
+              <a:t>30/1/2023</a:t>
             </a:fld>
             <a:endParaRPr lang="en-SG" dirty="0"/>
           </a:p>
@@ -2273,7 +2274,7 @@
           <a:p>
             <a:fld id="{568D23B1-6EF9-4DFF-A006-F22E70A73051}" type="datetimeFigureOut">
               <a:rPr lang="en-SG" smtClean="0"/>
-              <a:t>27/1/2023</a:t>
+              <a:t>30/1/2023</a:t>
             </a:fld>
             <a:endParaRPr lang="en-SG" dirty="0"/>
           </a:p>
@@ -2415,7 +2416,7 @@
           <a:p>
             <a:fld id="{568D23B1-6EF9-4DFF-A006-F22E70A73051}" type="datetimeFigureOut">
               <a:rPr lang="en-SG" smtClean="0"/>
-              <a:t>27/1/2023</a:t>
+              <a:t>30/1/2023</a:t>
             </a:fld>
             <a:endParaRPr lang="en-SG" dirty="0"/>
           </a:p>
@@ -2528,7 +2529,7 @@
           <a:p>
             <a:fld id="{568D23B1-6EF9-4DFF-A006-F22E70A73051}" type="datetimeFigureOut">
               <a:rPr lang="en-SG" smtClean="0"/>
-              <a:t>27/1/2023</a:t>
+              <a:t>30/1/2023</a:t>
             </a:fld>
             <a:endParaRPr lang="en-SG" dirty="0"/>
           </a:p>
@@ -2841,7 +2842,7 @@
           <a:p>
             <a:fld id="{568D23B1-6EF9-4DFF-A006-F22E70A73051}" type="datetimeFigureOut">
               <a:rPr lang="en-SG" smtClean="0"/>
-              <a:t>27/1/2023</a:t>
+              <a:t>30/1/2023</a:t>
             </a:fld>
             <a:endParaRPr lang="en-SG" dirty="0"/>
           </a:p>
@@ -3130,7 +3131,7 @@
           <a:p>
             <a:fld id="{568D23B1-6EF9-4DFF-A006-F22E70A73051}" type="datetimeFigureOut">
               <a:rPr lang="en-SG" smtClean="0"/>
-              <a:t>27/1/2023</a:t>
+              <a:t>30/1/2023</a:t>
             </a:fld>
             <a:endParaRPr lang="en-SG" dirty="0"/>
           </a:p>
@@ -3373,7 +3374,7 @@
           <a:p>
             <a:fld id="{568D23B1-6EF9-4DFF-A006-F22E70A73051}" type="datetimeFigureOut">
               <a:rPr lang="en-SG" smtClean="0"/>
-              <a:t>27/1/2023</a:t>
+              <a:t>30/1/2023</a:t>
             </a:fld>
             <a:endParaRPr lang="en-SG" dirty="0"/>
           </a:p>
@@ -15447,6 +15448,565 @@
 </file>
 
 <file path=ppt/slides/slide5.xml><?xml version="1.0" encoding="utf-8"?>
+<p:sld xmlns:a="http://schemas.openxmlformats.org/drawingml/2006/main" xmlns:r="http://schemas.openxmlformats.org/officeDocument/2006/relationships" xmlns:p="http://schemas.openxmlformats.org/presentationml/2006/main">
+  <p:cSld>
+    <p:spTree>
+      <p:nvGrpSpPr>
+        <p:cNvPr id="1" name=""/>
+        <p:cNvGrpSpPr/>
+        <p:nvPr/>
+      </p:nvGrpSpPr>
+      <p:grpSpPr>
+        <a:xfrm>
+          <a:off x="0" y="0"/>
+          <a:ext cx="0" cy="0"/>
+          <a:chOff x="0" y="0"/>
+          <a:chExt cx="0" cy="0"/>
+        </a:xfrm>
+      </p:grpSpPr>
+      <p:sp>
+        <p:nvSpPr>
+          <p:cNvPr id="4" name="TextBox 3">
+            <a:extLst>
+              <a:ext uri="{FF2B5EF4-FFF2-40B4-BE49-F238E27FC236}">
+                <a16:creationId xmlns:a16="http://schemas.microsoft.com/office/drawing/2014/main" id="{DD319421-850C-B862-91CA-94B309913F88}"/>
+              </a:ext>
+            </a:extLst>
+          </p:cNvPr>
+          <p:cNvSpPr txBox="1"/>
+          <p:nvPr/>
+        </p:nvSpPr>
+        <p:spPr>
+          <a:xfrm>
+            <a:off x="0" y="-12557"/>
+            <a:ext cx="12191999" cy="461665"/>
+          </a:xfrm>
+          <a:prstGeom prst="rect">
+            <a:avLst/>
+          </a:prstGeom>
+          <a:solidFill>
+            <a:schemeClr val="accent1">
+              <a:lumMod val="75000"/>
+            </a:schemeClr>
+          </a:solidFill>
+          <a:ln>
+            <a:solidFill>
+              <a:schemeClr val="tx1"/>
+            </a:solidFill>
+          </a:ln>
+        </p:spPr>
+        <p:txBody>
+          <a:bodyPr wrap="square" rtlCol="0">
+            <a:spAutoFit/>
+          </a:bodyPr>
+          <a:lstStyle/>
+          <a:p>
+            <a:r>
+              <a:rPr lang="en-SG" sz="2400" dirty="0">
+                <a:solidFill>
+                  <a:schemeClr val="bg1"/>
+                </a:solidFill>
+              </a:rPr>
+              <a:t>User Action Emulator [System Design improvement]  </a:t>
+            </a:r>
+            <a:endParaRPr lang="en-SG" sz="2400" dirty="0">
+              <a:solidFill>
+                <a:srgbClr val="FF0000"/>
+              </a:solidFill>
+            </a:endParaRPr>
+          </a:p>
+        </p:txBody>
+      </p:sp>
+      <p:pic>
+        <p:nvPicPr>
+          <p:cNvPr id="5" name="Picture 4" descr="Graphical user interface, text&#10;&#10;Description automatically generated with medium confidence">
+            <a:extLst>
+              <a:ext uri="{FF2B5EF4-FFF2-40B4-BE49-F238E27FC236}">
+                <a16:creationId xmlns:a16="http://schemas.microsoft.com/office/drawing/2014/main" id="{9377C686-F64B-D611-CFA6-6D7DE4AAE440}"/>
+              </a:ext>
+            </a:extLst>
+          </p:cNvPr>
+          <p:cNvPicPr>
+            <a:picLocks noChangeAspect="1"/>
+          </p:cNvPicPr>
+          <p:nvPr/>
+        </p:nvPicPr>
+        <p:blipFill>
+          <a:blip r:embed="rId2">
+            <a:extLst>
+              <a:ext uri="{28A0092B-C50C-407E-A947-70E740481C1C}">
+                <a14:useLocalDpi xmlns:a14="http://schemas.microsoft.com/office/drawing/2010/main" val="0"/>
+              </a:ext>
+            </a:extLst>
+          </a:blip>
+          <a:stretch>
+            <a:fillRect/>
+          </a:stretch>
+        </p:blipFill>
+        <p:spPr>
+          <a:xfrm>
+            <a:off x="10527245" y="53310"/>
+            <a:ext cx="1598494" cy="348275"/>
+          </a:xfrm>
+          <a:prstGeom prst="rect">
+            <a:avLst/>
+          </a:prstGeom>
+        </p:spPr>
+      </p:pic>
+      <p:pic>
+        <p:nvPicPr>
+          <p:cNvPr id="7" name="Picture 6" descr="Diagram, timeline&#10;&#10;Description automatically generated">
+            <a:extLst>
+              <a:ext uri="{FF2B5EF4-FFF2-40B4-BE49-F238E27FC236}">
+                <a16:creationId xmlns:a16="http://schemas.microsoft.com/office/drawing/2014/main" id="{63B418EE-6954-8309-B714-CF075A2A311D}"/>
+              </a:ext>
+            </a:extLst>
+          </p:cNvPr>
+          <p:cNvPicPr>
+            <a:picLocks noChangeAspect="1"/>
+          </p:cNvPicPr>
+          <p:nvPr/>
+        </p:nvPicPr>
+        <p:blipFill>
+          <a:blip r:embed="rId3">
+            <a:extLst>
+              <a:ext uri="{28A0092B-C50C-407E-A947-70E740481C1C}">
+                <a14:useLocalDpi xmlns:a14="http://schemas.microsoft.com/office/drawing/2010/main" val="0"/>
+              </a:ext>
+            </a:extLst>
+          </a:blip>
+          <a:stretch>
+            <a:fillRect/>
+          </a:stretch>
+        </p:blipFill>
+        <p:spPr>
+          <a:xfrm>
+            <a:off x="315755" y="1408915"/>
+            <a:ext cx="3987888" cy="2243187"/>
+          </a:xfrm>
+          <a:prstGeom prst="rect">
+            <a:avLst/>
+          </a:prstGeom>
+          <a:ln w="6350">
+            <a:solidFill>
+              <a:schemeClr val="tx1"/>
+            </a:solidFill>
+          </a:ln>
+        </p:spPr>
+      </p:pic>
+      <p:sp>
+        <p:nvSpPr>
+          <p:cNvPr id="11" name="TextBox 10">
+            <a:extLst>
+              <a:ext uri="{FF2B5EF4-FFF2-40B4-BE49-F238E27FC236}">
+                <a16:creationId xmlns:a16="http://schemas.microsoft.com/office/drawing/2014/main" id="{3F0E355A-FC61-65D3-3012-F75DE5F253DD}"/>
+              </a:ext>
+            </a:extLst>
+          </p:cNvPr>
+          <p:cNvSpPr txBox="1"/>
+          <p:nvPr/>
+        </p:nvSpPr>
+        <p:spPr>
+          <a:xfrm>
+            <a:off x="315755" y="682923"/>
+            <a:ext cx="3599930" cy="338554"/>
+          </a:xfrm>
+          <a:prstGeom prst="rect">
+            <a:avLst/>
+          </a:prstGeom>
+          <a:noFill/>
+        </p:spPr>
+        <p:txBody>
+          <a:bodyPr wrap="square" rtlCol="0">
+            <a:spAutoFit/>
+          </a:bodyPr>
+          <a:lstStyle/>
+          <a:p>
+            <a:r>
+              <a:rPr lang="en-US" sz="1600" b="1" dirty="0"/>
+              <a:t>System workflow diagram (old) </a:t>
+            </a:r>
+          </a:p>
+        </p:txBody>
+      </p:sp>
+      <p:pic>
+        <p:nvPicPr>
+          <p:cNvPr id="3" name="Picture 2" descr="Timeline&#10;&#10;Description automatically generated">
+            <a:extLst>
+              <a:ext uri="{FF2B5EF4-FFF2-40B4-BE49-F238E27FC236}">
+                <a16:creationId xmlns:a16="http://schemas.microsoft.com/office/drawing/2014/main" id="{76FD506A-C0AE-9574-C404-F411BBFEEFE2}"/>
+              </a:ext>
+            </a:extLst>
+          </p:cNvPr>
+          <p:cNvPicPr>
+            <a:picLocks noChangeAspect="1"/>
+          </p:cNvPicPr>
+          <p:nvPr/>
+        </p:nvPicPr>
+        <p:blipFill>
+          <a:blip r:embed="rId4">
+            <a:extLst>
+              <a:ext uri="{28A0092B-C50C-407E-A947-70E740481C1C}">
+                <a14:useLocalDpi xmlns:a14="http://schemas.microsoft.com/office/drawing/2010/main" val="0"/>
+              </a:ext>
+            </a:extLst>
+          </a:blip>
+          <a:stretch>
+            <a:fillRect/>
+          </a:stretch>
+        </p:blipFill>
+        <p:spPr>
+          <a:xfrm>
+            <a:off x="4664763" y="2236321"/>
+            <a:ext cx="7527236" cy="4234070"/>
+          </a:xfrm>
+          <a:prstGeom prst="rect">
+            <a:avLst/>
+          </a:prstGeom>
+          <a:ln w="12700">
+            <a:solidFill>
+              <a:schemeClr val="tx1"/>
+            </a:solidFill>
+          </a:ln>
+        </p:spPr>
+      </p:pic>
+      <p:cxnSp>
+        <p:nvCxnSpPr>
+          <p:cNvPr id="9" name="Connector: Elbow 8">
+            <a:extLst>
+              <a:ext uri="{FF2B5EF4-FFF2-40B4-BE49-F238E27FC236}">
+                <a16:creationId xmlns:a16="http://schemas.microsoft.com/office/drawing/2014/main" id="{97A19B67-1F9B-BCBF-4D6F-AC9511FD1863}"/>
+              </a:ext>
+            </a:extLst>
+          </p:cNvPr>
+          <p:cNvCxnSpPr/>
+          <p:nvPr/>
+        </p:nvCxnSpPr>
+        <p:spPr>
+          <a:xfrm>
+            <a:off x="4373217" y="1639973"/>
+            <a:ext cx="1421295" cy="596348"/>
+          </a:xfrm>
+          <a:prstGeom prst="bentConnector3">
+            <a:avLst>
+              <a:gd name="adj1" fmla="val 99650"/>
+            </a:avLst>
+          </a:prstGeom>
+          <a:ln w="28575">
+            <a:tailEnd type="triangle"/>
+          </a:ln>
+        </p:spPr>
+        <p:style>
+          <a:lnRef idx="1">
+            <a:schemeClr val="accent1"/>
+          </a:lnRef>
+          <a:fillRef idx="0">
+            <a:schemeClr val="accent1"/>
+          </a:fillRef>
+          <a:effectRef idx="0">
+            <a:schemeClr val="accent1"/>
+          </a:effectRef>
+          <a:fontRef idx="minor">
+            <a:schemeClr val="tx1"/>
+          </a:fontRef>
+        </p:style>
+      </p:cxnSp>
+      <p:sp>
+        <p:nvSpPr>
+          <p:cNvPr id="14" name="TextBox 13">
+            <a:extLst>
+              <a:ext uri="{FF2B5EF4-FFF2-40B4-BE49-F238E27FC236}">
+                <a16:creationId xmlns:a16="http://schemas.microsoft.com/office/drawing/2014/main" id="{33A3B9DA-860D-6767-0D01-9544927397E4}"/>
+              </a:ext>
+            </a:extLst>
+          </p:cNvPr>
+          <p:cNvSpPr txBox="1"/>
+          <p:nvPr/>
+        </p:nvSpPr>
+        <p:spPr>
+          <a:xfrm>
+            <a:off x="5864086" y="1702223"/>
+            <a:ext cx="3599930" cy="338554"/>
+          </a:xfrm>
+          <a:prstGeom prst="rect">
+            <a:avLst/>
+          </a:prstGeom>
+          <a:noFill/>
+        </p:spPr>
+        <p:txBody>
+          <a:bodyPr wrap="square" rtlCol="0">
+            <a:spAutoFit/>
+          </a:bodyPr>
+          <a:lstStyle/>
+          <a:p>
+            <a:r>
+              <a:rPr lang="en-US" sz="1600" b="1" dirty="0"/>
+              <a:t>System workflow diagram (Current</a:t>
+            </a:r>
+            <a:r>
+              <a:rPr lang="en-US" sz="1600" b="1"/>
+              <a:t>) </a:t>
+            </a:r>
+            <a:endParaRPr lang="en-US" sz="1600" b="1" dirty="0"/>
+          </a:p>
+        </p:txBody>
+      </p:sp>
+      <p:sp>
+        <p:nvSpPr>
+          <p:cNvPr id="15" name="Rectangle 14">
+            <a:extLst>
+              <a:ext uri="{FF2B5EF4-FFF2-40B4-BE49-F238E27FC236}">
+                <a16:creationId xmlns:a16="http://schemas.microsoft.com/office/drawing/2014/main" id="{182A3384-A5FD-A59D-7B50-1974EE7A5A56}"/>
+              </a:ext>
+            </a:extLst>
+          </p:cNvPr>
+          <p:cNvSpPr/>
+          <p:nvPr/>
+        </p:nvSpPr>
+        <p:spPr>
+          <a:xfrm>
+            <a:off x="7851913" y="2971800"/>
+            <a:ext cx="1550504" cy="2673626"/>
+          </a:xfrm>
+          <a:prstGeom prst="rect">
+            <a:avLst/>
+          </a:prstGeom>
+          <a:noFill/>
+          <a:ln w="28575">
+            <a:solidFill>
+              <a:srgbClr val="FF0000"/>
+            </a:solidFill>
+            <a:prstDash val="sysDot"/>
+          </a:ln>
+        </p:spPr>
+        <p:style>
+          <a:lnRef idx="2">
+            <a:schemeClr val="accent1">
+              <a:shade val="50000"/>
+            </a:schemeClr>
+          </a:lnRef>
+          <a:fillRef idx="1">
+            <a:schemeClr val="accent1"/>
+          </a:fillRef>
+          <a:effectRef idx="0">
+            <a:schemeClr val="accent1"/>
+          </a:effectRef>
+          <a:fontRef idx="minor">
+            <a:schemeClr val="lt1"/>
+          </a:fontRef>
+        </p:style>
+        <p:txBody>
+          <a:bodyPr rtlCol="0" anchor="ctr"/>
+          <a:lstStyle/>
+          <a:p>
+            <a:pPr algn="ctr"/>
+            <a:endParaRPr lang="en-SG" dirty="0">
+              <a:solidFill>
+                <a:srgbClr val="FF0000"/>
+              </a:solidFill>
+            </a:endParaRPr>
+          </a:p>
+        </p:txBody>
+      </p:sp>
+      <p:sp>
+        <p:nvSpPr>
+          <p:cNvPr id="16" name="TextBox 15">
+            <a:extLst>
+              <a:ext uri="{FF2B5EF4-FFF2-40B4-BE49-F238E27FC236}">
+                <a16:creationId xmlns:a16="http://schemas.microsoft.com/office/drawing/2014/main" id="{3ADC4CFC-CE6F-274D-4049-06121D09B80A}"/>
+              </a:ext>
+            </a:extLst>
+          </p:cNvPr>
+          <p:cNvSpPr txBox="1"/>
+          <p:nvPr/>
+        </p:nvSpPr>
+        <p:spPr>
+          <a:xfrm>
+            <a:off x="7851913" y="2710190"/>
+            <a:ext cx="2033768" cy="261610"/>
+          </a:xfrm>
+          <a:prstGeom prst="rect">
+            <a:avLst/>
+          </a:prstGeom>
+          <a:noFill/>
+        </p:spPr>
+        <p:txBody>
+          <a:bodyPr wrap="square" rtlCol="0">
+            <a:spAutoFit/>
+          </a:bodyPr>
+          <a:lstStyle/>
+          <a:p>
+            <a:r>
+              <a:rPr lang="en-US" sz="1100" b="1" dirty="0">
+                <a:solidFill>
+                  <a:srgbClr val="C00000"/>
+                </a:solidFill>
+              </a:rPr>
+              <a:t>New DB-history recover feature</a:t>
+            </a:r>
+            <a:endParaRPr lang="en-SG" sz="1100" b="1" dirty="0">
+              <a:solidFill>
+                <a:srgbClr val="C00000"/>
+              </a:solidFill>
+            </a:endParaRPr>
+          </a:p>
+        </p:txBody>
+      </p:sp>
+      <p:sp>
+        <p:nvSpPr>
+          <p:cNvPr id="17" name="TextBox 16">
+            <a:extLst>
+              <a:ext uri="{FF2B5EF4-FFF2-40B4-BE49-F238E27FC236}">
+                <a16:creationId xmlns:a16="http://schemas.microsoft.com/office/drawing/2014/main" id="{B81F8B59-8DA7-D543-DBEA-CA16950DCCD3}"/>
+              </a:ext>
+            </a:extLst>
+          </p:cNvPr>
+          <p:cNvSpPr txBox="1"/>
+          <p:nvPr/>
+        </p:nvSpPr>
+        <p:spPr>
+          <a:xfrm>
+            <a:off x="205398" y="3652102"/>
+            <a:ext cx="4384712" cy="3200876"/>
+          </a:xfrm>
+          <a:prstGeom prst="rect">
+            <a:avLst/>
+          </a:prstGeom>
+          <a:noFill/>
+        </p:spPr>
+        <p:txBody>
+          <a:bodyPr wrap="square" rtlCol="0">
+            <a:spAutoFit/>
+          </a:bodyPr>
+          <a:lstStyle/>
+          <a:p>
+            <a:r>
+              <a:rPr lang="en-US" sz="1600" b="1" dirty="0"/>
+              <a:t>D</a:t>
+            </a:r>
+            <a:r>
+              <a:rPr lang="en-SG" sz="1600" b="1" dirty="0"/>
+              <a:t>B-history recovery feature.</a:t>
+            </a:r>
+          </a:p>
+          <a:p>
+            <a:endParaRPr lang="en-SG" sz="1600" b="1" dirty="0"/>
+          </a:p>
+          <a:p>
+            <a:r>
+              <a:rPr lang="en-SG" sz="1400" b="1" dirty="0"/>
+              <a:t>Case 1 [ scheduler auto run over midnight]: </a:t>
+            </a:r>
+            <a:r>
+              <a:rPr lang="en-SG" sz="1400" dirty="0"/>
+              <a:t>At 00:01 am create new state table, recover yesterday DB user’s  setting (such as deactivate tasks) into new DB state table.</a:t>
+            </a:r>
+          </a:p>
+          <a:p>
+            <a:endParaRPr lang="en-SG" sz="1400" b="1" dirty="0"/>
+          </a:p>
+          <a:p>
+            <a:r>
+              <a:rPr lang="en-SG" sz="1400" b="1" dirty="0"/>
+              <a:t>Case 2 [ User start the scheduler 1</a:t>
+            </a:r>
+            <a:r>
+              <a:rPr lang="en-SG" sz="1400" b="1" baseline="30000" dirty="0"/>
+              <a:t>st</a:t>
+            </a:r>
+            <a:r>
+              <a:rPr lang="en-SG" sz="1400" b="1" dirty="0"/>
+              <a:t> time today]: </a:t>
+            </a:r>
+            <a:r>
+              <a:rPr lang="en-SG" sz="1400" dirty="0"/>
+              <a:t>Load yesterday state table based on user’s recover flag setting. Built new state table, recover the user setting. </a:t>
+            </a:r>
+          </a:p>
+          <a:p>
+            <a:endParaRPr lang="en-SG" sz="1400" b="1" dirty="0"/>
+          </a:p>
+          <a:p>
+            <a:r>
+              <a:rPr lang="en-SG" sz="1400" b="1" dirty="0"/>
+              <a:t>Case 3 [ User start the scheduler again (not the 1</a:t>
+            </a:r>
+            <a:r>
+              <a:rPr lang="en-SG" sz="1400" b="1" baseline="30000" dirty="0"/>
+              <a:t>st</a:t>
+            </a:r>
+            <a:r>
+              <a:rPr lang="en-SG" sz="1400" b="1" dirty="0"/>
+              <a:t> time) in one day]: </a:t>
+            </a:r>
+            <a:r>
+              <a:rPr lang="en-SG" sz="1400" dirty="0"/>
+              <a:t>Assume the scheduler is closed by user because some reason, load the state from the DB to recovery the program state to the time point. </a:t>
+            </a:r>
+            <a:r>
+              <a:rPr lang="en-SG" sz="1600" b="1" dirty="0"/>
+              <a:t> </a:t>
+            </a:r>
+          </a:p>
+        </p:txBody>
+      </p:sp>
+      <p:sp>
+        <p:nvSpPr>
+          <p:cNvPr id="19" name="TextBox 18">
+            <a:extLst>
+              <a:ext uri="{FF2B5EF4-FFF2-40B4-BE49-F238E27FC236}">
+                <a16:creationId xmlns:a16="http://schemas.microsoft.com/office/drawing/2014/main" id="{50735573-25A7-2A60-BAFD-93512C756D26}"/>
+              </a:ext>
+            </a:extLst>
+          </p:cNvPr>
+          <p:cNvSpPr txBox="1"/>
+          <p:nvPr/>
+        </p:nvSpPr>
+        <p:spPr>
+          <a:xfrm>
+            <a:off x="6397490" y="449108"/>
+            <a:ext cx="5836699" cy="1169551"/>
+          </a:xfrm>
+          <a:prstGeom prst="rect">
+            <a:avLst/>
+          </a:prstGeom>
+          <a:noFill/>
+        </p:spPr>
+        <p:txBody>
+          <a:bodyPr wrap="square" rtlCol="0">
+            <a:spAutoFit/>
+          </a:bodyPr>
+          <a:lstStyle/>
+          <a:p>
+            <a:pPr algn="just"/>
+            <a:r>
+              <a:rPr lang="en-US" sz="1400" b="1" dirty="0"/>
+              <a:t>Why we need the history recovery feature ? </a:t>
+            </a:r>
+          </a:p>
+          <a:p>
+            <a:pPr algn="just"/>
+            <a:r>
+              <a:rPr lang="en-SG" sz="1400" dirty="0"/>
+              <a:t>Assume task-2 [running on 10:00 am] needs task-1 [running on 09:00 am] to be executed successfully, if the computer reboot at 9:45 am, then user re-run scheduler at 9:50, the scheduler needs to auto recover its tasks state to the time point 9:45 am to decide whether execute task-2. </a:t>
+            </a:r>
+          </a:p>
+        </p:txBody>
+      </p:sp>
+    </p:spTree>
+    <p:extLst>
+      <p:ext uri="{BB962C8B-B14F-4D97-AF65-F5344CB8AC3E}">
+        <p14:creationId xmlns:p14="http://schemas.microsoft.com/office/powerpoint/2010/main" val="2275827904"/>
+      </p:ext>
+    </p:extLst>
+  </p:cSld>
+  <p:clrMapOvr>
+    <a:masterClrMapping/>
+  </p:clrMapOvr>
+</p:sld>
+</file>
+
+<file path=ppt/slides/slide6.xml><?xml version="1.0" encoding="utf-8"?>
 <p:sld xmlns:a="http://schemas.openxmlformats.org/drawingml/2006/main" xmlns:r="http://schemas.openxmlformats.org/officeDocument/2006/relationships" xmlns:p="http://schemas.openxmlformats.org/presentationml/2006/main">
   <p:cSld>
     <p:spTree>
@@ -18233,7 +18793,7 @@
 </p:sld>
 </file>
 
-<file path=ppt/slides/slide6.xml><?xml version="1.0" encoding="utf-8"?>
+<file path=ppt/slides/slide7.xml><?xml version="1.0" encoding="utf-8"?>
 <p:sld xmlns:a="http://schemas.openxmlformats.org/drawingml/2006/main" xmlns:r="http://schemas.openxmlformats.org/officeDocument/2006/relationships" xmlns:p="http://schemas.openxmlformats.org/presentationml/2006/main">
   <p:cSld>
     <p:spTree>
@@ -19378,7 +19938,7 @@
 </p:sld>
 </file>
 
-<file path=ppt/slides/slide7.xml><?xml version="1.0" encoding="utf-8"?>
+<file path=ppt/slides/slide8.xml><?xml version="1.0" encoding="utf-8"?>
 <p:sld xmlns:a="http://schemas.openxmlformats.org/drawingml/2006/main" xmlns:r="http://schemas.openxmlformats.org/officeDocument/2006/relationships" xmlns:p="http://schemas.openxmlformats.org/presentationml/2006/main">
   <p:cSld>
     <p:spTree>

</xml_diff>

<commit_message>
Update the use case doc.
</commit_message>
<xml_diff>
--- a/doc/designDoc.pptx
+++ b/doc/designDoc.pptx
@@ -5,7 +5,7 @@
     <p:sldMasterId id="2147483648" r:id="rId1"/>
   </p:sldMasterIdLst>
   <p:notesMasterIdLst>
-    <p:notesMasterId r:id="rId15"/>
+    <p:notesMasterId r:id="rId16"/>
   </p:notesMasterIdLst>
   <p:sldIdLst>
     <p:sldId id="262" r:id="rId2"/>
@@ -16,11 +16,12 @@
     <p:sldId id="298" r:id="rId7"/>
     <p:sldId id="299" r:id="rId8"/>
     <p:sldId id="300" r:id="rId9"/>
-    <p:sldId id="259" r:id="rId10"/>
-    <p:sldId id="297" r:id="rId11"/>
-    <p:sldId id="294" r:id="rId12"/>
-    <p:sldId id="260" r:id="rId13"/>
-    <p:sldId id="295" r:id="rId14"/>
+    <p:sldId id="301" r:id="rId10"/>
+    <p:sldId id="259" r:id="rId11"/>
+    <p:sldId id="297" r:id="rId12"/>
+    <p:sldId id="294" r:id="rId13"/>
+    <p:sldId id="260" r:id="rId14"/>
+    <p:sldId id="295" r:id="rId15"/>
   </p:sldIdLst>
   <p:sldSz cx="12192000" cy="6858000"/>
   <p:notesSz cx="6858000" cy="9144000"/>
@@ -4295,7 +4296,13 @@
           <p:cNvGraphicFramePr>
             <a:graphicFrameLocks noGrp="1"/>
           </p:cNvGraphicFramePr>
-          <p:nvPr/>
+          <p:nvPr>
+            <p:extLst>
+              <p:ext uri="{D42A27DB-BD31-4B8C-83A1-F6EECF244321}">
+                <p14:modId xmlns:p14="http://schemas.microsoft.com/office/powerpoint/2010/main" val="1642846139"/>
+              </p:ext>
+            </p:extLst>
+          </p:nvPr>
         </p:nvGraphicFramePr>
         <p:xfrm>
           <a:off x="372940" y="1204137"/>
@@ -4658,7 +4665,13 @@
           <p:cNvGraphicFramePr>
             <a:graphicFrameLocks noGrp="1"/>
           </p:cNvGraphicFramePr>
-          <p:nvPr/>
+          <p:nvPr>
+            <p:extLst>
+              <p:ext uri="{D42A27DB-BD31-4B8C-83A1-F6EECF244321}">
+                <p14:modId xmlns:p14="http://schemas.microsoft.com/office/powerpoint/2010/main" val="397633608"/>
+              </p:ext>
+            </p:extLst>
+          </p:nvPr>
         </p:nvGraphicFramePr>
         <p:xfrm>
           <a:off x="372940" y="3122486"/>
@@ -5283,12 +5296,8 @@
               <a:buChar char="•"/>
             </a:pPr>
             <a:r>
-              <a:rPr lang="en-SG" sz="1600"/>
-              <a:t>(Under </a:t>
-            </a:r>
-            <a:r>
               <a:rPr lang="en-SG" sz="1600" dirty="0"/>
-              <a:t>development) user can add new action/edit the actions from the Web interface</a:t>
+              <a:t>(Under development) user can add new action/edit the actions from the Web interface</a:t>
             </a:r>
             <a:r>
               <a:rPr lang="en-SG" sz="1600" b="1" dirty="0"/>
@@ -5300,7 +5309,7 @@
     </p:spTree>
     <p:extLst>
       <p:ext uri="{BB962C8B-B14F-4D97-AF65-F5344CB8AC3E}">
-        <p14:creationId xmlns:p14="http://schemas.microsoft.com/office/powerpoint/2010/main" val="2724637396"/>
+        <p14:creationId xmlns:p14="http://schemas.microsoft.com/office/powerpoint/2010/main" val="2311589"/>
       </p:ext>
     </p:extLst>
   </p:cSld>
@@ -5332,7 +5341,7 @@
           <p:cNvPr id="4" name="TextBox 3">
             <a:extLst>
               <a:ext uri="{FF2B5EF4-FFF2-40B4-BE49-F238E27FC236}">
-                <a16:creationId xmlns:a16="http://schemas.microsoft.com/office/drawing/2014/main" id="{DD319421-850C-B862-91CA-94B309913F88}"/>
+                <a16:creationId xmlns:a16="http://schemas.microsoft.com/office/drawing/2014/main" id="{B2EE9385-272D-78F8-37EF-D7BFBD2E461E}"/>
               </a:ext>
             </a:extLst>
           </p:cNvPr>
@@ -5370,7 +5379,7 @@
                   <a:schemeClr val="bg1"/>
                 </a:solidFill>
               </a:rPr>
-              <a:t>User Action Emulator [System Design improvement]  </a:t>
+              <a:t>User Action Emulator [ Pre-built actors we provided and monitor UI ]  </a:t>
             </a:r>
             <a:endParaRPr lang="en-SG" sz="2400" dirty="0">
               <a:solidFill>
@@ -5385,7 +5394,7 @@
           <p:cNvPr id="5" name="Picture 4" descr="Graphical user interface, text&#10;&#10;Description automatically generated with medium confidence">
             <a:extLst>
               <a:ext uri="{FF2B5EF4-FFF2-40B4-BE49-F238E27FC236}">
-                <a16:creationId xmlns:a16="http://schemas.microsoft.com/office/drawing/2014/main" id="{9377C686-F64B-D611-CFA6-6D7DE4AAE440}"/>
+                <a16:creationId xmlns:a16="http://schemas.microsoft.com/office/drawing/2014/main" id="{CCBDD8B4-58ED-392B-004A-4336DFD8CA6A}"/>
               </a:ext>
             </a:extLst>
           </p:cNvPr>
@@ -5416,53 +5425,336 @@
           </a:prstGeom>
         </p:spPr>
       </p:pic>
-      <p:pic>
-        <p:nvPicPr>
-          <p:cNvPr id="7" name="Picture 6" descr="Diagram, timeline&#10;&#10;Description automatically generated">
-            <a:extLst>
-              <a:ext uri="{FF2B5EF4-FFF2-40B4-BE49-F238E27FC236}">
-                <a16:creationId xmlns:a16="http://schemas.microsoft.com/office/drawing/2014/main" id="{63B418EE-6954-8309-B714-CF075A2A311D}"/>
-              </a:ext>
-            </a:extLst>
-          </p:cNvPr>
-          <p:cNvPicPr>
-            <a:picLocks noChangeAspect="1"/>
-          </p:cNvPicPr>
-          <p:nvPr/>
-        </p:nvPicPr>
-        <p:blipFill>
-          <a:blip r:embed="rId3">
-            <a:extLst>
-              <a:ext uri="{28A0092B-C50C-407E-A947-70E740481C1C}">
-                <a14:useLocalDpi xmlns:a14="http://schemas.microsoft.com/office/drawing/2010/main" val="0"/>
-              </a:ext>
-            </a:extLst>
-          </a:blip>
-          <a:stretch>
-            <a:fillRect/>
-          </a:stretch>
-        </p:blipFill>
-        <p:spPr>
-          <a:xfrm>
-            <a:off x="315755" y="1408915"/>
-            <a:ext cx="3987888" cy="2243187"/>
-          </a:xfrm>
-          <a:prstGeom prst="rect">
-            <a:avLst/>
-          </a:prstGeom>
-          <a:ln w="6350">
-            <a:solidFill>
-              <a:schemeClr val="tx1"/>
-            </a:solidFill>
-          </a:ln>
-        </p:spPr>
-      </p:pic>
+      <p:graphicFrame>
+        <p:nvGraphicFramePr>
+          <p:cNvPr id="7" name="Table 5">
+            <a:extLst>
+              <a:ext uri="{FF2B5EF4-FFF2-40B4-BE49-F238E27FC236}">
+                <a16:creationId xmlns:a16="http://schemas.microsoft.com/office/drawing/2014/main" id="{24B83012-43CA-4227-7189-5FC416B45BBC}"/>
+              </a:ext>
+            </a:extLst>
+          </p:cNvPr>
+          <p:cNvGraphicFramePr>
+            <a:graphicFrameLocks noGrp="1"/>
+          </p:cNvGraphicFramePr>
+          <p:nvPr/>
+        </p:nvGraphicFramePr>
+        <p:xfrm>
+          <a:off x="372940" y="1204137"/>
+          <a:ext cx="3548820" cy="1341120"/>
+        </p:xfrm>
+        <a:graphic>
+          <a:graphicData uri="http://schemas.openxmlformats.org/drawingml/2006/table">
+            <a:tbl>
+              <a:tblPr firstRow="1" bandRow="1">
+                <a:tableStyleId>{5C22544A-7EE6-4342-B048-85BDC9FD1C3A}</a:tableStyleId>
+              </a:tblPr>
+              <a:tblGrid>
+                <a:gridCol w="380979">
+                  <a:extLst>
+                    <a:ext uri="{9D8B030D-6E8A-4147-A177-3AD203B41FA5}">
+                      <a16:colId xmlns:a16="http://schemas.microsoft.com/office/drawing/2014/main" val="3380695120"/>
+                    </a:ext>
+                  </a:extLst>
+                </a:gridCol>
+                <a:gridCol w="1087359">
+                  <a:extLst>
+                    <a:ext uri="{9D8B030D-6E8A-4147-A177-3AD203B41FA5}">
+                      <a16:colId xmlns:a16="http://schemas.microsoft.com/office/drawing/2014/main" val="308096956"/>
+                    </a:ext>
+                  </a:extLst>
+                </a:gridCol>
+                <a:gridCol w="2080482">
+                  <a:extLst>
+                    <a:ext uri="{9D8B030D-6E8A-4147-A177-3AD203B41FA5}">
+                      <a16:colId xmlns:a16="http://schemas.microsoft.com/office/drawing/2014/main" val="1115179321"/>
+                    </a:ext>
+                  </a:extLst>
+                </a:gridCol>
+              </a:tblGrid>
+              <a:tr h="370840">
+                <a:tc>
+                  <a:txBody>
+                    <a:bodyPr/>
+                    <a:lstStyle/>
+                    <a:p>
+                      <a:r>
+                        <a:rPr lang="en-SG" sz="1000" dirty="0"/>
+                        <a:t>Index</a:t>
+                      </a:r>
+                    </a:p>
+                  </a:txBody>
+                  <a:tcPr>
+                    <a:lnL w="12700" cap="flat" cmpd="sng" algn="ctr">
+                      <a:solidFill>
+                        <a:schemeClr val="tx1"/>
+                      </a:solidFill>
+                      <a:prstDash val="solid"/>
+                      <a:round/>
+                      <a:headEnd type="none" w="med" len="med"/>
+                      <a:tailEnd type="none" w="med" len="med"/>
+                    </a:lnL>
+                    <a:lnT w="12700" cap="flat" cmpd="sng" algn="ctr">
+                      <a:solidFill>
+                        <a:schemeClr val="tx1"/>
+                      </a:solidFill>
+                      <a:prstDash val="solid"/>
+                      <a:round/>
+                      <a:headEnd type="none" w="med" len="med"/>
+                      <a:tailEnd type="none" w="med" len="med"/>
+                    </a:lnT>
+                  </a:tcPr>
+                </a:tc>
+                <a:tc>
+                  <a:txBody>
+                    <a:bodyPr/>
+                    <a:lstStyle/>
+                    <a:p>
+                      <a:r>
+                        <a:rPr lang="en-SG" sz="1000" dirty="0"/>
+                        <a:t>Actor module name</a:t>
+                      </a:r>
+                    </a:p>
+                  </a:txBody>
+                  <a:tcPr>
+                    <a:lnT w="12700" cap="flat" cmpd="sng" algn="ctr">
+                      <a:solidFill>
+                        <a:schemeClr val="tx1"/>
+                      </a:solidFill>
+                      <a:prstDash val="solid"/>
+                      <a:round/>
+                      <a:headEnd type="none" w="med" len="med"/>
+                      <a:tailEnd type="none" w="med" len="med"/>
+                    </a:lnT>
+                  </a:tcPr>
+                </a:tc>
+                <a:tc>
+                  <a:txBody>
+                    <a:bodyPr/>
+                    <a:lstStyle/>
+                    <a:p>
+                      <a:r>
+                        <a:rPr lang="en-SG" sz="1000" dirty="0"/>
+                        <a:t>Function provided</a:t>
+                      </a:r>
+                    </a:p>
+                  </a:txBody>
+                  <a:tcPr>
+                    <a:lnR w="12700" cap="flat" cmpd="sng" algn="ctr">
+                      <a:solidFill>
+                        <a:schemeClr val="tx1"/>
+                      </a:solidFill>
+                      <a:prstDash val="solid"/>
+                      <a:round/>
+                      <a:headEnd type="none" w="med" len="med"/>
+                      <a:tailEnd type="none" w="med" len="med"/>
+                    </a:lnR>
+                    <a:lnT w="12700" cap="flat" cmpd="sng" algn="ctr">
+                      <a:solidFill>
+                        <a:schemeClr val="tx1"/>
+                      </a:solidFill>
+                      <a:prstDash val="solid"/>
+                      <a:round/>
+                      <a:headEnd type="none" w="med" len="med"/>
+                      <a:tailEnd type="none" w="med" len="med"/>
+                    </a:lnT>
+                  </a:tcPr>
+                </a:tc>
+                <a:extLst>
+                  <a:ext uri="{0D108BD9-81ED-4DB2-BD59-A6C34878D82A}">
+                    <a16:rowId xmlns:a16="http://schemas.microsoft.com/office/drawing/2014/main" val="896556790"/>
+                  </a:ext>
+                </a:extLst>
+              </a:tr>
+              <a:tr h="370840">
+                <a:tc>
+                  <a:txBody>
+                    <a:bodyPr/>
+                    <a:lstStyle/>
+                    <a:p>
+                      <a:r>
+                        <a:rPr lang="en-SG" sz="1000" dirty="0"/>
+                        <a:t>1</a:t>
+                      </a:r>
+                    </a:p>
+                  </a:txBody>
+                  <a:tcPr>
+                    <a:lnL w="12700" cap="flat" cmpd="sng" algn="ctr">
+                      <a:solidFill>
+                        <a:schemeClr val="tx1"/>
+                      </a:solidFill>
+                      <a:prstDash val="solid"/>
+                      <a:round/>
+                      <a:headEnd type="none" w="med" len="med"/>
+                      <a:tailEnd type="none" w="med" len="med"/>
+                    </a:lnL>
+                  </a:tcPr>
+                </a:tc>
+                <a:tc>
+                  <a:txBody>
+                    <a:bodyPr/>
+                    <a:lstStyle/>
+                    <a:p>
+                      <a:r>
+                        <a:rPr lang="en-SG" sz="1000" b="0" kern="1200" dirty="0">
+                          <a:solidFill>
+                            <a:schemeClr val="dk1"/>
+                          </a:solidFill>
+                          <a:effectLst/>
+                        </a:rPr>
+                        <a:t>CmdActor</a:t>
+                      </a:r>
+                      <a:endParaRPr lang="en-SG" sz="1000" dirty="0"/>
+                    </a:p>
+                  </a:txBody>
+                  <a:tcPr/>
+                </a:tc>
+                <a:tc>
+                  <a:txBody>
+                    <a:bodyPr/>
+                    <a:lstStyle/>
+                    <a:p>
+                      <a:r>
+                        <a:rPr lang="en-US" sz="1000" b="0" kern="1200" dirty="0">
+                          <a:solidFill>
+                            <a:schemeClr val="dk1"/>
+                          </a:solidFill>
+                          <a:effectLst/>
+                        </a:rPr>
+                        <a:t>Run Window/Linux  commend under cmd or PowerShell.</a:t>
+                      </a:r>
+                      <a:endParaRPr lang="en-SG" sz="1000" dirty="0"/>
+                    </a:p>
+                  </a:txBody>
+                  <a:tcPr>
+                    <a:lnR w="12700" cap="flat" cmpd="sng" algn="ctr">
+                      <a:solidFill>
+                        <a:schemeClr val="tx1"/>
+                      </a:solidFill>
+                      <a:prstDash val="solid"/>
+                      <a:round/>
+                      <a:headEnd type="none" w="med" len="med"/>
+                      <a:tailEnd type="none" w="med" len="med"/>
+                    </a:lnR>
+                  </a:tcPr>
+                </a:tc>
+                <a:extLst>
+                  <a:ext uri="{0D108BD9-81ED-4DB2-BD59-A6C34878D82A}">
+                    <a16:rowId xmlns:a16="http://schemas.microsoft.com/office/drawing/2014/main" val="553099790"/>
+                  </a:ext>
+                </a:extLst>
+              </a:tr>
+              <a:tr h="370840">
+                <a:tc>
+                  <a:txBody>
+                    <a:bodyPr/>
+                    <a:lstStyle/>
+                    <a:p>
+                      <a:r>
+                        <a:rPr lang="en-SG" sz="1000" dirty="0"/>
+                        <a:t>2</a:t>
+                      </a:r>
+                    </a:p>
+                  </a:txBody>
+                  <a:tcPr>
+                    <a:lnL w="12700" cap="flat" cmpd="sng" algn="ctr">
+                      <a:solidFill>
+                        <a:schemeClr val="tx1"/>
+                      </a:solidFill>
+                      <a:prstDash val="solid"/>
+                      <a:round/>
+                      <a:headEnd type="none" w="med" len="med"/>
+                      <a:tailEnd type="none" w="med" len="med"/>
+                    </a:lnL>
+                    <a:lnB w="12700" cap="flat" cmpd="sng" algn="ctr">
+                      <a:solidFill>
+                        <a:schemeClr val="tx1"/>
+                      </a:solidFill>
+                      <a:prstDash val="solid"/>
+                      <a:round/>
+                      <a:headEnd type="none" w="med" len="med"/>
+                      <a:tailEnd type="none" w="med" len="med"/>
+                    </a:lnB>
+                  </a:tcPr>
+                </a:tc>
+                <a:tc>
+                  <a:txBody>
+                    <a:bodyPr/>
+                    <a:lstStyle/>
+                    <a:p>
+                      <a:r>
+                        <a:rPr lang="en-SG" sz="1000" b="0" kern="1200" dirty="0">
+                          <a:solidFill>
+                            <a:schemeClr val="dk1"/>
+                          </a:solidFill>
+                          <a:effectLst/>
+                        </a:rPr>
+                        <a:t>SettingActor</a:t>
+                      </a:r>
+                      <a:endParaRPr lang="en-SG" sz="1000" dirty="0"/>
+                    </a:p>
+                  </a:txBody>
+                  <a:tcPr>
+                    <a:lnB w="12700" cap="flat" cmpd="sng" algn="ctr">
+                      <a:solidFill>
+                        <a:schemeClr val="tx1"/>
+                      </a:solidFill>
+                      <a:prstDash val="solid"/>
+                      <a:round/>
+                      <a:headEnd type="none" w="med" len="med"/>
+                      <a:tailEnd type="none" w="med" len="med"/>
+                    </a:lnB>
+                  </a:tcPr>
+                </a:tc>
+                <a:tc>
+                  <a:txBody>
+                    <a:bodyPr/>
+                    <a:lstStyle/>
+                    <a:p>
+                      <a:r>
+                        <a:rPr lang="en-US" sz="1000" dirty="0"/>
+                        <a:t>Change some OS setting (on/off firewall, change display bg, sort desktop, reboot)</a:t>
+                      </a:r>
+                      <a:endParaRPr lang="en-SG" sz="1000" dirty="0"/>
+                    </a:p>
+                  </a:txBody>
+                  <a:tcPr>
+                    <a:lnR w="12700" cap="flat" cmpd="sng" algn="ctr">
+                      <a:solidFill>
+                        <a:schemeClr val="tx1"/>
+                      </a:solidFill>
+                      <a:prstDash val="solid"/>
+                      <a:round/>
+                      <a:headEnd type="none" w="med" len="med"/>
+                      <a:tailEnd type="none" w="med" len="med"/>
+                    </a:lnR>
+                    <a:lnB w="12700" cap="flat" cmpd="sng" algn="ctr">
+                      <a:solidFill>
+                        <a:schemeClr val="tx1"/>
+                      </a:solidFill>
+                      <a:prstDash val="solid"/>
+                      <a:round/>
+                      <a:headEnd type="none" w="med" len="med"/>
+                      <a:tailEnd type="none" w="med" len="med"/>
+                    </a:lnB>
+                  </a:tcPr>
+                </a:tc>
+                <a:extLst>
+                  <a:ext uri="{0D108BD9-81ED-4DB2-BD59-A6C34878D82A}">
+                    <a16:rowId xmlns:a16="http://schemas.microsoft.com/office/drawing/2014/main" val="3476181168"/>
+                  </a:ext>
+                </a:extLst>
+              </a:tr>
+            </a:tbl>
+          </a:graphicData>
+        </a:graphic>
+      </p:graphicFrame>
       <p:sp>
         <p:nvSpPr>
-          <p:cNvPr id="11" name="TextBox 10">
-            <a:extLst>
-              <a:ext uri="{FF2B5EF4-FFF2-40B4-BE49-F238E27FC236}">
-                <a16:creationId xmlns:a16="http://schemas.microsoft.com/office/drawing/2014/main" id="{3F0E355A-FC61-65D3-3012-F75DE5F253DD}"/>
+          <p:cNvPr id="8" name="TextBox 7">
+            <a:extLst>
+              <a:ext uri="{FF2B5EF4-FFF2-40B4-BE49-F238E27FC236}">
+                <a16:creationId xmlns:a16="http://schemas.microsoft.com/office/drawing/2014/main" id="{138EFD8C-376B-7A8F-739A-6047F97BE298}"/>
               </a:ext>
             </a:extLst>
           </p:cNvPr>
@@ -5471,8 +5763,8 @@
         </p:nvSpPr>
         <p:spPr>
           <a:xfrm>
-            <a:off x="315755" y="682923"/>
-            <a:ext cx="3599930" cy="338554"/>
+            <a:off x="259568" y="755026"/>
+            <a:ext cx="4269408" cy="338554"/>
           </a:xfrm>
           <a:prstGeom prst="rect">
             <a:avLst/>
@@ -5487,99 +5779,479 @@
           <a:p>
             <a:r>
               <a:rPr lang="en-US" sz="1600" b="1" dirty="0"/>
-              <a:t>System workflow diagram (old) </a:t>
+              <a:t>System Operation Actors </a:t>
+            </a:r>
+            <a:r>
+              <a:rPr lang="en-SG" sz="1600" b="1" dirty="0"/>
+              <a:t>Repository </a:t>
             </a:r>
           </a:p>
         </p:txBody>
       </p:sp>
-      <p:pic>
-        <p:nvPicPr>
-          <p:cNvPr id="3" name="Picture 2" descr="Timeline&#10;&#10;Description automatically generated">
-            <a:extLst>
-              <a:ext uri="{FF2B5EF4-FFF2-40B4-BE49-F238E27FC236}">
-                <a16:creationId xmlns:a16="http://schemas.microsoft.com/office/drawing/2014/main" id="{76FD506A-C0AE-9574-C404-F411BBFEEFE2}"/>
-              </a:ext>
-            </a:extLst>
-          </p:cNvPr>
-          <p:cNvPicPr>
-            <a:picLocks noChangeAspect="1"/>
-          </p:cNvPicPr>
-          <p:nvPr/>
-        </p:nvPicPr>
-        <p:blipFill>
-          <a:blip r:embed="rId4">
-            <a:extLst>
-              <a:ext uri="{28A0092B-C50C-407E-A947-70E740481C1C}">
-                <a14:useLocalDpi xmlns:a14="http://schemas.microsoft.com/office/drawing/2010/main" val="0"/>
-              </a:ext>
-            </a:extLst>
-          </a:blip>
-          <a:stretch>
-            <a:fillRect/>
-          </a:stretch>
-        </p:blipFill>
-        <p:spPr>
-          <a:xfrm>
-            <a:off x="4664763" y="2236321"/>
-            <a:ext cx="7527236" cy="4234070"/>
-          </a:xfrm>
-          <a:prstGeom prst="rect">
-            <a:avLst/>
-          </a:prstGeom>
-          <a:ln w="12700">
-            <a:solidFill>
-              <a:schemeClr val="tx1"/>
-            </a:solidFill>
-          </a:ln>
-        </p:spPr>
-      </p:pic>
-      <p:cxnSp>
-        <p:nvCxnSpPr>
-          <p:cNvPr id="9" name="Connector: Elbow 8">
-            <a:extLst>
-              <a:ext uri="{FF2B5EF4-FFF2-40B4-BE49-F238E27FC236}">
-                <a16:creationId xmlns:a16="http://schemas.microsoft.com/office/drawing/2014/main" id="{97A19B67-1F9B-BCBF-4D6F-AC9511FD1863}"/>
-              </a:ext>
-            </a:extLst>
-          </p:cNvPr>
-          <p:cNvCxnSpPr/>
-          <p:nvPr/>
-        </p:nvCxnSpPr>
-        <p:spPr>
-          <a:xfrm>
-            <a:off x="4373217" y="1639973"/>
-            <a:ext cx="1421295" cy="596348"/>
-          </a:xfrm>
-          <a:prstGeom prst="bentConnector3">
-            <a:avLst>
-              <a:gd name="adj1" fmla="val 99650"/>
-            </a:avLst>
-          </a:prstGeom>
-          <a:ln w="28575">
-            <a:tailEnd type="triangle"/>
-          </a:ln>
-        </p:spPr>
-        <p:style>
-          <a:lnRef idx="1">
-            <a:schemeClr val="accent1"/>
-          </a:lnRef>
-          <a:fillRef idx="0">
-            <a:schemeClr val="accent1"/>
-          </a:fillRef>
-          <a:effectRef idx="0">
-            <a:schemeClr val="accent1"/>
-          </a:effectRef>
-          <a:fontRef idx="minor">
-            <a:schemeClr val="tx1"/>
-          </a:fontRef>
-        </p:style>
-      </p:cxnSp>
+      <p:graphicFrame>
+        <p:nvGraphicFramePr>
+          <p:cNvPr id="9" name="Table 5">
+            <a:extLst>
+              <a:ext uri="{FF2B5EF4-FFF2-40B4-BE49-F238E27FC236}">
+                <a16:creationId xmlns:a16="http://schemas.microsoft.com/office/drawing/2014/main" id="{C0D742AC-0B12-6BEA-176A-BE437E45E5D3}"/>
+              </a:ext>
+            </a:extLst>
+          </p:cNvPr>
+          <p:cNvGraphicFramePr>
+            <a:graphicFrameLocks noGrp="1"/>
+          </p:cNvGraphicFramePr>
+          <p:nvPr/>
+        </p:nvGraphicFramePr>
+        <p:xfrm>
+          <a:off x="372940" y="3122486"/>
+          <a:ext cx="3548820" cy="2064989"/>
+        </p:xfrm>
+        <a:graphic>
+          <a:graphicData uri="http://schemas.openxmlformats.org/drawingml/2006/table">
+            <a:tbl>
+              <a:tblPr firstRow="1" bandRow="1">
+                <a:tableStyleId>{5C22544A-7EE6-4342-B048-85BDC9FD1C3A}</a:tableStyleId>
+              </a:tblPr>
+              <a:tblGrid>
+                <a:gridCol w="380979">
+                  <a:extLst>
+                    <a:ext uri="{9D8B030D-6E8A-4147-A177-3AD203B41FA5}">
+                      <a16:colId xmlns:a16="http://schemas.microsoft.com/office/drawing/2014/main" val="3380695120"/>
+                    </a:ext>
+                  </a:extLst>
+                </a:gridCol>
+                <a:gridCol w="1006894">
+                  <a:extLst>
+                    <a:ext uri="{9D8B030D-6E8A-4147-A177-3AD203B41FA5}">
+                      <a16:colId xmlns:a16="http://schemas.microsoft.com/office/drawing/2014/main" val="308096956"/>
+                    </a:ext>
+                  </a:extLst>
+                </a:gridCol>
+                <a:gridCol w="2160947">
+                  <a:extLst>
+                    <a:ext uri="{9D8B030D-6E8A-4147-A177-3AD203B41FA5}">
+                      <a16:colId xmlns:a16="http://schemas.microsoft.com/office/drawing/2014/main" val="1115179321"/>
+                    </a:ext>
+                  </a:extLst>
+                </a:gridCol>
+              </a:tblGrid>
+              <a:tr h="353412">
+                <a:tc>
+                  <a:txBody>
+                    <a:bodyPr/>
+                    <a:lstStyle/>
+                    <a:p>
+                      <a:r>
+                        <a:rPr lang="en-SG" sz="1000" dirty="0"/>
+                        <a:t>Index</a:t>
+                      </a:r>
+                    </a:p>
+                  </a:txBody>
+                  <a:tcPr>
+                    <a:lnL w="12700" cap="flat" cmpd="sng" algn="ctr">
+                      <a:solidFill>
+                        <a:schemeClr val="tx1"/>
+                      </a:solidFill>
+                      <a:prstDash val="solid"/>
+                      <a:round/>
+                      <a:headEnd type="none" w="med" len="med"/>
+                      <a:tailEnd type="none" w="med" len="med"/>
+                    </a:lnL>
+                    <a:lnT w="12700" cap="flat" cmpd="sng" algn="ctr">
+                      <a:solidFill>
+                        <a:schemeClr val="tx1"/>
+                      </a:solidFill>
+                      <a:prstDash val="solid"/>
+                      <a:round/>
+                      <a:headEnd type="none" w="med" len="med"/>
+                      <a:tailEnd type="none" w="med" len="med"/>
+                    </a:lnT>
+                  </a:tcPr>
+                </a:tc>
+                <a:tc>
+                  <a:txBody>
+                    <a:bodyPr/>
+                    <a:lstStyle/>
+                    <a:p>
+                      <a:r>
+                        <a:rPr lang="en-SG" sz="1000" dirty="0"/>
+                        <a:t>Actor module name</a:t>
+                      </a:r>
+                    </a:p>
+                  </a:txBody>
+                  <a:tcPr>
+                    <a:lnT w="12700" cap="flat" cmpd="sng" algn="ctr">
+                      <a:solidFill>
+                        <a:schemeClr val="tx1"/>
+                      </a:solidFill>
+                      <a:prstDash val="solid"/>
+                      <a:round/>
+                      <a:headEnd type="none" w="med" len="med"/>
+                      <a:tailEnd type="none" w="med" len="med"/>
+                    </a:lnT>
+                  </a:tcPr>
+                </a:tc>
+                <a:tc>
+                  <a:txBody>
+                    <a:bodyPr/>
+                    <a:lstStyle/>
+                    <a:p>
+                      <a:r>
+                        <a:rPr lang="en-SG" sz="1000" dirty="0"/>
+                        <a:t>Function provided</a:t>
+                      </a:r>
+                    </a:p>
+                  </a:txBody>
+                  <a:tcPr>
+                    <a:lnR w="12700" cap="flat" cmpd="sng" algn="ctr">
+                      <a:solidFill>
+                        <a:schemeClr val="tx1"/>
+                      </a:solidFill>
+                      <a:prstDash val="solid"/>
+                      <a:round/>
+                      <a:headEnd type="none" w="med" len="med"/>
+                      <a:tailEnd type="none" w="med" len="med"/>
+                    </a:lnR>
+                    <a:lnT w="12700" cap="flat" cmpd="sng" algn="ctr">
+                      <a:solidFill>
+                        <a:schemeClr val="tx1"/>
+                      </a:solidFill>
+                      <a:prstDash val="solid"/>
+                      <a:round/>
+                      <a:headEnd type="none" w="med" len="med"/>
+                      <a:tailEnd type="none" w="med" len="med"/>
+                    </a:lnT>
+                  </a:tcPr>
+                </a:tc>
+                <a:extLst>
+                  <a:ext uri="{0D108BD9-81ED-4DB2-BD59-A6C34878D82A}">
+                    <a16:rowId xmlns:a16="http://schemas.microsoft.com/office/drawing/2014/main" val="896556790"/>
+                  </a:ext>
+                </a:extLst>
+              </a:tr>
+              <a:tr h="522857">
+                <a:tc>
+                  <a:txBody>
+                    <a:bodyPr/>
+                    <a:lstStyle/>
+                    <a:p>
+                      <a:r>
+                        <a:rPr lang="en-SG" sz="1000" dirty="0"/>
+                        <a:t>1</a:t>
+                      </a:r>
+                    </a:p>
+                  </a:txBody>
+                  <a:tcPr>
+                    <a:lnL w="12700" cap="flat" cmpd="sng" algn="ctr">
+                      <a:solidFill>
+                        <a:schemeClr val="tx1"/>
+                      </a:solidFill>
+                      <a:prstDash val="solid"/>
+                      <a:round/>
+                      <a:headEnd type="none" w="med" len="med"/>
+                      <a:tailEnd type="none" w="med" len="med"/>
+                    </a:lnL>
+                  </a:tcPr>
+                </a:tc>
+                <a:tc>
+                  <a:txBody>
+                    <a:bodyPr/>
+                    <a:lstStyle/>
+                    <a:p>
+                      <a:r>
+                        <a:rPr lang="en-SG" sz="1000" b="0" kern="1200" dirty="0">
+                          <a:solidFill>
+                            <a:schemeClr val="dk1"/>
+                          </a:solidFill>
+                          <a:effectLst/>
+                        </a:rPr>
+                        <a:t>SerialConnector</a:t>
+                      </a:r>
+                      <a:endParaRPr lang="en-SG" sz="1000" dirty="0"/>
+                    </a:p>
+                  </a:txBody>
+                  <a:tcPr/>
+                </a:tc>
+                <a:tc>
+                  <a:txBody>
+                    <a:bodyPr/>
+                    <a:lstStyle/>
+                    <a:p>
+                      <a:r>
+                        <a:rPr lang="en-US" sz="1000" b="0" kern="1200" dirty="0">
+                          <a:solidFill>
+                            <a:schemeClr val="dk1"/>
+                          </a:solidFill>
+                          <a:effectLst/>
+                        </a:rPr>
+                        <a:t>Send and read message to/from COM port.</a:t>
+                      </a:r>
+                      <a:endParaRPr lang="en-SG" sz="1000" dirty="0"/>
+                    </a:p>
+                  </a:txBody>
+                  <a:tcPr>
+                    <a:lnR w="12700" cap="flat" cmpd="sng" algn="ctr">
+                      <a:solidFill>
+                        <a:schemeClr val="tx1"/>
+                      </a:solidFill>
+                      <a:prstDash val="solid"/>
+                      <a:round/>
+                      <a:headEnd type="none" w="med" len="med"/>
+                      <a:tailEnd type="none" w="med" len="med"/>
+                    </a:lnR>
+                  </a:tcPr>
+                </a:tc>
+                <a:extLst>
+                  <a:ext uri="{0D108BD9-81ED-4DB2-BD59-A6C34878D82A}">
+                    <a16:rowId xmlns:a16="http://schemas.microsoft.com/office/drawing/2014/main" val="553099790"/>
+                  </a:ext>
+                </a:extLst>
+              </a:tr>
+              <a:tr h="353412">
+                <a:tc>
+                  <a:txBody>
+                    <a:bodyPr/>
+                    <a:lstStyle/>
+                    <a:p>
+                      <a:r>
+                        <a:rPr lang="en-SG" sz="1000" dirty="0"/>
+                        <a:t>2</a:t>
+                      </a:r>
+                    </a:p>
+                  </a:txBody>
+                  <a:tcPr>
+                    <a:lnL w="12700" cap="flat" cmpd="sng" algn="ctr">
+                      <a:solidFill>
+                        <a:schemeClr val="tx1"/>
+                      </a:solidFill>
+                      <a:prstDash val="solid"/>
+                      <a:round/>
+                      <a:headEnd type="none" w="med" len="med"/>
+                      <a:tailEnd type="none" w="med" len="med"/>
+                    </a:lnL>
+                  </a:tcPr>
+                </a:tc>
+                <a:tc>
+                  <a:txBody>
+                    <a:bodyPr/>
+                    <a:lstStyle/>
+                    <a:p>
+                      <a:r>
+                        <a:rPr lang="en-SG" sz="1000" b="0" kern="1200" dirty="0">
+                          <a:solidFill>
+                            <a:schemeClr val="dk1"/>
+                          </a:solidFill>
+                          <a:effectLst/>
+                        </a:rPr>
+                        <a:t>camEchoServer</a:t>
+                      </a:r>
+                      <a:endParaRPr lang="en-SG" sz="1000" dirty="0"/>
+                    </a:p>
+                  </a:txBody>
+                  <a:tcPr/>
+                </a:tc>
+                <a:tc>
+                  <a:txBody>
+                    <a:bodyPr/>
+                    <a:lstStyle/>
+                    <a:p>
+                      <a:r>
+                        <a:rPr lang="en-US" sz="1000" dirty="0"/>
+                        <a:t>Computer built in camera/usb camera video read record. Start a HLS server.</a:t>
+                      </a:r>
+                      <a:endParaRPr lang="en-SG" sz="1000" dirty="0"/>
+                    </a:p>
+                  </a:txBody>
+                  <a:tcPr>
+                    <a:lnR w="12700" cap="flat" cmpd="sng" algn="ctr">
+                      <a:solidFill>
+                        <a:schemeClr val="tx1"/>
+                      </a:solidFill>
+                      <a:prstDash val="solid"/>
+                      <a:round/>
+                      <a:headEnd type="none" w="med" len="med"/>
+                      <a:tailEnd type="none" w="med" len="med"/>
+                    </a:lnR>
+                  </a:tcPr>
+                </a:tc>
+                <a:extLst>
+                  <a:ext uri="{0D108BD9-81ED-4DB2-BD59-A6C34878D82A}">
+                    <a16:rowId xmlns:a16="http://schemas.microsoft.com/office/drawing/2014/main" val="3476181168"/>
+                  </a:ext>
+                </a:extLst>
+              </a:tr>
+              <a:tr h="353412">
+                <a:tc>
+                  <a:txBody>
+                    <a:bodyPr/>
+                    <a:lstStyle/>
+                    <a:p>
+                      <a:r>
+                        <a:rPr lang="en-SG" sz="1000" dirty="0"/>
+                        <a:t>3</a:t>
+                      </a:r>
+                    </a:p>
+                  </a:txBody>
+                  <a:tcPr>
+                    <a:lnL w="12700" cap="flat" cmpd="sng" algn="ctr">
+                      <a:solidFill>
+                        <a:schemeClr val="tx1"/>
+                      </a:solidFill>
+                      <a:prstDash val="solid"/>
+                      <a:round/>
+                      <a:headEnd type="none" w="med" len="med"/>
+                      <a:tailEnd type="none" w="med" len="med"/>
+                    </a:lnL>
+                  </a:tcPr>
+                </a:tc>
+                <a:tc>
+                  <a:txBody>
+                    <a:bodyPr/>
+                    <a:lstStyle/>
+                    <a:p>
+                      <a:r>
+                        <a:rPr lang="en-SG" sz="1000" dirty="0"/>
+                        <a:t>ScreanRecorder</a:t>
+                      </a:r>
+                    </a:p>
+                  </a:txBody>
+                  <a:tcPr/>
+                </a:tc>
+                <a:tc>
+                  <a:txBody>
+                    <a:bodyPr/>
+                    <a:lstStyle/>
+                    <a:p>
+                      <a:r>
+                        <a:rPr lang="en-US" sz="1000" dirty="0"/>
+                        <a:t>snapshot the screen under frequency.</a:t>
+                      </a:r>
+                      <a:endParaRPr lang="en-SG" sz="1000" dirty="0"/>
+                    </a:p>
+                  </a:txBody>
+                  <a:tcPr>
+                    <a:lnR w="12700" cap="flat" cmpd="sng" algn="ctr">
+                      <a:solidFill>
+                        <a:schemeClr val="tx1"/>
+                      </a:solidFill>
+                      <a:prstDash val="solid"/>
+                      <a:round/>
+                      <a:headEnd type="none" w="med" len="med"/>
+                      <a:tailEnd type="none" w="med" len="med"/>
+                    </a:lnR>
+                  </a:tcPr>
+                </a:tc>
+                <a:extLst>
+                  <a:ext uri="{0D108BD9-81ED-4DB2-BD59-A6C34878D82A}">
+                    <a16:rowId xmlns:a16="http://schemas.microsoft.com/office/drawing/2014/main" val="3794426225"/>
+                  </a:ext>
+                </a:extLst>
+              </a:tr>
+              <a:tr h="353412">
+                <a:tc>
+                  <a:txBody>
+                    <a:bodyPr/>
+                    <a:lstStyle/>
+                    <a:p>
+                      <a:r>
+                        <a:rPr lang="en-SG" sz="1000" dirty="0"/>
+                        <a:t>4</a:t>
+                      </a:r>
+                    </a:p>
+                  </a:txBody>
+                  <a:tcPr>
+                    <a:lnL w="12700" cap="flat" cmpd="sng" algn="ctr">
+                      <a:solidFill>
+                        <a:schemeClr val="tx1"/>
+                      </a:solidFill>
+                      <a:prstDash val="solid"/>
+                      <a:round/>
+                      <a:headEnd type="none" w="med" len="med"/>
+                      <a:tailEnd type="none" w="med" len="med"/>
+                    </a:lnL>
+                    <a:lnB w="12700" cap="flat" cmpd="sng" algn="ctr">
+                      <a:solidFill>
+                        <a:schemeClr val="tx1"/>
+                      </a:solidFill>
+                      <a:prstDash val="solid"/>
+                      <a:round/>
+                      <a:headEnd type="none" w="med" len="med"/>
+                      <a:tailEnd type="none" w="med" len="med"/>
+                    </a:lnB>
+                  </a:tcPr>
+                </a:tc>
+                <a:tc>
+                  <a:txBody>
+                    <a:bodyPr/>
+                    <a:lstStyle/>
+                    <a:p>
+                      <a:r>
+                        <a:rPr lang="en-SG" sz="1000" dirty="0"/>
+                        <a:t>DBHandler</a:t>
+                      </a:r>
+                    </a:p>
+                  </a:txBody>
+                  <a:tcPr>
+                    <a:lnB w="12700" cap="flat" cmpd="sng" algn="ctr">
+                      <a:solidFill>
+                        <a:schemeClr val="tx1"/>
+                      </a:solidFill>
+                      <a:prstDash val="solid"/>
+                      <a:round/>
+                      <a:headEnd type="none" w="med" len="med"/>
+                      <a:tailEnd type="none" w="med" len="med"/>
+                    </a:lnB>
+                  </a:tcPr>
+                </a:tc>
+                <a:tc>
+                  <a:txBody>
+                    <a:bodyPr/>
+                    <a:lstStyle/>
+                    <a:p>
+                      <a:r>
+                        <a:rPr lang="en-US" sz="1000" dirty="0"/>
+                        <a:t>DataBase (SQLite3, influxDB, arangodb) access action simulator.</a:t>
+                      </a:r>
+                      <a:endParaRPr lang="en-SG" sz="1000" dirty="0"/>
+                    </a:p>
+                  </a:txBody>
+                  <a:tcPr>
+                    <a:lnR w="12700" cap="flat" cmpd="sng" algn="ctr">
+                      <a:solidFill>
+                        <a:schemeClr val="tx1"/>
+                      </a:solidFill>
+                      <a:prstDash val="solid"/>
+                      <a:round/>
+                      <a:headEnd type="none" w="med" len="med"/>
+                      <a:tailEnd type="none" w="med" len="med"/>
+                    </a:lnR>
+                    <a:lnB w="12700" cap="flat" cmpd="sng" algn="ctr">
+                      <a:solidFill>
+                        <a:schemeClr val="tx1"/>
+                      </a:solidFill>
+                      <a:prstDash val="solid"/>
+                      <a:round/>
+                      <a:headEnd type="none" w="med" len="med"/>
+                      <a:tailEnd type="none" w="med" len="med"/>
+                    </a:lnB>
+                  </a:tcPr>
+                </a:tc>
+                <a:extLst>
+                  <a:ext uri="{0D108BD9-81ED-4DB2-BD59-A6C34878D82A}">
+                    <a16:rowId xmlns:a16="http://schemas.microsoft.com/office/drawing/2014/main" val="3781525643"/>
+                  </a:ext>
+                </a:extLst>
+              </a:tr>
+            </a:tbl>
+          </a:graphicData>
+        </a:graphic>
+      </p:graphicFrame>
       <p:sp>
         <p:nvSpPr>
-          <p:cNvPr id="14" name="TextBox 13">
-            <a:extLst>
-              <a:ext uri="{FF2B5EF4-FFF2-40B4-BE49-F238E27FC236}">
-                <a16:creationId xmlns:a16="http://schemas.microsoft.com/office/drawing/2014/main" id="{33A3B9DA-860D-6767-0D01-9544927397E4}"/>
+          <p:cNvPr id="10" name="TextBox 9">
+            <a:extLst>
+              <a:ext uri="{FF2B5EF4-FFF2-40B4-BE49-F238E27FC236}">
+                <a16:creationId xmlns:a16="http://schemas.microsoft.com/office/drawing/2014/main" id="{DABC52E8-651F-68A0-4FD1-0C1389D4F432}"/>
               </a:ext>
             </a:extLst>
           </p:cNvPr>
@@ -5588,8 +6260,8 @@
         </p:nvSpPr>
         <p:spPr>
           <a:xfrm>
-            <a:off x="5864086" y="1702223"/>
-            <a:ext cx="3599930" cy="338554"/>
+            <a:off x="259568" y="2670028"/>
+            <a:ext cx="4269408" cy="338554"/>
           </a:xfrm>
           <a:prstGeom prst="rect">
             <a:avLst/>
@@ -5603,85 +6275,28 @@
           <a:lstStyle/>
           <a:p>
             <a:r>
-              <a:rPr lang="en-US" sz="1600" b="1" dirty="0"/>
-              <a:t>System workflow diagram (Current) </a:t>
+              <a:rPr lang="en-SG" sz="1600" b="1" dirty="0"/>
+              <a:t>Other Action Repository</a:t>
             </a:r>
           </a:p>
         </p:txBody>
       </p:sp>
       <p:sp>
         <p:nvSpPr>
-          <p:cNvPr id="15" name="Rectangle 14">
-            <a:extLst>
-              <a:ext uri="{FF2B5EF4-FFF2-40B4-BE49-F238E27FC236}">
-                <a16:creationId xmlns:a16="http://schemas.microsoft.com/office/drawing/2014/main" id="{182A3384-A5FD-A59D-7B50-1974EE7A5A56}"/>
-              </a:ext>
-            </a:extLst>
-          </p:cNvPr>
-          <p:cNvSpPr/>
+          <p:cNvPr id="2" name="TextBox 1">
+            <a:extLst>
+              <a:ext uri="{FF2B5EF4-FFF2-40B4-BE49-F238E27FC236}">
+                <a16:creationId xmlns:a16="http://schemas.microsoft.com/office/drawing/2014/main" id="{94E06D7B-D6E9-8DFE-3944-24B0157E4E43}"/>
+              </a:ext>
+            </a:extLst>
+          </p:cNvPr>
+          <p:cNvSpPr txBox="1"/>
           <p:nvPr/>
         </p:nvSpPr>
         <p:spPr>
           <a:xfrm>
-            <a:off x="7851913" y="2971800"/>
-            <a:ext cx="1550504" cy="2673626"/>
-          </a:xfrm>
-          <a:prstGeom prst="rect">
-            <a:avLst/>
-          </a:prstGeom>
-          <a:noFill/>
-          <a:ln w="28575">
-            <a:solidFill>
-              <a:srgbClr val="FF0000"/>
-            </a:solidFill>
-            <a:prstDash val="sysDot"/>
-          </a:ln>
-        </p:spPr>
-        <p:style>
-          <a:lnRef idx="2">
-            <a:schemeClr val="accent1">
-              <a:shade val="50000"/>
-            </a:schemeClr>
-          </a:lnRef>
-          <a:fillRef idx="1">
-            <a:schemeClr val="accent1"/>
-          </a:fillRef>
-          <a:effectRef idx="0">
-            <a:schemeClr val="accent1"/>
-          </a:effectRef>
-          <a:fontRef idx="minor">
-            <a:schemeClr val="lt1"/>
-          </a:fontRef>
-        </p:style>
-        <p:txBody>
-          <a:bodyPr rtlCol="0" anchor="ctr"/>
-          <a:lstStyle/>
-          <a:p>
-            <a:pPr algn="ctr"/>
-            <a:endParaRPr lang="en-SG" dirty="0">
-              <a:solidFill>
-                <a:srgbClr val="FF0000"/>
-              </a:solidFill>
-            </a:endParaRPr>
-          </a:p>
-        </p:txBody>
-      </p:sp>
-      <p:sp>
-        <p:nvSpPr>
-          <p:cNvPr id="16" name="TextBox 15">
-            <a:extLst>
-              <a:ext uri="{FF2B5EF4-FFF2-40B4-BE49-F238E27FC236}">
-                <a16:creationId xmlns:a16="http://schemas.microsoft.com/office/drawing/2014/main" id="{3ADC4CFC-CE6F-274D-4049-06121D09B80A}"/>
-              </a:ext>
-            </a:extLst>
-          </p:cNvPr>
-          <p:cNvSpPr txBox="1"/>
-          <p:nvPr/>
-        </p:nvSpPr>
-        <p:spPr>
-          <a:xfrm>
-            <a:off x="7851913" y="2710190"/>
-            <a:ext cx="2033768" cy="261610"/>
+            <a:off x="4519590" y="743663"/>
+            <a:ext cx="4269408" cy="338554"/>
           </a:xfrm>
           <a:prstGeom prst="rect">
             <a:avLst/>
@@ -5695,27 +6310,58 @@
           <a:lstStyle/>
           <a:p>
             <a:r>
-              <a:rPr lang="en-US" sz="1100" b="1" dirty="0">
-                <a:solidFill>
-                  <a:srgbClr val="C00000"/>
-                </a:solidFill>
-              </a:rPr>
-              <a:t>New DB-history recover feature</a:t>
-            </a:r>
-            <a:endParaRPr lang="en-SG" sz="1100" b="1" dirty="0">
-              <a:solidFill>
-                <a:srgbClr val="C00000"/>
-              </a:solidFill>
-            </a:endParaRPr>
+              <a:rPr lang="en-SG" sz="1600" b="1" dirty="0"/>
+              <a:t>User’s Action monitor web:</a:t>
+            </a:r>
           </a:p>
         </p:txBody>
       </p:sp>
+      <p:pic>
+        <p:nvPicPr>
+          <p:cNvPr id="12" name="Picture 11" descr="A screenshot of a computer&#10;&#10;Description automatically generated">
+            <a:extLst>
+              <a:ext uri="{FF2B5EF4-FFF2-40B4-BE49-F238E27FC236}">
+                <a16:creationId xmlns:a16="http://schemas.microsoft.com/office/drawing/2014/main" id="{BF37BF6A-DEF8-9A7D-19A7-30130330F815}"/>
+              </a:ext>
+            </a:extLst>
+          </p:cNvPr>
+          <p:cNvPicPr>
+            <a:picLocks noChangeAspect="1"/>
+          </p:cNvPicPr>
+          <p:nvPr/>
+        </p:nvPicPr>
+        <p:blipFill rotWithShape="1">
+          <a:blip r:embed="rId3">
+            <a:extLst>
+              <a:ext uri="{28A0092B-C50C-407E-A947-70E740481C1C}">
+                <a14:useLocalDpi xmlns:a14="http://schemas.microsoft.com/office/drawing/2010/main" val="0"/>
+              </a:ext>
+            </a:extLst>
+          </a:blip>
+          <a:srcRect b="5440"/>
+          <a:stretch/>
+        </p:blipFill>
+        <p:spPr>
+          <a:xfrm>
+            <a:off x="4528976" y="1204137"/>
+            <a:ext cx="7482532" cy="3979972"/>
+          </a:xfrm>
+          <a:prstGeom prst="rect">
+            <a:avLst/>
+          </a:prstGeom>
+          <a:ln w="3175">
+            <a:solidFill>
+              <a:schemeClr val="tx1"/>
+            </a:solidFill>
+          </a:ln>
+        </p:spPr>
+      </p:pic>
       <p:sp>
         <p:nvSpPr>
-          <p:cNvPr id="17" name="TextBox 16">
-            <a:extLst>
-              <a:ext uri="{FF2B5EF4-FFF2-40B4-BE49-F238E27FC236}">
-                <a16:creationId xmlns:a16="http://schemas.microsoft.com/office/drawing/2014/main" id="{B81F8B59-8DA7-D543-DBEA-CA16950DCCD3}"/>
+          <p:cNvPr id="13" name="TextBox 12">
+            <a:extLst>
+              <a:ext uri="{FF2B5EF4-FFF2-40B4-BE49-F238E27FC236}">
+                <a16:creationId xmlns:a16="http://schemas.microsoft.com/office/drawing/2014/main" id="{386AD3BF-2C15-9716-3262-FD64E58EB5A2}"/>
               </a:ext>
             </a:extLst>
           </p:cNvPr>
@@ -5724,8 +6370,8 @@
         </p:nvSpPr>
         <p:spPr>
           <a:xfrm>
-            <a:off x="205398" y="3652102"/>
-            <a:ext cx="4384712" cy="3200876"/>
+            <a:off x="259568" y="5326561"/>
+            <a:ext cx="8880788" cy="1323439"/>
           </a:xfrm>
           <a:prstGeom prst="rect">
             <a:avLst/>
@@ -5739,114 +6385,56 @@
           <a:lstStyle/>
           <a:p>
             <a:r>
-              <a:rPr lang="en-US" sz="1600" b="1" dirty="0"/>
-              <a:t>D</a:t>
-            </a:r>
-            <a:r>
               <a:rPr lang="en-SG" sz="1600" b="1" dirty="0"/>
-              <a:t>B-history recovery feature.</a:t>
-            </a:r>
-          </a:p>
-          <a:p>
-            <a:endParaRPr lang="en-SG" sz="1600" b="1" dirty="0"/>
-          </a:p>
-          <a:p>
-            <a:r>
-              <a:rPr lang="en-SG" sz="1400" b="1" dirty="0"/>
-              <a:t>Case 1 [ scheduler auto run over midnight]: </a:t>
-            </a:r>
-            <a:r>
-              <a:rPr lang="en-SG" sz="1400" dirty="0"/>
-              <a:t>At 00:01 am create new state table, recover yesterday DB user’s  setting (such as deactivate tasks) into new DB state table.</a:t>
-            </a:r>
-          </a:p>
-          <a:p>
-            <a:endParaRPr lang="en-SG" sz="1400" b="1" dirty="0"/>
-          </a:p>
-          <a:p>
-            <a:r>
-              <a:rPr lang="en-SG" sz="1400" b="1" dirty="0"/>
-              <a:t>Case 2 [ User start the scheduler 1</a:t>
-            </a:r>
-            <a:r>
-              <a:rPr lang="en-SG" sz="1400" b="1" baseline="30000" dirty="0"/>
-              <a:t>st</a:t>
-            </a:r>
-            <a:r>
-              <a:rPr lang="en-SG" sz="1400" b="1" dirty="0"/>
-              <a:t> time today]: </a:t>
-            </a:r>
-            <a:r>
-              <a:rPr lang="en-SG" sz="1400" dirty="0"/>
-              <a:t>Load yesterday state table based on user’s recover flag setting. Built new state table, recover the user setting. </a:t>
-            </a:r>
-          </a:p>
-          <a:p>
-            <a:endParaRPr lang="en-SG" sz="1400" b="1" dirty="0"/>
-          </a:p>
-          <a:p>
-            <a:r>
-              <a:rPr lang="en-SG" sz="1400" b="1" dirty="0"/>
-              <a:t>Case 3 [ User start the scheduler again (not the 1</a:t>
-            </a:r>
-            <a:r>
-              <a:rPr lang="en-SG" sz="1400" b="1" baseline="30000" dirty="0"/>
-              <a:t>st</a:t>
-            </a:r>
-            <a:r>
-              <a:rPr lang="en-SG" sz="1400" b="1" dirty="0"/>
-              <a:t> time) in one day]: </a:t>
-            </a:r>
-            <a:r>
-              <a:rPr lang="en-SG" sz="1400" dirty="0"/>
-              <a:t>Assume the scheduler is closed by user because some reason, load the state from the DB to recovery the program state to the time point. </a:t>
+              <a:t>Emulator’s action monitor web feature: </a:t>
+            </a:r>
+          </a:p>
+          <a:p>
+            <a:pPr marL="285750" indent="-285750">
+              <a:buFont typeface="Arial" panose="020B0604020202020204" pitchFamily="34" charset="0"/>
+              <a:buChar char="•"/>
+            </a:pPr>
+            <a:r>
+              <a:rPr lang="en-SG" sz="1600" dirty="0"/>
+              <a:t>User can monitor the scheduled actions(events) execution state from the monitor Web. </a:t>
+            </a:r>
+          </a:p>
+          <a:p>
+            <a:pPr marL="285750" indent="-285750">
+              <a:buFont typeface="Arial" panose="020B0604020202020204" pitchFamily="34" charset="0"/>
+              <a:buChar char="•"/>
+            </a:pPr>
+            <a:r>
+              <a:rPr lang="en-SG" sz="1600" dirty="0"/>
+              <a:t>User can remove/deactivate the action from the web. </a:t>
+            </a:r>
+          </a:p>
+          <a:p>
+            <a:pPr marL="285750" indent="-285750">
+              <a:buFont typeface="Arial" panose="020B0604020202020204" pitchFamily="34" charset="0"/>
+              <a:buChar char="•"/>
+            </a:pPr>
+            <a:r>
+              <a:rPr lang="en-SG" sz="1600" dirty="0"/>
+              <a:t>The web provide regular action (daily/weekly action) and random action monitoring. </a:t>
+            </a:r>
+          </a:p>
+          <a:p>
+            <a:pPr marL="285750" indent="-285750">
+              <a:buFont typeface="Arial" panose="020B0604020202020204" pitchFamily="34" charset="0"/>
+              <a:buChar char="•"/>
+            </a:pPr>
+            <a:r>
+              <a:rPr lang="en-SG" sz="1600"/>
+              <a:t>(Under </a:t>
+            </a:r>
+            <a:r>
+              <a:rPr lang="en-SG" sz="1600" dirty="0"/>
+              <a:t>development) user can add new action/edit the actions from the Web interface</a:t>
             </a:r>
             <a:r>
               <a:rPr lang="en-SG" sz="1600" b="1" dirty="0"/>
-              <a:t> </a:t>
-            </a:r>
-          </a:p>
-        </p:txBody>
-      </p:sp>
-      <p:sp>
-        <p:nvSpPr>
-          <p:cNvPr id="19" name="TextBox 18">
-            <a:extLst>
-              <a:ext uri="{FF2B5EF4-FFF2-40B4-BE49-F238E27FC236}">
-                <a16:creationId xmlns:a16="http://schemas.microsoft.com/office/drawing/2014/main" id="{50735573-25A7-2A60-BAFD-93512C756D26}"/>
-              </a:ext>
-            </a:extLst>
-          </p:cNvPr>
-          <p:cNvSpPr txBox="1"/>
-          <p:nvPr/>
-        </p:nvSpPr>
-        <p:spPr>
-          <a:xfrm>
-            <a:off x="6397490" y="449108"/>
-            <a:ext cx="5836699" cy="1169551"/>
-          </a:xfrm>
-          <a:prstGeom prst="rect">
-            <a:avLst/>
-          </a:prstGeom>
-          <a:noFill/>
-        </p:spPr>
-        <p:txBody>
-          <a:bodyPr wrap="square" rtlCol="0">
-            <a:spAutoFit/>
-          </a:bodyPr>
-          <a:lstStyle/>
-          <a:p>
-            <a:pPr algn="just"/>
-            <a:r>
-              <a:rPr lang="en-US" sz="1400" b="1" dirty="0"/>
-              <a:t>Why we need the history recovery feature ? </a:t>
-            </a:r>
-          </a:p>
-          <a:p>
-            <a:pPr algn="just"/>
-            <a:r>
-              <a:rPr lang="en-SG" sz="1400" dirty="0"/>
-              <a:t>Assume task-2 [running on 10:00 am] needs task-1 [running on 09:00 am] to be executed successfully, if the computer reboot at 9:45 am, then user re-run scheduler at 9:50, the scheduler needs to auto recover its tasks state to the time point 9:45 am to decide whether execute task-2. </a:t>
+              <a:t>. </a:t>
             </a:r>
           </a:p>
         </p:txBody>
@@ -5854,7 +6442,7 @@
     </p:spTree>
     <p:extLst>
       <p:ext uri="{BB962C8B-B14F-4D97-AF65-F5344CB8AC3E}">
-        <p14:creationId xmlns:p14="http://schemas.microsoft.com/office/powerpoint/2010/main" val="2275827904"/>
+        <p14:creationId xmlns:p14="http://schemas.microsoft.com/office/powerpoint/2010/main" val="2724637396"/>
       </p:ext>
     </p:extLst>
   </p:cSld>
@@ -5883,6 +6471,560 @@
       </p:grpSpPr>
       <p:sp>
         <p:nvSpPr>
+          <p:cNvPr id="4" name="TextBox 3">
+            <a:extLst>
+              <a:ext uri="{FF2B5EF4-FFF2-40B4-BE49-F238E27FC236}">
+                <a16:creationId xmlns:a16="http://schemas.microsoft.com/office/drawing/2014/main" id="{DD319421-850C-B862-91CA-94B309913F88}"/>
+              </a:ext>
+            </a:extLst>
+          </p:cNvPr>
+          <p:cNvSpPr txBox="1"/>
+          <p:nvPr/>
+        </p:nvSpPr>
+        <p:spPr>
+          <a:xfrm>
+            <a:off x="0" y="-12557"/>
+            <a:ext cx="12191999" cy="461665"/>
+          </a:xfrm>
+          <a:prstGeom prst="rect">
+            <a:avLst/>
+          </a:prstGeom>
+          <a:solidFill>
+            <a:schemeClr val="accent1">
+              <a:lumMod val="75000"/>
+            </a:schemeClr>
+          </a:solidFill>
+          <a:ln>
+            <a:solidFill>
+              <a:schemeClr val="tx1"/>
+            </a:solidFill>
+          </a:ln>
+        </p:spPr>
+        <p:txBody>
+          <a:bodyPr wrap="square" rtlCol="0">
+            <a:spAutoFit/>
+          </a:bodyPr>
+          <a:lstStyle/>
+          <a:p>
+            <a:r>
+              <a:rPr lang="en-SG" sz="2400" dirty="0">
+                <a:solidFill>
+                  <a:schemeClr val="bg1"/>
+                </a:solidFill>
+              </a:rPr>
+              <a:t>User Action Emulator [System Design improvement]  </a:t>
+            </a:r>
+            <a:endParaRPr lang="en-SG" sz="2400" dirty="0">
+              <a:solidFill>
+                <a:srgbClr val="FF0000"/>
+              </a:solidFill>
+            </a:endParaRPr>
+          </a:p>
+        </p:txBody>
+      </p:sp>
+      <p:pic>
+        <p:nvPicPr>
+          <p:cNvPr id="5" name="Picture 4" descr="Graphical user interface, text&#10;&#10;Description automatically generated with medium confidence">
+            <a:extLst>
+              <a:ext uri="{FF2B5EF4-FFF2-40B4-BE49-F238E27FC236}">
+                <a16:creationId xmlns:a16="http://schemas.microsoft.com/office/drawing/2014/main" id="{9377C686-F64B-D611-CFA6-6D7DE4AAE440}"/>
+              </a:ext>
+            </a:extLst>
+          </p:cNvPr>
+          <p:cNvPicPr>
+            <a:picLocks noChangeAspect="1"/>
+          </p:cNvPicPr>
+          <p:nvPr/>
+        </p:nvPicPr>
+        <p:blipFill>
+          <a:blip r:embed="rId2">
+            <a:extLst>
+              <a:ext uri="{28A0092B-C50C-407E-A947-70E740481C1C}">
+                <a14:useLocalDpi xmlns:a14="http://schemas.microsoft.com/office/drawing/2010/main" val="0"/>
+              </a:ext>
+            </a:extLst>
+          </a:blip>
+          <a:stretch>
+            <a:fillRect/>
+          </a:stretch>
+        </p:blipFill>
+        <p:spPr>
+          <a:xfrm>
+            <a:off x="10527245" y="53310"/>
+            <a:ext cx="1598494" cy="348275"/>
+          </a:xfrm>
+          <a:prstGeom prst="rect">
+            <a:avLst/>
+          </a:prstGeom>
+        </p:spPr>
+      </p:pic>
+      <p:pic>
+        <p:nvPicPr>
+          <p:cNvPr id="7" name="Picture 6" descr="Diagram, timeline&#10;&#10;Description automatically generated">
+            <a:extLst>
+              <a:ext uri="{FF2B5EF4-FFF2-40B4-BE49-F238E27FC236}">
+                <a16:creationId xmlns:a16="http://schemas.microsoft.com/office/drawing/2014/main" id="{63B418EE-6954-8309-B714-CF075A2A311D}"/>
+              </a:ext>
+            </a:extLst>
+          </p:cNvPr>
+          <p:cNvPicPr>
+            <a:picLocks noChangeAspect="1"/>
+          </p:cNvPicPr>
+          <p:nvPr/>
+        </p:nvPicPr>
+        <p:blipFill>
+          <a:blip r:embed="rId3">
+            <a:extLst>
+              <a:ext uri="{28A0092B-C50C-407E-A947-70E740481C1C}">
+                <a14:useLocalDpi xmlns:a14="http://schemas.microsoft.com/office/drawing/2010/main" val="0"/>
+              </a:ext>
+            </a:extLst>
+          </a:blip>
+          <a:stretch>
+            <a:fillRect/>
+          </a:stretch>
+        </p:blipFill>
+        <p:spPr>
+          <a:xfrm>
+            <a:off x="315755" y="1408915"/>
+            <a:ext cx="3987888" cy="2243187"/>
+          </a:xfrm>
+          <a:prstGeom prst="rect">
+            <a:avLst/>
+          </a:prstGeom>
+          <a:ln w="6350">
+            <a:solidFill>
+              <a:schemeClr val="tx1"/>
+            </a:solidFill>
+          </a:ln>
+        </p:spPr>
+      </p:pic>
+      <p:sp>
+        <p:nvSpPr>
+          <p:cNvPr id="11" name="TextBox 10">
+            <a:extLst>
+              <a:ext uri="{FF2B5EF4-FFF2-40B4-BE49-F238E27FC236}">
+                <a16:creationId xmlns:a16="http://schemas.microsoft.com/office/drawing/2014/main" id="{3F0E355A-FC61-65D3-3012-F75DE5F253DD}"/>
+              </a:ext>
+            </a:extLst>
+          </p:cNvPr>
+          <p:cNvSpPr txBox="1"/>
+          <p:nvPr/>
+        </p:nvSpPr>
+        <p:spPr>
+          <a:xfrm>
+            <a:off x="315755" y="682923"/>
+            <a:ext cx="3599930" cy="338554"/>
+          </a:xfrm>
+          <a:prstGeom prst="rect">
+            <a:avLst/>
+          </a:prstGeom>
+          <a:noFill/>
+        </p:spPr>
+        <p:txBody>
+          <a:bodyPr wrap="square" rtlCol="0">
+            <a:spAutoFit/>
+          </a:bodyPr>
+          <a:lstStyle/>
+          <a:p>
+            <a:r>
+              <a:rPr lang="en-US" sz="1600" b="1" dirty="0"/>
+              <a:t>System workflow diagram (old) </a:t>
+            </a:r>
+          </a:p>
+        </p:txBody>
+      </p:sp>
+      <p:pic>
+        <p:nvPicPr>
+          <p:cNvPr id="3" name="Picture 2" descr="Timeline&#10;&#10;Description automatically generated">
+            <a:extLst>
+              <a:ext uri="{FF2B5EF4-FFF2-40B4-BE49-F238E27FC236}">
+                <a16:creationId xmlns:a16="http://schemas.microsoft.com/office/drawing/2014/main" id="{76FD506A-C0AE-9574-C404-F411BBFEEFE2}"/>
+              </a:ext>
+            </a:extLst>
+          </p:cNvPr>
+          <p:cNvPicPr>
+            <a:picLocks noChangeAspect="1"/>
+          </p:cNvPicPr>
+          <p:nvPr/>
+        </p:nvPicPr>
+        <p:blipFill>
+          <a:blip r:embed="rId4">
+            <a:extLst>
+              <a:ext uri="{28A0092B-C50C-407E-A947-70E740481C1C}">
+                <a14:useLocalDpi xmlns:a14="http://schemas.microsoft.com/office/drawing/2010/main" val="0"/>
+              </a:ext>
+            </a:extLst>
+          </a:blip>
+          <a:stretch>
+            <a:fillRect/>
+          </a:stretch>
+        </p:blipFill>
+        <p:spPr>
+          <a:xfrm>
+            <a:off x="4664763" y="2236321"/>
+            <a:ext cx="7527236" cy="4234070"/>
+          </a:xfrm>
+          <a:prstGeom prst="rect">
+            <a:avLst/>
+          </a:prstGeom>
+          <a:ln w="12700">
+            <a:solidFill>
+              <a:schemeClr val="tx1"/>
+            </a:solidFill>
+          </a:ln>
+        </p:spPr>
+      </p:pic>
+      <p:cxnSp>
+        <p:nvCxnSpPr>
+          <p:cNvPr id="9" name="Connector: Elbow 8">
+            <a:extLst>
+              <a:ext uri="{FF2B5EF4-FFF2-40B4-BE49-F238E27FC236}">
+                <a16:creationId xmlns:a16="http://schemas.microsoft.com/office/drawing/2014/main" id="{97A19B67-1F9B-BCBF-4D6F-AC9511FD1863}"/>
+              </a:ext>
+            </a:extLst>
+          </p:cNvPr>
+          <p:cNvCxnSpPr/>
+          <p:nvPr/>
+        </p:nvCxnSpPr>
+        <p:spPr>
+          <a:xfrm>
+            <a:off x="4373217" y="1639973"/>
+            <a:ext cx="1421295" cy="596348"/>
+          </a:xfrm>
+          <a:prstGeom prst="bentConnector3">
+            <a:avLst>
+              <a:gd name="adj1" fmla="val 99650"/>
+            </a:avLst>
+          </a:prstGeom>
+          <a:ln w="28575">
+            <a:tailEnd type="triangle"/>
+          </a:ln>
+        </p:spPr>
+        <p:style>
+          <a:lnRef idx="1">
+            <a:schemeClr val="accent1"/>
+          </a:lnRef>
+          <a:fillRef idx="0">
+            <a:schemeClr val="accent1"/>
+          </a:fillRef>
+          <a:effectRef idx="0">
+            <a:schemeClr val="accent1"/>
+          </a:effectRef>
+          <a:fontRef idx="minor">
+            <a:schemeClr val="tx1"/>
+          </a:fontRef>
+        </p:style>
+      </p:cxnSp>
+      <p:sp>
+        <p:nvSpPr>
+          <p:cNvPr id="14" name="TextBox 13">
+            <a:extLst>
+              <a:ext uri="{FF2B5EF4-FFF2-40B4-BE49-F238E27FC236}">
+                <a16:creationId xmlns:a16="http://schemas.microsoft.com/office/drawing/2014/main" id="{33A3B9DA-860D-6767-0D01-9544927397E4}"/>
+              </a:ext>
+            </a:extLst>
+          </p:cNvPr>
+          <p:cNvSpPr txBox="1"/>
+          <p:nvPr/>
+        </p:nvSpPr>
+        <p:spPr>
+          <a:xfrm>
+            <a:off x="5864086" y="1702223"/>
+            <a:ext cx="3599930" cy="338554"/>
+          </a:xfrm>
+          <a:prstGeom prst="rect">
+            <a:avLst/>
+          </a:prstGeom>
+          <a:noFill/>
+        </p:spPr>
+        <p:txBody>
+          <a:bodyPr wrap="square" rtlCol="0">
+            <a:spAutoFit/>
+          </a:bodyPr>
+          <a:lstStyle/>
+          <a:p>
+            <a:r>
+              <a:rPr lang="en-US" sz="1600" b="1" dirty="0"/>
+              <a:t>System workflow diagram (Current) </a:t>
+            </a:r>
+          </a:p>
+        </p:txBody>
+      </p:sp>
+      <p:sp>
+        <p:nvSpPr>
+          <p:cNvPr id="15" name="Rectangle 14">
+            <a:extLst>
+              <a:ext uri="{FF2B5EF4-FFF2-40B4-BE49-F238E27FC236}">
+                <a16:creationId xmlns:a16="http://schemas.microsoft.com/office/drawing/2014/main" id="{182A3384-A5FD-A59D-7B50-1974EE7A5A56}"/>
+              </a:ext>
+            </a:extLst>
+          </p:cNvPr>
+          <p:cNvSpPr/>
+          <p:nvPr/>
+        </p:nvSpPr>
+        <p:spPr>
+          <a:xfrm>
+            <a:off x="7851913" y="2971800"/>
+            <a:ext cx="1550504" cy="2673626"/>
+          </a:xfrm>
+          <a:prstGeom prst="rect">
+            <a:avLst/>
+          </a:prstGeom>
+          <a:noFill/>
+          <a:ln w="28575">
+            <a:solidFill>
+              <a:srgbClr val="FF0000"/>
+            </a:solidFill>
+            <a:prstDash val="sysDot"/>
+          </a:ln>
+        </p:spPr>
+        <p:style>
+          <a:lnRef idx="2">
+            <a:schemeClr val="accent1">
+              <a:shade val="50000"/>
+            </a:schemeClr>
+          </a:lnRef>
+          <a:fillRef idx="1">
+            <a:schemeClr val="accent1"/>
+          </a:fillRef>
+          <a:effectRef idx="0">
+            <a:schemeClr val="accent1"/>
+          </a:effectRef>
+          <a:fontRef idx="minor">
+            <a:schemeClr val="lt1"/>
+          </a:fontRef>
+        </p:style>
+        <p:txBody>
+          <a:bodyPr rtlCol="0" anchor="ctr"/>
+          <a:lstStyle/>
+          <a:p>
+            <a:pPr algn="ctr"/>
+            <a:endParaRPr lang="en-SG" dirty="0">
+              <a:solidFill>
+                <a:srgbClr val="FF0000"/>
+              </a:solidFill>
+            </a:endParaRPr>
+          </a:p>
+        </p:txBody>
+      </p:sp>
+      <p:sp>
+        <p:nvSpPr>
+          <p:cNvPr id="16" name="TextBox 15">
+            <a:extLst>
+              <a:ext uri="{FF2B5EF4-FFF2-40B4-BE49-F238E27FC236}">
+                <a16:creationId xmlns:a16="http://schemas.microsoft.com/office/drawing/2014/main" id="{3ADC4CFC-CE6F-274D-4049-06121D09B80A}"/>
+              </a:ext>
+            </a:extLst>
+          </p:cNvPr>
+          <p:cNvSpPr txBox="1"/>
+          <p:nvPr/>
+        </p:nvSpPr>
+        <p:spPr>
+          <a:xfrm>
+            <a:off x="7851913" y="2710190"/>
+            <a:ext cx="2033768" cy="261610"/>
+          </a:xfrm>
+          <a:prstGeom prst="rect">
+            <a:avLst/>
+          </a:prstGeom>
+          <a:noFill/>
+        </p:spPr>
+        <p:txBody>
+          <a:bodyPr wrap="square" rtlCol="0">
+            <a:spAutoFit/>
+          </a:bodyPr>
+          <a:lstStyle/>
+          <a:p>
+            <a:r>
+              <a:rPr lang="en-US" sz="1100" b="1" dirty="0">
+                <a:solidFill>
+                  <a:srgbClr val="C00000"/>
+                </a:solidFill>
+              </a:rPr>
+              <a:t>New DB-history recover feature</a:t>
+            </a:r>
+            <a:endParaRPr lang="en-SG" sz="1100" b="1" dirty="0">
+              <a:solidFill>
+                <a:srgbClr val="C00000"/>
+              </a:solidFill>
+            </a:endParaRPr>
+          </a:p>
+        </p:txBody>
+      </p:sp>
+      <p:sp>
+        <p:nvSpPr>
+          <p:cNvPr id="17" name="TextBox 16">
+            <a:extLst>
+              <a:ext uri="{FF2B5EF4-FFF2-40B4-BE49-F238E27FC236}">
+                <a16:creationId xmlns:a16="http://schemas.microsoft.com/office/drawing/2014/main" id="{B81F8B59-8DA7-D543-DBEA-CA16950DCCD3}"/>
+              </a:ext>
+            </a:extLst>
+          </p:cNvPr>
+          <p:cNvSpPr txBox="1"/>
+          <p:nvPr/>
+        </p:nvSpPr>
+        <p:spPr>
+          <a:xfrm>
+            <a:off x="205398" y="3652102"/>
+            <a:ext cx="4384712" cy="3200876"/>
+          </a:xfrm>
+          <a:prstGeom prst="rect">
+            <a:avLst/>
+          </a:prstGeom>
+          <a:noFill/>
+        </p:spPr>
+        <p:txBody>
+          <a:bodyPr wrap="square" rtlCol="0">
+            <a:spAutoFit/>
+          </a:bodyPr>
+          <a:lstStyle/>
+          <a:p>
+            <a:r>
+              <a:rPr lang="en-US" sz="1600" b="1" dirty="0"/>
+              <a:t>D</a:t>
+            </a:r>
+            <a:r>
+              <a:rPr lang="en-SG" sz="1600" b="1" dirty="0"/>
+              <a:t>B-history recovery feature.</a:t>
+            </a:r>
+          </a:p>
+          <a:p>
+            <a:endParaRPr lang="en-SG" sz="1600" b="1" dirty="0"/>
+          </a:p>
+          <a:p>
+            <a:r>
+              <a:rPr lang="en-SG" sz="1400" b="1" dirty="0"/>
+              <a:t>Case 1 [ scheduler auto run over midnight]: </a:t>
+            </a:r>
+            <a:r>
+              <a:rPr lang="en-SG" sz="1400" dirty="0"/>
+              <a:t>At 00:01 am create new state table, recover yesterday DB user’s  setting (such as deactivate tasks) into new DB state table.</a:t>
+            </a:r>
+          </a:p>
+          <a:p>
+            <a:endParaRPr lang="en-SG" sz="1400" b="1" dirty="0"/>
+          </a:p>
+          <a:p>
+            <a:r>
+              <a:rPr lang="en-SG" sz="1400" b="1" dirty="0"/>
+              <a:t>Case 2 [ User start the scheduler 1</a:t>
+            </a:r>
+            <a:r>
+              <a:rPr lang="en-SG" sz="1400" b="1" baseline="30000" dirty="0"/>
+              <a:t>st</a:t>
+            </a:r>
+            <a:r>
+              <a:rPr lang="en-SG" sz="1400" b="1" dirty="0"/>
+              <a:t> time today]: </a:t>
+            </a:r>
+            <a:r>
+              <a:rPr lang="en-SG" sz="1400" dirty="0"/>
+              <a:t>Load yesterday state table based on user’s recover flag setting. Built new state table, recover the user setting. </a:t>
+            </a:r>
+          </a:p>
+          <a:p>
+            <a:endParaRPr lang="en-SG" sz="1400" b="1" dirty="0"/>
+          </a:p>
+          <a:p>
+            <a:r>
+              <a:rPr lang="en-SG" sz="1400" b="1" dirty="0"/>
+              <a:t>Case 3 [ User start the scheduler again (not the 1</a:t>
+            </a:r>
+            <a:r>
+              <a:rPr lang="en-SG" sz="1400" b="1" baseline="30000" dirty="0"/>
+              <a:t>st</a:t>
+            </a:r>
+            <a:r>
+              <a:rPr lang="en-SG" sz="1400" b="1" dirty="0"/>
+              <a:t> time) in one day]: </a:t>
+            </a:r>
+            <a:r>
+              <a:rPr lang="en-SG" sz="1400" dirty="0"/>
+              <a:t>Assume the scheduler is closed by user because some reason, load the state from the DB to recovery the program state to the time point. </a:t>
+            </a:r>
+            <a:r>
+              <a:rPr lang="en-SG" sz="1600" b="1" dirty="0"/>
+              <a:t> </a:t>
+            </a:r>
+          </a:p>
+        </p:txBody>
+      </p:sp>
+      <p:sp>
+        <p:nvSpPr>
+          <p:cNvPr id="19" name="TextBox 18">
+            <a:extLst>
+              <a:ext uri="{FF2B5EF4-FFF2-40B4-BE49-F238E27FC236}">
+                <a16:creationId xmlns:a16="http://schemas.microsoft.com/office/drawing/2014/main" id="{50735573-25A7-2A60-BAFD-93512C756D26}"/>
+              </a:ext>
+            </a:extLst>
+          </p:cNvPr>
+          <p:cNvSpPr txBox="1"/>
+          <p:nvPr/>
+        </p:nvSpPr>
+        <p:spPr>
+          <a:xfrm>
+            <a:off x="6397490" y="449108"/>
+            <a:ext cx="5836699" cy="1169551"/>
+          </a:xfrm>
+          <a:prstGeom prst="rect">
+            <a:avLst/>
+          </a:prstGeom>
+          <a:noFill/>
+        </p:spPr>
+        <p:txBody>
+          <a:bodyPr wrap="square" rtlCol="0">
+            <a:spAutoFit/>
+          </a:bodyPr>
+          <a:lstStyle/>
+          <a:p>
+            <a:pPr algn="just"/>
+            <a:r>
+              <a:rPr lang="en-US" sz="1400" b="1" dirty="0"/>
+              <a:t>Why we need the history recovery feature ? </a:t>
+            </a:r>
+          </a:p>
+          <a:p>
+            <a:pPr algn="just"/>
+            <a:r>
+              <a:rPr lang="en-SG" sz="1400" dirty="0"/>
+              <a:t>Assume task-2 [running on 10:00 am] needs task-1 [running on 09:00 am] to be executed successfully, if the computer reboot at 9:45 am, then user re-run scheduler at 9:50, the scheduler needs to auto recover its tasks state to the time point 9:45 am to decide whether execute task-2. </a:t>
+            </a:r>
+          </a:p>
+        </p:txBody>
+      </p:sp>
+    </p:spTree>
+    <p:extLst>
+      <p:ext uri="{BB962C8B-B14F-4D97-AF65-F5344CB8AC3E}">
+        <p14:creationId xmlns:p14="http://schemas.microsoft.com/office/powerpoint/2010/main" val="2275827904"/>
+      </p:ext>
+    </p:extLst>
+  </p:cSld>
+  <p:clrMapOvr>
+    <a:masterClrMapping/>
+  </p:clrMapOvr>
+</p:sld>
+</file>
+
+<file path=ppt/slides/slide13.xml><?xml version="1.0" encoding="utf-8"?>
+<p:sld xmlns:a="http://schemas.openxmlformats.org/drawingml/2006/main" xmlns:r="http://schemas.openxmlformats.org/officeDocument/2006/relationships" xmlns:p="http://schemas.openxmlformats.org/presentationml/2006/main">
+  <p:cSld>
+    <p:spTree>
+      <p:nvGrpSpPr>
+        <p:cNvPr id="1" name=""/>
+        <p:cNvGrpSpPr/>
+        <p:nvPr/>
+      </p:nvGrpSpPr>
+      <p:grpSpPr>
+        <a:xfrm>
+          <a:off x="0" y="0"/>
+          <a:ext cx="0" cy="0"/>
+          <a:chOff x="0" y="0"/>
+          <a:chExt cx="0" cy="0"/>
+        </a:xfrm>
+      </p:grpSpPr>
+      <p:sp>
+        <p:nvSpPr>
           <p:cNvPr id="4" name="Rectangle 3">
             <a:extLst>
               <a:ext uri="{FF2B5EF4-FFF2-40B4-BE49-F238E27FC236}">
@@ -10959,7 +12101,7 @@
 </p:sld>
 </file>
 
-<file path=ppt/slides/slide13.xml><?xml version="1.0" encoding="utf-8"?>
+<file path=ppt/slides/slide14.xml><?xml version="1.0" encoding="utf-8"?>
 <p:sld xmlns:a="http://schemas.openxmlformats.org/drawingml/2006/main" xmlns:r="http://schemas.openxmlformats.org/officeDocument/2006/relationships" xmlns:p="http://schemas.openxmlformats.org/presentationml/2006/main">
   <p:cSld>
     <p:spTree>
@@ -28571,7 +29713,7 @@
                   <a:schemeClr val="bg1"/>
                 </a:solidFill>
               </a:rPr>
-              <a:t>Cluster Users Emulator  [ Introduction ] </a:t>
+              <a:t>Cluster Users Emulator  [ Product overview ] </a:t>
             </a:r>
             <a:endParaRPr lang="en-SG" sz="2400" dirty="0">
               <a:solidFill>
@@ -28631,8 +29773,8 @@
         </p:nvSpPr>
         <p:spPr>
           <a:xfrm>
-            <a:off x="251280" y="737330"/>
-            <a:ext cx="11327807" cy="1569660"/>
+            <a:off x="281097" y="657817"/>
+            <a:ext cx="11629806" cy="1200329"/>
           </a:xfrm>
           <a:prstGeom prst="rect">
             <a:avLst/>
@@ -28653,13 +29795,9 @@
           </a:p>
           <a:p>
             <a:pPr algn="just"/>
-            <a:endParaRPr lang="en-US" sz="1600" b="1" dirty="0"/>
-          </a:p>
-          <a:p>
-            <a:pPr algn="just"/>
-            <a:r>
-              <a:rPr lang="en-US" sz="1600" dirty="0"/>
-              <a:t>There are several kinds of network traffic generators, task schedulers and the progress monitors hub in the market. But most of these tools don’t cover all three areas to provide a packaged solution to simulate, management and monitor a group of user's action. Our Cluster Users emulator is aimed to provide an all-in-one packaged solution allow our customer to simulate a groups of different users complex human type action, then schedule these event and monitor/control the task progress in a computer network/cluster. </a:t>
+            <a:r>
+              <a:rPr lang="en-US" sz="1400" dirty="0"/>
+              <a:t>There are several kinds of network traffic generators, task scheduler tools and the tasks progress monitors hub in the market. But most of these tools don’t cover all the three areas (monitor, management and simulate) to provide an all-in-one solution to emulate a group of users’ activities. Our Cluster Users emulator is aimed to provide a packaged solution allow our customer to simulate a groups of different users’ complex human type action, then schedule these event and monitor/control the task progress in the computer network/cluster. </a:t>
             </a:r>
           </a:p>
         </p:txBody>
@@ -28679,14 +29817,14 @@
           <p:nvPr>
             <p:extLst>
               <p:ext uri="{D42A27DB-BD31-4B8C-83A1-F6EECF244321}">
-                <p14:modId xmlns:p14="http://schemas.microsoft.com/office/powerpoint/2010/main" val="485339524"/>
+                <p14:modId xmlns:p14="http://schemas.microsoft.com/office/powerpoint/2010/main" val="1497385377"/>
               </p:ext>
             </p:extLst>
           </p:nvPr>
         </p:nvGraphicFramePr>
         <p:xfrm>
-          <a:off x="400367" y="2633637"/>
-          <a:ext cx="10396588" cy="3216168"/>
+          <a:off x="360610" y="2365281"/>
+          <a:ext cx="10396588" cy="3474720"/>
         </p:xfrm>
         <a:graphic>
           <a:graphicData uri="http://schemas.openxmlformats.org/drawingml/2006/table">
@@ -28897,12 +30035,12 @@
                         <a:defRPr/>
                       </a:pPr>
                       <a:r>
-                        <a:rPr lang="en-SG" sz="1200" dirty="0">
+                        <a:rPr lang="en-SG" sz="1200" b="0" dirty="0">
                           <a:solidFill>
                             <a:schemeClr val="tx1"/>
                           </a:solidFill>
                         </a:rPr>
-                        <a:t>Simulation situation may not be same as the real 5G vendor’s solution.</a:t>
+                        <a:t>Monitor-hub only provides basic tasks control function </a:t>
                       </a:r>
                     </a:p>
                     <a:p>
@@ -28924,12 +30062,12 @@
                         <a:defRPr/>
                       </a:pPr>
                       <a:r>
-                        <a:rPr lang="en-SG" sz="1200" dirty="0">
+                        <a:rPr lang="en-SG" sz="1200" b="0" dirty="0">
                           <a:solidFill>
                             <a:schemeClr val="tx1"/>
                           </a:solidFill>
                         </a:rPr>
-                        <a:t>Hard to convince market people as currently there is no real-life use case.</a:t>
+                        <a:t>Need to do the customized change based on the server and platform. </a:t>
                       </a:r>
                     </a:p>
                     <a:p>
@@ -28951,12 +30089,12 @@
                         <a:defRPr/>
                       </a:pPr>
                       <a:r>
-                        <a:rPr lang="en-SG" sz="1200" dirty="0">
+                        <a:rPr lang="en-SG" sz="1200" b="0" dirty="0">
                           <a:solidFill>
                             <a:schemeClr val="tx1"/>
                           </a:solidFill>
                         </a:rPr>
-                        <a:t>Hard to answer the question about why/how the 5G-function is implemented as we don’t hold the IP.</a:t>
+                        <a:t>Don’t have task pause/continuous function. </a:t>
                       </a:r>
                     </a:p>
                     <a:p>
@@ -28977,7 +30115,34 @@
                         <a:tabLst/>
                         <a:defRPr/>
                       </a:pPr>
-                      <a:endParaRPr lang="en-US" sz="1200" dirty="0">
+                      <a:r>
+                        <a:rPr lang="en-SG" sz="1200" b="0" dirty="0">
+                          <a:solidFill>
+                            <a:schemeClr val="tx1"/>
+                          </a:solidFill>
+                        </a:rPr>
+                        <a:t>Some of the features are under development. </a:t>
+                      </a:r>
+                    </a:p>
+                    <a:p>
+                      <a:pPr marL="285750" marR="0" lvl="0" indent="-285750" algn="l" defTabSz="914400" rtl="0" eaLnBrk="1" fontAlgn="auto" latinLnBrk="0" hangingPunct="1">
+                        <a:lnSpc>
+                          <a:spcPct val="100000"/>
+                        </a:lnSpc>
+                        <a:spcBef>
+                          <a:spcPts val="0"/>
+                        </a:spcBef>
+                        <a:spcAft>
+                          <a:spcPts val="0"/>
+                        </a:spcAft>
+                        <a:buClrTx/>
+                        <a:buSzTx/>
+                        <a:buFont typeface="Arial" panose="020B0604020202020204" pitchFamily="34" charset="0"/>
+                        <a:buChar char="•"/>
+                        <a:tabLst/>
+                        <a:defRPr/>
+                      </a:pPr>
+                      <a:endParaRPr lang="en-SG" sz="1200" b="0" dirty="0">
                         <a:solidFill>
                           <a:schemeClr val="tx1"/>
                         </a:solidFill>
@@ -28999,7 +30164,7 @@
                   </a:ext>
                 </a:extLst>
               </a:tr>
-              <a:tr h="1478808">
+              <a:tr h="1224599">
                 <a:tc>
                   <a:txBody>
                     <a:bodyPr/>
@@ -29029,8 +30194,8 @@
                         <a:buChar char="•"/>
                       </a:pPr>
                       <a:r>
-                        <a:rPr lang="en-SG" sz="1200" b="1" dirty="0"/>
-                        <a:t>Design different attack and defence simulation (can config vulnerable point). </a:t>
+                        <a:rPr lang="en-SG" sz="1200" b="0" dirty="0"/>
+                        <a:t>Avoid customer to use different kind tools with compatible along different programming language, platform and license issue. </a:t>
                       </a:r>
                     </a:p>
                     <a:p>
@@ -29039,8 +30204,18 @@
                         <a:buChar char="•"/>
                       </a:pPr>
                       <a:r>
-                        <a:rPr lang="en-SG" sz="1200" b="1" dirty="0"/>
-                        <a:t>Customized the 5G environment for cyber event/exercise. </a:t>
+                        <a:rPr lang="en-SG" sz="1200" b="0" dirty="0"/>
+                        <a:t>Provide more action emulation feature for the MS-windows customer and the customer with UI operation request.</a:t>
+                      </a:r>
+                    </a:p>
+                    <a:p>
+                      <a:pPr marL="285750" indent="-285750">
+                        <a:buFont typeface="Arial" panose="020B0604020202020204" pitchFamily="34" charset="0"/>
+                        <a:buChar char="•"/>
+                      </a:pPr>
+                      <a:r>
+                        <a:rPr lang="en-SG" sz="1200" b="0" dirty="0"/>
+                        <a:t>Can also used to simulate different teams’ attack and defence action in cyber exercise . </a:t>
                       </a:r>
                     </a:p>
                   </a:txBody>
@@ -29069,7 +30244,7 @@
                     <a:p>
                       <a:r>
                         <a:rPr lang="en-SG" sz="1200" b="1" dirty="0"/>
-                        <a:t>Several Opensource 5G project: </a:t>
+                        <a:t>Several Cluster task management tools: </a:t>
                       </a:r>
                     </a:p>
                     <a:p>
@@ -29078,128 +30253,29 @@
                         <a:buChar char="•"/>
                       </a:pPr>
                       <a:r>
-                        <a:rPr lang="en-SG" sz="1200" b="1" dirty="0"/>
-                        <a:t>my5G / my5G-RANTester</a:t>
+                        <a:rPr lang="en-SG" sz="1200" b="0" dirty="0"/>
+                        <a:t>Airflow (Linux)</a:t>
                       </a:r>
                     </a:p>
                     <a:p>
-                      <a:pPr marL="285750" marR="0" lvl="0" indent="-285750" algn="l" defTabSz="914400" rtl="0" eaLnBrk="1" fontAlgn="auto" latinLnBrk="0" hangingPunct="1">
-                        <a:lnSpc>
-                          <a:spcPct val="100000"/>
-                        </a:lnSpc>
-                        <a:spcBef>
-                          <a:spcPts val="0"/>
-                        </a:spcBef>
-                        <a:spcAft>
-                          <a:spcPts val="0"/>
-                        </a:spcAft>
-                        <a:buClrTx/>
-                        <a:buSzTx/>
+                      <a:pPr marL="285750" indent="-285750">
                         <a:buFont typeface="Arial" panose="020B0604020202020204" pitchFamily="34" charset="0"/>
                         <a:buChar char="•"/>
-                        <a:tabLst/>
-                        <a:defRPr/>
                       </a:pPr>
                       <a:r>
-                        <a:rPr lang="en-SG" sz="1200" b="1" i="0" kern="1200" dirty="0">
-                          <a:solidFill>
-                            <a:schemeClr val="dk1"/>
-                          </a:solidFill>
-                          <a:effectLst/>
-                          <a:latin typeface="+mn-lt"/>
-                          <a:ea typeface="+mn-ea"/>
-                          <a:cs typeface="+mn-cs"/>
-                        </a:rPr>
-                        <a:t>K-</a:t>
-                      </a:r>
-                      <a:r>
-                        <a:rPr lang="en-SG" sz="1200" b="1" i="0" kern="1200" dirty="0" err="1">
-                          <a:solidFill>
-                            <a:schemeClr val="dk1"/>
-                          </a:solidFill>
-                          <a:effectLst/>
-                          <a:latin typeface="+mn-lt"/>
-                          <a:ea typeface="+mn-ea"/>
-                          <a:cs typeface="+mn-cs"/>
-                        </a:rPr>
-                        <a:t>SimNet</a:t>
-                      </a:r>
-                      <a:r>
-                        <a:rPr lang="en-SG" sz="1200" b="1" i="0" kern="1200" dirty="0">
-                          <a:solidFill>
-                            <a:schemeClr val="dk1"/>
-                          </a:solidFill>
-                          <a:effectLst/>
-                          <a:latin typeface="+mn-lt"/>
-                          <a:ea typeface="+mn-ea"/>
-                          <a:cs typeface="+mn-cs"/>
-                        </a:rPr>
-                        <a:t>/ 5G Network Simulator (5G)</a:t>
+                        <a:rPr lang="en-SG" sz="1200" b="0" dirty="0"/>
+                        <a:t>PM2 (Linux)</a:t>
                       </a:r>
                     </a:p>
                     <a:p>
-                      <a:pPr marL="285750" marR="0" lvl="0" indent="-285750" algn="l" defTabSz="914400" rtl="0" eaLnBrk="1" fontAlgn="auto" latinLnBrk="0" hangingPunct="1">
-                        <a:lnSpc>
-                          <a:spcPct val="100000"/>
-                        </a:lnSpc>
-                        <a:spcBef>
-                          <a:spcPts val="0"/>
-                        </a:spcBef>
-                        <a:spcAft>
-                          <a:spcPts val="0"/>
-                        </a:spcAft>
-                        <a:buClrTx/>
-                        <a:buSzTx/>
+                      <a:pPr marL="285750" indent="-285750">
                         <a:buFont typeface="Arial" panose="020B0604020202020204" pitchFamily="34" charset="0"/>
                         <a:buChar char="•"/>
-                        <a:tabLst/>
-                        <a:defRPr/>
                       </a:pPr>
                       <a:r>
-                        <a:rPr lang="en-US" sz="1200" b="1" i="0" kern="1200" dirty="0">
-                          <a:solidFill>
-                            <a:schemeClr val="dk1"/>
-                          </a:solidFill>
-                          <a:effectLst/>
-                          <a:latin typeface="+mn-lt"/>
-                          <a:ea typeface="+mn-ea"/>
-                          <a:cs typeface="+mn-cs"/>
-                        </a:rPr>
-                        <a:t>UERANSIM/ 5G UE and RAN (</a:t>
+                        <a:rPr lang="en-SG" sz="1200" b="0" dirty="0"/>
+                        <a:t>Rancher-hub (K8s)</a:t>
                       </a:r>
-                      <a:r>
-                        <a:rPr lang="en-US" sz="1200" b="1" i="0" kern="1200" dirty="0" err="1">
-                          <a:solidFill>
-                            <a:schemeClr val="dk1"/>
-                          </a:solidFill>
-                          <a:effectLst/>
-                          <a:latin typeface="+mn-lt"/>
-                          <a:ea typeface="+mn-ea"/>
-                          <a:cs typeface="+mn-cs"/>
-                        </a:rPr>
-                        <a:t>gNodeB</a:t>
-                      </a:r>
-                      <a:r>
-                        <a:rPr lang="en-US" sz="1200" b="1" i="0" kern="1200" dirty="0">
-                          <a:solidFill>
-                            <a:schemeClr val="dk1"/>
-                          </a:solidFill>
-                          <a:effectLst/>
-                          <a:latin typeface="+mn-lt"/>
-                          <a:ea typeface="+mn-ea"/>
-                          <a:cs typeface="+mn-cs"/>
-                        </a:rPr>
-                        <a:t>) simulator</a:t>
-                      </a:r>
-                      <a:endParaRPr lang="en-SG" sz="1200" b="1" i="0" kern="1200" dirty="0">
-                        <a:solidFill>
-                          <a:schemeClr val="dk1"/>
-                        </a:solidFill>
-                        <a:effectLst/>
-                        <a:latin typeface="+mn-lt"/>
-                        <a:ea typeface="+mn-ea"/>
-                        <a:cs typeface="+mn-cs"/>
-                      </a:endParaRPr>
                     </a:p>
                   </a:txBody>
                   <a:tcPr>
@@ -29221,6 +30297,104 @@
           </a:graphicData>
         </a:graphic>
       </p:graphicFrame>
+      <p:sp>
+        <p:nvSpPr>
+          <p:cNvPr id="9" name="TextBox 8">
+            <a:extLst>
+              <a:ext uri="{FF2B5EF4-FFF2-40B4-BE49-F238E27FC236}">
+                <a16:creationId xmlns:a16="http://schemas.microsoft.com/office/drawing/2014/main" id="{CBED0AED-F398-BF63-86FD-DE7214483296}"/>
+              </a:ext>
+            </a:extLst>
+          </p:cNvPr>
+          <p:cNvSpPr txBox="1"/>
+          <p:nvPr/>
+        </p:nvSpPr>
+        <p:spPr>
+          <a:xfrm>
+            <a:off x="360610" y="5944917"/>
+            <a:ext cx="11327807" cy="769441"/>
+          </a:xfrm>
+          <a:prstGeom prst="rect">
+            <a:avLst/>
+          </a:prstGeom>
+          <a:noFill/>
+        </p:spPr>
+        <p:txBody>
+          <a:bodyPr wrap="square" rtlCol="0">
+            <a:spAutoFit/>
+          </a:bodyPr>
+          <a:lstStyle/>
+          <a:p>
+            <a:pPr algn="just"/>
+            <a:r>
+              <a:rPr lang="en-US" sz="1600" b="1" dirty="0"/>
+              <a:t>User Action emulator demo video: </a:t>
+            </a:r>
+          </a:p>
+          <a:p>
+            <a:pPr marL="285750" indent="-285750" algn="just">
+              <a:buFont typeface="Arial" panose="020B0604020202020204" pitchFamily="34" charset="0"/>
+              <a:buChar char="•"/>
+            </a:pPr>
+            <a:r>
+              <a:rPr lang="en-US" sz="1400" dirty="0">
+                <a:hlinkClick r:id="rId3"/>
+              </a:rPr>
+              <a:t>https://www.youtube.com/watch?v=jgm3gQhzUq4&amp;t=57s</a:t>
+            </a:r>
+            <a:endParaRPr lang="en-US" sz="1400" dirty="0"/>
+          </a:p>
+          <a:p>
+            <a:pPr marL="285750" indent="-285750" algn="just">
+              <a:buFont typeface="Arial" panose="020B0604020202020204" pitchFamily="34" charset="0"/>
+              <a:buChar char="•"/>
+            </a:pPr>
+            <a:r>
+              <a:rPr lang="en-US" sz="1400" dirty="0">
+                <a:hlinkClick r:id="rId4"/>
+              </a:rPr>
+              <a:t>https://www.youtube.com/watch?v=wZsRmYPcPTQ</a:t>
+            </a:r>
+            <a:endParaRPr lang="en-US" sz="1400" dirty="0"/>
+          </a:p>
+        </p:txBody>
+      </p:sp>
+      <p:sp>
+        <p:nvSpPr>
+          <p:cNvPr id="10" name="TextBox 9">
+            <a:extLst>
+              <a:ext uri="{FF2B5EF4-FFF2-40B4-BE49-F238E27FC236}">
+                <a16:creationId xmlns:a16="http://schemas.microsoft.com/office/drawing/2014/main" id="{66A0348F-4908-C82D-0A95-0008B24CFD46}"/>
+              </a:ext>
+            </a:extLst>
+          </p:cNvPr>
+          <p:cNvSpPr txBox="1"/>
+          <p:nvPr/>
+        </p:nvSpPr>
+        <p:spPr>
+          <a:xfrm>
+            <a:off x="281097" y="2003991"/>
+            <a:ext cx="3599930" cy="338554"/>
+          </a:xfrm>
+          <a:prstGeom prst="rect">
+            <a:avLst/>
+          </a:prstGeom>
+          <a:noFill/>
+        </p:spPr>
+        <p:txBody>
+          <a:bodyPr wrap="square" rtlCol="0">
+            <a:spAutoFit/>
+          </a:bodyPr>
+          <a:lstStyle/>
+          <a:p>
+            <a:r>
+              <a:rPr lang="en-US" sz="1600" b="1" dirty="0"/>
+              <a:t>SWOT business analysis</a:t>
+            </a:r>
+            <a:endParaRPr lang="en-SG" sz="1600" b="1" dirty="0"/>
+          </a:p>
+        </p:txBody>
+      </p:sp>
     </p:spTree>
     <p:extLst>
       <p:ext uri="{BB962C8B-B14F-4D97-AF65-F5344CB8AC3E}">
@@ -29251,12 +30425,104 @@
           <a:chExt cx="0" cy="0"/>
         </a:xfrm>
       </p:grpSpPr>
+      <p:pic>
+        <p:nvPicPr>
+          <p:cNvPr id="11" name="Picture 10">
+            <a:extLst>
+              <a:ext uri="{FF2B5EF4-FFF2-40B4-BE49-F238E27FC236}">
+                <a16:creationId xmlns:a16="http://schemas.microsoft.com/office/drawing/2014/main" id="{4654A506-5697-D88F-5888-B22A4672632C}"/>
+              </a:ext>
+            </a:extLst>
+          </p:cNvPr>
+          <p:cNvPicPr>
+            <a:picLocks noChangeAspect="1"/>
+          </p:cNvPicPr>
+          <p:nvPr/>
+        </p:nvPicPr>
+        <p:blipFill>
+          <a:blip r:embed="rId2">
+            <a:alphaModFix amt="70000"/>
+          </a:blip>
+          <a:stretch>
+            <a:fillRect/>
+          </a:stretch>
+        </p:blipFill>
+        <p:spPr>
+          <a:xfrm>
+            <a:off x="579244" y="2851698"/>
+            <a:ext cx="5652695" cy="3202066"/>
+          </a:xfrm>
+          <a:prstGeom prst="rect">
+            <a:avLst/>
+          </a:prstGeom>
+          <a:ln>
+            <a:solidFill>
+              <a:schemeClr val="tx1"/>
+            </a:solidFill>
+            <a:prstDash val="dash"/>
+          </a:ln>
+        </p:spPr>
+      </p:pic>
       <p:sp>
         <p:nvSpPr>
-          <p:cNvPr id="4" name="TextBox 3">
-            <a:extLst>
-              <a:ext uri="{FF2B5EF4-FFF2-40B4-BE49-F238E27FC236}">
-                <a16:creationId xmlns:a16="http://schemas.microsoft.com/office/drawing/2014/main" id="{B2EE9385-272D-78F8-37EF-D7BFBD2E461E}"/>
+          <p:cNvPr id="12" name="Rectangle 11">
+            <a:extLst>
+              <a:ext uri="{FF2B5EF4-FFF2-40B4-BE49-F238E27FC236}">
+                <a16:creationId xmlns:a16="http://schemas.microsoft.com/office/drawing/2014/main" id="{F2EB35E3-7A48-7FB5-C890-8ABF44D83490}"/>
+              </a:ext>
+            </a:extLst>
+          </p:cNvPr>
+          <p:cNvSpPr/>
+          <p:nvPr/>
+        </p:nvSpPr>
+        <p:spPr>
+          <a:xfrm>
+            <a:off x="327993" y="2027584"/>
+            <a:ext cx="6200764" cy="4432851"/>
+          </a:xfrm>
+          <a:prstGeom prst="rect">
+            <a:avLst/>
+          </a:prstGeom>
+          <a:noFill/>
+          <a:ln w="19050" cap="flat" cmpd="sng" algn="ctr">
+            <a:solidFill>
+              <a:schemeClr val="dk1"/>
+            </a:solidFill>
+            <a:prstDash val="solid"/>
+            <a:round/>
+            <a:headEnd type="none" w="med" len="med"/>
+            <a:tailEnd type="none" w="med" len="med"/>
+          </a:ln>
+        </p:spPr>
+        <p:style>
+          <a:lnRef idx="0">
+            <a:scrgbClr r="0" g="0" b="0"/>
+          </a:lnRef>
+          <a:fillRef idx="0">
+            <a:scrgbClr r="0" g="0" b="0"/>
+          </a:fillRef>
+          <a:effectRef idx="0">
+            <a:scrgbClr r="0" g="0" b="0"/>
+          </a:effectRef>
+          <a:fontRef idx="minor">
+            <a:schemeClr val="dk1"/>
+          </a:fontRef>
+        </p:style>
+        <p:txBody>
+          <a:bodyPr rtlCol="0" anchor="ctr"/>
+          <a:lstStyle/>
+          <a:p>
+            <a:pPr algn="ctr"/>
+            <a:endParaRPr lang="en-SG" dirty="0"/>
+          </a:p>
+        </p:txBody>
+      </p:sp>
+      <p:sp>
+        <p:nvSpPr>
+          <p:cNvPr id="15" name="TextBox 14">
+            <a:extLst>
+              <a:ext uri="{FF2B5EF4-FFF2-40B4-BE49-F238E27FC236}">
+                <a16:creationId xmlns:a16="http://schemas.microsoft.com/office/drawing/2014/main" id="{D4A376FC-EEE0-3BCA-AB03-A1AF17A4FEEC}"/>
               </a:ext>
             </a:extLst>
           </p:cNvPr>
@@ -29265,7 +30531,7 @@
         </p:nvSpPr>
         <p:spPr>
           <a:xfrm>
-            <a:off x="0" y="-12557"/>
+            <a:off x="-9939" y="-12557"/>
             <a:ext cx="12191999" cy="461665"/>
           </a:xfrm>
           <a:prstGeom prst="rect">
@@ -29294,7 +30560,7 @@
                   <a:schemeClr val="bg1"/>
                 </a:solidFill>
               </a:rPr>
-              <a:t>User Action Emulator [ Pre-built actors we provided and monitor UI ]  </a:t>
+              <a:t>Cluster Users Emulator [ Use case: LS2023 ]  </a:t>
             </a:r>
             <a:endParaRPr lang="en-SG" sz="2400" dirty="0">
               <a:solidFill>
@@ -29306,10 +30572,10 @@
       </p:sp>
       <p:pic>
         <p:nvPicPr>
-          <p:cNvPr id="5" name="Picture 4" descr="Graphical user interface, text&#10;&#10;Description automatically generated with medium confidence">
-            <a:extLst>
-              <a:ext uri="{FF2B5EF4-FFF2-40B4-BE49-F238E27FC236}">
-                <a16:creationId xmlns:a16="http://schemas.microsoft.com/office/drawing/2014/main" id="{CCBDD8B4-58ED-392B-004A-4336DFD8CA6A}"/>
+          <p:cNvPr id="16" name="Picture 15" descr="Graphical user interface, text&#10;&#10;Description automatically generated with medium confidence">
+            <a:extLst>
+              <a:ext uri="{FF2B5EF4-FFF2-40B4-BE49-F238E27FC236}">
+                <a16:creationId xmlns:a16="http://schemas.microsoft.com/office/drawing/2014/main" id="{77C40496-49D1-C0BF-8AE2-9AE0CA6F9C35}"/>
               </a:ext>
             </a:extLst>
           </p:cNvPr>
@@ -29319,7 +30585,7 @@
           <p:nvPr/>
         </p:nvPicPr>
         <p:blipFill>
-          <a:blip r:embed="rId2">
+          <a:blip r:embed="rId3">
             <a:extLst>
               <a:ext uri="{28A0092B-C50C-407E-A947-70E740481C1C}">
                 <a14:useLocalDpi xmlns:a14="http://schemas.microsoft.com/office/drawing/2010/main" val="0"/>
@@ -29340,342 +30606,12 @@
           </a:prstGeom>
         </p:spPr>
       </p:pic>
-      <p:graphicFrame>
-        <p:nvGraphicFramePr>
-          <p:cNvPr id="7" name="Table 5">
-            <a:extLst>
-              <a:ext uri="{FF2B5EF4-FFF2-40B4-BE49-F238E27FC236}">
-                <a16:creationId xmlns:a16="http://schemas.microsoft.com/office/drawing/2014/main" id="{24B83012-43CA-4227-7189-5FC416B45BBC}"/>
-              </a:ext>
-            </a:extLst>
-          </p:cNvPr>
-          <p:cNvGraphicFramePr>
-            <a:graphicFrameLocks noGrp="1"/>
-          </p:cNvGraphicFramePr>
-          <p:nvPr>
-            <p:extLst>
-              <p:ext uri="{D42A27DB-BD31-4B8C-83A1-F6EECF244321}">
-                <p14:modId xmlns:p14="http://schemas.microsoft.com/office/powerpoint/2010/main" val="1642846139"/>
-              </p:ext>
-            </p:extLst>
-          </p:nvPr>
-        </p:nvGraphicFramePr>
-        <p:xfrm>
-          <a:off x="372940" y="1204137"/>
-          <a:ext cx="3548820" cy="1341120"/>
-        </p:xfrm>
-        <a:graphic>
-          <a:graphicData uri="http://schemas.openxmlformats.org/drawingml/2006/table">
-            <a:tbl>
-              <a:tblPr firstRow="1" bandRow="1">
-                <a:tableStyleId>{5C22544A-7EE6-4342-B048-85BDC9FD1C3A}</a:tableStyleId>
-              </a:tblPr>
-              <a:tblGrid>
-                <a:gridCol w="380979">
-                  <a:extLst>
-                    <a:ext uri="{9D8B030D-6E8A-4147-A177-3AD203B41FA5}">
-                      <a16:colId xmlns:a16="http://schemas.microsoft.com/office/drawing/2014/main" val="3380695120"/>
-                    </a:ext>
-                  </a:extLst>
-                </a:gridCol>
-                <a:gridCol w="1087359">
-                  <a:extLst>
-                    <a:ext uri="{9D8B030D-6E8A-4147-A177-3AD203B41FA5}">
-                      <a16:colId xmlns:a16="http://schemas.microsoft.com/office/drawing/2014/main" val="308096956"/>
-                    </a:ext>
-                  </a:extLst>
-                </a:gridCol>
-                <a:gridCol w="2080482">
-                  <a:extLst>
-                    <a:ext uri="{9D8B030D-6E8A-4147-A177-3AD203B41FA5}">
-                      <a16:colId xmlns:a16="http://schemas.microsoft.com/office/drawing/2014/main" val="1115179321"/>
-                    </a:ext>
-                  </a:extLst>
-                </a:gridCol>
-              </a:tblGrid>
-              <a:tr h="370840">
-                <a:tc>
-                  <a:txBody>
-                    <a:bodyPr/>
-                    <a:lstStyle/>
-                    <a:p>
-                      <a:r>
-                        <a:rPr lang="en-SG" sz="1000" dirty="0"/>
-                        <a:t>Index</a:t>
-                      </a:r>
-                    </a:p>
-                  </a:txBody>
-                  <a:tcPr>
-                    <a:lnL w="12700" cap="flat" cmpd="sng" algn="ctr">
-                      <a:solidFill>
-                        <a:schemeClr val="tx1"/>
-                      </a:solidFill>
-                      <a:prstDash val="solid"/>
-                      <a:round/>
-                      <a:headEnd type="none" w="med" len="med"/>
-                      <a:tailEnd type="none" w="med" len="med"/>
-                    </a:lnL>
-                    <a:lnT w="12700" cap="flat" cmpd="sng" algn="ctr">
-                      <a:solidFill>
-                        <a:schemeClr val="tx1"/>
-                      </a:solidFill>
-                      <a:prstDash val="solid"/>
-                      <a:round/>
-                      <a:headEnd type="none" w="med" len="med"/>
-                      <a:tailEnd type="none" w="med" len="med"/>
-                    </a:lnT>
-                  </a:tcPr>
-                </a:tc>
-                <a:tc>
-                  <a:txBody>
-                    <a:bodyPr/>
-                    <a:lstStyle/>
-                    <a:p>
-                      <a:r>
-                        <a:rPr lang="en-SG" sz="1000" dirty="0"/>
-                        <a:t>Actor module name</a:t>
-                      </a:r>
-                    </a:p>
-                  </a:txBody>
-                  <a:tcPr>
-                    <a:lnT w="12700" cap="flat" cmpd="sng" algn="ctr">
-                      <a:solidFill>
-                        <a:schemeClr val="tx1"/>
-                      </a:solidFill>
-                      <a:prstDash val="solid"/>
-                      <a:round/>
-                      <a:headEnd type="none" w="med" len="med"/>
-                      <a:tailEnd type="none" w="med" len="med"/>
-                    </a:lnT>
-                  </a:tcPr>
-                </a:tc>
-                <a:tc>
-                  <a:txBody>
-                    <a:bodyPr/>
-                    <a:lstStyle/>
-                    <a:p>
-                      <a:r>
-                        <a:rPr lang="en-SG" sz="1000" dirty="0"/>
-                        <a:t>Function provided</a:t>
-                      </a:r>
-                    </a:p>
-                  </a:txBody>
-                  <a:tcPr>
-                    <a:lnR w="12700" cap="flat" cmpd="sng" algn="ctr">
-                      <a:solidFill>
-                        <a:schemeClr val="tx1"/>
-                      </a:solidFill>
-                      <a:prstDash val="solid"/>
-                      <a:round/>
-                      <a:headEnd type="none" w="med" len="med"/>
-                      <a:tailEnd type="none" w="med" len="med"/>
-                    </a:lnR>
-                    <a:lnT w="12700" cap="flat" cmpd="sng" algn="ctr">
-                      <a:solidFill>
-                        <a:schemeClr val="tx1"/>
-                      </a:solidFill>
-                      <a:prstDash val="solid"/>
-                      <a:round/>
-                      <a:headEnd type="none" w="med" len="med"/>
-                      <a:tailEnd type="none" w="med" len="med"/>
-                    </a:lnT>
-                  </a:tcPr>
-                </a:tc>
-                <a:extLst>
-                  <a:ext uri="{0D108BD9-81ED-4DB2-BD59-A6C34878D82A}">
-                    <a16:rowId xmlns:a16="http://schemas.microsoft.com/office/drawing/2014/main" val="896556790"/>
-                  </a:ext>
-                </a:extLst>
-              </a:tr>
-              <a:tr h="370840">
-                <a:tc>
-                  <a:txBody>
-                    <a:bodyPr/>
-                    <a:lstStyle/>
-                    <a:p>
-                      <a:r>
-                        <a:rPr lang="en-SG" sz="1000" dirty="0"/>
-                        <a:t>1</a:t>
-                      </a:r>
-                    </a:p>
-                  </a:txBody>
-                  <a:tcPr>
-                    <a:lnL w="12700" cap="flat" cmpd="sng" algn="ctr">
-                      <a:solidFill>
-                        <a:schemeClr val="tx1"/>
-                      </a:solidFill>
-                      <a:prstDash val="solid"/>
-                      <a:round/>
-                      <a:headEnd type="none" w="med" len="med"/>
-                      <a:tailEnd type="none" w="med" len="med"/>
-                    </a:lnL>
-                  </a:tcPr>
-                </a:tc>
-                <a:tc>
-                  <a:txBody>
-                    <a:bodyPr/>
-                    <a:lstStyle/>
-                    <a:p>
-                      <a:r>
-                        <a:rPr lang="en-SG" sz="1000" b="0" kern="1200" dirty="0">
-                          <a:solidFill>
-                            <a:schemeClr val="dk1"/>
-                          </a:solidFill>
-                          <a:effectLst/>
-                        </a:rPr>
-                        <a:t>CmdActor</a:t>
-                      </a:r>
-                      <a:endParaRPr lang="en-SG" sz="1000" dirty="0"/>
-                    </a:p>
-                  </a:txBody>
-                  <a:tcPr/>
-                </a:tc>
-                <a:tc>
-                  <a:txBody>
-                    <a:bodyPr/>
-                    <a:lstStyle/>
-                    <a:p>
-                      <a:r>
-                        <a:rPr lang="en-US" sz="1000" b="0" kern="1200" dirty="0">
-                          <a:solidFill>
-                            <a:schemeClr val="dk1"/>
-                          </a:solidFill>
-                          <a:effectLst/>
-                        </a:rPr>
-                        <a:t>Run Window/Linux  commend under cmd or PowerShell.</a:t>
-                      </a:r>
-                      <a:endParaRPr lang="en-SG" sz="1000" dirty="0"/>
-                    </a:p>
-                  </a:txBody>
-                  <a:tcPr>
-                    <a:lnR w="12700" cap="flat" cmpd="sng" algn="ctr">
-                      <a:solidFill>
-                        <a:schemeClr val="tx1"/>
-                      </a:solidFill>
-                      <a:prstDash val="solid"/>
-                      <a:round/>
-                      <a:headEnd type="none" w="med" len="med"/>
-                      <a:tailEnd type="none" w="med" len="med"/>
-                    </a:lnR>
-                  </a:tcPr>
-                </a:tc>
-                <a:extLst>
-                  <a:ext uri="{0D108BD9-81ED-4DB2-BD59-A6C34878D82A}">
-                    <a16:rowId xmlns:a16="http://schemas.microsoft.com/office/drawing/2014/main" val="553099790"/>
-                  </a:ext>
-                </a:extLst>
-              </a:tr>
-              <a:tr h="370840">
-                <a:tc>
-                  <a:txBody>
-                    <a:bodyPr/>
-                    <a:lstStyle/>
-                    <a:p>
-                      <a:r>
-                        <a:rPr lang="en-SG" sz="1000" dirty="0"/>
-                        <a:t>2</a:t>
-                      </a:r>
-                    </a:p>
-                  </a:txBody>
-                  <a:tcPr>
-                    <a:lnL w="12700" cap="flat" cmpd="sng" algn="ctr">
-                      <a:solidFill>
-                        <a:schemeClr val="tx1"/>
-                      </a:solidFill>
-                      <a:prstDash val="solid"/>
-                      <a:round/>
-                      <a:headEnd type="none" w="med" len="med"/>
-                      <a:tailEnd type="none" w="med" len="med"/>
-                    </a:lnL>
-                    <a:lnB w="12700" cap="flat" cmpd="sng" algn="ctr">
-                      <a:solidFill>
-                        <a:schemeClr val="tx1"/>
-                      </a:solidFill>
-                      <a:prstDash val="solid"/>
-                      <a:round/>
-                      <a:headEnd type="none" w="med" len="med"/>
-                      <a:tailEnd type="none" w="med" len="med"/>
-                    </a:lnB>
-                  </a:tcPr>
-                </a:tc>
-                <a:tc>
-                  <a:txBody>
-                    <a:bodyPr/>
-                    <a:lstStyle/>
-                    <a:p>
-                      <a:r>
-                        <a:rPr lang="en-SG" sz="1000" b="0" kern="1200" dirty="0">
-                          <a:solidFill>
-                            <a:schemeClr val="dk1"/>
-                          </a:solidFill>
-                          <a:effectLst/>
-                        </a:rPr>
-                        <a:t>SettingActor</a:t>
-                      </a:r>
-                      <a:endParaRPr lang="en-SG" sz="1000" dirty="0"/>
-                    </a:p>
-                  </a:txBody>
-                  <a:tcPr>
-                    <a:lnB w="12700" cap="flat" cmpd="sng" algn="ctr">
-                      <a:solidFill>
-                        <a:schemeClr val="tx1"/>
-                      </a:solidFill>
-                      <a:prstDash val="solid"/>
-                      <a:round/>
-                      <a:headEnd type="none" w="med" len="med"/>
-                      <a:tailEnd type="none" w="med" len="med"/>
-                    </a:lnB>
-                  </a:tcPr>
-                </a:tc>
-                <a:tc>
-                  <a:txBody>
-                    <a:bodyPr/>
-                    <a:lstStyle/>
-                    <a:p>
-                      <a:r>
-                        <a:rPr lang="en-US" sz="1000" dirty="0"/>
-                        <a:t>Change some OS setting (on/off firewall, change display bg, sort desktop, reboot)</a:t>
-                      </a:r>
-                      <a:endParaRPr lang="en-SG" sz="1000" dirty="0"/>
-                    </a:p>
-                  </a:txBody>
-                  <a:tcPr>
-                    <a:lnR w="12700" cap="flat" cmpd="sng" algn="ctr">
-                      <a:solidFill>
-                        <a:schemeClr val="tx1"/>
-                      </a:solidFill>
-                      <a:prstDash val="solid"/>
-                      <a:round/>
-                      <a:headEnd type="none" w="med" len="med"/>
-                      <a:tailEnd type="none" w="med" len="med"/>
-                    </a:lnR>
-                    <a:lnB w="12700" cap="flat" cmpd="sng" algn="ctr">
-                      <a:solidFill>
-                        <a:schemeClr val="tx1"/>
-                      </a:solidFill>
-                      <a:prstDash val="solid"/>
-                      <a:round/>
-                      <a:headEnd type="none" w="med" len="med"/>
-                      <a:tailEnd type="none" w="med" len="med"/>
-                    </a:lnB>
-                  </a:tcPr>
-                </a:tc>
-                <a:extLst>
-                  <a:ext uri="{0D108BD9-81ED-4DB2-BD59-A6C34878D82A}">
-                    <a16:rowId xmlns:a16="http://schemas.microsoft.com/office/drawing/2014/main" val="3476181168"/>
-                  </a:ext>
-                </a:extLst>
-              </a:tr>
-            </a:tbl>
-          </a:graphicData>
-        </a:graphic>
-      </p:graphicFrame>
       <p:sp>
         <p:nvSpPr>
-          <p:cNvPr id="8" name="TextBox 7">
-            <a:extLst>
-              <a:ext uri="{FF2B5EF4-FFF2-40B4-BE49-F238E27FC236}">
-                <a16:creationId xmlns:a16="http://schemas.microsoft.com/office/drawing/2014/main" id="{138EFD8C-376B-7A8F-739A-6047F97BE298}"/>
+          <p:cNvPr id="17" name="TextBox 16">
+            <a:extLst>
+              <a:ext uri="{FF2B5EF4-FFF2-40B4-BE49-F238E27FC236}">
+                <a16:creationId xmlns:a16="http://schemas.microsoft.com/office/drawing/2014/main" id="{EBF08DFE-C653-793C-2A90-1F31A7ED92CE}"/>
               </a:ext>
             </a:extLst>
           </p:cNvPr>
@@ -29684,8 +30620,8 @@
         </p:nvSpPr>
         <p:spPr>
           <a:xfrm>
-            <a:off x="259568" y="755026"/>
-            <a:ext cx="4269408" cy="338554"/>
+            <a:off x="327992" y="2027584"/>
+            <a:ext cx="1510747" cy="338554"/>
           </a:xfrm>
           <a:prstGeom prst="rect">
             <a:avLst/>
@@ -29699,486 +30635,18 @@
           <a:lstStyle/>
           <a:p>
             <a:r>
-              <a:rPr lang="en-US" sz="1600" b="1" dirty="0"/>
-              <a:t>System Operation Actors </a:t>
-            </a:r>
-            <a:r>
               <a:rPr lang="en-SG" sz="1600" b="1" dirty="0"/>
-              <a:t>Repository </a:t>
+              <a:t>Physical Server</a:t>
             </a:r>
           </a:p>
         </p:txBody>
       </p:sp>
-      <p:graphicFrame>
-        <p:nvGraphicFramePr>
-          <p:cNvPr id="9" name="Table 5">
-            <a:extLst>
-              <a:ext uri="{FF2B5EF4-FFF2-40B4-BE49-F238E27FC236}">
-                <a16:creationId xmlns:a16="http://schemas.microsoft.com/office/drawing/2014/main" id="{C0D742AC-0B12-6BEA-176A-BE437E45E5D3}"/>
-              </a:ext>
-            </a:extLst>
-          </p:cNvPr>
-          <p:cNvGraphicFramePr>
-            <a:graphicFrameLocks noGrp="1"/>
-          </p:cNvGraphicFramePr>
-          <p:nvPr>
-            <p:extLst>
-              <p:ext uri="{D42A27DB-BD31-4B8C-83A1-F6EECF244321}">
-                <p14:modId xmlns:p14="http://schemas.microsoft.com/office/powerpoint/2010/main" val="397633608"/>
-              </p:ext>
-            </p:extLst>
-          </p:nvPr>
-        </p:nvGraphicFramePr>
-        <p:xfrm>
-          <a:off x="372940" y="3122486"/>
-          <a:ext cx="3548820" cy="2064989"/>
-        </p:xfrm>
-        <a:graphic>
-          <a:graphicData uri="http://schemas.openxmlformats.org/drawingml/2006/table">
-            <a:tbl>
-              <a:tblPr firstRow="1" bandRow="1">
-                <a:tableStyleId>{5C22544A-7EE6-4342-B048-85BDC9FD1C3A}</a:tableStyleId>
-              </a:tblPr>
-              <a:tblGrid>
-                <a:gridCol w="380979">
-                  <a:extLst>
-                    <a:ext uri="{9D8B030D-6E8A-4147-A177-3AD203B41FA5}">
-                      <a16:colId xmlns:a16="http://schemas.microsoft.com/office/drawing/2014/main" val="3380695120"/>
-                    </a:ext>
-                  </a:extLst>
-                </a:gridCol>
-                <a:gridCol w="1006894">
-                  <a:extLst>
-                    <a:ext uri="{9D8B030D-6E8A-4147-A177-3AD203B41FA5}">
-                      <a16:colId xmlns:a16="http://schemas.microsoft.com/office/drawing/2014/main" val="308096956"/>
-                    </a:ext>
-                  </a:extLst>
-                </a:gridCol>
-                <a:gridCol w="2160947">
-                  <a:extLst>
-                    <a:ext uri="{9D8B030D-6E8A-4147-A177-3AD203B41FA5}">
-                      <a16:colId xmlns:a16="http://schemas.microsoft.com/office/drawing/2014/main" val="1115179321"/>
-                    </a:ext>
-                  </a:extLst>
-                </a:gridCol>
-              </a:tblGrid>
-              <a:tr h="353412">
-                <a:tc>
-                  <a:txBody>
-                    <a:bodyPr/>
-                    <a:lstStyle/>
-                    <a:p>
-                      <a:r>
-                        <a:rPr lang="en-SG" sz="1000" dirty="0"/>
-                        <a:t>Index</a:t>
-                      </a:r>
-                    </a:p>
-                  </a:txBody>
-                  <a:tcPr>
-                    <a:lnL w="12700" cap="flat" cmpd="sng" algn="ctr">
-                      <a:solidFill>
-                        <a:schemeClr val="tx1"/>
-                      </a:solidFill>
-                      <a:prstDash val="solid"/>
-                      <a:round/>
-                      <a:headEnd type="none" w="med" len="med"/>
-                      <a:tailEnd type="none" w="med" len="med"/>
-                    </a:lnL>
-                    <a:lnT w="12700" cap="flat" cmpd="sng" algn="ctr">
-                      <a:solidFill>
-                        <a:schemeClr val="tx1"/>
-                      </a:solidFill>
-                      <a:prstDash val="solid"/>
-                      <a:round/>
-                      <a:headEnd type="none" w="med" len="med"/>
-                      <a:tailEnd type="none" w="med" len="med"/>
-                    </a:lnT>
-                  </a:tcPr>
-                </a:tc>
-                <a:tc>
-                  <a:txBody>
-                    <a:bodyPr/>
-                    <a:lstStyle/>
-                    <a:p>
-                      <a:r>
-                        <a:rPr lang="en-SG" sz="1000" dirty="0"/>
-                        <a:t>Actor module name</a:t>
-                      </a:r>
-                    </a:p>
-                  </a:txBody>
-                  <a:tcPr>
-                    <a:lnT w="12700" cap="flat" cmpd="sng" algn="ctr">
-                      <a:solidFill>
-                        <a:schemeClr val="tx1"/>
-                      </a:solidFill>
-                      <a:prstDash val="solid"/>
-                      <a:round/>
-                      <a:headEnd type="none" w="med" len="med"/>
-                      <a:tailEnd type="none" w="med" len="med"/>
-                    </a:lnT>
-                  </a:tcPr>
-                </a:tc>
-                <a:tc>
-                  <a:txBody>
-                    <a:bodyPr/>
-                    <a:lstStyle/>
-                    <a:p>
-                      <a:r>
-                        <a:rPr lang="en-SG" sz="1000" dirty="0"/>
-                        <a:t>Function provided</a:t>
-                      </a:r>
-                    </a:p>
-                  </a:txBody>
-                  <a:tcPr>
-                    <a:lnR w="12700" cap="flat" cmpd="sng" algn="ctr">
-                      <a:solidFill>
-                        <a:schemeClr val="tx1"/>
-                      </a:solidFill>
-                      <a:prstDash val="solid"/>
-                      <a:round/>
-                      <a:headEnd type="none" w="med" len="med"/>
-                      <a:tailEnd type="none" w="med" len="med"/>
-                    </a:lnR>
-                    <a:lnT w="12700" cap="flat" cmpd="sng" algn="ctr">
-                      <a:solidFill>
-                        <a:schemeClr val="tx1"/>
-                      </a:solidFill>
-                      <a:prstDash val="solid"/>
-                      <a:round/>
-                      <a:headEnd type="none" w="med" len="med"/>
-                      <a:tailEnd type="none" w="med" len="med"/>
-                    </a:lnT>
-                  </a:tcPr>
-                </a:tc>
-                <a:extLst>
-                  <a:ext uri="{0D108BD9-81ED-4DB2-BD59-A6C34878D82A}">
-                    <a16:rowId xmlns:a16="http://schemas.microsoft.com/office/drawing/2014/main" val="896556790"/>
-                  </a:ext>
-                </a:extLst>
-              </a:tr>
-              <a:tr h="522857">
-                <a:tc>
-                  <a:txBody>
-                    <a:bodyPr/>
-                    <a:lstStyle/>
-                    <a:p>
-                      <a:r>
-                        <a:rPr lang="en-SG" sz="1000" dirty="0"/>
-                        <a:t>1</a:t>
-                      </a:r>
-                    </a:p>
-                  </a:txBody>
-                  <a:tcPr>
-                    <a:lnL w="12700" cap="flat" cmpd="sng" algn="ctr">
-                      <a:solidFill>
-                        <a:schemeClr val="tx1"/>
-                      </a:solidFill>
-                      <a:prstDash val="solid"/>
-                      <a:round/>
-                      <a:headEnd type="none" w="med" len="med"/>
-                      <a:tailEnd type="none" w="med" len="med"/>
-                    </a:lnL>
-                  </a:tcPr>
-                </a:tc>
-                <a:tc>
-                  <a:txBody>
-                    <a:bodyPr/>
-                    <a:lstStyle/>
-                    <a:p>
-                      <a:r>
-                        <a:rPr lang="en-SG" sz="1000" b="0" kern="1200" dirty="0">
-                          <a:solidFill>
-                            <a:schemeClr val="dk1"/>
-                          </a:solidFill>
-                          <a:effectLst/>
-                        </a:rPr>
-                        <a:t>SerialConnector</a:t>
-                      </a:r>
-                      <a:endParaRPr lang="en-SG" sz="1000" dirty="0"/>
-                    </a:p>
-                  </a:txBody>
-                  <a:tcPr/>
-                </a:tc>
-                <a:tc>
-                  <a:txBody>
-                    <a:bodyPr/>
-                    <a:lstStyle/>
-                    <a:p>
-                      <a:r>
-                        <a:rPr lang="en-US" sz="1000" b="0" kern="1200" dirty="0">
-                          <a:solidFill>
-                            <a:schemeClr val="dk1"/>
-                          </a:solidFill>
-                          <a:effectLst/>
-                        </a:rPr>
-                        <a:t>Send and read message to/from COM port.</a:t>
-                      </a:r>
-                      <a:endParaRPr lang="en-SG" sz="1000" dirty="0"/>
-                    </a:p>
-                  </a:txBody>
-                  <a:tcPr>
-                    <a:lnR w="12700" cap="flat" cmpd="sng" algn="ctr">
-                      <a:solidFill>
-                        <a:schemeClr val="tx1"/>
-                      </a:solidFill>
-                      <a:prstDash val="solid"/>
-                      <a:round/>
-                      <a:headEnd type="none" w="med" len="med"/>
-                      <a:tailEnd type="none" w="med" len="med"/>
-                    </a:lnR>
-                  </a:tcPr>
-                </a:tc>
-                <a:extLst>
-                  <a:ext uri="{0D108BD9-81ED-4DB2-BD59-A6C34878D82A}">
-                    <a16:rowId xmlns:a16="http://schemas.microsoft.com/office/drawing/2014/main" val="553099790"/>
-                  </a:ext>
-                </a:extLst>
-              </a:tr>
-              <a:tr h="353412">
-                <a:tc>
-                  <a:txBody>
-                    <a:bodyPr/>
-                    <a:lstStyle/>
-                    <a:p>
-                      <a:r>
-                        <a:rPr lang="en-SG" sz="1000" dirty="0"/>
-                        <a:t>2</a:t>
-                      </a:r>
-                    </a:p>
-                  </a:txBody>
-                  <a:tcPr>
-                    <a:lnL w="12700" cap="flat" cmpd="sng" algn="ctr">
-                      <a:solidFill>
-                        <a:schemeClr val="tx1"/>
-                      </a:solidFill>
-                      <a:prstDash val="solid"/>
-                      <a:round/>
-                      <a:headEnd type="none" w="med" len="med"/>
-                      <a:tailEnd type="none" w="med" len="med"/>
-                    </a:lnL>
-                  </a:tcPr>
-                </a:tc>
-                <a:tc>
-                  <a:txBody>
-                    <a:bodyPr/>
-                    <a:lstStyle/>
-                    <a:p>
-                      <a:r>
-                        <a:rPr lang="en-SG" sz="1000" b="0" kern="1200" dirty="0">
-                          <a:solidFill>
-                            <a:schemeClr val="dk1"/>
-                          </a:solidFill>
-                          <a:effectLst/>
-                        </a:rPr>
-                        <a:t>camEchoServer</a:t>
-                      </a:r>
-                      <a:endParaRPr lang="en-SG" sz="1000" dirty="0"/>
-                    </a:p>
-                  </a:txBody>
-                  <a:tcPr/>
-                </a:tc>
-                <a:tc>
-                  <a:txBody>
-                    <a:bodyPr/>
-                    <a:lstStyle/>
-                    <a:p>
-                      <a:r>
-                        <a:rPr lang="en-US" sz="1000" dirty="0"/>
-                        <a:t>Computer built in camera/usb camera video read record. Start a HLS server.</a:t>
-                      </a:r>
-                      <a:endParaRPr lang="en-SG" sz="1000" dirty="0"/>
-                    </a:p>
-                  </a:txBody>
-                  <a:tcPr>
-                    <a:lnR w="12700" cap="flat" cmpd="sng" algn="ctr">
-                      <a:solidFill>
-                        <a:schemeClr val="tx1"/>
-                      </a:solidFill>
-                      <a:prstDash val="solid"/>
-                      <a:round/>
-                      <a:headEnd type="none" w="med" len="med"/>
-                      <a:tailEnd type="none" w="med" len="med"/>
-                    </a:lnR>
-                  </a:tcPr>
-                </a:tc>
-                <a:extLst>
-                  <a:ext uri="{0D108BD9-81ED-4DB2-BD59-A6C34878D82A}">
-                    <a16:rowId xmlns:a16="http://schemas.microsoft.com/office/drawing/2014/main" val="3476181168"/>
-                  </a:ext>
-                </a:extLst>
-              </a:tr>
-              <a:tr h="353412">
-                <a:tc>
-                  <a:txBody>
-                    <a:bodyPr/>
-                    <a:lstStyle/>
-                    <a:p>
-                      <a:r>
-                        <a:rPr lang="en-SG" sz="1000" dirty="0"/>
-                        <a:t>3</a:t>
-                      </a:r>
-                    </a:p>
-                  </a:txBody>
-                  <a:tcPr>
-                    <a:lnL w="12700" cap="flat" cmpd="sng" algn="ctr">
-                      <a:solidFill>
-                        <a:schemeClr val="tx1"/>
-                      </a:solidFill>
-                      <a:prstDash val="solid"/>
-                      <a:round/>
-                      <a:headEnd type="none" w="med" len="med"/>
-                      <a:tailEnd type="none" w="med" len="med"/>
-                    </a:lnL>
-                  </a:tcPr>
-                </a:tc>
-                <a:tc>
-                  <a:txBody>
-                    <a:bodyPr/>
-                    <a:lstStyle/>
-                    <a:p>
-                      <a:r>
-                        <a:rPr lang="en-SG" sz="1000" dirty="0"/>
-                        <a:t>ScreanRecorder</a:t>
-                      </a:r>
-                    </a:p>
-                  </a:txBody>
-                  <a:tcPr/>
-                </a:tc>
-                <a:tc>
-                  <a:txBody>
-                    <a:bodyPr/>
-                    <a:lstStyle/>
-                    <a:p>
-                      <a:r>
-                        <a:rPr lang="en-US" sz="1000" dirty="0"/>
-                        <a:t>snapshot the screen under frequency.</a:t>
-                      </a:r>
-                      <a:endParaRPr lang="en-SG" sz="1000" dirty="0"/>
-                    </a:p>
-                  </a:txBody>
-                  <a:tcPr>
-                    <a:lnR w="12700" cap="flat" cmpd="sng" algn="ctr">
-                      <a:solidFill>
-                        <a:schemeClr val="tx1"/>
-                      </a:solidFill>
-                      <a:prstDash val="solid"/>
-                      <a:round/>
-                      <a:headEnd type="none" w="med" len="med"/>
-                      <a:tailEnd type="none" w="med" len="med"/>
-                    </a:lnR>
-                  </a:tcPr>
-                </a:tc>
-                <a:extLst>
-                  <a:ext uri="{0D108BD9-81ED-4DB2-BD59-A6C34878D82A}">
-                    <a16:rowId xmlns:a16="http://schemas.microsoft.com/office/drawing/2014/main" val="3794426225"/>
-                  </a:ext>
-                </a:extLst>
-              </a:tr>
-              <a:tr h="353412">
-                <a:tc>
-                  <a:txBody>
-                    <a:bodyPr/>
-                    <a:lstStyle/>
-                    <a:p>
-                      <a:r>
-                        <a:rPr lang="en-SG" sz="1000" dirty="0"/>
-                        <a:t>4</a:t>
-                      </a:r>
-                    </a:p>
-                  </a:txBody>
-                  <a:tcPr>
-                    <a:lnL w="12700" cap="flat" cmpd="sng" algn="ctr">
-                      <a:solidFill>
-                        <a:schemeClr val="tx1"/>
-                      </a:solidFill>
-                      <a:prstDash val="solid"/>
-                      <a:round/>
-                      <a:headEnd type="none" w="med" len="med"/>
-                      <a:tailEnd type="none" w="med" len="med"/>
-                    </a:lnL>
-                    <a:lnB w="12700" cap="flat" cmpd="sng" algn="ctr">
-                      <a:solidFill>
-                        <a:schemeClr val="tx1"/>
-                      </a:solidFill>
-                      <a:prstDash val="solid"/>
-                      <a:round/>
-                      <a:headEnd type="none" w="med" len="med"/>
-                      <a:tailEnd type="none" w="med" len="med"/>
-                    </a:lnB>
-                  </a:tcPr>
-                </a:tc>
-                <a:tc>
-                  <a:txBody>
-                    <a:bodyPr/>
-                    <a:lstStyle/>
-                    <a:p>
-                      <a:r>
-                        <a:rPr lang="en-SG" sz="1000" dirty="0"/>
-                        <a:t>DBHandler</a:t>
-                      </a:r>
-                    </a:p>
-                  </a:txBody>
-                  <a:tcPr>
-                    <a:lnB w="12700" cap="flat" cmpd="sng" algn="ctr">
-                      <a:solidFill>
-                        <a:schemeClr val="tx1"/>
-                      </a:solidFill>
-                      <a:prstDash val="solid"/>
-                      <a:round/>
-                      <a:headEnd type="none" w="med" len="med"/>
-                      <a:tailEnd type="none" w="med" len="med"/>
-                    </a:lnB>
-                  </a:tcPr>
-                </a:tc>
-                <a:tc>
-                  <a:txBody>
-                    <a:bodyPr/>
-                    <a:lstStyle/>
-                    <a:p>
-                      <a:r>
-                        <a:rPr lang="en-US" sz="1000" dirty="0"/>
-                        <a:t>DataBase (SQLite3, influxDB, arangodb) access action simulator.</a:t>
-                      </a:r>
-                      <a:endParaRPr lang="en-SG" sz="1000" dirty="0"/>
-                    </a:p>
-                  </a:txBody>
-                  <a:tcPr>
-                    <a:lnR w="12700" cap="flat" cmpd="sng" algn="ctr">
-                      <a:solidFill>
-                        <a:schemeClr val="tx1"/>
-                      </a:solidFill>
-                      <a:prstDash val="solid"/>
-                      <a:round/>
-                      <a:headEnd type="none" w="med" len="med"/>
-                      <a:tailEnd type="none" w="med" len="med"/>
-                    </a:lnR>
-                    <a:lnB w="12700" cap="flat" cmpd="sng" algn="ctr">
-                      <a:solidFill>
-                        <a:schemeClr val="tx1"/>
-                      </a:solidFill>
-                      <a:prstDash val="solid"/>
-                      <a:round/>
-                      <a:headEnd type="none" w="med" len="med"/>
-                      <a:tailEnd type="none" w="med" len="med"/>
-                    </a:lnB>
-                  </a:tcPr>
-                </a:tc>
-                <a:extLst>
-                  <a:ext uri="{0D108BD9-81ED-4DB2-BD59-A6C34878D82A}">
-                    <a16:rowId xmlns:a16="http://schemas.microsoft.com/office/drawing/2014/main" val="3781525643"/>
-                  </a:ext>
-                </a:extLst>
-              </a:tr>
-            </a:tbl>
-          </a:graphicData>
-        </a:graphic>
-      </p:graphicFrame>
       <p:sp>
         <p:nvSpPr>
-          <p:cNvPr id="10" name="TextBox 9">
-            <a:extLst>
-              <a:ext uri="{FF2B5EF4-FFF2-40B4-BE49-F238E27FC236}">
-                <a16:creationId xmlns:a16="http://schemas.microsoft.com/office/drawing/2014/main" id="{DABC52E8-651F-68A0-4FD1-0C1389D4F432}"/>
+          <p:cNvPr id="18" name="TextBox 17">
+            <a:extLst>
+              <a:ext uri="{FF2B5EF4-FFF2-40B4-BE49-F238E27FC236}">
+                <a16:creationId xmlns:a16="http://schemas.microsoft.com/office/drawing/2014/main" id="{DD0F07C9-038A-D995-B5E2-EF0922867D50}"/>
               </a:ext>
             </a:extLst>
           </p:cNvPr>
@@ -30187,8 +30655,8 @@
         </p:nvSpPr>
         <p:spPr>
           <a:xfrm>
-            <a:off x="259568" y="2670028"/>
-            <a:ext cx="4269408" cy="338554"/>
+            <a:off x="447594" y="2520738"/>
+            <a:ext cx="2957997" cy="276999"/>
           </a:xfrm>
           <a:prstGeom prst="rect">
             <a:avLst/>
@@ -30202,18 +30670,293 @@
           <a:lstStyle/>
           <a:p>
             <a:r>
-              <a:rPr lang="en-SG" sz="1600" b="1" dirty="0"/>
-              <a:t>Other Action Repository</a:t>
+              <a:rPr lang="en-SG" sz="1200" dirty="0"/>
+              <a:t>Test environment built by virtual box [VMs]</a:t>
             </a:r>
           </a:p>
         </p:txBody>
       </p:sp>
+      <p:pic>
+        <p:nvPicPr>
+          <p:cNvPr id="19" name="Picture 18">
+            <a:extLst>
+              <a:ext uri="{FF2B5EF4-FFF2-40B4-BE49-F238E27FC236}">
+                <a16:creationId xmlns:a16="http://schemas.microsoft.com/office/drawing/2014/main" id="{A5663F4A-DF56-0BE4-0874-D3C7A9386952}"/>
+              </a:ext>
+            </a:extLst>
+          </p:cNvPr>
+          <p:cNvPicPr>
+            <a:picLocks noChangeAspect="1"/>
+          </p:cNvPicPr>
+          <p:nvPr/>
+        </p:nvPicPr>
+        <p:blipFill>
+          <a:blip r:embed="rId4"/>
+          <a:stretch>
+            <a:fillRect/>
+          </a:stretch>
+        </p:blipFill>
+        <p:spPr>
+          <a:xfrm>
+            <a:off x="3335903" y="5421141"/>
+            <a:ext cx="357810" cy="278297"/>
+          </a:xfrm>
+          <a:prstGeom prst="rect">
+            <a:avLst/>
+          </a:prstGeom>
+          <a:ln w="12700">
+            <a:solidFill>
+              <a:schemeClr val="tx1"/>
+            </a:solidFill>
+          </a:ln>
+        </p:spPr>
+      </p:pic>
+      <p:pic>
+        <p:nvPicPr>
+          <p:cNvPr id="20" name="Picture 19">
+            <a:extLst>
+              <a:ext uri="{FF2B5EF4-FFF2-40B4-BE49-F238E27FC236}">
+                <a16:creationId xmlns:a16="http://schemas.microsoft.com/office/drawing/2014/main" id="{61575D29-847C-72AF-3576-65E140622928}"/>
+              </a:ext>
+            </a:extLst>
+          </p:cNvPr>
+          <p:cNvPicPr>
+            <a:picLocks noChangeAspect="1"/>
+          </p:cNvPicPr>
+          <p:nvPr/>
+        </p:nvPicPr>
+        <p:blipFill>
+          <a:blip r:embed="rId4"/>
+          <a:stretch>
+            <a:fillRect/>
+          </a:stretch>
+        </p:blipFill>
+        <p:spPr>
+          <a:xfrm>
+            <a:off x="4459128" y="5411202"/>
+            <a:ext cx="357810" cy="278297"/>
+          </a:xfrm>
+          <a:prstGeom prst="rect">
+            <a:avLst/>
+          </a:prstGeom>
+          <a:ln w="12700">
+            <a:solidFill>
+              <a:schemeClr val="tx1"/>
+            </a:solidFill>
+          </a:ln>
+        </p:spPr>
+      </p:pic>
+      <p:pic>
+        <p:nvPicPr>
+          <p:cNvPr id="21" name="Picture 20">
+            <a:extLst>
+              <a:ext uri="{FF2B5EF4-FFF2-40B4-BE49-F238E27FC236}">
+                <a16:creationId xmlns:a16="http://schemas.microsoft.com/office/drawing/2014/main" id="{964AB3C3-84D4-3813-228F-B503AC8675DA}"/>
+              </a:ext>
+            </a:extLst>
+          </p:cNvPr>
+          <p:cNvPicPr>
+            <a:picLocks noChangeAspect="1"/>
+          </p:cNvPicPr>
+          <p:nvPr/>
+        </p:nvPicPr>
+        <p:blipFill>
+          <a:blip r:embed="rId4"/>
+          <a:stretch>
+            <a:fillRect/>
+          </a:stretch>
+        </p:blipFill>
+        <p:spPr>
+          <a:xfrm>
+            <a:off x="5452829" y="4358310"/>
+            <a:ext cx="357810" cy="278297"/>
+          </a:xfrm>
+          <a:prstGeom prst="rect">
+            <a:avLst/>
+          </a:prstGeom>
+          <a:ln w="12700">
+            <a:solidFill>
+              <a:schemeClr val="tx1"/>
+            </a:solidFill>
+          </a:ln>
+        </p:spPr>
+      </p:pic>
+      <p:pic>
+        <p:nvPicPr>
+          <p:cNvPr id="23" name="Picture 22">
+            <a:extLst>
+              <a:ext uri="{FF2B5EF4-FFF2-40B4-BE49-F238E27FC236}">
+                <a16:creationId xmlns:a16="http://schemas.microsoft.com/office/drawing/2014/main" id="{1D01585E-0FCE-699F-11E8-0F6500BF5B34}"/>
+              </a:ext>
+            </a:extLst>
+          </p:cNvPr>
+          <p:cNvPicPr>
+            <a:picLocks noChangeAspect="1"/>
+          </p:cNvPicPr>
+          <p:nvPr/>
+        </p:nvPicPr>
+        <p:blipFill>
+          <a:blip r:embed="rId5"/>
+          <a:stretch>
+            <a:fillRect/>
+          </a:stretch>
+        </p:blipFill>
+        <p:spPr>
+          <a:xfrm>
+            <a:off x="5462768" y="2302003"/>
+            <a:ext cx="427130" cy="445361"/>
+          </a:xfrm>
+          <a:prstGeom prst="rect">
+            <a:avLst/>
+          </a:prstGeom>
+          <a:ln w="9525">
+            <a:solidFill>
+              <a:schemeClr val="tx1"/>
+            </a:solidFill>
+          </a:ln>
+        </p:spPr>
+      </p:pic>
+      <p:cxnSp>
+        <p:nvCxnSpPr>
+          <p:cNvPr id="26" name="Straight Arrow Connector 25">
+            <a:extLst>
+              <a:ext uri="{FF2B5EF4-FFF2-40B4-BE49-F238E27FC236}">
+                <a16:creationId xmlns:a16="http://schemas.microsoft.com/office/drawing/2014/main" id="{3A2229DC-453F-0E46-8D94-74F333771273}"/>
+              </a:ext>
+            </a:extLst>
+          </p:cNvPr>
+          <p:cNvCxnSpPr>
+            <a:cxnSpLocks/>
+          </p:cNvCxnSpPr>
+          <p:nvPr/>
+        </p:nvCxnSpPr>
+        <p:spPr>
+          <a:xfrm flipH="1">
+            <a:off x="3000043" y="5519693"/>
+            <a:ext cx="335860" cy="0"/>
+          </a:xfrm>
+          <a:prstGeom prst="straightConnector1">
+            <a:avLst/>
+          </a:prstGeom>
+          <a:ln w="28575">
+            <a:solidFill>
+              <a:srgbClr val="002060"/>
+            </a:solidFill>
+            <a:headEnd type="triangle" w="med" len="med"/>
+            <a:tailEnd type="triangle" w="med" len="med"/>
+          </a:ln>
+        </p:spPr>
+        <p:style>
+          <a:lnRef idx="1">
+            <a:schemeClr val="accent1"/>
+          </a:lnRef>
+          <a:fillRef idx="0">
+            <a:schemeClr val="accent1"/>
+          </a:fillRef>
+          <a:effectRef idx="0">
+            <a:schemeClr val="accent1"/>
+          </a:effectRef>
+          <a:fontRef idx="minor">
+            <a:schemeClr val="tx1"/>
+          </a:fontRef>
+        </p:style>
+      </p:cxnSp>
+      <p:cxnSp>
+        <p:nvCxnSpPr>
+          <p:cNvPr id="28" name="Straight Arrow Connector 27">
+            <a:extLst>
+              <a:ext uri="{FF2B5EF4-FFF2-40B4-BE49-F238E27FC236}">
+                <a16:creationId xmlns:a16="http://schemas.microsoft.com/office/drawing/2014/main" id="{10622C23-9A67-0694-F042-338D02AD5E52}"/>
+              </a:ext>
+            </a:extLst>
+          </p:cNvPr>
+          <p:cNvCxnSpPr>
+            <a:cxnSpLocks/>
+          </p:cNvCxnSpPr>
+          <p:nvPr/>
+        </p:nvCxnSpPr>
+        <p:spPr>
+          <a:xfrm flipH="1">
+            <a:off x="4123268" y="5519693"/>
+            <a:ext cx="335860" cy="0"/>
+          </a:xfrm>
+          <a:prstGeom prst="straightConnector1">
+            <a:avLst/>
+          </a:prstGeom>
+          <a:ln w="28575">
+            <a:solidFill>
+              <a:srgbClr val="002060"/>
+            </a:solidFill>
+            <a:headEnd type="triangle" w="med" len="med"/>
+            <a:tailEnd type="triangle" w="med" len="med"/>
+          </a:ln>
+        </p:spPr>
+        <p:style>
+          <a:lnRef idx="1">
+            <a:schemeClr val="accent1"/>
+          </a:lnRef>
+          <a:fillRef idx="0">
+            <a:schemeClr val="accent1"/>
+          </a:fillRef>
+          <a:effectRef idx="0">
+            <a:schemeClr val="accent1"/>
+          </a:effectRef>
+          <a:fontRef idx="minor">
+            <a:schemeClr val="tx1"/>
+          </a:fontRef>
+        </p:style>
+      </p:cxnSp>
+      <p:cxnSp>
+        <p:nvCxnSpPr>
+          <p:cNvPr id="29" name="Straight Arrow Connector 28">
+            <a:extLst>
+              <a:ext uri="{FF2B5EF4-FFF2-40B4-BE49-F238E27FC236}">
+                <a16:creationId xmlns:a16="http://schemas.microsoft.com/office/drawing/2014/main" id="{0C5F31A3-9A70-8BB1-F63D-E988FC7914FD}"/>
+              </a:ext>
+            </a:extLst>
+          </p:cNvPr>
+          <p:cNvCxnSpPr>
+            <a:cxnSpLocks/>
+          </p:cNvCxnSpPr>
+          <p:nvPr/>
+        </p:nvCxnSpPr>
+        <p:spPr>
+          <a:xfrm flipH="1">
+            <a:off x="5158408" y="4459519"/>
+            <a:ext cx="294421" cy="0"/>
+          </a:xfrm>
+          <a:prstGeom prst="straightConnector1">
+            <a:avLst/>
+          </a:prstGeom>
+          <a:ln w="28575">
+            <a:solidFill>
+              <a:srgbClr val="002060"/>
+            </a:solidFill>
+            <a:headEnd type="triangle" w="med" len="med"/>
+            <a:tailEnd type="triangle" w="med" len="med"/>
+          </a:ln>
+        </p:spPr>
+        <p:style>
+          <a:lnRef idx="1">
+            <a:schemeClr val="accent1"/>
+          </a:lnRef>
+          <a:fillRef idx="0">
+            <a:schemeClr val="accent1"/>
+          </a:fillRef>
+          <a:effectRef idx="0">
+            <a:schemeClr val="accent1"/>
+          </a:effectRef>
+          <a:fontRef idx="minor">
+            <a:schemeClr val="tx1"/>
+          </a:fontRef>
+        </p:style>
+      </p:cxnSp>
       <p:sp>
         <p:nvSpPr>
-          <p:cNvPr id="2" name="TextBox 1">
-            <a:extLst>
-              <a:ext uri="{FF2B5EF4-FFF2-40B4-BE49-F238E27FC236}">
-                <a16:creationId xmlns:a16="http://schemas.microsoft.com/office/drawing/2014/main" id="{94E06D7B-D6E9-8DFE-3944-24B0157E4E43}"/>
+          <p:cNvPr id="40" name="TextBox 39">
+            <a:extLst>
+              <a:ext uri="{FF2B5EF4-FFF2-40B4-BE49-F238E27FC236}">
+                <a16:creationId xmlns:a16="http://schemas.microsoft.com/office/drawing/2014/main" id="{5DEF7E3D-E4CE-CF8F-E80E-DEE43B4A3FA5}"/>
               </a:ext>
             </a:extLst>
           </p:cNvPr>
@@ -30222,8 +30965,8 @@
         </p:nvSpPr>
         <p:spPr>
           <a:xfrm>
-            <a:off x="4519590" y="743663"/>
-            <a:ext cx="4269408" cy="338554"/>
+            <a:off x="5251039" y="2090631"/>
+            <a:ext cx="1277717" cy="230832"/>
           </a:xfrm>
           <a:prstGeom prst="rect">
             <a:avLst/>
@@ -30237,58 +30980,27 @@
           <a:lstStyle/>
           <a:p>
             <a:r>
-              <a:rPr lang="en-SG" sz="1600" b="1" dirty="0"/>
-              <a:t>User’s Action monitor web:</a:t>
-            </a:r>
+              <a:rPr lang="en-US" sz="900" b="1" dirty="0">
+                <a:solidFill>
+                  <a:srgbClr val="002060"/>
+                </a:solidFill>
+              </a:rPr>
+              <a:t>Monitor-Hub</a:t>
+            </a:r>
+            <a:endParaRPr lang="en-SG" sz="900" b="1" dirty="0">
+              <a:solidFill>
+                <a:srgbClr val="002060"/>
+              </a:solidFill>
+            </a:endParaRPr>
           </a:p>
         </p:txBody>
       </p:sp>
-      <p:pic>
-        <p:nvPicPr>
-          <p:cNvPr id="12" name="Picture 11" descr="A screenshot of a computer&#10;&#10;Description automatically generated">
-            <a:extLst>
-              <a:ext uri="{FF2B5EF4-FFF2-40B4-BE49-F238E27FC236}">
-                <a16:creationId xmlns:a16="http://schemas.microsoft.com/office/drawing/2014/main" id="{BF37BF6A-DEF8-9A7D-19A7-30130330F815}"/>
-              </a:ext>
-            </a:extLst>
-          </p:cNvPr>
-          <p:cNvPicPr>
-            <a:picLocks noChangeAspect="1"/>
-          </p:cNvPicPr>
-          <p:nvPr/>
-        </p:nvPicPr>
-        <p:blipFill rotWithShape="1">
-          <a:blip r:embed="rId3">
-            <a:extLst>
-              <a:ext uri="{28A0092B-C50C-407E-A947-70E740481C1C}">
-                <a14:useLocalDpi xmlns:a14="http://schemas.microsoft.com/office/drawing/2010/main" val="0"/>
-              </a:ext>
-            </a:extLst>
-          </a:blip>
-          <a:srcRect b="5440"/>
-          <a:stretch/>
-        </p:blipFill>
-        <p:spPr>
-          <a:xfrm>
-            <a:off x="4528976" y="1204137"/>
-            <a:ext cx="7482532" cy="3979972"/>
-          </a:xfrm>
-          <a:prstGeom prst="rect">
-            <a:avLst/>
-          </a:prstGeom>
-          <a:ln w="3175">
-            <a:solidFill>
-              <a:schemeClr val="tx1"/>
-            </a:solidFill>
-          </a:ln>
-        </p:spPr>
-      </p:pic>
       <p:sp>
         <p:nvSpPr>
-          <p:cNvPr id="13" name="TextBox 12">
-            <a:extLst>
-              <a:ext uri="{FF2B5EF4-FFF2-40B4-BE49-F238E27FC236}">
-                <a16:creationId xmlns:a16="http://schemas.microsoft.com/office/drawing/2014/main" id="{386AD3BF-2C15-9716-3262-FD64E58EB5A2}"/>
+          <p:cNvPr id="41" name="TextBox 40">
+            <a:extLst>
+              <a:ext uri="{FF2B5EF4-FFF2-40B4-BE49-F238E27FC236}">
+                <a16:creationId xmlns:a16="http://schemas.microsoft.com/office/drawing/2014/main" id="{6F441173-D231-740C-65D7-3DCDBD5C2E8C}"/>
               </a:ext>
             </a:extLst>
           </p:cNvPr>
@@ -30297,8 +31009,8 @@
         </p:nvSpPr>
         <p:spPr>
           <a:xfrm>
-            <a:off x="259568" y="5326561"/>
-            <a:ext cx="8880788" cy="1323439"/>
+            <a:off x="2637998" y="5206962"/>
+            <a:ext cx="1220524" cy="230832"/>
           </a:xfrm>
           <a:prstGeom prst="rect">
             <a:avLst/>
@@ -30312,9 +31024,660 @@
           <a:lstStyle/>
           <a:p>
             <a:r>
+              <a:rPr lang="en-US" sz="900" b="1" dirty="0">
+                <a:solidFill>
+                  <a:srgbClr val="002060"/>
+                </a:solidFill>
+              </a:rPr>
+              <a:t>User emulator [Bob</a:t>
+            </a:r>
+            <a:r>
+              <a:rPr lang="en-US" sz="900" dirty="0">
+                <a:solidFill>
+                  <a:srgbClr val="002060"/>
+                </a:solidFill>
+              </a:rPr>
+              <a:t>]</a:t>
+            </a:r>
+            <a:endParaRPr lang="en-SG" sz="900" dirty="0">
+              <a:solidFill>
+                <a:srgbClr val="002060"/>
+              </a:solidFill>
+            </a:endParaRPr>
+          </a:p>
+        </p:txBody>
+      </p:sp>
+      <p:sp>
+        <p:nvSpPr>
+          <p:cNvPr id="42" name="TextBox 41">
+            <a:extLst>
+              <a:ext uri="{FF2B5EF4-FFF2-40B4-BE49-F238E27FC236}">
+                <a16:creationId xmlns:a16="http://schemas.microsoft.com/office/drawing/2014/main" id="{20D40CCA-2D26-1B5B-13BD-170C2DF5B4E2}"/>
+              </a:ext>
+            </a:extLst>
+          </p:cNvPr>
+          <p:cNvSpPr txBox="1"/>
+          <p:nvPr/>
+        </p:nvSpPr>
+        <p:spPr>
+          <a:xfrm>
+            <a:off x="4077644" y="5199134"/>
+            <a:ext cx="1220524" cy="230832"/>
+          </a:xfrm>
+          <a:prstGeom prst="rect">
+            <a:avLst/>
+          </a:prstGeom>
+          <a:noFill/>
+        </p:spPr>
+        <p:txBody>
+          <a:bodyPr wrap="square" rtlCol="0">
+            <a:spAutoFit/>
+          </a:bodyPr>
+          <a:lstStyle/>
+          <a:p>
+            <a:r>
+              <a:rPr lang="en-US" sz="900" b="1" dirty="0">
+                <a:solidFill>
+                  <a:srgbClr val="002060"/>
+                </a:solidFill>
+              </a:rPr>
+              <a:t>User emulator [Alice</a:t>
+            </a:r>
+            <a:r>
+              <a:rPr lang="en-US" sz="900" dirty="0">
+                <a:solidFill>
+                  <a:srgbClr val="002060"/>
+                </a:solidFill>
+              </a:rPr>
+              <a:t>]</a:t>
+            </a:r>
+            <a:endParaRPr lang="en-SG" sz="900" dirty="0">
+              <a:solidFill>
+                <a:srgbClr val="002060"/>
+              </a:solidFill>
+            </a:endParaRPr>
+          </a:p>
+        </p:txBody>
+      </p:sp>
+      <p:sp>
+        <p:nvSpPr>
+          <p:cNvPr id="43" name="TextBox 42">
+            <a:extLst>
+              <a:ext uri="{FF2B5EF4-FFF2-40B4-BE49-F238E27FC236}">
+                <a16:creationId xmlns:a16="http://schemas.microsoft.com/office/drawing/2014/main" id="{B1061F2D-0400-6955-7F0B-AF5D481C80D9}"/>
+              </a:ext>
+            </a:extLst>
+          </p:cNvPr>
+          <p:cNvSpPr txBox="1"/>
+          <p:nvPr/>
+        </p:nvSpPr>
+        <p:spPr>
+          <a:xfrm>
+            <a:off x="5200377" y="4128593"/>
+            <a:ext cx="1737136" cy="230832"/>
+          </a:xfrm>
+          <a:prstGeom prst="rect">
+            <a:avLst/>
+          </a:prstGeom>
+          <a:noFill/>
+        </p:spPr>
+        <p:txBody>
+          <a:bodyPr wrap="square" rtlCol="0">
+            <a:spAutoFit/>
+          </a:bodyPr>
+          <a:lstStyle/>
+          <a:p>
+            <a:r>
+              <a:rPr lang="en-US" sz="900" b="1" dirty="0">
+                <a:solidFill>
+                  <a:srgbClr val="002060"/>
+                </a:solidFill>
+              </a:rPr>
+              <a:t>User emulator [Charlie</a:t>
+            </a:r>
+            <a:r>
+              <a:rPr lang="en-US" sz="900" dirty="0">
+                <a:solidFill>
+                  <a:srgbClr val="002060"/>
+                </a:solidFill>
+              </a:rPr>
+              <a:t>]</a:t>
+            </a:r>
+            <a:endParaRPr lang="en-SG" sz="900" dirty="0">
+              <a:solidFill>
+                <a:srgbClr val="002060"/>
+              </a:solidFill>
+            </a:endParaRPr>
+          </a:p>
+        </p:txBody>
+      </p:sp>
+      <p:pic>
+        <p:nvPicPr>
+          <p:cNvPr id="45" name="Picture 4">
+            <a:extLst>
+              <a:ext uri="{FF2B5EF4-FFF2-40B4-BE49-F238E27FC236}">
+                <a16:creationId xmlns:a16="http://schemas.microsoft.com/office/drawing/2014/main" id="{18AEAC78-15DE-816E-20FC-D7D8E5432D62}"/>
+              </a:ext>
+            </a:extLst>
+          </p:cNvPr>
+          <p:cNvPicPr>
+            <a:picLocks noChangeAspect="1" noChangeArrowheads="1"/>
+          </p:cNvPicPr>
+          <p:nvPr/>
+        </p:nvPicPr>
+        <p:blipFill>
+          <a:blip r:embed="rId6">
+            <a:extLst>
+              <a:ext uri="{28A0092B-C50C-407E-A947-70E740481C1C}">
+                <a14:useLocalDpi xmlns:a14="http://schemas.microsoft.com/office/drawing/2010/main" val="0"/>
+              </a:ext>
+            </a:extLst>
+          </a:blip>
+          <a:srcRect/>
+          <a:stretch>
+            <a:fillRect/>
+          </a:stretch>
+        </p:blipFill>
+        <p:spPr bwMode="auto">
+          <a:xfrm>
+            <a:off x="6673418" y="2256238"/>
+            <a:ext cx="528189" cy="528189"/>
+          </a:xfrm>
+          <a:prstGeom prst="rect">
+            <a:avLst/>
+          </a:prstGeom>
+          <a:noFill/>
+          <a:extLst>
+            <a:ext uri="{909E8E84-426E-40DD-AFC4-6F175D3DCCD1}">
+              <a14:hiddenFill xmlns:a14="http://schemas.microsoft.com/office/drawing/2010/main">
+                <a:solidFill>
+                  <a:srgbClr val="FFFFFF"/>
+                </a:solidFill>
+              </a14:hiddenFill>
+            </a:ext>
+          </a:extLst>
+        </p:spPr>
+      </p:pic>
+      <p:cxnSp>
+        <p:nvCxnSpPr>
+          <p:cNvPr id="56" name="Connector: Elbow 55">
+            <a:extLst>
+              <a:ext uri="{FF2B5EF4-FFF2-40B4-BE49-F238E27FC236}">
+                <a16:creationId xmlns:a16="http://schemas.microsoft.com/office/drawing/2014/main" id="{C1F66C8E-30E1-D8AB-0667-F60AAB84E2A5}"/>
+              </a:ext>
+            </a:extLst>
+          </p:cNvPr>
+          <p:cNvCxnSpPr>
+            <a:cxnSpLocks/>
+            <a:stCxn id="23" idx="1"/>
+          </p:cNvCxnSpPr>
+          <p:nvPr/>
+        </p:nvCxnSpPr>
+        <p:spPr>
+          <a:xfrm rot="10800000" flipV="1">
+            <a:off x="3693714" y="2524683"/>
+            <a:ext cx="1769054" cy="1790955"/>
+          </a:xfrm>
+          <a:prstGeom prst="bentConnector2">
+            <a:avLst/>
+          </a:prstGeom>
+          <a:ln w="19050">
+            <a:solidFill>
+              <a:srgbClr val="00B050"/>
+            </a:solidFill>
+            <a:prstDash val="sysDash"/>
+            <a:tailEnd type="triangle"/>
+          </a:ln>
+        </p:spPr>
+        <p:style>
+          <a:lnRef idx="1">
+            <a:schemeClr val="accent1"/>
+          </a:lnRef>
+          <a:fillRef idx="0">
+            <a:schemeClr val="accent1"/>
+          </a:fillRef>
+          <a:effectRef idx="0">
+            <a:schemeClr val="accent1"/>
+          </a:effectRef>
+          <a:fontRef idx="minor">
+            <a:schemeClr val="tx1"/>
+          </a:fontRef>
+        </p:style>
+      </p:cxnSp>
+      <p:cxnSp>
+        <p:nvCxnSpPr>
+          <p:cNvPr id="62" name="Straight Arrow Connector 61">
+            <a:extLst>
+              <a:ext uri="{FF2B5EF4-FFF2-40B4-BE49-F238E27FC236}">
+                <a16:creationId xmlns:a16="http://schemas.microsoft.com/office/drawing/2014/main" id="{88DA4BF1-BE6F-94AE-D32B-F514534FEB0F}"/>
+              </a:ext>
+            </a:extLst>
+          </p:cNvPr>
+          <p:cNvCxnSpPr>
+            <a:cxnSpLocks/>
+          </p:cNvCxnSpPr>
+          <p:nvPr/>
+        </p:nvCxnSpPr>
+        <p:spPr>
+          <a:xfrm flipH="1">
+            <a:off x="3053399" y="4753281"/>
+            <a:ext cx="352192" cy="118911"/>
+          </a:xfrm>
+          <a:prstGeom prst="straightConnector1">
+            <a:avLst/>
+          </a:prstGeom>
+          <a:ln w="19050">
+            <a:solidFill>
+              <a:srgbClr val="00B050"/>
+            </a:solidFill>
+            <a:prstDash val="sysDash"/>
+            <a:tailEnd type="triangle"/>
+          </a:ln>
+        </p:spPr>
+        <p:style>
+          <a:lnRef idx="1">
+            <a:schemeClr val="accent1"/>
+          </a:lnRef>
+          <a:fillRef idx="0">
+            <a:schemeClr val="accent1"/>
+          </a:fillRef>
+          <a:effectRef idx="0">
+            <a:schemeClr val="accent1"/>
+          </a:effectRef>
+          <a:fontRef idx="minor">
+            <a:schemeClr val="tx1"/>
+          </a:fontRef>
+        </p:style>
+      </p:cxnSp>
+      <p:cxnSp>
+        <p:nvCxnSpPr>
+          <p:cNvPr id="63" name="Straight Arrow Connector 62">
+            <a:extLst>
+              <a:ext uri="{FF2B5EF4-FFF2-40B4-BE49-F238E27FC236}">
+                <a16:creationId xmlns:a16="http://schemas.microsoft.com/office/drawing/2014/main" id="{08CA909A-A8CD-B38C-974B-748CCCF60FFC}"/>
+              </a:ext>
+            </a:extLst>
+          </p:cNvPr>
+          <p:cNvCxnSpPr>
+            <a:cxnSpLocks/>
+          </p:cNvCxnSpPr>
+          <p:nvPr/>
+        </p:nvCxnSpPr>
+        <p:spPr>
+          <a:xfrm>
+            <a:off x="3745548" y="4636607"/>
+            <a:ext cx="627669" cy="235585"/>
+          </a:xfrm>
+          <a:prstGeom prst="straightConnector1">
+            <a:avLst/>
+          </a:prstGeom>
+          <a:ln w="19050">
+            <a:solidFill>
+              <a:srgbClr val="00B050"/>
+            </a:solidFill>
+            <a:prstDash val="sysDash"/>
+            <a:tailEnd type="triangle"/>
+          </a:ln>
+        </p:spPr>
+        <p:style>
+          <a:lnRef idx="1">
+            <a:schemeClr val="accent1"/>
+          </a:lnRef>
+          <a:fillRef idx="0">
+            <a:schemeClr val="accent1"/>
+          </a:fillRef>
+          <a:effectRef idx="0">
+            <a:schemeClr val="accent1"/>
+          </a:effectRef>
+          <a:fontRef idx="minor">
+            <a:schemeClr val="tx1"/>
+          </a:fontRef>
+        </p:style>
+      </p:cxnSp>
+      <p:cxnSp>
+        <p:nvCxnSpPr>
+          <p:cNvPr id="1033" name="Straight Arrow Connector 1032">
+            <a:extLst>
+              <a:ext uri="{FF2B5EF4-FFF2-40B4-BE49-F238E27FC236}">
+                <a16:creationId xmlns:a16="http://schemas.microsoft.com/office/drawing/2014/main" id="{6342948D-65D9-FEE2-05F2-253F7B23E44C}"/>
+              </a:ext>
+            </a:extLst>
+          </p:cNvPr>
+          <p:cNvCxnSpPr>
+            <a:cxnSpLocks/>
+          </p:cNvCxnSpPr>
+          <p:nvPr/>
+        </p:nvCxnSpPr>
+        <p:spPr>
+          <a:xfrm flipV="1">
+            <a:off x="3804712" y="4128593"/>
+            <a:ext cx="968535" cy="420617"/>
+          </a:xfrm>
+          <a:prstGeom prst="straightConnector1">
+            <a:avLst/>
+          </a:prstGeom>
+          <a:ln w="19050">
+            <a:solidFill>
+              <a:srgbClr val="00B050"/>
+            </a:solidFill>
+            <a:prstDash val="sysDash"/>
+            <a:tailEnd type="triangle"/>
+          </a:ln>
+        </p:spPr>
+        <p:style>
+          <a:lnRef idx="1">
+            <a:schemeClr val="accent1"/>
+          </a:lnRef>
+          <a:fillRef idx="0">
+            <a:schemeClr val="accent1"/>
+          </a:fillRef>
+          <a:effectRef idx="0">
+            <a:schemeClr val="accent1"/>
+          </a:effectRef>
+          <a:fontRef idx="minor">
+            <a:schemeClr val="tx1"/>
+          </a:fontRef>
+        </p:style>
+      </p:cxnSp>
+      <p:cxnSp>
+        <p:nvCxnSpPr>
+          <p:cNvPr id="1037" name="Connector: Elbow 1036">
+            <a:extLst>
+              <a:ext uri="{FF2B5EF4-FFF2-40B4-BE49-F238E27FC236}">
+                <a16:creationId xmlns:a16="http://schemas.microsoft.com/office/drawing/2014/main" id="{0B8F3B91-7916-25BE-F415-83702836C7D6}"/>
+              </a:ext>
+            </a:extLst>
+          </p:cNvPr>
+          <p:cNvCxnSpPr/>
+          <p:nvPr/>
+        </p:nvCxnSpPr>
+        <p:spPr>
+          <a:xfrm rot="16200000" flipH="1">
+            <a:off x="3044917" y="5027743"/>
+            <a:ext cx="391941" cy="374976"/>
+          </a:xfrm>
+          <a:prstGeom prst="bentConnector3">
+            <a:avLst>
+              <a:gd name="adj1" fmla="val -3253"/>
+            </a:avLst>
+          </a:prstGeom>
+          <a:ln w="19050">
+            <a:solidFill>
+              <a:srgbClr val="00B050"/>
+            </a:solidFill>
+            <a:prstDash val="sysDash"/>
+            <a:tailEnd type="triangle"/>
+          </a:ln>
+        </p:spPr>
+        <p:style>
+          <a:lnRef idx="1">
+            <a:schemeClr val="accent1"/>
+          </a:lnRef>
+          <a:fillRef idx="0">
+            <a:schemeClr val="accent1"/>
+          </a:fillRef>
+          <a:effectRef idx="0">
+            <a:schemeClr val="accent1"/>
+          </a:effectRef>
+          <a:fontRef idx="minor">
+            <a:schemeClr val="tx1"/>
+          </a:fontRef>
+        </p:style>
+      </p:cxnSp>
+      <p:cxnSp>
+        <p:nvCxnSpPr>
+          <p:cNvPr id="1040" name="Connector: Elbow 1039">
+            <a:extLst>
+              <a:ext uri="{FF2B5EF4-FFF2-40B4-BE49-F238E27FC236}">
+                <a16:creationId xmlns:a16="http://schemas.microsoft.com/office/drawing/2014/main" id="{5B0C25E4-2035-228D-30C0-2E69E02D7874}"/>
+              </a:ext>
+            </a:extLst>
+          </p:cNvPr>
+          <p:cNvCxnSpPr>
+            <a:endCxn id="20" idx="0"/>
+          </p:cNvCxnSpPr>
+          <p:nvPr/>
+        </p:nvCxnSpPr>
+        <p:spPr>
+          <a:xfrm rot="16200000" flipH="1">
+            <a:off x="4267535" y="5040704"/>
+            <a:ext cx="391942" cy="349054"/>
+          </a:xfrm>
+          <a:prstGeom prst="bentConnector3">
+            <a:avLst>
+              <a:gd name="adj1" fmla="val -717"/>
+            </a:avLst>
+          </a:prstGeom>
+          <a:ln w="19050">
+            <a:solidFill>
+              <a:srgbClr val="00B050"/>
+            </a:solidFill>
+            <a:prstDash val="sysDash"/>
+            <a:tailEnd type="triangle"/>
+          </a:ln>
+        </p:spPr>
+        <p:style>
+          <a:lnRef idx="1">
+            <a:schemeClr val="accent1"/>
+          </a:lnRef>
+          <a:fillRef idx="0">
+            <a:schemeClr val="accent1"/>
+          </a:fillRef>
+          <a:effectRef idx="0">
+            <a:schemeClr val="accent1"/>
+          </a:effectRef>
+          <a:fontRef idx="minor">
+            <a:schemeClr val="tx1"/>
+          </a:fontRef>
+        </p:style>
+      </p:cxnSp>
+      <p:cxnSp>
+        <p:nvCxnSpPr>
+          <p:cNvPr id="1042" name="Connector: Elbow 1041">
+            <a:extLst>
+              <a:ext uri="{FF2B5EF4-FFF2-40B4-BE49-F238E27FC236}">
+                <a16:creationId xmlns:a16="http://schemas.microsoft.com/office/drawing/2014/main" id="{29FA9369-0196-2FC3-3780-99C0A5F9B190}"/>
+              </a:ext>
+            </a:extLst>
+          </p:cNvPr>
+          <p:cNvCxnSpPr/>
+          <p:nvPr/>
+        </p:nvCxnSpPr>
+        <p:spPr>
+          <a:xfrm rot="16200000" flipH="1">
+            <a:off x="5284850" y="3988927"/>
+            <a:ext cx="391942" cy="349054"/>
+          </a:xfrm>
+          <a:prstGeom prst="bentConnector3">
+            <a:avLst>
+              <a:gd name="adj1" fmla="val -717"/>
+            </a:avLst>
+          </a:prstGeom>
+          <a:ln w="19050">
+            <a:solidFill>
+              <a:srgbClr val="00B050"/>
+            </a:solidFill>
+            <a:prstDash val="sysDash"/>
+            <a:tailEnd type="triangle"/>
+          </a:ln>
+        </p:spPr>
+        <p:style>
+          <a:lnRef idx="1">
+            <a:schemeClr val="accent1"/>
+          </a:lnRef>
+          <a:fillRef idx="0">
+            <a:schemeClr val="accent1"/>
+          </a:fillRef>
+          <a:effectRef idx="0">
+            <a:schemeClr val="accent1"/>
+          </a:effectRef>
+          <a:fontRef idx="minor">
+            <a:schemeClr val="tx1"/>
+          </a:fontRef>
+        </p:style>
+      </p:cxnSp>
+      <p:cxnSp>
+        <p:nvCxnSpPr>
+          <p:cNvPr id="1043" name="Straight Arrow Connector 1042">
+            <a:extLst>
+              <a:ext uri="{FF2B5EF4-FFF2-40B4-BE49-F238E27FC236}">
+                <a16:creationId xmlns:a16="http://schemas.microsoft.com/office/drawing/2014/main" id="{785DE261-75AB-150F-6EF8-795014FF8218}"/>
+              </a:ext>
+            </a:extLst>
+          </p:cNvPr>
+          <p:cNvCxnSpPr>
+            <a:cxnSpLocks/>
+            <a:stCxn id="45" idx="1"/>
+            <a:endCxn id="23" idx="3"/>
+          </p:cNvCxnSpPr>
+          <p:nvPr/>
+        </p:nvCxnSpPr>
+        <p:spPr>
+          <a:xfrm flipH="1">
+            <a:off x="5889898" y="2520333"/>
+            <a:ext cx="783520" cy="4351"/>
+          </a:xfrm>
+          <a:prstGeom prst="straightConnector1">
+            <a:avLst/>
+          </a:prstGeom>
+          <a:ln w="19050">
+            <a:solidFill>
+              <a:srgbClr val="00B050"/>
+            </a:solidFill>
+            <a:prstDash val="sysDash"/>
+            <a:tailEnd type="triangle"/>
+          </a:ln>
+        </p:spPr>
+        <p:style>
+          <a:lnRef idx="1">
+            <a:schemeClr val="accent1"/>
+          </a:lnRef>
+          <a:fillRef idx="0">
+            <a:schemeClr val="accent1"/>
+          </a:fillRef>
+          <a:effectRef idx="0">
+            <a:schemeClr val="accent1"/>
+          </a:effectRef>
+          <a:fontRef idx="minor">
+            <a:schemeClr val="tx1"/>
+          </a:fontRef>
+        </p:style>
+      </p:cxnSp>
+      <p:sp>
+        <p:nvSpPr>
+          <p:cNvPr id="1048" name="TextBox 1047">
+            <a:extLst>
+              <a:ext uri="{FF2B5EF4-FFF2-40B4-BE49-F238E27FC236}">
+                <a16:creationId xmlns:a16="http://schemas.microsoft.com/office/drawing/2014/main" id="{FEEBE512-1904-0162-454E-658567A18122}"/>
+              </a:ext>
+            </a:extLst>
+          </p:cNvPr>
+          <p:cNvSpPr txBox="1"/>
+          <p:nvPr/>
+        </p:nvSpPr>
+        <p:spPr>
+          <a:xfrm>
+            <a:off x="252875" y="660722"/>
+            <a:ext cx="11152984" cy="1415772"/>
+          </a:xfrm>
+          <a:prstGeom prst="rect">
+            <a:avLst/>
+          </a:prstGeom>
+          <a:noFill/>
+        </p:spPr>
+        <p:txBody>
+          <a:bodyPr wrap="square" rtlCol="0">
+            <a:spAutoFit/>
+          </a:bodyPr>
+          <a:lstStyle/>
+          <a:p>
+            <a:r>
               <a:rPr lang="en-SG" sz="1600" b="1" dirty="0"/>
-              <a:t>Emulator’s action monitor web feature: </a:t>
-            </a:r>
+              <a:t>Background </a:t>
+            </a:r>
+          </a:p>
+          <a:p>
+            <a:pPr algn="just"/>
+            <a:r>
+              <a:rPr lang="en-SG" sz="1400" dirty="0"/>
+              <a:t>In the </a:t>
+            </a:r>
+            <a:r>
+              <a:rPr lang="en-SG" sz="1400" dirty="0" err="1"/>
+              <a:t>lockshield</a:t>
+            </a:r>
+            <a:r>
+              <a:rPr lang="en-SG" sz="1400" dirty="0"/>
+              <a:t> 2023, we used VirtualBox to create a mini software define network environment, in the network system, we want to simulate 3 Windows users’ daily office work action and do some attack on one of the user’s windows machine with malware. Then we want to analysis different logs to parse the malware’s action from all the users’ normal action. Cluster User Emulator is used to simulate 2 types of users action: normal users and the network admin in the system. (The system config diagram is shown below)</a:t>
+            </a:r>
+          </a:p>
+          <a:p>
+            <a:endParaRPr lang="en-SG" sz="1400" dirty="0"/>
+          </a:p>
+        </p:txBody>
+      </p:sp>
+      <p:sp>
+        <p:nvSpPr>
+          <p:cNvPr id="1049" name="TextBox 1048">
+            <a:extLst>
+              <a:ext uri="{FF2B5EF4-FFF2-40B4-BE49-F238E27FC236}">
+                <a16:creationId xmlns:a16="http://schemas.microsoft.com/office/drawing/2014/main" id="{4E631B38-5A19-D85D-CB1A-C5A174773D8F}"/>
+              </a:ext>
+            </a:extLst>
+          </p:cNvPr>
+          <p:cNvSpPr txBox="1"/>
+          <p:nvPr/>
+        </p:nvSpPr>
+        <p:spPr>
+          <a:xfrm>
+            <a:off x="7424403" y="1855129"/>
+            <a:ext cx="4673743" cy="4832092"/>
+          </a:xfrm>
+          <a:prstGeom prst="rect">
+            <a:avLst/>
+          </a:prstGeom>
+          <a:noFill/>
+        </p:spPr>
+        <p:txBody>
+          <a:bodyPr wrap="square" rtlCol="0">
+            <a:spAutoFit/>
+          </a:bodyPr>
+          <a:lstStyle/>
+          <a:p>
+            <a:r>
+              <a:rPr lang="en-SG" sz="1400" b="1" dirty="0"/>
+              <a:t>Cluster User Emulator Config </a:t>
+            </a:r>
+          </a:p>
+          <a:p>
+            <a:endParaRPr lang="en-SG" sz="1400" b="1" dirty="0"/>
+          </a:p>
+          <a:p>
+            <a:r>
+              <a:rPr lang="en-SG" sz="1400" dirty="0"/>
+              <a:t>The monitor hub ran on the host physical server.</a:t>
+            </a:r>
+          </a:p>
+          <a:p>
+            <a:endParaRPr lang="en-SG" sz="1400" dirty="0"/>
+          </a:p>
+          <a:p>
+            <a:r>
+              <a:rPr lang="en-SG" sz="1400" dirty="0"/>
+              <a:t>Action repository are set individually on each VM. </a:t>
+            </a:r>
+          </a:p>
+          <a:p>
+            <a:endParaRPr lang="en-SG" sz="1400" dirty="0"/>
+          </a:p>
+          <a:p>
+            <a:r>
+              <a:rPr lang="en-SG" sz="1400" dirty="0"/>
+              <a:t>Each User Emulator would run on one Windows VM with the specific action timeline config: </a:t>
+            </a:r>
+          </a:p>
+          <a:p>
+            <a:endParaRPr lang="en-SG" sz="1400" dirty="0"/>
           </a:p>
           <a:p>
             <a:pPr marL="285750" indent="-285750">
@@ -30322,8 +31685,16 @@
               <a:buChar char="•"/>
             </a:pPr>
             <a:r>
-              <a:rPr lang="en-SG" sz="1600" dirty="0"/>
-              <a:t>User can monitor the scheduled actions(events) execution state from the monitor Web. </a:t>
+              <a:rPr lang="en-SG" sz="1400" dirty="0"/>
+              <a:t>User emulator [Bob] will simulate a network admin’s daily work action from 9:00 am – 6:00pm. Total 32 actions will be emulated such as (read/write email, </a:t>
+            </a:r>
+            <a:r>
+              <a:rPr lang="en-SG" sz="1400" dirty="0" err="1"/>
+              <a:t>ssh</a:t>
+            </a:r>
+            <a:r>
+              <a:rPr lang="en-SG" sz="1400" dirty="0"/>
+              <a:t> to server, check the network, upload/download file, join zoom meeting, write daily report …)</a:t>
             </a:r>
           </a:p>
           <a:p>
@@ -30331,10 +31702,7 @@
               <a:buFont typeface="Arial" panose="020B0604020202020204" pitchFamily="34" charset="0"/>
               <a:buChar char="•"/>
             </a:pPr>
-            <a:r>
-              <a:rPr lang="en-SG" sz="1600" dirty="0"/>
-              <a:t>User can remove/deactivate the action from the web. </a:t>
-            </a:r>
+            <a:endParaRPr lang="en-SG" sz="1400" dirty="0"/>
           </a:p>
           <a:p>
             <a:pPr marL="285750" indent="-285750">
@@ -30342,30 +31710,121 @@
               <a:buChar char="•"/>
             </a:pPr>
             <a:r>
-              <a:rPr lang="en-SG" sz="1600" dirty="0"/>
-              <a:t>The web provide regular action (daily/weekly action) and random action monitoring. </a:t>
-            </a:r>
-          </a:p>
-          <a:p>
-            <a:pPr marL="285750" indent="-285750">
-              <a:buFont typeface="Arial" panose="020B0604020202020204" pitchFamily="34" charset="0"/>
-              <a:buChar char="•"/>
-            </a:pPr>
-            <a:r>
-              <a:rPr lang="en-SG" sz="1600" dirty="0"/>
-              <a:t>(Under development) user can add new action/edit the actions from the Web interface</a:t>
-            </a:r>
-            <a:r>
-              <a:rPr lang="en-SG" sz="1600" b="1" dirty="0"/>
-              <a:t>. </a:t>
-            </a:r>
+              <a:rPr lang="en-SG" sz="1400" dirty="0"/>
+              <a:t>User emulator [Alice, Charlie] will simulate a normal office user’s daily work action from 9:00 am – 5:30pm. 24 action will be emulated such as (read/write email, draw picture, create present slides, play game, watch you tube video ..)</a:t>
+            </a:r>
+          </a:p>
+          <a:p>
+            <a:endParaRPr lang="en-SG" sz="1400" dirty="0"/>
+          </a:p>
+          <a:p>
+            <a:r>
+              <a:rPr lang="en-SG" sz="1400" dirty="0"/>
+              <a:t>All the actions will be repeat every day with the same time </a:t>
+            </a:r>
+            <a:r>
+              <a:rPr lang="en-SG" sz="1400"/>
+              <a:t>line config.</a:t>
+            </a:r>
+            <a:endParaRPr lang="en-SG" sz="1400" dirty="0"/>
+          </a:p>
+        </p:txBody>
+      </p:sp>
+      <p:cxnSp>
+        <p:nvCxnSpPr>
+          <p:cNvPr id="2" name="Straight Arrow Connector 1">
+            <a:extLst>
+              <a:ext uri="{FF2B5EF4-FFF2-40B4-BE49-F238E27FC236}">
+                <a16:creationId xmlns:a16="http://schemas.microsoft.com/office/drawing/2014/main" id="{C67AC045-8CB7-F9E4-326C-D7012290E866}"/>
+              </a:ext>
+            </a:extLst>
+          </p:cNvPr>
+          <p:cNvCxnSpPr>
+            <a:cxnSpLocks/>
+          </p:cNvCxnSpPr>
+          <p:nvPr/>
+        </p:nvCxnSpPr>
+        <p:spPr>
+          <a:xfrm>
+            <a:off x="638138" y="6259627"/>
+            <a:ext cx="265325" cy="0"/>
+          </a:xfrm>
+          <a:prstGeom prst="straightConnector1">
+            <a:avLst/>
+          </a:prstGeom>
+          <a:ln>
+            <a:solidFill>
+              <a:schemeClr val="accent6">
+                <a:lumMod val="75000"/>
+              </a:schemeClr>
+            </a:solidFill>
+            <a:prstDash val="dash"/>
+            <a:tailEnd type="triangle"/>
+          </a:ln>
+        </p:spPr>
+        <p:style>
+          <a:lnRef idx="1">
+            <a:schemeClr val="accent1"/>
+          </a:lnRef>
+          <a:fillRef idx="0">
+            <a:schemeClr val="accent1"/>
+          </a:fillRef>
+          <a:effectRef idx="0">
+            <a:schemeClr val="accent1"/>
+          </a:effectRef>
+          <a:fontRef idx="minor">
+            <a:schemeClr val="tx1"/>
+          </a:fontRef>
+        </p:style>
+      </p:cxnSp>
+      <p:sp>
+        <p:nvSpPr>
+          <p:cNvPr id="3" name="TextBox 2">
+            <a:extLst>
+              <a:ext uri="{FF2B5EF4-FFF2-40B4-BE49-F238E27FC236}">
+                <a16:creationId xmlns:a16="http://schemas.microsoft.com/office/drawing/2014/main" id="{F0741695-7E3A-A396-37B7-AFE8C2257424}"/>
+              </a:ext>
+            </a:extLst>
+          </p:cNvPr>
+          <p:cNvSpPr txBox="1"/>
+          <p:nvPr/>
+        </p:nvSpPr>
+        <p:spPr>
+          <a:xfrm>
+            <a:off x="872184" y="6158098"/>
+            <a:ext cx="1505636" cy="230832"/>
+          </a:xfrm>
+          <a:prstGeom prst="rect">
+            <a:avLst/>
+          </a:prstGeom>
+          <a:noFill/>
+        </p:spPr>
+        <p:txBody>
+          <a:bodyPr wrap="square" rtlCol="0">
+            <a:spAutoFit/>
+          </a:bodyPr>
+          <a:lstStyle/>
+          <a:p>
+            <a:r>
+              <a:rPr lang="en-US" sz="900" dirty="0">
+                <a:solidFill>
+                  <a:srgbClr val="002060"/>
+                </a:solidFill>
+              </a:rPr>
+              <a:t>Monitor hub’s control flow</a:t>
+            </a:r>
+            <a:endParaRPr lang="en-SG" sz="900" dirty="0">
+              <a:solidFill>
+                <a:srgbClr val="002060"/>
+              </a:solidFill>
+            </a:endParaRPr>
           </a:p>
         </p:txBody>
       </p:sp>
     </p:spTree>
     <p:extLst>
       <p:ext uri="{BB962C8B-B14F-4D97-AF65-F5344CB8AC3E}">
-        <p14:creationId xmlns:p14="http://schemas.microsoft.com/office/powerpoint/2010/main" val="2311589"/>
+        <p14:creationId xmlns:p14="http://schemas.microsoft.com/office/powerpoint/2010/main" val="927584084"/>
       </p:ext>
     </p:extLst>
   </p:cSld>

</xml_diff>

<commit_message>
Added the problem record and the solution doc.
</commit_message>
<xml_diff>
--- a/doc/designDoc.pptx
+++ b/doc/designDoc.pptx
@@ -553,6 +553,90 @@
     <p:extLst>
       <p:ext uri="{BB962C8B-B14F-4D97-AF65-F5344CB8AC3E}">
         <p14:creationId xmlns:p14="http://schemas.microsoft.com/office/powerpoint/2010/main" val="2765088347"/>
+      </p:ext>
+    </p:extLst>
+  </p:cSld>
+  <p:clrMapOvr>
+    <a:masterClrMapping/>
+  </p:clrMapOvr>
+</p:notes>
+</file>
+
+<file path=ppt/notesSlides/notesSlide2.xml><?xml version="1.0" encoding="utf-8"?>
+<p:notes xmlns:a="http://schemas.openxmlformats.org/drawingml/2006/main" xmlns:r="http://schemas.openxmlformats.org/officeDocument/2006/relationships" xmlns:p="http://schemas.openxmlformats.org/presentationml/2006/main">
+  <p:cSld>
+    <p:spTree>
+      <p:nvGrpSpPr>
+        <p:cNvPr id="1" name=""/>
+        <p:cNvGrpSpPr/>
+        <p:nvPr/>
+      </p:nvGrpSpPr>
+      <p:grpSpPr>
+        <a:xfrm>
+          <a:off x="0" y="0"/>
+          <a:ext cx="0" cy="0"/>
+          <a:chOff x="0" y="0"/>
+          <a:chExt cx="0" cy="0"/>
+        </a:xfrm>
+      </p:grpSpPr>
+      <p:sp>
+        <p:nvSpPr>
+          <p:cNvPr id="2" name="Slide Image Placeholder 1"/>
+          <p:cNvSpPr>
+            <a:spLocks noGrp="1" noRot="1" noChangeAspect="1"/>
+          </p:cNvSpPr>
+          <p:nvPr>
+            <p:ph type="sldImg"/>
+          </p:nvPr>
+        </p:nvSpPr>
+        <p:spPr/>
+      </p:sp>
+      <p:sp>
+        <p:nvSpPr>
+          <p:cNvPr id="3" name="Notes Placeholder 2"/>
+          <p:cNvSpPr>
+            <a:spLocks noGrp="1"/>
+          </p:cNvSpPr>
+          <p:nvPr>
+            <p:ph type="body" idx="1"/>
+          </p:nvPr>
+        </p:nvSpPr>
+        <p:spPr/>
+        <p:txBody>
+          <a:bodyPr/>
+          <a:lstStyle/>
+          <a:p>
+            <a:endParaRPr lang="en-SG" dirty="0"/>
+          </a:p>
+        </p:txBody>
+      </p:sp>
+      <p:sp>
+        <p:nvSpPr>
+          <p:cNvPr id="4" name="Slide Number Placeholder 3"/>
+          <p:cNvSpPr>
+            <a:spLocks noGrp="1"/>
+          </p:cNvSpPr>
+          <p:nvPr>
+            <p:ph type="sldNum" sz="quarter" idx="5"/>
+          </p:nvPr>
+        </p:nvSpPr>
+        <p:spPr/>
+        <p:txBody>
+          <a:bodyPr/>
+          <a:lstStyle/>
+          <a:p>
+            <a:fld id="{3B0C630E-0CE8-4915-8E08-22247CA7F11A}" type="slidenum">
+              <a:rPr lang="en-SG" smtClean="0"/>
+              <a:t>9</a:t>
+            </a:fld>
+            <a:endParaRPr lang="en-SG" dirty="0"/>
+          </a:p>
+        </p:txBody>
+      </p:sp>
+    </p:spTree>
+    <p:extLst>
+      <p:ext uri="{BB962C8B-B14F-4D97-AF65-F5344CB8AC3E}">
+        <p14:creationId xmlns:p14="http://schemas.microsoft.com/office/powerpoint/2010/main" val="3344393934"/>
       </p:ext>
     </p:extLst>
   </p:cSld>
@@ -30440,7 +30524,7 @@
           <p:nvPr/>
         </p:nvPicPr>
         <p:blipFill>
-          <a:blip r:embed="rId2">
+          <a:blip r:embed="rId3">
             <a:alphaModFix amt="70000"/>
           </a:blip>
           <a:stretch>
@@ -30560,7 +30644,7 @@
                   <a:schemeClr val="bg1"/>
                 </a:solidFill>
               </a:rPr>
-              <a:t>Cluster Users Emulator [ Use case: LS2023 ]  </a:t>
+              <a:t>Cluster Users Emulator [ Use case: LS2023 benign traffic/events generate ]  </a:t>
             </a:r>
             <a:endParaRPr lang="en-SG" sz="2400" dirty="0">
               <a:solidFill>
@@ -30585,7 +30669,7 @@
           <p:nvPr/>
         </p:nvPicPr>
         <p:blipFill>
-          <a:blip r:embed="rId3">
+          <a:blip r:embed="rId4">
             <a:extLst>
               <a:ext uri="{28A0092B-C50C-407E-A947-70E740481C1C}">
                 <a14:useLocalDpi xmlns:a14="http://schemas.microsoft.com/office/drawing/2010/main" val="0"/>
@@ -30691,7 +30775,7 @@
           <p:nvPr/>
         </p:nvPicPr>
         <p:blipFill>
-          <a:blip r:embed="rId4"/>
+          <a:blip r:embed="rId5"/>
           <a:stretch>
             <a:fillRect/>
           </a:stretch>
@@ -30726,7 +30810,7 @@
           <p:nvPr/>
         </p:nvPicPr>
         <p:blipFill>
-          <a:blip r:embed="rId4"/>
+          <a:blip r:embed="rId5"/>
           <a:stretch>
             <a:fillRect/>
           </a:stretch>
@@ -30761,7 +30845,7 @@
           <p:nvPr/>
         </p:nvPicPr>
         <p:blipFill>
-          <a:blip r:embed="rId4"/>
+          <a:blip r:embed="rId5"/>
           <a:stretch>
             <a:fillRect/>
           </a:stretch>
@@ -30796,7 +30880,7 @@
           <p:nvPr/>
         </p:nvPicPr>
         <p:blipFill>
-          <a:blip r:embed="rId5"/>
+          <a:blip r:embed="rId6"/>
           <a:stretch>
             <a:fillRect/>
           </a:stretch>
@@ -31166,7 +31250,7 @@
           <p:nvPr/>
         </p:nvPicPr>
         <p:blipFill>
-          <a:blip r:embed="rId6">
+          <a:blip r:embed="rId7">
             <a:extLst>
               <a:ext uri="{28A0092B-C50C-407E-A947-70E740481C1C}">
                 <a14:useLocalDpi xmlns:a14="http://schemas.microsoft.com/office/drawing/2010/main" val="0"/>
@@ -31223,7 +31307,9 @@
           </a:prstGeom>
           <a:ln w="19050">
             <a:solidFill>
-              <a:srgbClr val="00B050"/>
+              <a:schemeClr val="accent6">
+                <a:lumMod val="75000"/>
+              </a:schemeClr>
             </a:solidFill>
             <a:prstDash val="sysDash"/>
             <a:tailEnd type="triangle"/>
@@ -31268,7 +31354,9 @@
           </a:prstGeom>
           <a:ln w="19050">
             <a:solidFill>
-              <a:srgbClr val="00B050"/>
+              <a:schemeClr val="accent6">
+                <a:lumMod val="75000"/>
+              </a:schemeClr>
             </a:solidFill>
             <a:prstDash val="sysDash"/>
             <a:tailEnd type="triangle"/>
@@ -31313,7 +31401,9 @@
           </a:prstGeom>
           <a:ln w="19050">
             <a:solidFill>
-              <a:srgbClr val="00B050"/>
+              <a:schemeClr val="accent6">
+                <a:lumMod val="75000"/>
+              </a:schemeClr>
             </a:solidFill>
             <a:prstDash val="sysDash"/>
             <a:tailEnd type="triangle"/>
@@ -31358,7 +31448,9 @@
           </a:prstGeom>
           <a:ln w="19050">
             <a:solidFill>
-              <a:srgbClr val="00B050"/>
+              <a:schemeClr val="accent6">
+                <a:lumMod val="75000"/>
+              </a:schemeClr>
             </a:solidFill>
             <a:prstDash val="sysDash"/>
             <a:tailEnd type="triangle"/>
@@ -31403,7 +31495,9 @@
           </a:prstGeom>
           <a:ln w="19050">
             <a:solidFill>
-              <a:srgbClr val="00B050"/>
+              <a:schemeClr val="accent6">
+                <a:lumMod val="75000"/>
+              </a:schemeClr>
             </a:solidFill>
             <a:prstDash val="sysDash"/>
             <a:tailEnd type="triangle"/>
@@ -31450,7 +31544,9 @@
           </a:prstGeom>
           <a:ln w="19050">
             <a:solidFill>
-              <a:srgbClr val="00B050"/>
+              <a:schemeClr val="accent6">
+                <a:lumMod val="75000"/>
+              </a:schemeClr>
             </a:solidFill>
             <a:prstDash val="sysDash"/>
             <a:tailEnd type="triangle"/>
@@ -31495,7 +31591,9 @@
           </a:prstGeom>
           <a:ln w="19050">
             <a:solidFill>
-              <a:srgbClr val="00B050"/>
+              <a:schemeClr val="accent6">
+                <a:lumMod val="75000"/>
+              </a:schemeClr>
             </a:solidFill>
             <a:prstDash val="sysDash"/>
             <a:tailEnd type="triangle"/>
@@ -31542,7 +31640,9 @@
           </a:prstGeom>
           <a:ln w="19050">
             <a:solidFill>
-              <a:srgbClr val="00B050"/>
+              <a:schemeClr val="accent6">
+                <a:lumMod val="75000"/>
+              </a:schemeClr>
             </a:solidFill>
             <a:prstDash val="sysDash"/>
             <a:tailEnd type="triangle"/>
@@ -31578,7 +31678,7 @@
         <p:spPr>
           <a:xfrm>
             <a:off x="252875" y="660722"/>
-            <a:ext cx="11152984" cy="1415772"/>
+            <a:ext cx="11611132" cy="1415772"/>
           </a:xfrm>
           <a:prstGeom prst="rect">
             <a:avLst/>
@@ -31608,7 +31708,7 @@
             </a:r>
             <a:r>
               <a:rPr lang="en-SG" sz="1400" dirty="0"/>
-              <a:t> 2023, we used VirtualBox to create a mini software define network environment, in the network system, we want to simulate 3 Windows users’ daily office work action and do some attack on one of the user’s windows machine with malware. Then we want to analysis different logs to parse the malware’s action from all the users’ normal action. Cluster User Emulator is used to simulate 2 types of users action: normal users and the network admin in the system. (The system config diagram is shown below)</a:t>
+              <a:t> 2023, we used VirtualBox to create serval VM based functional servers and a mini software define network environment to simulate a normal company network. We want to simulate 3 Windows users’ daily office work action and do some attack on one of the user’s windows machine with malware. Then we want to analysis different logs to parse the malware’s action from all the users’ normal action and benign traffic data. Cluster User Emulator is used to simulate 2 types of users action: normal users and the network admin user in the system. (The system config diagram is shown below)</a:t>
             </a:r>
           </a:p>
           <a:p>
@@ -31630,8 +31730,8 @@
         </p:nvSpPr>
         <p:spPr>
           <a:xfrm>
-            <a:off x="7424403" y="1855129"/>
-            <a:ext cx="4673743" cy="4832092"/>
+            <a:off x="7271153" y="1899592"/>
+            <a:ext cx="4763003" cy="4832092"/>
           </a:xfrm>
           <a:prstGeom prst="rect">
             <a:avLst/>
@@ -31650,43 +31750,50 @@
             </a:r>
           </a:p>
           <a:p>
+            <a:pPr algn="just"/>
             <a:endParaRPr lang="en-SG" sz="1400" b="1" dirty="0"/>
           </a:p>
           <a:p>
+            <a:pPr algn="just"/>
             <a:r>
               <a:rPr lang="en-SG" sz="1400" dirty="0"/>
-              <a:t>The monitor hub ran on the host physical server.</a:t>
-            </a:r>
-          </a:p>
-          <a:p>
+              <a:t>The monitor-hub ran on the host physical server.</a:t>
+            </a:r>
+          </a:p>
+          <a:p>
+            <a:pPr algn="just"/>
             <a:endParaRPr lang="en-SG" sz="1400" dirty="0"/>
           </a:p>
           <a:p>
+            <a:pPr algn="just"/>
             <a:r>
               <a:rPr lang="en-SG" sz="1400" dirty="0"/>
               <a:t>Action repository are set individually on each VM. </a:t>
             </a:r>
           </a:p>
           <a:p>
+            <a:pPr algn="just"/>
             <a:endParaRPr lang="en-SG" sz="1400" dirty="0"/>
           </a:p>
           <a:p>
+            <a:pPr algn="just"/>
             <a:r>
               <a:rPr lang="en-SG" sz="1400" dirty="0"/>
-              <a:t>Each User Emulator would run on one Windows VM with the specific action timeline config: </a:t>
-            </a:r>
-          </a:p>
-          <a:p>
+              <a:t>Each User Emulator would run on one Windows VM with its own specific action timeline config: </a:t>
+            </a:r>
+          </a:p>
+          <a:p>
+            <a:pPr algn="just"/>
             <a:endParaRPr lang="en-SG" sz="1400" dirty="0"/>
           </a:p>
           <a:p>
-            <a:pPr marL="285750" indent="-285750">
+            <a:pPr marL="285750" indent="-285750" algn="just">
               <a:buFont typeface="Arial" panose="020B0604020202020204" pitchFamily="34" charset="0"/>
               <a:buChar char="•"/>
             </a:pPr>
             <a:r>
               <a:rPr lang="en-SG" sz="1400" dirty="0"/>
-              <a:t>User emulator [Bob] will simulate a network admin’s daily work action from 9:00 am – 6:00pm. Total 32 actions will be emulated such as (read/write email, </a:t>
+              <a:t>User emulator [Bob] will simulate a network admin’s daily work action from 9:00 am – 6:00pm. Total 32 actions will be emulated such as (read/write emails, </a:t>
             </a:r>
             <a:r>
               <a:rPr lang="en-SG" sz="1400" dirty="0" err="1"/>
@@ -31694,18 +31801,26 @@
             </a:r>
             <a:r>
               <a:rPr lang="en-SG" sz="1400" dirty="0"/>
-              <a:t> to server, check the network, upload/download file, join zoom meeting, write daily report …)</a:t>
-            </a:r>
-          </a:p>
-          <a:p>
-            <a:pPr marL="285750" indent="-285750">
+              <a:t> to server, check the network, </a:t>
+            </a:r>
+            <a:r>
+              <a:rPr lang="en-SG" sz="1400" dirty="0" err="1"/>
+              <a:t>scp</a:t>
+            </a:r>
+            <a:r>
+              <a:rPr lang="en-SG" sz="1400" dirty="0"/>
+              <a:t>/upload/download file, join zoom meeting, write daily report …)</a:t>
+            </a:r>
+          </a:p>
+          <a:p>
+            <a:pPr marL="285750" indent="-285750" algn="just">
               <a:buFont typeface="Arial" panose="020B0604020202020204" pitchFamily="34" charset="0"/>
               <a:buChar char="•"/>
             </a:pPr>
             <a:endParaRPr lang="en-SG" sz="1400" dirty="0"/>
           </a:p>
           <a:p>
-            <a:pPr marL="285750" indent="-285750">
+            <a:pPr marL="285750" indent="-285750" algn="just">
               <a:buFont typeface="Arial" panose="020B0604020202020204" pitchFamily="34" charset="0"/>
               <a:buChar char="•"/>
             </a:pPr>
@@ -31715,18 +31830,15 @@
             </a:r>
           </a:p>
           <a:p>
+            <a:pPr algn="just"/>
             <a:endParaRPr lang="en-SG" sz="1400" dirty="0"/>
           </a:p>
           <a:p>
+            <a:pPr algn="just"/>
             <a:r>
               <a:rPr lang="en-SG" sz="1400" dirty="0"/>
-              <a:t>All the actions will be repeat every day with the same time </a:t>
-            </a:r>
-            <a:r>
-              <a:rPr lang="en-SG" sz="1400"/>
-              <a:t>line config.</a:t>
-            </a:r>
-            <a:endParaRPr lang="en-SG" sz="1400" dirty="0"/>
+              <a:t>All the actions will be repeat every day with the same time line config.</a:t>
+            </a:r>
           </a:p>
         </p:txBody>
       </p:sp>
@@ -31812,6 +31924,85 @@
                 </a:solidFill>
               </a:rPr>
               <a:t>Monitor hub’s control flow</a:t>
+            </a:r>
+            <a:endParaRPr lang="en-SG" sz="900" dirty="0">
+              <a:solidFill>
+                <a:srgbClr val="002060"/>
+              </a:solidFill>
+            </a:endParaRPr>
+          </a:p>
+        </p:txBody>
+      </p:sp>
+      <p:pic>
+        <p:nvPicPr>
+          <p:cNvPr id="6" name="Picture 5">
+            <a:extLst>
+              <a:ext uri="{FF2B5EF4-FFF2-40B4-BE49-F238E27FC236}">
+                <a16:creationId xmlns:a16="http://schemas.microsoft.com/office/drawing/2014/main" id="{4B609343-71CD-746D-CE57-8A72529019C0}"/>
+              </a:ext>
+            </a:extLst>
+          </p:cNvPr>
+          <p:cNvPicPr>
+            <a:picLocks noChangeAspect="1"/>
+          </p:cNvPicPr>
+          <p:nvPr/>
+        </p:nvPicPr>
+        <p:blipFill>
+          <a:blip r:embed="rId5"/>
+          <a:stretch>
+            <a:fillRect/>
+          </a:stretch>
+        </p:blipFill>
+        <p:spPr>
+          <a:xfrm>
+            <a:off x="2697584" y="6179850"/>
+            <a:ext cx="269885" cy="209911"/>
+          </a:xfrm>
+          <a:prstGeom prst="rect">
+            <a:avLst/>
+          </a:prstGeom>
+          <a:ln w="3175">
+            <a:solidFill>
+              <a:schemeClr val="tx1"/>
+            </a:solidFill>
+          </a:ln>
+        </p:spPr>
+      </p:pic>
+      <p:sp>
+        <p:nvSpPr>
+          <p:cNvPr id="7" name="TextBox 6">
+            <a:extLst>
+              <a:ext uri="{FF2B5EF4-FFF2-40B4-BE49-F238E27FC236}">
+                <a16:creationId xmlns:a16="http://schemas.microsoft.com/office/drawing/2014/main" id="{724A010F-052A-1CA9-0DE7-11805902E90E}"/>
+              </a:ext>
+            </a:extLst>
+          </p:cNvPr>
+          <p:cNvSpPr txBox="1"/>
+          <p:nvPr/>
+        </p:nvSpPr>
+        <p:spPr>
+          <a:xfrm>
+            <a:off x="2922011" y="6179282"/>
+            <a:ext cx="1277717" cy="230832"/>
+          </a:xfrm>
+          <a:prstGeom prst="rect">
+            <a:avLst/>
+          </a:prstGeom>
+          <a:noFill/>
+        </p:spPr>
+        <p:txBody>
+          <a:bodyPr wrap="square" rtlCol="0">
+            <a:spAutoFit/>
+          </a:bodyPr>
+          <a:lstStyle/>
+          <a:p>
+            <a:r>
+              <a:rPr lang="en-US" sz="900" dirty="0">
+                <a:solidFill>
+                  <a:srgbClr val="002060"/>
+                </a:solidFill>
+              </a:rPr>
+              <a:t>User Action Emulator </a:t>
             </a:r>
             <a:endParaRPr lang="en-SG" sz="900" dirty="0">
               <a:solidFill>

</xml_diff>

<commit_message>
Fixed bug and doc, added the random weekly task adding function.
</commit_message>
<xml_diff>
--- a/doc/designDoc.pptx
+++ b/doc/designDoc.pptx
@@ -212,7 +212,7 @@
           <a:p>
             <a:fld id="{2BA6DB02-48BF-406A-9449-0BBAAE1D3FCC}" type="datetimeFigureOut">
               <a:rPr lang="en-SG" smtClean="0"/>
-              <a:t>17/2/2023</a:t>
+              <a:t>20/2/2023</a:t>
             </a:fld>
             <a:endParaRPr lang="en-SG" dirty="0"/>
           </a:p>
@@ -797,7 +797,7 @@
           <a:p>
             <a:fld id="{568D23B1-6EF9-4DFF-A006-F22E70A73051}" type="datetimeFigureOut">
               <a:rPr lang="en-SG" smtClean="0"/>
-              <a:t>17/2/2023</a:t>
+              <a:t>20/2/2023</a:t>
             </a:fld>
             <a:endParaRPr lang="en-SG" dirty="0"/>
           </a:p>
@@ -997,7 +997,7 @@
           <a:p>
             <a:fld id="{568D23B1-6EF9-4DFF-A006-F22E70A73051}" type="datetimeFigureOut">
               <a:rPr lang="en-SG" smtClean="0"/>
-              <a:t>17/2/2023</a:t>
+              <a:t>20/2/2023</a:t>
             </a:fld>
             <a:endParaRPr lang="en-SG" dirty="0"/>
           </a:p>
@@ -1207,7 +1207,7 @@
           <a:p>
             <a:fld id="{568D23B1-6EF9-4DFF-A006-F22E70A73051}" type="datetimeFigureOut">
               <a:rPr lang="en-SG" smtClean="0"/>
-              <a:t>17/2/2023</a:t>
+              <a:t>20/2/2023</a:t>
             </a:fld>
             <a:endParaRPr lang="en-SG" dirty="0"/>
           </a:p>
@@ -1407,7 +1407,7 @@
           <a:p>
             <a:fld id="{568D23B1-6EF9-4DFF-A006-F22E70A73051}" type="datetimeFigureOut">
               <a:rPr lang="en-SG" smtClean="0"/>
-              <a:t>17/2/2023</a:t>
+              <a:t>20/2/2023</a:t>
             </a:fld>
             <a:endParaRPr lang="en-SG" dirty="0"/>
           </a:p>
@@ -1683,7 +1683,7 @@
           <a:p>
             <a:fld id="{568D23B1-6EF9-4DFF-A006-F22E70A73051}" type="datetimeFigureOut">
               <a:rPr lang="en-SG" smtClean="0"/>
-              <a:t>17/2/2023</a:t>
+              <a:t>20/2/2023</a:t>
             </a:fld>
             <a:endParaRPr lang="en-SG" dirty="0"/>
           </a:p>
@@ -1951,7 +1951,7 @@
           <a:p>
             <a:fld id="{568D23B1-6EF9-4DFF-A006-F22E70A73051}" type="datetimeFigureOut">
               <a:rPr lang="en-SG" smtClean="0"/>
-              <a:t>17/2/2023</a:t>
+              <a:t>20/2/2023</a:t>
             </a:fld>
             <a:endParaRPr lang="en-SG" dirty="0"/>
           </a:p>
@@ -2366,7 +2366,7 @@
           <a:p>
             <a:fld id="{568D23B1-6EF9-4DFF-A006-F22E70A73051}" type="datetimeFigureOut">
               <a:rPr lang="en-SG" smtClean="0"/>
-              <a:t>17/2/2023</a:t>
+              <a:t>20/2/2023</a:t>
             </a:fld>
             <a:endParaRPr lang="en-SG" dirty="0"/>
           </a:p>
@@ -2508,7 +2508,7 @@
           <a:p>
             <a:fld id="{568D23B1-6EF9-4DFF-A006-F22E70A73051}" type="datetimeFigureOut">
               <a:rPr lang="en-SG" smtClean="0"/>
-              <a:t>17/2/2023</a:t>
+              <a:t>20/2/2023</a:t>
             </a:fld>
             <a:endParaRPr lang="en-SG" dirty="0"/>
           </a:p>
@@ -2621,7 +2621,7 @@
           <a:p>
             <a:fld id="{568D23B1-6EF9-4DFF-A006-F22E70A73051}" type="datetimeFigureOut">
               <a:rPr lang="en-SG" smtClean="0"/>
-              <a:t>17/2/2023</a:t>
+              <a:t>20/2/2023</a:t>
             </a:fld>
             <a:endParaRPr lang="en-SG" dirty="0"/>
           </a:p>
@@ -2934,7 +2934,7 @@
           <a:p>
             <a:fld id="{568D23B1-6EF9-4DFF-A006-F22E70A73051}" type="datetimeFigureOut">
               <a:rPr lang="en-SG" smtClean="0"/>
-              <a:t>17/2/2023</a:t>
+              <a:t>20/2/2023</a:t>
             </a:fld>
             <a:endParaRPr lang="en-SG" dirty="0"/>
           </a:p>
@@ -3223,7 +3223,7 @@
           <a:p>
             <a:fld id="{568D23B1-6EF9-4DFF-A006-F22E70A73051}" type="datetimeFigureOut">
               <a:rPr lang="en-SG" smtClean="0"/>
-              <a:t>17/2/2023</a:t>
+              <a:t>20/2/2023</a:t>
             </a:fld>
             <a:endParaRPr lang="en-SG" dirty="0"/>
           </a:p>
@@ -3466,7 +3466,7 @@
           <a:p>
             <a:fld id="{568D23B1-6EF9-4DFF-A006-F22E70A73051}" type="datetimeFigureOut">
               <a:rPr lang="en-SG" smtClean="0"/>
-              <a:t>17/2/2023</a:t>
+              <a:t>20/2/2023</a:t>
             </a:fld>
             <a:endParaRPr lang="en-SG" dirty="0"/>
           </a:p>
@@ -13620,7 +13620,7 @@
                   <a:srgbClr val="002060"/>
                 </a:solidFill>
               </a:rPr>
-              <a:t>VM with user emulator</a:t>
+              <a:t>VM with profile emulator</a:t>
             </a:r>
             <a:endParaRPr lang="en-SG" sz="900" dirty="0">
               <a:solidFill>
@@ -13664,7 +13664,7 @@
                   <a:srgbClr val="002060"/>
                 </a:solidFill>
               </a:rPr>
-              <a:t>Servers cluster with user emulator</a:t>
+              <a:t>Servers cluster with profile emulator</a:t>
             </a:r>
             <a:endParaRPr lang="en-SG" sz="900" dirty="0">
               <a:solidFill>
@@ -13688,8 +13688,8 @@
         </p:nvSpPr>
         <p:spPr>
           <a:xfrm>
-            <a:off x="5815603" y="2111117"/>
-            <a:ext cx="1141436" cy="369332"/>
+            <a:off x="5815602" y="2111117"/>
+            <a:ext cx="1550665" cy="369332"/>
           </a:xfrm>
           <a:prstGeom prst="rect">
             <a:avLst/>
@@ -13708,7 +13708,7 @@
                   <a:srgbClr val="002060"/>
                 </a:solidFill>
               </a:rPr>
-              <a:t>Laptop/Desktop with user emulator</a:t>
+              <a:t>Laptop/Desktop with profile emulator</a:t>
             </a:r>
             <a:endParaRPr lang="en-SG" sz="900" dirty="0">
               <a:solidFill>
@@ -13752,7 +13752,7 @@
                   <a:srgbClr val="002060"/>
                 </a:solidFill>
               </a:rPr>
-              <a:t>Raspberry-PI with user emulator</a:t>
+              <a:t>Raspberry-PI with profile emulator</a:t>
             </a:r>
             <a:endParaRPr lang="en-SG" sz="900" dirty="0">
               <a:solidFill>
@@ -13928,7 +13928,7 @@
                   <a:srgbClr val="002060"/>
                 </a:solidFill>
               </a:rPr>
-              <a:t>Internal monitor hub server  </a:t>
+              <a:t>Internal Scheduler monitor hub server  </a:t>
             </a:r>
             <a:endParaRPr lang="en-SG" sz="900" dirty="0">
               <a:solidFill>
@@ -13997,7 +13997,7 @@
         <p:spPr>
           <a:xfrm>
             <a:off x="6183342" y="5791044"/>
-            <a:ext cx="1435820" cy="230832"/>
+            <a:ext cx="1435820" cy="369332"/>
           </a:xfrm>
           <a:prstGeom prst="rect">
             <a:avLst/>
@@ -14016,7 +14016,7 @@
                   <a:srgbClr val="002060"/>
                 </a:solidFill>
               </a:rPr>
-              <a:t>Tasks monitor hub website </a:t>
+              <a:t>Scheduler monitor hub website </a:t>
             </a:r>
             <a:endParaRPr lang="en-SG" sz="900" dirty="0">
               <a:solidFill>
@@ -14562,7 +14562,7 @@
                   <a:srgbClr val="002060"/>
                 </a:solidFill>
               </a:rPr>
-              <a:t>User Action Emulator </a:t>
+              <a:t>User Profile Emulator</a:t>
             </a:r>
             <a:endParaRPr lang="en-SG" sz="900" dirty="0">
               <a:solidFill>
@@ -15017,7 +15017,7 @@
         <p:spPr>
           <a:xfrm>
             <a:off x="2850130" y="5191291"/>
-            <a:ext cx="1277717" cy="230832"/>
+            <a:ext cx="1911644" cy="230832"/>
           </a:xfrm>
           <a:prstGeom prst="rect">
             <a:avLst/>
@@ -15036,7 +15036,7 @@
                   <a:srgbClr val="002060"/>
                 </a:solidFill>
               </a:rPr>
-              <a:t>User repository </a:t>
+              <a:t>User Action Agents repository </a:t>
             </a:r>
             <a:endParaRPr lang="en-SG" sz="900" dirty="0">
               <a:solidFill>
@@ -15293,7 +15293,7 @@
                   <a:srgbClr val="002060"/>
                 </a:solidFill>
               </a:rPr>
-              <a:t>Monitor-Hub</a:t>
+              <a:t>Scheduler Monitor Hub</a:t>
             </a:r>
             <a:endParaRPr lang="en-SG" sz="900" dirty="0">
               <a:solidFill>

</xml_diff>

<commit_message>
Update the update the deployment section.
</commit_message>
<xml_diff>
--- a/doc/designDoc.pptx
+++ b/doc/designDoc.pptx
@@ -5,7 +5,7 @@
     <p:sldMasterId id="2147483648" r:id="rId1"/>
   </p:sldMasterIdLst>
   <p:notesMasterIdLst>
-    <p:notesMasterId r:id="rId19"/>
+    <p:notesMasterId r:id="rId20"/>
   </p:notesMasterIdLst>
   <p:sldIdLst>
     <p:sldId id="262" r:id="rId2"/>
@@ -25,6 +25,7 @@
     <p:sldId id="295" r:id="rId16"/>
     <p:sldId id="302" r:id="rId17"/>
     <p:sldId id="303" r:id="rId18"/>
+    <p:sldId id="305" r:id="rId19"/>
   </p:sldIdLst>
   <p:sldSz cx="12192000" cy="6858000"/>
   <p:notesSz cx="6858000" cy="9144000"/>
@@ -213,7 +214,7 @@
           <a:p>
             <a:fld id="{2BA6DB02-48BF-406A-9449-0BBAAE1D3FCC}" type="datetimeFigureOut">
               <a:rPr lang="en-SG" smtClean="0"/>
-              <a:t>26/2/2023</a:t>
+              <a:t>14/3/2024</a:t>
             </a:fld>
             <a:endParaRPr lang="en-SG" dirty="0"/>
           </a:p>
@@ -798,7 +799,7 @@
           <a:p>
             <a:fld id="{568D23B1-6EF9-4DFF-A006-F22E70A73051}" type="datetimeFigureOut">
               <a:rPr lang="en-SG" smtClean="0"/>
-              <a:t>26/2/2023</a:t>
+              <a:t>14/3/2024</a:t>
             </a:fld>
             <a:endParaRPr lang="en-SG" dirty="0"/>
           </a:p>
@@ -998,7 +999,7 @@
           <a:p>
             <a:fld id="{568D23B1-6EF9-4DFF-A006-F22E70A73051}" type="datetimeFigureOut">
               <a:rPr lang="en-SG" smtClean="0"/>
-              <a:t>26/2/2023</a:t>
+              <a:t>14/3/2024</a:t>
             </a:fld>
             <a:endParaRPr lang="en-SG" dirty="0"/>
           </a:p>
@@ -1208,7 +1209,7 @@
           <a:p>
             <a:fld id="{568D23B1-6EF9-4DFF-A006-F22E70A73051}" type="datetimeFigureOut">
               <a:rPr lang="en-SG" smtClean="0"/>
-              <a:t>26/2/2023</a:t>
+              <a:t>14/3/2024</a:t>
             </a:fld>
             <a:endParaRPr lang="en-SG" dirty="0"/>
           </a:p>
@@ -1408,7 +1409,7 @@
           <a:p>
             <a:fld id="{568D23B1-6EF9-4DFF-A006-F22E70A73051}" type="datetimeFigureOut">
               <a:rPr lang="en-SG" smtClean="0"/>
-              <a:t>26/2/2023</a:t>
+              <a:t>14/3/2024</a:t>
             </a:fld>
             <a:endParaRPr lang="en-SG" dirty="0"/>
           </a:p>
@@ -1684,7 +1685,7 @@
           <a:p>
             <a:fld id="{568D23B1-6EF9-4DFF-A006-F22E70A73051}" type="datetimeFigureOut">
               <a:rPr lang="en-SG" smtClean="0"/>
-              <a:t>26/2/2023</a:t>
+              <a:t>14/3/2024</a:t>
             </a:fld>
             <a:endParaRPr lang="en-SG" dirty="0"/>
           </a:p>
@@ -1952,7 +1953,7 @@
           <a:p>
             <a:fld id="{568D23B1-6EF9-4DFF-A006-F22E70A73051}" type="datetimeFigureOut">
               <a:rPr lang="en-SG" smtClean="0"/>
-              <a:t>26/2/2023</a:t>
+              <a:t>14/3/2024</a:t>
             </a:fld>
             <a:endParaRPr lang="en-SG" dirty="0"/>
           </a:p>
@@ -2367,7 +2368,7 @@
           <a:p>
             <a:fld id="{568D23B1-6EF9-4DFF-A006-F22E70A73051}" type="datetimeFigureOut">
               <a:rPr lang="en-SG" smtClean="0"/>
-              <a:t>26/2/2023</a:t>
+              <a:t>14/3/2024</a:t>
             </a:fld>
             <a:endParaRPr lang="en-SG" dirty="0"/>
           </a:p>
@@ -2509,7 +2510,7 @@
           <a:p>
             <a:fld id="{568D23B1-6EF9-4DFF-A006-F22E70A73051}" type="datetimeFigureOut">
               <a:rPr lang="en-SG" smtClean="0"/>
-              <a:t>26/2/2023</a:t>
+              <a:t>14/3/2024</a:t>
             </a:fld>
             <a:endParaRPr lang="en-SG" dirty="0"/>
           </a:p>
@@ -2622,7 +2623,7 @@
           <a:p>
             <a:fld id="{568D23B1-6EF9-4DFF-A006-F22E70A73051}" type="datetimeFigureOut">
               <a:rPr lang="en-SG" smtClean="0"/>
-              <a:t>26/2/2023</a:t>
+              <a:t>14/3/2024</a:t>
             </a:fld>
             <a:endParaRPr lang="en-SG" dirty="0"/>
           </a:p>
@@ -2935,7 +2936,7 @@
           <a:p>
             <a:fld id="{568D23B1-6EF9-4DFF-A006-F22E70A73051}" type="datetimeFigureOut">
               <a:rPr lang="en-SG" smtClean="0"/>
-              <a:t>26/2/2023</a:t>
+              <a:t>14/3/2024</a:t>
             </a:fld>
             <a:endParaRPr lang="en-SG" dirty="0"/>
           </a:p>
@@ -3224,7 +3225,7 @@
           <a:p>
             <a:fld id="{568D23B1-6EF9-4DFF-A006-F22E70A73051}" type="datetimeFigureOut">
               <a:rPr lang="en-SG" smtClean="0"/>
-              <a:t>26/2/2023</a:t>
+              <a:t>14/3/2024</a:t>
             </a:fld>
             <a:endParaRPr lang="en-SG" dirty="0"/>
           </a:p>
@@ -3467,7 +3468,7 @@
           <a:p>
             <a:fld id="{568D23B1-6EF9-4DFF-A006-F22E70A73051}" type="datetimeFigureOut">
               <a:rPr lang="en-SG" smtClean="0"/>
-              <a:t>26/2/2023</a:t>
+              <a:t>14/3/2024</a:t>
             </a:fld>
             <a:endParaRPr lang="en-SG" dirty="0"/>
           </a:p>
@@ -5328,7 +5329,7 @@
         </p:nvSpPr>
         <p:spPr>
           <a:xfrm>
-            <a:off x="259568" y="5326561"/>
+            <a:off x="613530" y="5326561"/>
             <a:ext cx="8880788" cy="1323439"/>
           </a:xfrm>
           <a:prstGeom prst="rect">
@@ -24216,6 +24217,113 @@
     <p:extLst>
       <p:ext uri="{BB962C8B-B14F-4D97-AF65-F5344CB8AC3E}">
         <p14:creationId xmlns:p14="http://schemas.microsoft.com/office/powerpoint/2010/main" val="429245713"/>
+      </p:ext>
+    </p:extLst>
+  </p:cSld>
+  <p:clrMapOvr>
+    <a:masterClrMapping/>
+  </p:clrMapOvr>
+</p:sld>
+</file>
+
+<file path=ppt/slides/slide18.xml><?xml version="1.0" encoding="utf-8"?>
+<p:sld xmlns:a="http://schemas.openxmlformats.org/drawingml/2006/main" xmlns:r="http://schemas.openxmlformats.org/officeDocument/2006/relationships" xmlns:p="http://schemas.openxmlformats.org/presentationml/2006/main">
+  <p:cSld>
+    <p:spTree>
+      <p:nvGrpSpPr>
+        <p:cNvPr id="1" name=""/>
+        <p:cNvGrpSpPr/>
+        <p:nvPr/>
+      </p:nvGrpSpPr>
+      <p:grpSpPr>
+        <a:xfrm>
+          <a:off x="0" y="0"/>
+          <a:ext cx="0" cy="0"/>
+          <a:chOff x="0" y="0"/>
+          <a:chExt cx="0" cy="0"/>
+        </a:xfrm>
+      </p:grpSpPr>
+      <p:pic>
+        <p:nvPicPr>
+          <p:cNvPr id="5" name="Picture 4" descr="A diagram of a cloud computing system&#10;&#10;Description automatically generated">
+            <a:extLst>
+              <a:ext uri="{FF2B5EF4-FFF2-40B4-BE49-F238E27FC236}">
+                <a16:creationId xmlns:a16="http://schemas.microsoft.com/office/drawing/2014/main" id="{E5308BE7-2240-AC61-D712-945834D75A5F}"/>
+              </a:ext>
+            </a:extLst>
+          </p:cNvPr>
+          <p:cNvPicPr>
+            <a:picLocks noChangeAspect="1"/>
+          </p:cNvPicPr>
+          <p:nvPr/>
+        </p:nvPicPr>
+        <p:blipFill rotWithShape="1">
+          <a:blip r:embed="rId2">
+            <a:extLst>
+              <a:ext uri="{28A0092B-C50C-407E-A947-70E740481C1C}">
+                <a14:useLocalDpi xmlns:a14="http://schemas.microsoft.com/office/drawing/2010/main" val="0"/>
+              </a:ext>
+            </a:extLst>
+          </a:blip>
+          <a:srcRect r="12644"/>
+          <a:stretch/>
+        </p:blipFill>
+        <p:spPr>
+          <a:xfrm>
+            <a:off x="147738" y="993057"/>
+            <a:ext cx="6056417" cy="5314335"/>
+          </a:xfrm>
+          <a:prstGeom prst="rect">
+            <a:avLst/>
+          </a:prstGeom>
+        </p:spPr>
+      </p:pic>
+      <p:pic>
+        <p:nvPicPr>
+          <p:cNvPr id="7" name="Picture 6" descr="A diagram of a system&#10;&#10;Description automatically generated">
+            <a:extLst>
+              <a:ext uri="{FF2B5EF4-FFF2-40B4-BE49-F238E27FC236}">
+                <a16:creationId xmlns:a16="http://schemas.microsoft.com/office/drawing/2014/main" id="{45AB867D-CE0B-F7BD-27AC-40C8669083AB}"/>
+              </a:ext>
+            </a:extLst>
+          </p:cNvPr>
+          <p:cNvPicPr>
+            <a:picLocks noChangeAspect="1"/>
+          </p:cNvPicPr>
+          <p:nvPr/>
+        </p:nvPicPr>
+        <p:blipFill>
+          <a:blip r:embed="rId3">
+            <a:extLst>
+              <a:ext uri="{28A0092B-C50C-407E-A947-70E740481C1C}">
+                <a14:useLocalDpi xmlns:a14="http://schemas.microsoft.com/office/drawing/2010/main" val="0"/>
+              </a:ext>
+            </a:extLst>
+          </a:blip>
+          <a:stretch>
+            <a:fillRect/>
+          </a:stretch>
+        </p:blipFill>
+        <p:spPr>
+          <a:xfrm>
+            <a:off x="6204156" y="1111046"/>
+            <a:ext cx="5358580" cy="5083953"/>
+          </a:xfrm>
+          <a:prstGeom prst="rect">
+            <a:avLst/>
+          </a:prstGeom>
+          <a:ln w="9525">
+            <a:solidFill>
+              <a:schemeClr val="tx1"/>
+            </a:solidFill>
+            <a:prstDash val="dash"/>
+          </a:ln>
+        </p:spPr>
+      </p:pic>
+    </p:spTree>
+    <p:extLst>
+      <p:ext uri="{BB962C8B-B14F-4D97-AF65-F5344CB8AC3E}">
+        <p14:creationId xmlns:p14="http://schemas.microsoft.com/office/powerpoint/2010/main" val="3485891767"/>
       </p:ext>
     </p:extLst>
   </p:cSld>

</xml_diff>

<commit_message>
Update the read me file of the Orchestrator hub.
</commit_message>
<xml_diff>
--- a/doc/designDoc.pptx
+++ b/doc/designDoc.pptx
@@ -5,7 +5,7 @@
     <p:sldMasterId id="2147483648" r:id="rId1"/>
   </p:sldMasterIdLst>
   <p:notesMasterIdLst>
-    <p:notesMasterId r:id="rId20"/>
+    <p:notesMasterId r:id="rId21"/>
   </p:notesMasterIdLst>
   <p:sldIdLst>
     <p:sldId id="262" r:id="rId2"/>
@@ -23,9 +23,10 @@
     <p:sldId id="260" r:id="rId14"/>
     <p:sldId id="304" r:id="rId15"/>
     <p:sldId id="295" r:id="rId16"/>
-    <p:sldId id="302" r:id="rId17"/>
-    <p:sldId id="303" r:id="rId18"/>
-    <p:sldId id="305" r:id="rId19"/>
+    <p:sldId id="306" r:id="rId17"/>
+    <p:sldId id="302" r:id="rId18"/>
+    <p:sldId id="303" r:id="rId19"/>
+    <p:sldId id="305" r:id="rId20"/>
   </p:sldIdLst>
   <p:sldSz cx="12192000" cy="6858000"/>
   <p:notesSz cx="6858000" cy="9144000"/>
@@ -214,7 +215,7 @@
           <a:p>
             <a:fld id="{2BA6DB02-48BF-406A-9449-0BBAAE1D3FCC}" type="datetimeFigureOut">
               <a:rPr lang="en-SG" smtClean="0"/>
-              <a:t>14/3/2024</a:t>
+              <a:t>15/5/2024</a:t>
             </a:fld>
             <a:endParaRPr lang="en-SG" dirty="0"/>
           </a:p>
@@ -799,7 +800,7 @@
           <a:p>
             <a:fld id="{568D23B1-6EF9-4DFF-A006-F22E70A73051}" type="datetimeFigureOut">
               <a:rPr lang="en-SG" smtClean="0"/>
-              <a:t>14/3/2024</a:t>
+              <a:t>15/5/2024</a:t>
             </a:fld>
             <a:endParaRPr lang="en-SG" dirty="0"/>
           </a:p>
@@ -999,7 +1000,7 @@
           <a:p>
             <a:fld id="{568D23B1-6EF9-4DFF-A006-F22E70A73051}" type="datetimeFigureOut">
               <a:rPr lang="en-SG" smtClean="0"/>
-              <a:t>14/3/2024</a:t>
+              <a:t>15/5/2024</a:t>
             </a:fld>
             <a:endParaRPr lang="en-SG" dirty="0"/>
           </a:p>
@@ -1209,7 +1210,7 @@
           <a:p>
             <a:fld id="{568D23B1-6EF9-4DFF-A006-F22E70A73051}" type="datetimeFigureOut">
               <a:rPr lang="en-SG" smtClean="0"/>
-              <a:t>14/3/2024</a:t>
+              <a:t>15/5/2024</a:t>
             </a:fld>
             <a:endParaRPr lang="en-SG" dirty="0"/>
           </a:p>
@@ -1409,7 +1410,7 @@
           <a:p>
             <a:fld id="{568D23B1-6EF9-4DFF-A006-F22E70A73051}" type="datetimeFigureOut">
               <a:rPr lang="en-SG" smtClean="0"/>
-              <a:t>14/3/2024</a:t>
+              <a:t>15/5/2024</a:t>
             </a:fld>
             <a:endParaRPr lang="en-SG" dirty="0"/>
           </a:p>
@@ -1685,7 +1686,7 @@
           <a:p>
             <a:fld id="{568D23B1-6EF9-4DFF-A006-F22E70A73051}" type="datetimeFigureOut">
               <a:rPr lang="en-SG" smtClean="0"/>
-              <a:t>14/3/2024</a:t>
+              <a:t>15/5/2024</a:t>
             </a:fld>
             <a:endParaRPr lang="en-SG" dirty="0"/>
           </a:p>
@@ -1953,7 +1954,7 @@
           <a:p>
             <a:fld id="{568D23B1-6EF9-4DFF-A006-F22E70A73051}" type="datetimeFigureOut">
               <a:rPr lang="en-SG" smtClean="0"/>
-              <a:t>14/3/2024</a:t>
+              <a:t>15/5/2024</a:t>
             </a:fld>
             <a:endParaRPr lang="en-SG" dirty="0"/>
           </a:p>
@@ -2368,7 +2369,7 @@
           <a:p>
             <a:fld id="{568D23B1-6EF9-4DFF-A006-F22E70A73051}" type="datetimeFigureOut">
               <a:rPr lang="en-SG" smtClean="0"/>
-              <a:t>14/3/2024</a:t>
+              <a:t>15/5/2024</a:t>
             </a:fld>
             <a:endParaRPr lang="en-SG" dirty="0"/>
           </a:p>
@@ -2510,7 +2511,7 @@
           <a:p>
             <a:fld id="{568D23B1-6EF9-4DFF-A006-F22E70A73051}" type="datetimeFigureOut">
               <a:rPr lang="en-SG" smtClean="0"/>
-              <a:t>14/3/2024</a:t>
+              <a:t>15/5/2024</a:t>
             </a:fld>
             <a:endParaRPr lang="en-SG" dirty="0"/>
           </a:p>
@@ -2623,7 +2624,7 @@
           <a:p>
             <a:fld id="{568D23B1-6EF9-4DFF-A006-F22E70A73051}" type="datetimeFigureOut">
               <a:rPr lang="en-SG" smtClean="0"/>
-              <a:t>14/3/2024</a:t>
+              <a:t>15/5/2024</a:t>
             </a:fld>
             <a:endParaRPr lang="en-SG" dirty="0"/>
           </a:p>
@@ -2936,7 +2937,7 @@
           <a:p>
             <a:fld id="{568D23B1-6EF9-4DFF-A006-F22E70A73051}" type="datetimeFigureOut">
               <a:rPr lang="en-SG" smtClean="0"/>
-              <a:t>14/3/2024</a:t>
+              <a:t>15/5/2024</a:t>
             </a:fld>
             <a:endParaRPr lang="en-SG" dirty="0"/>
           </a:p>
@@ -3225,7 +3226,7 @@
           <a:p>
             <a:fld id="{568D23B1-6EF9-4DFF-A006-F22E70A73051}" type="datetimeFigureOut">
               <a:rPr lang="en-SG" smtClean="0"/>
-              <a:t>14/3/2024</a:t>
+              <a:t>15/5/2024</a:t>
             </a:fld>
             <a:endParaRPr lang="en-SG" dirty="0"/>
           </a:p>
@@ -3468,7 +3469,7 @@
           <a:p>
             <a:fld id="{568D23B1-6EF9-4DFF-A006-F22E70A73051}" type="datetimeFigureOut">
               <a:rPr lang="en-SG" smtClean="0"/>
-              <a:t>14/3/2024</a:t>
+              <a:t>15/5/2024</a:t>
             </a:fld>
             <a:endParaRPr lang="en-SG" dirty="0"/>
           </a:p>
@@ -21017,489 +21018,40 @@
           <a:chExt cx="0" cy="0"/>
         </a:xfrm>
       </p:grpSpPr>
-      <p:pic>
-        <p:nvPicPr>
-          <p:cNvPr id="5" name="Picture 4">
-            <a:extLst>
-              <a:ext uri="{FF2B5EF4-FFF2-40B4-BE49-F238E27FC236}">
-                <a16:creationId xmlns:a16="http://schemas.microsoft.com/office/drawing/2014/main" id="{04F4D0BF-39B3-B798-ED1D-6A31064C07E8}"/>
-              </a:ext>
-            </a:extLst>
-          </p:cNvPr>
-          <p:cNvPicPr>
-            <a:picLocks noChangeAspect="1"/>
-          </p:cNvPicPr>
-          <p:nvPr/>
-        </p:nvPicPr>
-        <p:blipFill>
-          <a:blip r:embed="rId2"/>
-          <a:stretch>
-            <a:fillRect/>
-          </a:stretch>
-        </p:blipFill>
-        <p:spPr>
-          <a:xfrm>
-            <a:off x="3610268" y="2345385"/>
-            <a:ext cx="355832" cy="427982"/>
-          </a:xfrm>
-          <a:prstGeom prst="rect">
-            <a:avLst/>
-          </a:prstGeom>
-        </p:spPr>
-      </p:pic>
       <p:sp>
         <p:nvSpPr>
-          <p:cNvPr id="7" name="TextBox 6">
-            <a:extLst>
-              <a:ext uri="{FF2B5EF4-FFF2-40B4-BE49-F238E27FC236}">
-                <a16:creationId xmlns:a16="http://schemas.microsoft.com/office/drawing/2014/main" id="{31CEDEF5-2CAB-C993-6EC5-0C8CDC2F087D}"/>
-              </a:ext>
-            </a:extLst>
-          </p:cNvPr>
-          <p:cNvSpPr txBox="1"/>
+          <p:cNvPr id="4" name="Rectangle 3">
+            <a:extLst>
+              <a:ext uri="{FF2B5EF4-FFF2-40B4-BE49-F238E27FC236}">
+                <a16:creationId xmlns:a16="http://schemas.microsoft.com/office/drawing/2014/main" id="{D9AEC5BD-FFF7-1C91-B37B-D91FE9A17920}"/>
+              </a:ext>
+            </a:extLst>
+          </p:cNvPr>
+          <p:cNvSpPr/>
           <p:nvPr/>
         </p:nvSpPr>
         <p:spPr>
           <a:xfrm>
-            <a:off x="2291072" y="1825973"/>
-            <a:ext cx="2638392" cy="276999"/>
+            <a:off x="910299" y="1894595"/>
+            <a:ext cx="2604425" cy="2477379"/>
           </a:xfrm>
           <a:prstGeom prst="rect">
             <a:avLst/>
           </a:prstGeom>
           <a:noFill/>
-        </p:spPr>
-        <p:txBody>
-          <a:bodyPr wrap="square" rtlCol="0">
-            <a:spAutoFit/>
-          </a:bodyPr>
-          <a:lstStyle/>
-          <a:p>
-            <a:r>
-              <a:rPr lang="en-SG" sz="1200" b="1" dirty="0">
-                <a:effectLst/>
-                <a:ea typeface="Times New Roman" panose="02020603050405020304" pitchFamily="18" charset="0"/>
-              </a:rPr>
-              <a:t>User Action Agents [UAR</a:t>
-            </a:r>
-            <a:r>
-              <a:rPr lang="en-SG" sz="1200" b="1" dirty="0">
-                <a:ea typeface="Times New Roman" panose="02020603050405020304" pitchFamily="18" charset="0"/>
-              </a:rPr>
-              <a:t>]</a:t>
-            </a:r>
-            <a:r>
-              <a:rPr lang="en-SG" sz="1200" b="1" dirty="0">
-                <a:effectLst/>
-                <a:ea typeface="Times New Roman" panose="02020603050405020304" pitchFamily="18" charset="0"/>
-              </a:rPr>
-              <a:t> Repository </a:t>
-            </a:r>
-            <a:r>
-              <a:rPr lang="en-SG" sz="1200" b="1" u="sng" dirty="0">
-                <a:effectLst/>
-                <a:ea typeface="Times New Roman" panose="02020603050405020304" pitchFamily="18" charset="0"/>
-              </a:rPr>
-              <a:t> </a:t>
-            </a:r>
-            <a:endParaRPr lang="en-SG" sz="1200" dirty="0"/>
-          </a:p>
-        </p:txBody>
-      </p:sp>
-      <p:sp>
-        <p:nvSpPr>
-          <p:cNvPr id="8" name="TextBox 7">
-            <a:extLst>
-              <a:ext uri="{FF2B5EF4-FFF2-40B4-BE49-F238E27FC236}">
-                <a16:creationId xmlns:a16="http://schemas.microsoft.com/office/drawing/2014/main" id="{9F9E6393-1A43-DFA2-B110-974E61F17BBC}"/>
-              </a:ext>
-            </a:extLst>
-          </p:cNvPr>
-          <p:cNvSpPr txBox="1"/>
-          <p:nvPr/>
-        </p:nvSpPr>
-        <p:spPr>
-          <a:xfrm>
-            <a:off x="2555897" y="2763958"/>
-            <a:ext cx="896285" cy="246221"/>
-          </a:xfrm>
-          <a:prstGeom prst="rect">
-            <a:avLst/>
-          </a:prstGeom>
-          <a:noFill/>
-        </p:spPr>
-        <p:txBody>
-          <a:bodyPr wrap="square" rtlCol="0">
-            <a:spAutoFit/>
-          </a:bodyPr>
-          <a:lstStyle/>
-          <a:p>
-            <a:r>
-              <a:rPr lang="en-SG" sz="1000" dirty="0"/>
-              <a:t>UAR_[Web]</a:t>
-            </a:r>
-          </a:p>
-        </p:txBody>
-      </p:sp>
-      <p:sp>
-        <p:nvSpPr>
-          <p:cNvPr id="9" name="TextBox 8">
-            <a:extLst>
-              <a:ext uri="{FF2B5EF4-FFF2-40B4-BE49-F238E27FC236}">
-                <a16:creationId xmlns:a16="http://schemas.microsoft.com/office/drawing/2014/main" id="{08B77C9A-152A-D2CF-6431-57E09AC00FFB}"/>
-              </a:ext>
-            </a:extLst>
-          </p:cNvPr>
-          <p:cNvSpPr txBox="1"/>
-          <p:nvPr/>
-        </p:nvSpPr>
-        <p:spPr>
-          <a:xfrm>
-            <a:off x="3452182" y="2763656"/>
-            <a:ext cx="896285" cy="246221"/>
-          </a:xfrm>
-          <a:prstGeom prst="rect">
-            <a:avLst/>
-          </a:prstGeom>
-          <a:noFill/>
-        </p:spPr>
-        <p:txBody>
-          <a:bodyPr wrap="square" rtlCol="0">
-            <a:spAutoFit/>
-          </a:bodyPr>
-          <a:lstStyle/>
-          <a:p>
-            <a:r>
-              <a:rPr lang="en-SG" sz="1000" dirty="0"/>
-              <a:t>UAR_[HW]</a:t>
-            </a:r>
-          </a:p>
-        </p:txBody>
-      </p:sp>
-      <p:pic>
-        <p:nvPicPr>
-          <p:cNvPr id="10" name="Picture 9">
-            <a:extLst>
-              <a:ext uri="{FF2B5EF4-FFF2-40B4-BE49-F238E27FC236}">
-                <a16:creationId xmlns:a16="http://schemas.microsoft.com/office/drawing/2014/main" id="{5AC5431D-6ECD-2703-272B-F50C89818475}"/>
-              </a:ext>
-            </a:extLst>
-          </p:cNvPr>
-          <p:cNvPicPr>
-            <a:picLocks noChangeAspect="1"/>
-          </p:cNvPicPr>
-          <p:nvPr/>
-        </p:nvPicPr>
-        <p:blipFill>
-          <a:blip r:embed="rId2"/>
-          <a:stretch>
-            <a:fillRect/>
-          </a:stretch>
-        </p:blipFill>
-        <p:spPr>
-          <a:xfrm>
-            <a:off x="4417336" y="2345385"/>
-            <a:ext cx="355832" cy="427982"/>
-          </a:xfrm>
-          <a:prstGeom prst="rect">
-            <a:avLst/>
-          </a:prstGeom>
-        </p:spPr>
-      </p:pic>
-      <p:sp>
-        <p:nvSpPr>
-          <p:cNvPr id="11" name="TextBox 10">
-            <a:extLst>
-              <a:ext uri="{FF2B5EF4-FFF2-40B4-BE49-F238E27FC236}">
-                <a16:creationId xmlns:a16="http://schemas.microsoft.com/office/drawing/2014/main" id="{02D5F13F-492A-2B05-3CD3-5C074D9B67D3}"/>
-              </a:ext>
-            </a:extLst>
-          </p:cNvPr>
-          <p:cNvSpPr txBox="1"/>
-          <p:nvPr/>
-        </p:nvSpPr>
-        <p:spPr>
-          <a:xfrm>
-            <a:off x="4273255" y="2763354"/>
-            <a:ext cx="896285" cy="246221"/>
-          </a:xfrm>
-          <a:prstGeom prst="rect">
-            <a:avLst/>
-          </a:prstGeom>
-          <a:noFill/>
-        </p:spPr>
-        <p:txBody>
-          <a:bodyPr wrap="square" rtlCol="0">
-            <a:spAutoFit/>
-          </a:bodyPr>
-          <a:lstStyle/>
-          <a:p>
-            <a:r>
-              <a:rPr lang="en-SG" sz="1000" dirty="0"/>
-              <a:t>UAR_[App]</a:t>
-            </a:r>
-          </a:p>
-        </p:txBody>
-      </p:sp>
-      <p:sp>
-        <p:nvSpPr>
-          <p:cNvPr id="12" name="TextBox 11">
-            <a:extLst>
-              <a:ext uri="{FF2B5EF4-FFF2-40B4-BE49-F238E27FC236}">
-                <a16:creationId xmlns:a16="http://schemas.microsoft.com/office/drawing/2014/main" id="{AD662BE1-8C57-860E-1A1B-D3B71F2F4225}"/>
-              </a:ext>
-            </a:extLst>
-          </p:cNvPr>
-          <p:cNvSpPr txBox="1"/>
-          <p:nvPr/>
-        </p:nvSpPr>
-        <p:spPr>
-          <a:xfrm>
-            <a:off x="3170008" y="2494328"/>
-            <a:ext cx="347472" cy="369332"/>
-          </a:xfrm>
-          <a:prstGeom prst="rect">
-            <a:avLst/>
-          </a:prstGeom>
-          <a:noFill/>
-        </p:spPr>
-        <p:txBody>
-          <a:bodyPr wrap="square" rtlCol="0">
-            <a:spAutoFit/>
-          </a:bodyPr>
-          <a:lstStyle/>
-          <a:p>
-            <a:r>
-              <a:rPr lang="en-SG" dirty="0"/>
-              <a:t>…</a:t>
-            </a:r>
-          </a:p>
-        </p:txBody>
-      </p:sp>
-      <p:pic>
-        <p:nvPicPr>
-          <p:cNvPr id="13" name="Picture 12">
-            <a:extLst>
-              <a:ext uri="{FF2B5EF4-FFF2-40B4-BE49-F238E27FC236}">
-                <a16:creationId xmlns:a16="http://schemas.microsoft.com/office/drawing/2014/main" id="{CC77102F-8DC1-9BBB-31DE-3EE9B4B80E2E}"/>
-              </a:ext>
-            </a:extLst>
-          </p:cNvPr>
-          <p:cNvPicPr>
-            <a:picLocks noChangeAspect="1"/>
-          </p:cNvPicPr>
-          <p:nvPr/>
-        </p:nvPicPr>
-        <p:blipFill>
-          <a:blip r:embed="rId2"/>
-          <a:stretch>
-            <a:fillRect/>
-          </a:stretch>
-        </p:blipFill>
-        <p:spPr>
-          <a:xfrm>
-            <a:off x="2823235" y="2280337"/>
-            <a:ext cx="355832" cy="427982"/>
-          </a:xfrm>
-          <a:prstGeom prst="rect">
-            <a:avLst/>
-          </a:prstGeom>
-        </p:spPr>
-      </p:pic>
-      <p:pic>
-        <p:nvPicPr>
-          <p:cNvPr id="6" name="Picture 5">
-            <a:extLst>
-              <a:ext uri="{FF2B5EF4-FFF2-40B4-BE49-F238E27FC236}">
-                <a16:creationId xmlns:a16="http://schemas.microsoft.com/office/drawing/2014/main" id="{3DF9721C-5A0D-BD8F-BA65-3195D6B8A603}"/>
-              </a:ext>
-            </a:extLst>
-          </p:cNvPr>
-          <p:cNvPicPr>
-            <a:picLocks noChangeAspect="1"/>
-          </p:cNvPicPr>
-          <p:nvPr/>
-        </p:nvPicPr>
-        <p:blipFill>
-          <a:blip r:embed="rId2"/>
-          <a:stretch>
-            <a:fillRect/>
-          </a:stretch>
-        </p:blipFill>
-        <p:spPr>
-          <a:xfrm>
-            <a:off x="2710412" y="2327843"/>
-            <a:ext cx="355832" cy="427982"/>
-          </a:xfrm>
-          <a:prstGeom prst="rect">
-            <a:avLst/>
-          </a:prstGeom>
-        </p:spPr>
-      </p:pic>
-      <p:sp>
-        <p:nvSpPr>
-          <p:cNvPr id="14" name="TextBox 13">
-            <a:extLst>
-              <a:ext uri="{FF2B5EF4-FFF2-40B4-BE49-F238E27FC236}">
-                <a16:creationId xmlns:a16="http://schemas.microsoft.com/office/drawing/2014/main" id="{CFE70FE2-9D5B-4796-06C1-76C508A0051C}"/>
-              </a:ext>
-            </a:extLst>
-          </p:cNvPr>
-          <p:cNvSpPr txBox="1"/>
-          <p:nvPr/>
-        </p:nvSpPr>
-        <p:spPr>
-          <a:xfrm>
-            <a:off x="4020312" y="2503274"/>
-            <a:ext cx="347472" cy="369332"/>
-          </a:xfrm>
-          <a:prstGeom prst="rect">
-            <a:avLst/>
-          </a:prstGeom>
-          <a:noFill/>
-        </p:spPr>
-        <p:txBody>
-          <a:bodyPr wrap="square" rtlCol="0">
-            <a:spAutoFit/>
-          </a:bodyPr>
-          <a:lstStyle/>
-          <a:p>
-            <a:r>
-              <a:rPr lang="en-SG" dirty="0"/>
-              <a:t>…</a:t>
-            </a:r>
-          </a:p>
-        </p:txBody>
-      </p:sp>
-      <p:pic>
-        <p:nvPicPr>
-          <p:cNvPr id="15" name="Picture 14">
-            <a:extLst>
-              <a:ext uri="{FF2B5EF4-FFF2-40B4-BE49-F238E27FC236}">
-                <a16:creationId xmlns:a16="http://schemas.microsoft.com/office/drawing/2014/main" id="{31903FAE-4C93-BE80-BE5F-CCCA24A302EB}"/>
-              </a:ext>
-            </a:extLst>
-          </p:cNvPr>
-          <p:cNvPicPr>
-            <a:picLocks noChangeAspect="1"/>
-          </p:cNvPicPr>
-          <p:nvPr/>
-        </p:nvPicPr>
-        <p:blipFill>
-          <a:blip r:embed="rId3"/>
-          <a:stretch>
-            <a:fillRect/>
-          </a:stretch>
-        </p:blipFill>
-        <p:spPr>
-          <a:xfrm>
-            <a:off x="3054269" y="2219989"/>
-            <a:ext cx="176680" cy="175361"/>
-          </a:xfrm>
-          <a:prstGeom prst="rect">
-            <a:avLst/>
-          </a:prstGeom>
-        </p:spPr>
-      </p:pic>
-      <p:pic>
-        <p:nvPicPr>
-          <p:cNvPr id="16" name="Picture 15">
-            <a:extLst>
-              <a:ext uri="{FF2B5EF4-FFF2-40B4-BE49-F238E27FC236}">
-                <a16:creationId xmlns:a16="http://schemas.microsoft.com/office/drawing/2014/main" id="{CFB0B42E-0474-0A00-DED9-C376516F462E}"/>
-              </a:ext>
-            </a:extLst>
-          </p:cNvPr>
-          <p:cNvPicPr>
-            <a:picLocks noChangeAspect="1"/>
-          </p:cNvPicPr>
-          <p:nvPr/>
-        </p:nvPicPr>
-        <p:blipFill>
-          <a:blip r:embed="rId4"/>
-          <a:stretch>
-            <a:fillRect/>
-          </a:stretch>
-        </p:blipFill>
-        <p:spPr>
-          <a:xfrm>
-            <a:off x="3844234" y="2255533"/>
-            <a:ext cx="202752" cy="199446"/>
-          </a:xfrm>
-          <a:prstGeom prst="rect">
-            <a:avLst/>
-          </a:prstGeom>
-          <a:ln w="6350">
+          <a:ln w="12700">
             <a:solidFill>
-              <a:schemeClr val="tx1"/>
+              <a:schemeClr val="accent6">
+                <a:lumMod val="75000"/>
+              </a:schemeClr>
             </a:solidFill>
+            <a:prstDash val="sysDash"/>
           </a:ln>
-        </p:spPr>
-      </p:pic>
-      <p:pic>
-        <p:nvPicPr>
-          <p:cNvPr id="17" name="Picture 16">
-            <a:extLst>
-              <a:ext uri="{FF2B5EF4-FFF2-40B4-BE49-F238E27FC236}">
-                <a16:creationId xmlns:a16="http://schemas.microsoft.com/office/drawing/2014/main" id="{ED2FF56A-2562-0469-6275-E7A5C4269DAA}"/>
-              </a:ext>
-            </a:extLst>
-          </p:cNvPr>
-          <p:cNvPicPr>
-            <a:picLocks noChangeAspect="1"/>
-          </p:cNvPicPr>
-          <p:nvPr/>
-        </p:nvPicPr>
-        <p:blipFill>
-          <a:blip r:embed="rId5"/>
-          <a:stretch>
-            <a:fillRect/>
-          </a:stretch>
-        </p:blipFill>
-        <p:spPr>
-          <a:xfrm>
-            <a:off x="4660271" y="2285946"/>
-            <a:ext cx="162449" cy="171619"/>
-          </a:xfrm>
-          <a:prstGeom prst="rect">
-            <a:avLst/>
-          </a:prstGeom>
-          <a:ln w="9525">
-            <a:solidFill>
-              <a:schemeClr val="tx1"/>
-            </a:solidFill>
-          </a:ln>
-        </p:spPr>
-      </p:pic>
-      <p:sp>
-        <p:nvSpPr>
-          <p:cNvPr id="18" name="Arrow: Left-Right 17">
-            <a:extLst>
-              <a:ext uri="{FF2B5EF4-FFF2-40B4-BE49-F238E27FC236}">
-                <a16:creationId xmlns:a16="http://schemas.microsoft.com/office/drawing/2014/main" id="{6136EF72-86D5-57AD-956B-4A92DA78D366}"/>
-              </a:ext>
-            </a:extLst>
-          </p:cNvPr>
-          <p:cNvSpPr/>
-          <p:nvPr/>
-        </p:nvSpPr>
-        <p:spPr>
-          <a:xfrm rot="5400000">
-            <a:off x="3583395" y="3410317"/>
-            <a:ext cx="520021" cy="121368"/>
-          </a:xfrm>
-          <a:prstGeom prst="leftRightArrow">
-            <a:avLst/>
-          </a:prstGeom>
-          <a:solidFill>
-            <a:schemeClr val="bg1"/>
-          </a:solidFill>
-          <a:ln w="19050"/>
         </p:spPr>
         <p:style>
           <a:lnRef idx="2">
             <a:schemeClr val="accent1">
-              <a:shade val="50000"/>
+              <a:shade val="15000"/>
             </a:schemeClr>
           </a:lnRef>
           <a:fillRef idx="1">
@@ -21517,55 +21069,16 @@
           <a:lstStyle/>
           <a:p>
             <a:pPr algn="ctr"/>
-            <a:endParaRPr lang="en-SG" dirty="0">
-              <a:solidFill>
-                <a:schemeClr val="bg1"/>
-              </a:solidFill>
-            </a:endParaRPr>
+            <a:endParaRPr lang="en-SG" dirty="0"/>
           </a:p>
         </p:txBody>
       </p:sp>
-      <p:pic>
-        <p:nvPicPr>
-          <p:cNvPr id="19" name="Picture 18">
-            <a:extLst>
-              <a:ext uri="{FF2B5EF4-FFF2-40B4-BE49-F238E27FC236}">
-                <a16:creationId xmlns:a16="http://schemas.microsoft.com/office/drawing/2014/main" id="{43DF75AF-53E9-8D1A-1078-3DD9BAACFA44}"/>
-              </a:ext>
-            </a:extLst>
-          </p:cNvPr>
-          <p:cNvPicPr>
-            <a:picLocks noChangeAspect="1"/>
-          </p:cNvPicPr>
-          <p:nvPr/>
-        </p:nvPicPr>
-        <p:blipFill>
-          <a:blip r:embed="rId6"/>
-          <a:stretch>
-            <a:fillRect/>
-          </a:stretch>
-        </p:blipFill>
-        <p:spPr>
-          <a:xfrm>
-            <a:off x="1492604" y="3898023"/>
-            <a:ext cx="411108" cy="424159"/>
-          </a:xfrm>
-          <a:prstGeom prst="rect">
-            <a:avLst/>
-          </a:prstGeom>
-          <a:ln w="3175">
-            <a:solidFill>
-              <a:schemeClr val="tx1"/>
-            </a:solidFill>
-          </a:ln>
-        </p:spPr>
-      </p:pic>
       <p:sp>
         <p:nvSpPr>
-          <p:cNvPr id="20" name="TextBox 19">
-            <a:extLst>
-              <a:ext uri="{FF2B5EF4-FFF2-40B4-BE49-F238E27FC236}">
-                <a16:creationId xmlns:a16="http://schemas.microsoft.com/office/drawing/2014/main" id="{5F5C525F-1342-C9DE-33E7-54A8C92CCD7B}"/>
+          <p:cNvPr id="5" name="TextBox 4">
+            <a:extLst>
+              <a:ext uri="{FF2B5EF4-FFF2-40B4-BE49-F238E27FC236}">
+                <a16:creationId xmlns:a16="http://schemas.microsoft.com/office/drawing/2014/main" id="{44CC3B59-C9BC-2E32-CAD3-74EBB5ACF9AB}"/>
               </a:ext>
             </a:extLst>
           </p:cNvPr>
@@ -21574,8 +21087,8 @@
         </p:nvSpPr>
         <p:spPr>
           <a:xfrm>
-            <a:off x="1220044" y="3621034"/>
-            <a:ext cx="956227" cy="276999"/>
+            <a:off x="836550" y="1534972"/>
+            <a:ext cx="2752774" cy="307777"/>
           </a:xfrm>
           <a:prstGeom prst="rect">
             <a:avLst/>
@@ -21589,880 +21102,31 @@
           <a:lstStyle/>
           <a:p>
             <a:r>
-              <a:rPr lang="en-US" sz="1200" b="1" dirty="0"/>
-              <a:t>User profile  </a:t>
-            </a:r>
-            <a:endParaRPr lang="en-SG" sz="1200" dirty="0"/>
-          </a:p>
-        </p:txBody>
-      </p:sp>
-      <p:cxnSp>
-        <p:nvCxnSpPr>
-          <p:cNvPr id="21" name="Straight Arrow Connector 20">
-            <a:extLst>
-              <a:ext uri="{FF2B5EF4-FFF2-40B4-BE49-F238E27FC236}">
-                <a16:creationId xmlns:a16="http://schemas.microsoft.com/office/drawing/2014/main" id="{73EBCA76-A48F-F890-2FC5-49BF0ADEC537}"/>
-              </a:ext>
-            </a:extLst>
-          </p:cNvPr>
-          <p:cNvCxnSpPr>
-            <a:cxnSpLocks/>
-          </p:cNvCxnSpPr>
-          <p:nvPr/>
-        </p:nvCxnSpPr>
-        <p:spPr>
-          <a:xfrm>
-            <a:off x="1998246" y="4110101"/>
-            <a:ext cx="1002905" cy="0"/>
-          </a:xfrm>
-          <a:prstGeom prst="straightConnector1">
-            <a:avLst/>
-          </a:prstGeom>
-          <a:ln w="19050">
-            <a:tailEnd type="triangle"/>
-          </a:ln>
-        </p:spPr>
-        <p:style>
-          <a:lnRef idx="1">
-            <a:schemeClr val="accent1"/>
-          </a:lnRef>
-          <a:fillRef idx="0">
-            <a:schemeClr val="accent1"/>
-          </a:fillRef>
-          <a:effectRef idx="0">
-            <a:schemeClr val="accent1"/>
-          </a:effectRef>
-          <a:fontRef idx="minor">
-            <a:schemeClr val="tx1"/>
-          </a:fontRef>
-        </p:style>
-      </p:cxnSp>
-      <p:sp>
-        <p:nvSpPr>
-          <p:cNvPr id="23" name="Rectangle: Rounded Corners 22">
-            <a:extLst>
-              <a:ext uri="{FF2B5EF4-FFF2-40B4-BE49-F238E27FC236}">
-                <a16:creationId xmlns:a16="http://schemas.microsoft.com/office/drawing/2014/main" id="{64F9C992-5B41-8D07-9793-289F939C8803}"/>
-              </a:ext>
-            </a:extLst>
-          </p:cNvPr>
-          <p:cNvSpPr/>
-          <p:nvPr/>
-        </p:nvSpPr>
-        <p:spPr>
-          <a:xfrm>
-            <a:off x="3054269" y="3791518"/>
-            <a:ext cx="1654976" cy="637167"/>
-          </a:xfrm>
-          <a:prstGeom prst="roundRect">
-            <a:avLst/>
-          </a:prstGeom>
-          <a:noFill/>
-          <a:ln w="19050" cap="flat" cmpd="sng" algn="ctr">
-            <a:solidFill>
-              <a:schemeClr val="accent1">
-                <a:lumMod val="75000"/>
-              </a:schemeClr>
-            </a:solidFill>
-            <a:prstDash val="solid"/>
-            <a:round/>
-            <a:headEnd type="none" w="med" len="med"/>
-            <a:tailEnd type="none" w="med" len="med"/>
-          </a:ln>
-        </p:spPr>
-        <p:style>
-          <a:lnRef idx="0">
-            <a:scrgbClr r="0" g="0" b="0"/>
-          </a:lnRef>
-          <a:fillRef idx="0">
-            <a:scrgbClr r="0" g="0" b="0"/>
-          </a:fillRef>
-          <a:effectRef idx="0">
-            <a:scrgbClr r="0" g="0" b="0"/>
-          </a:effectRef>
-          <a:fontRef idx="minor">
-            <a:schemeClr val="accent2"/>
-          </a:fontRef>
-        </p:style>
-        <p:txBody>
-          <a:bodyPr rtlCol="0" anchor="ctr"/>
-          <a:lstStyle/>
-          <a:p>
-            <a:pPr algn="ctr"/>
-            <a:r>
-              <a:rPr lang="en-SG" sz="1200" b="1" dirty="0">
+              <a:rPr lang="en-US" sz="1400" b="1" dirty="0">
                 <a:solidFill>
-                  <a:schemeClr val="tx1"/>
+                  <a:schemeClr val="accent6">
+                    <a:lumMod val="75000"/>
+                  </a:schemeClr>
                 </a:solidFill>
               </a:rPr>
-              <a:t>User Profile Emulator [UPE] </a:t>
-            </a:r>
-          </a:p>
-        </p:txBody>
-      </p:sp>
-      <p:sp>
-        <p:nvSpPr>
-          <p:cNvPr id="29" name="Arrow: Right 28">
-            <a:extLst>
-              <a:ext uri="{FF2B5EF4-FFF2-40B4-BE49-F238E27FC236}">
-                <a16:creationId xmlns:a16="http://schemas.microsoft.com/office/drawing/2014/main" id="{167339C1-602C-91B8-3CD4-86E66BAC2839}"/>
-              </a:ext>
-            </a:extLst>
-          </p:cNvPr>
-          <p:cNvSpPr/>
-          <p:nvPr/>
-        </p:nvSpPr>
-        <p:spPr>
-          <a:xfrm>
-            <a:off x="4801659" y="4014845"/>
-            <a:ext cx="691367" cy="120133"/>
-          </a:xfrm>
-          <a:prstGeom prst="rightArrow">
-            <a:avLst/>
-          </a:prstGeom>
-          <a:solidFill>
-            <a:schemeClr val="bg1"/>
-          </a:solidFill>
-          <a:ln w="19050"/>
-        </p:spPr>
-        <p:style>
-          <a:lnRef idx="2">
-            <a:schemeClr val="accent1">
-              <a:shade val="50000"/>
-            </a:schemeClr>
-          </a:lnRef>
-          <a:fillRef idx="1">
-            <a:schemeClr val="accent1"/>
-          </a:fillRef>
-          <a:effectRef idx="0">
-            <a:schemeClr val="accent1"/>
-          </a:effectRef>
-          <a:fontRef idx="minor">
-            <a:schemeClr val="lt1"/>
-          </a:fontRef>
-        </p:style>
-        <p:txBody>
-          <a:bodyPr rtlCol="0" anchor="ctr"/>
-          <a:lstStyle/>
-          <a:p>
-            <a:pPr algn="ctr"/>
-            <a:endParaRPr lang="en-SG" dirty="0"/>
+              <a:t>Cluster Network Environment</a:t>
+            </a:r>
+            <a:endParaRPr lang="en-SG" sz="1400" b="1" dirty="0">
+              <a:solidFill>
+                <a:schemeClr val="accent6">
+                  <a:lumMod val="75000"/>
+                </a:schemeClr>
+              </a:solidFill>
+            </a:endParaRPr>
           </a:p>
         </p:txBody>
       </p:sp>
       <p:pic>
         <p:nvPicPr>
-          <p:cNvPr id="30" name="Picture 29">
-            <a:extLst>
-              <a:ext uri="{FF2B5EF4-FFF2-40B4-BE49-F238E27FC236}">
-                <a16:creationId xmlns:a16="http://schemas.microsoft.com/office/drawing/2014/main" id="{EBC8FC24-5B02-77B7-95E2-6BB2BEC0280A}"/>
-              </a:ext>
-            </a:extLst>
-          </p:cNvPr>
-          <p:cNvPicPr>
-            <a:picLocks noChangeAspect="1"/>
-          </p:cNvPicPr>
-          <p:nvPr/>
-        </p:nvPicPr>
-        <p:blipFill>
-          <a:blip r:embed="rId7"/>
-          <a:stretch>
-            <a:fillRect/>
-          </a:stretch>
-        </p:blipFill>
-        <p:spPr>
-          <a:xfrm>
-            <a:off x="5779574" y="3857873"/>
-            <a:ext cx="407652" cy="317063"/>
-          </a:xfrm>
-          <a:prstGeom prst="rect">
-            <a:avLst/>
-          </a:prstGeom>
-          <a:ln w="3175">
-            <a:solidFill>
-              <a:schemeClr val="tx1"/>
-            </a:solidFill>
-          </a:ln>
-        </p:spPr>
-      </p:pic>
-      <p:pic>
-        <p:nvPicPr>
-          <p:cNvPr id="31" name="Picture 30">
-            <a:extLst>
-              <a:ext uri="{FF2B5EF4-FFF2-40B4-BE49-F238E27FC236}">
-                <a16:creationId xmlns:a16="http://schemas.microsoft.com/office/drawing/2014/main" id="{2DE7B82E-7132-8EFA-F467-300276E246C5}"/>
-              </a:ext>
-            </a:extLst>
-          </p:cNvPr>
-          <p:cNvPicPr>
-            <a:picLocks noChangeAspect="1"/>
-          </p:cNvPicPr>
-          <p:nvPr/>
-        </p:nvPicPr>
-        <p:blipFill>
-          <a:blip r:embed="rId7"/>
-          <a:stretch>
-            <a:fillRect/>
-          </a:stretch>
-        </p:blipFill>
-        <p:spPr>
-          <a:xfrm>
-            <a:off x="6363529" y="3874057"/>
-            <a:ext cx="407652" cy="317063"/>
-          </a:xfrm>
-          <a:prstGeom prst="rect">
-            <a:avLst/>
-          </a:prstGeom>
-          <a:ln w="3175">
-            <a:solidFill>
-              <a:schemeClr val="tx1"/>
-            </a:solidFill>
-          </a:ln>
-        </p:spPr>
-      </p:pic>
-      <p:pic>
-        <p:nvPicPr>
-          <p:cNvPr id="32" name="Picture 31">
-            <a:extLst>
-              <a:ext uri="{FF2B5EF4-FFF2-40B4-BE49-F238E27FC236}">
-                <a16:creationId xmlns:a16="http://schemas.microsoft.com/office/drawing/2014/main" id="{97BEEEB7-387A-B905-069B-CA1F1B143D63}"/>
-              </a:ext>
-            </a:extLst>
-          </p:cNvPr>
-          <p:cNvPicPr>
-            <a:picLocks noChangeAspect="1"/>
-          </p:cNvPicPr>
-          <p:nvPr/>
-        </p:nvPicPr>
-        <p:blipFill>
-          <a:blip r:embed="rId7"/>
-          <a:stretch>
-            <a:fillRect/>
-          </a:stretch>
-        </p:blipFill>
-        <p:spPr>
-          <a:xfrm>
-            <a:off x="7014888" y="3778607"/>
-            <a:ext cx="407652" cy="317063"/>
-          </a:xfrm>
-          <a:prstGeom prst="rect">
-            <a:avLst/>
-          </a:prstGeom>
-          <a:ln w="3175">
-            <a:solidFill>
-              <a:schemeClr val="tx1"/>
-            </a:solidFill>
-          </a:ln>
-        </p:spPr>
-      </p:pic>
-      <p:pic>
-        <p:nvPicPr>
-          <p:cNvPr id="33" name="Picture 32">
-            <a:extLst>
-              <a:ext uri="{FF2B5EF4-FFF2-40B4-BE49-F238E27FC236}">
-                <a16:creationId xmlns:a16="http://schemas.microsoft.com/office/drawing/2014/main" id="{C78F167F-45BF-F55B-1A72-AE9668C145DC}"/>
-              </a:ext>
-            </a:extLst>
-          </p:cNvPr>
-          <p:cNvPicPr>
-            <a:picLocks noChangeAspect="1"/>
-          </p:cNvPicPr>
-          <p:nvPr/>
-        </p:nvPicPr>
-        <p:blipFill>
-          <a:blip r:embed="rId7"/>
-          <a:stretch>
-            <a:fillRect/>
-          </a:stretch>
-        </p:blipFill>
-        <p:spPr>
-          <a:xfrm>
-            <a:off x="6935126" y="3953456"/>
-            <a:ext cx="407652" cy="317063"/>
-          </a:xfrm>
-          <a:prstGeom prst="rect">
-            <a:avLst/>
-          </a:prstGeom>
-          <a:ln w="3175">
-            <a:solidFill>
-              <a:schemeClr val="tx1"/>
-            </a:solidFill>
-          </a:ln>
-        </p:spPr>
-      </p:pic>
-      <p:pic>
-        <p:nvPicPr>
-          <p:cNvPr id="34" name="Picture 33">
-            <a:extLst>
-              <a:ext uri="{FF2B5EF4-FFF2-40B4-BE49-F238E27FC236}">
-                <a16:creationId xmlns:a16="http://schemas.microsoft.com/office/drawing/2014/main" id="{664B94CC-6E35-311D-AF4D-369EA658F89D}"/>
-              </a:ext>
-            </a:extLst>
-          </p:cNvPr>
-          <p:cNvPicPr>
-            <a:picLocks noChangeAspect="1"/>
-          </p:cNvPicPr>
-          <p:nvPr/>
-        </p:nvPicPr>
-        <p:blipFill>
-          <a:blip r:embed="rId3"/>
-          <a:stretch>
-            <a:fillRect/>
-          </a:stretch>
-        </p:blipFill>
-        <p:spPr>
-          <a:xfrm>
-            <a:off x="6565410" y="3969496"/>
-            <a:ext cx="176680" cy="175361"/>
-          </a:xfrm>
-          <a:prstGeom prst="rect">
-            <a:avLst/>
-          </a:prstGeom>
-          <a:ln w="6350">
-            <a:solidFill>
-              <a:schemeClr val="tx1"/>
-            </a:solidFill>
-          </a:ln>
-        </p:spPr>
-      </p:pic>
-      <p:pic>
-        <p:nvPicPr>
-          <p:cNvPr id="35" name="Picture 34">
-            <a:extLst>
-              <a:ext uri="{FF2B5EF4-FFF2-40B4-BE49-F238E27FC236}">
-                <a16:creationId xmlns:a16="http://schemas.microsoft.com/office/drawing/2014/main" id="{07D65D5E-95C1-E69F-D35E-D927C8D20761}"/>
-              </a:ext>
-            </a:extLst>
-          </p:cNvPr>
-          <p:cNvPicPr>
-            <a:picLocks noChangeAspect="1"/>
-          </p:cNvPicPr>
-          <p:nvPr/>
-        </p:nvPicPr>
-        <p:blipFill>
-          <a:blip r:embed="rId4"/>
-          <a:stretch>
-            <a:fillRect/>
-          </a:stretch>
-        </p:blipFill>
-        <p:spPr>
-          <a:xfrm>
-            <a:off x="7140026" y="4029043"/>
-            <a:ext cx="202752" cy="199446"/>
-          </a:xfrm>
-          <a:prstGeom prst="rect">
-            <a:avLst/>
-          </a:prstGeom>
-          <a:ln w="6350">
-            <a:solidFill>
-              <a:schemeClr val="tx1"/>
-            </a:solidFill>
-          </a:ln>
-        </p:spPr>
-      </p:pic>
-      <p:sp>
-        <p:nvSpPr>
-          <p:cNvPr id="38" name="TextBox 37">
-            <a:extLst>
-              <a:ext uri="{FF2B5EF4-FFF2-40B4-BE49-F238E27FC236}">
-                <a16:creationId xmlns:a16="http://schemas.microsoft.com/office/drawing/2014/main" id="{872F52B7-AB8F-47B4-3D2C-91249D24784B}"/>
-              </a:ext>
-            </a:extLst>
-          </p:cNvPr>
-          <p:cNvSpPr txBox="1"/>
-          <p:nvPr/>
-        </p:nvSpPr>
-        <p:spPr>
-          <a:xfrm>
-            <a:off x="5579748" y="4208306"/>
-            <a:ext cx="1803521" cy="246221"/>
-          </a:xfrm>
-          <a:prstGeom prst="rect">
-            <a:avLst/>
-          </a:prstGeom>
-          <a:noFill/>
-        </p:spPr>
-        <p:txBody>
-          <a:bodyPr wrap="square" rtlCol="0">
-            <a:spAutoFit/>
-          </a:bodyPr>
-          <a:lstStyle/>
-          <a:p>
-            <a:r>
-              <a:rPr lang="en-SG" sz="1000" dirty="0"/>
-              <a:t>Automatic Actions Program</a:t>
-            </a:r>
-          </a:p>
-        </p:txBody>
-      </p:sp>
-      <p:cxnSp>
-        <p:nvCxnSpPr>
-          <p:cNvPr id="40" name="Straight Arrow Connector 39">
-            <a:extLst>
-              <a:ext uri="{FF2B5EF4-FFF2-40B4-BE49-F238E27FC236}">
-                <a16:creationId xmlns:a16="http://schemas.microsoft.com/office/drawing/2014/main" id="{4979912A-E255-C75F-CEF9-67C6E1999DEA}"/>
-              </a:ext>
-            </a:extLst>
-          </p:cNvPr>
-          <p:cNvCxnSpPr>
-            <a:cxnSpLocks/>
-          </p:cNvCxnSpPr>
-          <p:nvPr/>
-        </p:nvCxnSpPr>
-        <p:spPr>
-          <a:xfrm>
-            <a:off x="6187226" y="4043129"/>
-            <a:ext cx="186545" cy="0"/>
-          </a:xfrm>
-          <a:prstGeom prst="straightConnector1">
-            <a:avLst/>
-          </a:prstGeom>
-          <a:ln w="19050">
-            <a:tailEnd type="triangle"/>
-          </a:ln>
-        </p:spPr>
-        <p:style>
-          <a:lnRef idx="1">
-            <a:schemeClr val="dk1"/>
-          </a:lnRef>
-          <a:fillRef idx="0">
-            <a:schemeClr val="dk1"/>
-          </a:fillRef>
-          <a:effectRef idx="0">
-            <a:schemeClr val="dk1"/>
-          </a:effectRef>
-          <a:fontRef idx="minor">
-            <a:schemeClr val="tx1"/>
-          </a:fontRef>
-        </p:style>
-      </p:cxnSp>
-      <p:cxnSp>
-        <p:nvCxnSpPr>
-          <p:cNvPr id="43" name="Straight Arrow Connector 42">
-            <a:extLst>
-              <a:ext uri="{FF2B5EF4-FFF2-40B4-BE49-F238E27FC236}">
-                <a16:creationId xmlns:a16="http://schemas.microsoft.com/office/drawing/2014/main" id="{FF31F093-E2C1-E13A-5E65-7F08733FC59C}"/>
-              </a:ext>
-            </a:extLst>
-          </p:cNvPr>
-          <p:cNvCxnSpPr>
-            <a:cxnSpLocks/>
-            <a:endCxn id="32" idx="1"/>
-          </p:cNvCxnSpPr>
-          <p:nvPr/>
-        </p:nvCxnSpPr>
-        <p:spPr>
-          <a:xfrm>
-            <a:off x="6771181" y="3901503"/>
-            <a:ext cx="243707" cy="0"/>
-          </a:xfrm>
-          <a:prstGeom prst="straightConnector1">
-            <a:avLst/>
-          </a:prstGeom>
-          <a:ln w="19050">
-            <a:tailEnd type="triangle"/>
-          </a:ln>
-        </p:spPr>
-        <p:style>
-          <a:lnRef idx="1">
-            <a:schemeClr val="dk1"/>
-          </a:lnRef>
-          <a:fillRef idx="0">
-            <a:schemeClr val="dk1"/>
-          </a:fillRef>
-          <a:effectRef idx="0">
-            <a:schemeClr val="dk1"/>
-          </a:effectRef>
-          <a:fontRef idx="minor">
-            <a:schemeClr val="tx1"/>
-          </a:fontRef>
-        </p:style>
-      </p:cxnSp>
-      <p:cxnSp>
-        <p:nvCxnSpPr>
-          <p:cNvPr id="47" name="Straight Arrow Connector 46">
-            <a:extLst>
-              <a:ext uri="{FF2B5EF4-FFF2-40B4-BE49-F238E27FC236}">
-                <a16:creationId xmlns:a16="http://schemas.microsoft.com/office/drawing/2014/main" id="{A65A17B2-19D7-FA6D-A338-A233275165D9}"/>
-              </a:ext>
-            </a:extLst>
-          </p:cNvPr>
-          <p:cNvCxnSpPr>
-            <a:cxnSpLocks/>
-          </p:cNvCxnSpPr>
-          <p:nvPr/>
-        </p:nvCxnSpPr>
-        <p:spPr>
-          <a:xfrm>
-            <a:off x="6771181" y="4083740"/>
-            <a:ext cx="163945" cy="0"/>
-          </a:xfrm>
-          <a:prstGeom prst="straightConnector1">
-            <a:avLst/>
-          </a:prstGeom>
-          <a:ln w="19050">
-            <a:tailEnd type="triangle"/>
-          </a:ln>
-        </p:spPr>
-        <p:style>
-          <a:lnRef idx="1">
-            <a:schemeClr val="dk1"/>
-          </a:lnRef>
-          <a:fillRef idx="0">
-            <a:schemeClr val="dk1"/>
-          </a:fillRef>
-          <a:effectRef idx="0">
-            <a:schemeClr val="dk1"/>
-          </a:effectRef>
-          <a:fontRef idx="minor">
-            <a:schemeClr val="tx1"/>
-          </a:fontRef>
-        </p:style>
-      </p:cxnSp>
-      <p:cxnSp>
-        <p:nvCxnSpPr>
-          <p:cNvPr id="50" name="Straight Arrow Connector 49">
-            <a:extLst>
-              <a:ext uri="{FF2B5EF4-FFF2-40B4-BE49-F238E27FC236}">
-                <a16:creationId xmlns:a16="http://schemas.microsoft.com/office/drawing/2014/main" id="{6625841B-FDB9-46CD-21C3-F8D75D7D7ACB}"/>
-              </a:ext>
-            </a:extLst>
-          </p:cNvPr>
-          <p:cNvCxnSpPr>
-            <a:cxnSpLocks/>
-          </p:cNvCxnSpPr>
-          <p:nvPr/>
-        </p:nvCxnSpPr>
-        <p:spPr>
-          <a:xfrm>
-            <a:off x="7342778" y="4128766"/>
-            <a:ext cx="163945" cy="0"/>
-          </a:xfrm>
-          <a:prstGeom prst="straightConnector1">
-            <a:avLst/>
-          </a:prstGeom>
-          <a:ln w="19050">
-            <a:tailEnd type="triangle"/>
-          </a:ln>
-        </p:spPr>
-        <p:style>
-          <a:lnRef idx="1">
-            <a:schemeClr val="dk1"/>
-          </a:lnRef>
-          <a:fillRef idx="0">
-            <a:schemeClr val="dk1"/>
-          </a:fillRef>
-          <a:effectRef idx="0">
-            <a:schemeClr val="dk1"/>
-          </a:effectRef>
-          <a:fontRef idx="minor">
-            <a:schemeClr val="tx1"/>
-          </a:fontRef>
-        </p:style>
-      </p:cxnSp>
-      <p:sp>
-        <p:nvSpPr>
-          <p:cNvPr id="51" name="TextBox 50">
-            <a:extLst>
-              <a:ext uri="{FF2B5EF4-FFF2-40B4-BE49-F238E27FC236}">
-                <a16:creationId xmlns:a16="http://schemas.microsoft.com/office/drawing/2014/main" id="{7AFE76E0-D685-F7CC-5E93-35053568B8BF}"/>
-              </a:ext>
-            </a:extLst>
-          </p:cNvPr>
-          <p:cNvSpPr txBox="1"/>
-          <p:nvPr/>
-        </p:nvSpPr>
-        <p:spPr>
-          <a:xfrm>
-            <a:off x="7492511" y="3943633"/>
-            <a:ext cx="347472" cy="369332"/>
-          </a:xfrm>
-          <a:prstGeom prst="rect">
-            <a:avLst/>
-          </a:prstGeom>
-          <a:noFill/>
-        </p:spPr>
-        <p:txBody>
-          <a:bodyPr wrap="square" rtlCol="0">
-            <a:spAutoFit/>
-          </a:bodyPr>
-          <a:lstStyle/>
-          <a:p>
-            <a:r>
-              <a:rPr lang="en-SG" dirty="0"/>
-              <a:t>…</a:t>
-            </a:r>
-          </a:p>
-        </p:txBody>
-      </p:sp>
-      <p:sp>
-        <p:nvSpPr>
-          <p:cNvPr id="52" name="TextBox 51">
-            <a:extLst>
-              <a:ext uri="{FF2B5EF4-FFF2-40B4-BE49-F238E27FC236}">
-                <a16:creationId xmlns:a16="http://schemas.microsoft.com/office/drawing/2014/main" id="{556D929D-D6DC-9D00-8A1C-D7FBFE824535}"/>
-              </a:ext>
-            </a:extLst>
-          </p:cNvPr>
-          <p:cNvSpPr txBox="1"/>
-          <p:nvPr/>
-        </p:nvSpPr>
-        <p:spPr>
-          <a:xfrm>
-            <a:off x="5476398" y="4417005"/>
-            <a:ext cx="2178024" cy="276999"/>
-          </a:xfrm>
-          <a:prstGeom prst="rect">
-            <a:avLst/>
-          </a:prstGeom>
-          <a:noFill/>
-        </p:spPr>
-        <p:txBody>
-          <a:bodyPr wrap="square" rtlCol="0">
-            <a:spAutoFit/>
-          </a:bodyPr>
-          <a:lstStyle/>
-          <a:p>
-            <a:r>
-              <a:rPr lang="en-SG" sz="1200" b="1" dirty="0"/>
-              <a:t>Modelled Actions Chain/Tree </a:t>
-            </a:r>
-          </a:p>
-        </p:txBody>
-      </p:sp>
-      <p:sp>
-        <p:nvSpPr>
-          <p:cNvPr id="53" name="Rectangle: Rounded Corners 52">
-            <a:extLst>
-              <a:ext uri="{FF2B5EF4-FFF2-40B4-BE49-F238E27FC236}">
-                <a16:creationId xmlns:a16="http://schemas.microsoft.com/office/drawing/2014/main" id="{E8C79FE5-052C-E398-4845-6CB49FDE4954}"/>
-              </a:ext>
-            </a:extLst>
-          </p:cNvPr>
-          <p:cNvSpPr/>
-          <p:nvPr/>
-        </p:nvSpPr>
-        <p:spPr>
-          <a:xfrm>
-            <a:off x="5886849" y="2307669"/>
-            <a:ext cx="1654976" cy="637167"/>
-          </a:xfrm>
-          <a:prstGeom prst="roundRect">
-            <a:avLst/>
-          </a:prstGeom>
-          <a:noFill/>
-          <a:ln w="19050" cap="flat" cmpd="sng" algn="ctr">
-            <a:solidFill>
-              <a:schemeClr val="accent1">
-                <a:lumMod val="75000"/>
-              </a:schemeClr>
-            </a:solidFill>
-            <a:prstDash val="solid"/>
-            <a:round/>
-            <a:headEnd type="none" w="med" len="med"/>
-            <a:tailEnd type="none" w="med" len="med"/>
-          </a:ln>
-        </p:spPr>
-        <p:style>
-          <a:lnRef idx="0">
-            <a:scrgbClr r="0" g="0" b="0"/>
-          </a:lnRef>
-          <a:fillRef idx="0">
-            <a:scrgbClr r="0" g="0" b="0"/>
-          </a:fillRef>
-          <a:effectRef idx="0">
-            <a:scrgbClr r="0" g="0" b="0"/>
-          </a:effectRef>
-          <a:fontRef idx="minor">
-            <a:schemeClr val="accent2"/>
-          </a:fontRef>
-        </p:style>
-        <p:txBody>
-          <a:bodyPr rtlCol="0" anchor="ctr"/>
-          <a:lstStyle/>
-          <a:p>
-            <a:pPr algn="ctr"/>
-            <a:r>
-              <a:rPr lang="en-SG" sz="1200" b="1" dirty="0">
-                <a:solidFill>
-                  <a:schemeClr val="tx1"/>
-                </a:solidFill>
-              </a:rPr>
-              <a:t>Scheduler Monitor Hub [SMU] </a:t>
-            </a:r>
-          </a:p>
-        </p:txBody>
-      </p:sp>
-      <p:cxnSp>
-        <p:nvCxnSpPr>
-          <p:cNvPr id="57" name="Straight Arrow Connector 56">
-            <a:extLst>
-              <a:ext uri="{FF2B5EF4-FFF2-40B4-BE49-F238E27FC236}">
-                <a16:creationId xmlns:a16="http://schemas.microsoft.com/office/drawing/2014/main" id="{E3B95400-44E6-45D0-782B-A0A7510EBF69}"/>
-              </a:ext>
-            </a:extLst>
-          </p:cNvPr>
-          <p:cNvCxnSpPr/>
-          <p:nvPr/>
-        </p:nvCxnSpPr>
-        <p:spPr>
-          <a:xfrm>
-            <a:off x="6096000" y="2960738"/>
-            <a:ext cx="0" cy="846682"/>
-          </a:xfrm>
-          <a:prstGeom prst="straightConnector1">
-            <a:avLst/>
-          </a:prstGeom>
-          <a:ln>
-            <a:headEnd type="triangle"/>
-            <a:tailEnd type="triangle"/>
-          </a:ln>
-        </p:spPr>
-        <p:style>
-          <a:lnRef idx="1">
-            <a:schemeClr val="accent1"/>
-          </a:lnRef>
-          <a:fillRef idx="0">
-            <a:schemeClr val="accent1"/>
-          </a:fillRef>
-          <a:effectRef idx="0">
-            <a:schemeClr val="accent1"/>
-          </a:effectRef>
-          <a:fontRef idx="minor">
-            <a:schemeClr val="tx1"/>
-          </a:fontRef>
-        </p:style>
-      </p:cxnSp>
-      <p:cxnSp>
-        <p:nvCxnSpPr>
-          <p:cNvPr id="62" name="Straight Arrow Connector 61">
-            <a:extLst>
-              <a:ext uri="{FF2B5EF4-FFF2-40B4-BE49-F238E27FC236}">
-                <a16:creationId xmlns:a16="http://schemas.microsoft.com/office/drawing/2014/main" id="{685B7E69-2D21-2396-8F2F-03A86443E0D8}"/>
-              </a:ext>
-            </a:extLst>
-          </p:cNvPr>
-          <p:cNvCxnSpPr/>
-          <p:nvPr/>
-        </p:nvCxnSpPr>
-        <p:spPr>
-          <a:xfrm>
-            <a:off x="6579821" y="2960738"/>
-            <a:ext cx="0" cy="846682"/>
-          </a:xfrm>
-          <a:prstGeom prst="straightConnector1">
-            <a:avLst/>
-          </a:prstGeom>
-          <a:ln>
-            <a:headEnd type="triangle"/>
-            <a:tailEnd type="triangle"/>
-          </a:ln>
-        </p:spPr>
-        <p:style>
-          <a:lnRef idx="1">
-            <a:schemeClr val="accent1"/>
-          </a:lnRef>
-          <a:fillRef idx="0">
-            <a:schemeClr val="accent1"/>
-          </a:fillRef>
-          <a:effectRef idx="0">
-            <a:schemeClr val="accent1"/>
-          </a:effectRef>
-          <a:fontRef idx="minor">
-            <a:schemeClr val="tx1"/>
-          </a:fontRef>
-        </p:style>
-      </p:cxnSp>
-      <p:cxnSp>
-        <p:nvCxnSpPr>
-          <p:cNvPr id="63" name="Straight Arrow Connector 62">
-            <a:extLst>
-              <a:ext uri="{FF2B5EF4-FFF2-40B4-BE49-F238E27FC236}">
-                <a16:creationId xmlns:a16="http://schemas.microsoft.com/office/drawing/2014/main" id="{119582EB-2F9C-B593-E3AF-930F9DC4E54D}"/>
-              </a:ext>
-            </a:extLst>
-          </p:cNvPr>
-          <p:cNvCxnSpPr>
-            <a:cxnSpLocks/>
-          </p:cNvCxnSpPr>
-          <p:nvPr/>
-        </p:nvCxnSpPr>
-        <p:spPr>
-          <a:xfrm>
-            <a:off x="7185589" y="2961980"/>
-            <a:ext cx="0" cy="769032"/>
-          </a:xfrm>
-          <a:prstGeom prst="straightConnector1">
-            <a:avLst/>
-          </a:prstGeom>
-          <a:ln>
-            <a:headEnd type="triangle"/>
-            <a:tailEnd type="triangle"/>
-          </a:ln>
-        </p:spPr>
-        <p:style>
-          <a:lnRef idx="1">
-            <a:schemeClr val="accent1"/>
-          </a:lnRef>
-          <a:fillRef idx="0">
-            <a:schemeClr val="accent1"/>
-          </a:fillRef>
-          <a:effectRef idx="0">
-            <a:schemeClr val="accent1"/>
-          </a:effectRef>
-          <a:fontRef idx="minor">
-            <a:schemeClr val="tx1"/>
-          </a:fontRef>
-        </p:style>
-      </p:cxnSp>
-      <p:cxnSp>
-        <p:nvCxnSpPr>
-          <p:cNvPr id="65" name="Straight Arrow Connector 64">
-            <a:extLst>
-              <a:ext uri="{FF2B5EF4-FFF2-40B4-BE49-F238E27FC236}">
-                <a16:creationId xmlns:a16="http://schemas.microsoft.com/office/drawing/2014/main" id="{28F8EF49-A405-035B-39E6-FEB7730F8573}"/>
-              </a:ext>
-            </a:extLst>
-          </p:cNvPr>
-          <p:cNvCxnSpPr>
-            <a:cxnSpLocks/>
-          </p:cNvCxnSpPr>
-          <p:nvPr/>
-        </p:nvCxnSpPr>
-        <p:spPr>
-          <a:xfrm>
-            <a:off x="7121984" y="2961980"/>
-            <a:ext cx="0" cy="769032"/>
-          </a:xfrm>
-          <a:prstGeom prst="straightConnector1">
-            <a:avLst/>
-          </a:prstGeom>
-          <a:ln>
-            <a:headEnd type="triangle"/>
-            <a:tailEnd type="triangle"/>
-          </a:ln>
-        </p:spPr>
-        <p:style>
-          <a:lnRef idx="1">
-            <a:schemeClr val="accent1"/>
-          </a:lnRef>
-          <a:fillRef idx="0">
-            <a:schemeClr val="accent1"/>
-          </a:fillRef>
-          <a:effectRef idx="0">
-            <a:schemeClr val="accent1"/>
-          </a:effectRef>
-          <a:fontRef idx="minor">
-            <a:schemeClr val="tx1"/>
-          </a:fontRef>
-        </p:style>
-      </p:cxnSp>
-      <p:pic>
-        <p:nvPicPr>
-          <p:cNvPr id="67" name="Picture 4">
-            <a:extLst>
-              <a:ext uri="{FF2B5EF4-FFF2-40B4-BE49-F238E27FC236}">
-                <a16:creationId xmlns:a16="http://schemas.microsoft.com/office/drawing/2014/main" id="{8E89A05D-5CFE-7DA8-87DC-B9312D615034}"/>
+          <p:cNvPr id="6" name="Picture 4">
+            <a:extLst>
+              <a:ext uri="{FF2B5EF4-FFF2-40B4-BE49-F238E27FC236}">
+                <a16:creationId xmlns:a16="http://schemas.microsoft.com/office/drawing/2014/main" id="{DD84C72F-8F64-EDF5-B7A4-6AB4BF2145E9}"/>
               </a:ext>
             </a:extLst>
           </p:cNvPr>
@@ -22472,7 +21136,7 @@
           <p:nvPr/>
         </p:nvPicPr>
         <p:blipFill>
-          <a:blip r:embed="rId8">
+          <a:blip r:embed="rId2">
             <a:extLst>
               <a:ext uri="{28A0092B-C50C-407E-A947-70E740481C1C}">
                 <a14:useLocalDpi xmlns:a14="http://schemas.microsoft.com/office/drawing/2010/main" val="0"/>
@@ -22486,8 +21150,8 @@
         </p:blipFill>
         <p:spPr bwMode="auto">
           <a:xfrm>
-            <a:off x="8220536" y="2435079"/>
-            <a:ext cx="382345" cy="382345"/>
+            <a:off x="2334162" y="3976636"/>
+            <a:ext cx="340524" cy="340524"/>
           </a:xfrm>
           <a:prstGeom prst="rect">
             <a:avLst/>
@@ -22504,67 +21168,370 @@
           </a:extLst>
         </p:spPr>
       </p:pic>
+      <p:pic>
+        <p:nvPicPr>
+          <p:cNvPr id="7" name="Picture 4">
+            <a:extLst>
+              <a:ext uri="{FF2B5EF4-FFF2-40B4-BE49-F238E27FC236}">
+                <a16:creationId xmlns:a16="http://schemas.microsoft.com/office/drawing/2014/main" id="{155F1055-82E3-0D86-1DAA-2907A3CDBDF6}"/>
+              </a:ext>
+            </a:extLst>
+          </p:cNvPr>
+          <p:cNvPicPr>
+            <a:picLocks noChangeAspect="1" noChangeArrowheads="1"/>
+          </p:cNvPicPr>
+          <p:nvPr/>
+        </p:nvPicPr>
+        <p:blipFill>
+          <a:blip r:embed="rId2">
+            <a:extLst>
+              <a:ext uri="{28A0092B-C50C-407E-A947-70E740481C1C}">
+                <a14:useLocalDpi xmlns:a14="http://schemas.microsoft.com/office/drawing/2010/main" val="0"/>
+              </a:ext>
+            </a:extLst>
+          </a:blip>
+          <a:srcRect/>
+          <a:stretch>
+            <a:fillRect/>
+          </a:stretch>
+        </p:blipFill>
+        <p:spPr bwMode="auto">
+          <a:xfrm>
+            <a:off x="7322362" y="3888068"/>
+            <a:ext cx="340524" cy="340524"/>
+          </a:xfrm>
+          <a:prstGeom prst="rect">
+            <a:avLst/>
+          </a:prstGeom>
+          <a:noFill/>
+          <a:extLst>
+            <a:ext uri="{909E8E84-426E-40DD-AFC4-6F175D3DCCD1}">
+              <a14:hiddenFill xmlns:a14="http://schemas.microsoft.com/office/drawing/2010/main">
+                <a:solidFill>
+                  <a:srgbClr val="FFFFFF"/>
+                </a:solidFill>
+              </a14:hiddenFill>
+            </a:ext>
+          </a:extLst>
+        </p:spPr>
+      </p:pic>
       <p:sp>
         <p:nvSpPr>
-          <p:cNvPr id="69" name="TextBox 68">
-            <a:extLst>
-              <a:ext uri="{FF2B5EF4-FFF2-40B4-BE49-F238E27FC236}">
-                <a16:creationId xmlns:a16="http://schemas.microsoft.com/office/drawing/2014/main" id="{263D8DD6-59FF-D830-DEF4-93B0A27B58C1}"/>
-              </a:ext>
-            </a:extLst>
-          </p:cNvPr>
-          <p:cNvSpPr txBox="1"/>
+          <p:cNvPr id="9" name="Rectangle 8">
+            <a:extLst>
+              <a:ext uri="{FF2B5EF4-FFF2-40B4-BE49-F238E27FC236}">
+                <a16:creationId xmlns:a16="http://schemas.microsoft.com/office/drawing/2014/main" id="{66BB8C68-A106-555A-6FD5-872196530D6E}"/>
+              </a:ext>
+            </a:extLst>
+          </p:cNvPr>
+          <p:cNvSpPr/>
           <p:nvPr/>
         </p:nvSpPr>
         <p:spPr>
           <a:xfrm>
-            <a:off x="8220536" y="2773367"/>
-            <a:ext cx="956227" cy="276999"/>
-          </a:xfrm>
-          <a:prstGeom prst="rect">
-            <a:avLst/>
-          </a:prstGeom>
-          <a:noFill/>
-        </p:spPr>
+            <a:off x="1150780" y="1971675"/>
+            <a:ext cx="1156863" cy="228617"/>
+          </a:xfrm>
+          <a:prstGeom prst="rect">
+            <a:avLst/>
+          </a:prstGeom>
+          <a:solidFill>
+            <a:schemeClr val="accent6">
+              <a:lumMod val="40000"/>
+              <a:lumOff val="60000"/>
+            </a:schemeClr>
+          </a:solidFill>
+        </p:spPr>
+        <p:style>
+          <a:lnRef idx="2">
+            <a:schemeClr val="accent1">
+              <a:shade val="15000"/>
+            </a:schemeClr>
+          </a:lnRef>
+          <a:fillRef idx="1">
+            <a:schemeClr val="accent1"/>
+          </a:fillRef>
+          <a:effectRef idx="0">
+            <a:schemeClr val="accent1"/>
+          </a:effectRef>
+          <a:fontRef idx="minor">
+            <a:schemeClr val="lt1"/>
+          </a:fontRef>
+        </p:style>
         <p:txBody>
-          <a:bodyPr wrap="square" rtlCol="0">
-            <a:spAutoFit/>
-          </a:bodyPr>
+          <a:bodyPr rtlCol="0" anchor="ctr"/>
           <a:lstStyle/>
           <a:p>
-            <a:r>
-              <a:rPr lang="en-US" sz="1200" b="1" dirty="0"/>
-              <a:t>User</a:t>
-            </a:r>
-            <a:endParaRPr lang="en-SG" sz="1200" dirty="0"/>
+            <a:pPr algn="ctr"/>
+            <a:r>
+              <a:rPr lang="en-US" sz="1200" b="1" dirty="0">
+                <a:solidFill>
+                  <a:schemeClr val="tx1"/>
+                </a:solidFill>
+              </a:rPr>
+              <a:t>Scheduler01</a:t>
+            </a:r>
+            <a:endParaRPr lang="en-SG" sz="1200" b="1" dirty="0">
+              <a:solidFill>
+                <a:schemeClr val="tx1"/>
+              </a:solidFill>
+            </a:endParaRPr>
+          </a:p>
+        </p:txBody>
+      </p:sp>
+      <p:sp>
+        <p:nvSpPr>
+          <p:cNvPr id="10" name="Rectangle 9">
+            <a:extLst>
+              <a:ext uri="{FF2B5EF4-FFF2-40B4-BE49-F238E27FC236}">
+                <a16:creationId xmlns:a16="http://schemas.microsoft.com/office/drawing/2014/main" id="{64291F12-C97D-7B5D-983F-E928F78F4CC5}"/>
+              </a:ext>
+            </a:extLst>
+          </p:cNvPr>
+          <p:cNvSpPr/>
+          <p:nvPr/>
+        </p:nvSpPr>
+        <p:spPr>
+          <a:xfrm>
+            <a:off x="1729211" y="2297597"/>
+            <a:ext cx="1156863" cy="228617"/>
+          </a:xfrm>
+          <a:prstGeom prst="rect">
+            <a:avLst/>
+          </a:prstGeom>
+          <a:solidFill>
+            <a:schemeClr val="accent6">
+              <a:lumMod val="40000"/>
+              <a:lumOff val="60000"/>
+            </a:schemeClr>
+          </a:solidFill>
+        </p:spPr>
+        <p:style>
+          <a:lnRef idx="2">
+            <a:schemeClr val="accent1">
+              <a:shade val="15000"/>
+            </a:schemeClr>
+          </a:lnRef>
+          <a:fillRef idx="1">
+            <a:schemeClr val="accent1"/>
+          </a:fillRef>
+          <a:effectRef idx="0">
+            <a:schemeClr val="accent1"/>
+          </a:effectRef>
+          <a:fontRef idx="minor">
+            <a:schemeClr val="lt1"/>
+          </a:fontRef>
+        </p:style>
+        <p:txBody>
+          <a:bodyPr rtlCol="0" anchor="ctr"/>
+          <a:lstStyle/>
+          <a:p>
+            <a:pPr algn="ctr"/>
+            <a:r>
+              <a:rPr lang="en-US" sz="1200" b="1" dirty="0">
+                <a:solidFill>
+                  <a:schemeClr val="tx1"/>
+                </a:solidFill>
+              </a:rPr>
+              <a:t>Scheduler02</a:t>
+            </a:r>
+            <a:endParaRPr lang="en-SG" sz="1200" b="1" dirty="0">
+              <a:solidFill>
+                <a:schemeClr val="tx1"/>
+              </a:solidFill>
+            </a:endParaRPr>
+          </a:p>
+        </p:txBody>
+      </p:sp>
+      <p:sp>
+        <p:nvSpPr>
+          <p:cNvPr id="11" name="Rectangle 10">
+            <a:extLst>
+              <a:ext uri="{FF2B5EF4-FFF2-40B4-BE49-F238E27FC236}">
+                <a16:creationId xmlns:a16="http://schemas.microsoft.com/office/drawing/2014/main" id="{771F9827-3549-2210-5B3E-C25F707DBC17}"/>
+              </a:ext>
+            </a:extLst>
+          </p:cNvPr>
+          <p:cNvSpPr/>
+          <p:nvPr/>
+        </p:nvSpPr>
+        <p:spPr>
+          <a:xfrm>
+            <a:off x="2212937" y="2707018"/>
+            <a:ext cx="1156863" cy="229821"/>
+          </a:xfrm>
+          <a:prstGeom prst="rect">
+            <a:avLst/>
+          </a:prstGeom>
+          <a:solidFill>
+            <a:schemeClr val="accent6">
+              <a:lumMod val="40000"/>
+              <a:lumOff val="60000"/>
+            </a:schemeClr>
+          </a:solidFill>
+        </p:spPr>
+        <p:style>
+          <a:lnRef idx="2">
+            <a:schemeClr val="accent1">
+              <a:shade val="15000"/>
+            </a:schemeClr>
+          </a:lnRef>
+          <a:fillRef idx="1">
+            <a:schemeClr val="accent1"/>
+          </a:fillRef>
+          <a:effectRef idx="0">
+            <a:schemeClr val="accent1"/>
+          </a:effectRef>
+          <a:fontRef idx="minor">
+            <a:schemeClr val="lt1"/>
+          </a:fontRef>
+        </p:style>
+        <p:txBody>
+          <a:bodyPr rtlCol="0" anchor="ctr"/>
+          <a:lstStyle/>
+          <a:p>
+            <a:pPr algn="ctr"/>
+            <a:r>
+              <a:rPr lang="en-US" sz="1200" b="1" dirty="0" err="1">
+                <a:solidFill>
+                  <a:schemeClr val="tx1"/>
+                </a:solidFill>
+              </a:rPr>
+              <a:t>Scheduler_N</a:t>
+            </a:r>
+            <a:endParaRPr lang="en-SG" sz="1200" b="1" dirty="0">
+              <a:solidFill>
+                <a:schemeClr val="tx1"/>
+              </a:solidFill>
+            </a:endParaRPr>
+          </a:p>
+        </p:txBody>
+      </p:sp>
+      <p:sp>
+        <p:nvSpPr>
+          <p:cNvPr id="12" name="Rectangle 11">
+            <a:extLst>
+              <a:ext uri="{FF2B5EF4-FFF2-40B4-BE49-F238E27FC236}">
+                <a16:creationId xmlns:a16="http://schemas.microsoft.com/office/drawing/2014/main" id="{C57CF57A-423B-BFE6-E700-7E565EF5B7B6}"/>
+              </a:ext>
+            </a:extLst>
+          </p:cNvPr>
+          <p:cNvSpPr/>
+          <p:nvPr/>
+        </p:nvSpPr>
+        <p:spPr>
+          <a:xfrm>
+            <a:off x="1150779" y="3240089"/>
+            <a:ext cx="2219013" cy="418011"/>
+          </a:xfrm>
+          <a:prstGeom prst="rect">
+            <a:avLst/>
+          </a:prstGeom>
+          <a:solidFill>
+            <a:schemeClr val="accent1">
+              <a:lumMod val="60000"/>
+              <a:lumOff val="40000"/>
+            </a:schemeClr>
+          </a:solidFill>
+        </p:spPr>
+        <p:style>
+          <a:lnRef idx="2">
+            <a:schemeClr val="accent1">
+              <a:shade val="15000"/>
+            </a:schemeClr>
+          </a:lnRef>
+          <a:fillRef idx="1">
+            <a:schemeClr val="accent1"/>
+          </a:fillRef>
+          <a:effectRef idx="0">
+            <a:schemeClr val="accent1"/>
+          </a:effectRef>
+          <a:fontRef idx="minor">
+            <a:schemeClr val="lt1"/>
+          </a:fontRef>
+        </p:style>
+        <p:txBody>
+          <a:bodyPr rtlCol="0" anchor="ctr"/>
+          <a:lstStyle/>
+          <a:p>
+            <a:pPr algn="ctr"/>
+            <a:r>
+              <a:rPr lang="en-SG" sz="1200" b="1" dirty="0">
+                <a:solidFill>
+                  <a:schemeClr val="tx1"/>
+                </a:solidFill>
+              </a:rPr>
+              <a:t>Cluster User Emulation System Monitor Hub [centralized ]</a:t>
+            </a:r>
           </a:p>
         </p:txBody>
       </p:sp>
       <p:cxnSp>
         <p:nvCxnSpPr>
-          <p:cNvPr id="70" name="Straight Arrow Connector 69">
-            <a:extLst>
-              <a:ext uri="{FF2B5EF4-FFF2-40B4-BE49-F238E27FC236}">
-                <a16:creationId xmlns:a16="http://schemas.microsoft.com/office/drawing/2014/main" id="{1419F927-2C0D-4EAA-31CD-04AF40F81590}"/>
+          <p:cNvPr id="14" name="Straight Arrow Connector 13">
+            <a:extLst>
+              <a:ext uri="{FF2B5EF4-FFF2-40B4-BE49-F238E27FC236}">
+                <a16:creationId xmlns:a16="http://schemas.microsoft.com/office/drawing/2014/main" id="{AD5591B1-10AD-891B-0E5B-0E1B76BA2F2C}"/>
               </a:ext>
             </a:extLst>
           </p:cNvPr>
           <p:cNvCxnSpPr>
             <a:cxnSpLocks/>
-            <a:stCxn id="67" idx="1"/>
-            <a:endCxn id="53" idx="3"/>
           </p:cNvCxnSpPr>
           <p:nvPr/>
         </p:nvCxnSpPr>
         <p:spPr>
-          <a:xfrm flipH="1">
-            <a:off x="7541825" y="2626252"/>
-            <a:ext cx="678711" cy="1"/>
+          <a:xfrm>
+            <a:off x="1376808" y="2200292"/>
+            <a:ext cx="0" cy="1038593"/>
           </a:xfrm>
           <a:prstGeom prst="straightConnector1">
             <a:avLst/>
           </a:prstGeom>
           <a:ln w="19050">
+            <a:headEnd type="triangle"/>
+            <a:tailEnd type="triangle"/>
+          </a:ln>
+        </p:spPr>
+        <p:style>
+          <a:lnRef idx="1">
+            <a:schemeClr val="accent1"/>
+          </a:lnRef>
+          <a:fillRef idx="0">
+            <a:schemeClr val="accent1"/>
+          </a:fillRef>
+          <a:effectRef idx="0">
+            <a:schemeClr val="accent1"/>
+          </a:effectRef>
+          <a:fontRef idx="minor">
+            <a:schemeClr val="tx1"/>
+          </a:fontRef>
+        </p:style>
+      </p:cxnSp>
+      <p:cxnSp>
+        <p:nvCxnSpPr>
+          <p:cNvPr id="15" name="Straight Arrow Connector 14">
+            <a:extLst>
+              <a:ext uri="{FF2B5EF4-FFF2-40B4-BE49-F238E27FC236}">
+                <a16:creationId xmlns:a16="http://schemas.microsoft.com/office/drawing/2014/main" id="{318113D6-9382-78D1-2751-73D2688432E8}"/>
+              </a:ext>
+            </a:extLst>
+          </p:cNvPr>
+          <p:cNvCxnSpPr>
+            <a:cxnSpLocks/>
+          </p:cNvCxnSpPr>
+          <p:nvPr/>
+        </p:nvCxnSpPr>
+        <p:spPr>
+          <a:xfrm>
+            <a:off x="2388725" y="2936839"/>
+            <a:ext cx="0" cy="302046"/>
+          </a:xfrm>
+          <a:prstGeom prst="straightConnector1">
+            <a:avLst/>
+          </a:prstGeom>
+          <a:ln w="19050">
+            <a:headEnd type="triangle"/>
             <a:tailEnd type="triangle"/>
           </a:ln>
         </p:spPr>
@@ -22585,49 +21552,116 @@
       </p:cxnSp>
       <p:sp>
         <p:nvSpPr>
-          <p:cNvPr id="76" name="Rectangle: Rounded Corners 75">
-            <a:extLst>
-              <a:ext uri="{FF2B5EF4-FFF2-40B4-BE49-F238E27FC236}">
-                <a16:creationId xmlns:a16="http://schemas.microsoft.com/office/drawing/2014/main" id="{EFBE7E73-DC18-6A5C-6BCE-2ED75EB808BA}"/>
-              </a:ext>
-            </a:extLst>
-          </p:cNvPr>
-          <p:cNvSpPr/>
+          <p:cNvPr id="18" name="TextBox 17">
+            <a:extLst>
+              <a:ext uri="{FF2B5EF4-FFF2-40B4-BE49-F238E27FC236}">
+                <a16:creationId xmlns:a16="http://schemas.microsoft.com/office/drawing/2014/main" id="{7447272A-66E8-2A85-6B9E-87DD0FE5F33F}"/>
+              </a:ext>
+            </a:extLst>
+          </p:cNvPr>
+          <p:cNvSpPr txBox="1"/>
           <p:nvPr/>
         </p:nvSpPr>
         <p:spPr>
           <a:xfrm>
-            <a:off x="2568727" y="2158666"/>
-            <a:ext cx="2630988" cy="991812"/>
-          </a:xfrm>
-          <a:prstGeom prst="roundRect">
+            <a:off x="2500950" y="2390499"/>
+            <a:ext cx="347472" cy="369332"/>
+          </a:xfrm>
+          <a:prstGeom prst="rect">
             <a:avLst/>
           </a:prstGeom>
           <a:noFill/>
-          <a:ln w="19050" cap="flat" cmpd="sng" algn="ctr">
-            <a:solidFill>
-              <a:schemeClr val="accent1">
-                <a:lumMod val="75000"/>
-              </a:schemeClr>
-            </a:solidFill>
-            <a:prstDash val="sysDash"/>
-            <a:round/>
-            <a:headEnd type="none" w="med" len="med"/>
-            <a:tailEnd type="none" w="med" len="med"/>
+        </p:spPr>
+        <p:txBody>
+          <a:bodyPr wrap="square" rtlCol="0">
+            <a:spAutoFit/>
+          </a:bodyPr>
+          <a:lstStyle/>
+          <a:p>
+            <a:r>
+              <a:rPr lang="en-SG" dirty="0"/>
+              <a:t>…</a:t>
+            </a:r>
+          </a:p>
+        </p:txBody>
+      </p:sp>
+      <p:cxnSp>
+        <p:nvCxnSpPr>
+          <p:cNvPr id="24" name="Straight Arrow Connector 23">
+            <a:extLst>
+              <a:ext uri="{FF2B5EF4-FFF2-40B4-BE49-F238E27FC236}">
+                <a16:creationId xmlns:a16="http://schemas.microsoft.com/office/drawing/2014/main" id="{B43E3166-42C4-1503-6FFB-E1DE15A99940}"/>
+              </a:ext>
+            </a:extLst>
+          </p:cNvPr>
+          <p:cNvCxnSpPr>
+            <a:cxnSpLocks/>
+          </p:cNvCxnSpPr>
+          <p:nvPr/>
+        </p:nvCxnSpPr>
+        <p:spPr>
+          <a:xfrm>
+            <a:off x="1899474" y="2538200"/>
+            <a:ext cx="0" cy="700685"/>
+          </a:xfrm>
+          <a:prstGeom prst="straightConnector1">
+            <a:avLst/>
+          </a:prstGeom>
+          <a:ln w="19050">
+            <a:headEnd type="triangle"/>
+            <a:tailEnd type="triangle"/>
           </a:ln>
         </p:spPr>
         <p:style>
-          <a:lnRef idx="0">
-            <a:scrgbClr r="0" g="0" b="0"/>
+          <a:lnRef idx="1">
+            <a:schemeClr val="accent1"/>
           </a:lnRef>
           <a:fillRef idx="0">
-            <a:scrgbClr r="0" g="0" b="0"/>
+            <a:schemeClr val="accent1"/>
           </a:fillRef>
           <a:effectRef idx="0">
-            <a:scrgbClr r="0" g="0" b="0"/>
+            <a:schemeClr val="accent1"/>
           </a:effectRef>
           <a:fontRef idx="minor">
-            <a:schemeClr val="accent2"/>
+            <a:schemeClr val="tx1"/>
+          </a:fontRef>
+        </p:style>
+      </p:cxnSp>
+      <p:sp>
+        <p:nvSpPr>
+          <p:cNvPr id="26" name="Cylinder 25">
+            <a:extLst>
+              <a:ext uri="{FF2B5EF4-FFF2-40B4-BE49-F238E27FC236}">
+                <a16:creationId xmlns:a16="http://schemas.microsoft.com/office/drawing/2014/main" id="{176CB7C5-6C0E-959A-1CE3-B5209DE6C79E}"/>
+              </a:ext>
+            </a:extLst>
+          </p:cNvPr>
+          <p:cNvSpPr/>
+          <p:nvPr/>
+        </p:nvSpPr>
+        <p:spPr>
+          <a:xfrm>
+            <a:off x="1136916" y="3856307"/>
+            <a:ext cx="801702" cy="404047"/>
+          </a:xfrm>
+          <a:prstGeom prst="can">
+            <a:avLst/>
+          </a:prstGeom>
+        </p:spPr>
+        <p:style>
+          <a:lnRef idx="2">
+            <a:schemeClr val="accent1">
+              <a:shade val="50000"/>
+            </a:schemeClr>
+          </a:lnRef>
+          <a:fillRef idx="1">
+            <a:schemeClr val="accent1"/>
+          </a:fillRef>
+          <a:effectRef idx="0">
+            <a:schemeClr val="accent1"/>
+          </a:effectRef>
+          <a:fontRef idx="minor">
+            <a:schemeClr val="lt1"/>
           </a:fontRef>
         </p:style>
         <p:txBody>
@@ -22635,20 +21669,255 @@
           <a:lstStyle/>
           <a:p>
             <a:pPr algn="ctr"/>
-            <a:endParaRPr lang="en-SG" sz="1200" b="1" dirty="0">
-              <a:solidFill>
-                <a:schemeClr val="tx1"/>
-              </a:solidFill>
-            </a:endParaRPr>
+            <a:r>
+              <a:rPr lang="en-US" sz="1200" b="1" dirty="0"/>
+              <a:t>Database </a:t>
+            </a:r>
+            <a:endParaRPr lang="en-SG" sz="1200" b="1" dirty="0"/>
+          </a:p>
+        </p:txBody>
+      </p:sp>
+      <p:cxnSp>
+        <p:nvCxnSpPr>
+          <p:cNvPr id="27" name="Straight Arrow Connector 26">
+            <a:extLst>
+              <a:ext uri="{FF2B5EF4-FFF2-40B4-BE49-F238E27FC236}">
+                <a16:creationId xmlns:a16="http://schemas.microsoft.com/office/drawing/2014/main" id="{D147C274-B57A-8C23-B499-6D6C32F4F609}"/>
+              </a:ext>
+            </a:extLst>
+          </p:cNvPr>
+          <p:cNvCxnSpPr>
+            <a:cxnSpLocks/>
+            <a:endCxn id="26" idx="1"/>
+          </p:cNvCxnSpPr>
+          <p:nvPr/>
+        </p:nvCxnSpPr>
+        <p:spPr>
+          <a:xfrm>
+            <a:off x="1537767" y="3658100"/>
+            <a:ext cx="0" cy="198207"/>
+          </a:xfrm>
+          <a:prstGeom prst="straightConnector1">
+            <a:avLst/>
+          </a:prstGeom>
+          <a:ln w="19050">
+            <a:headEnd type="triangle"/>
+            <a:tailEnd type="triangle"/>
+          </a:ln>
+        </p:spPr>
+        <p:style>
+          <a:lnRef idx="1">
+            <a:schemeClr val="accent1"/>
+          </a:lnRef>
+          <a:fillRef idx="0">
+            <a:schemeClr val="accent1"/>
+          </a:fillRef>
+          <a:effectRef idx="0">
+            <a:schemeClr val="accent1"/>
+          </a:effectRef>
+          <a:fontRef idx="minor">
+            <a:schemeClr val="tx1"/>
+          </a:fontRef>
+        </p:style>
+      </p:cxnSp>
+      <p:pic>
+        <p:nvPicPr>
+          <p:cNvPr id="31" name="Picture 30">
+            <a:extLst>
+              <a:ext uri="{FF2B5EF4-FFF2-40B4-BE49-F238E27FC236}">
+                <a16:creationId xmlns:a16="http://schemas.microsoft.com/office/drawing/2014/main" id="{4580A719-99BF-50D1-BB99-28753E6BCAE6}"/>
+              </a:ext>
+            </a:extLst>
+          </p:cNvPr>
+          <p:cNvPicPr>
+            <a:picLocks noChangeAspect="1"/>
+          </p:cNvPicPr>
+          <p:nvPr/>
+        </p:nvPicPr>
+        <p:blipFill>
+          <a:blip r:embed="rId3"/>
+          <a:stretch>
+            <a:fillRect/>
+          </a:stretch>
+        </p:blipFill>
+        <p:spPr>
+          <a:xfrm>
+            <a:off x="4350644" y="3223927"/>
+            <a:ext cx="2485938" cy="1176678"/>
+          </a:xfrm>
+          <a:prstGeom prst="rect">
+            <a:avLst/>
+          </a:prstGeom>
+        </p:spPr>
+      </p:pic>
+      <p:cxnSp>
+        <p:nvCxnSpPr>
+          <p:cNvPr id="32" name="Straight Arrow Connector 31">
+            <a:extLst>
+              <a:ext uri="{FF2B5EF4-FFF2-40B4-BE49-F238E27FC236}">
+                <a16:creationId xmlns:a16="http://schemas.microsoft.com/office/drawing/2014/main" id="{088615CB-1138-EBDF-F60C-D29C0FA2E5E0}"/>
+              </a:ext>
+            </a:extLst>
+          </p:cNvPr>
+          <p:cNvCxnSpPr>
+            <a:cxnSpLocks/>
+          </p:cNvCxnSpPr>
+          <p:nvPr/>
+        </p:nvCxnSpPr>
+        <p:spPr>
+          <a:xfrm>
+            <a:off x="3369792" y="3437207"/>
+            <a:ext cx="971559" cy="0"/>
+          </a:xfrm>
+          <a:prstGeom prst="straightConnector1">
+            <a:avLst/>
+          </a:prstGeom>
+          <a:ln w="19050">
+            <a:headEnd type="triangle"/>
+            <a:tailEnd type="triangle"/>
+          </a:ln>
+        </p:spPr>
+        <p:style>
+          <a:lnRef idx="1">
+            <a:schemeClr val="accent1"/>
+          </a:lnRef>
+          <a:fillRef idx="0">
+            <a:schemeClr val="accent1"/>
+          </a:fillRef>
+          <a:effectRef idx="0">
+            <a:schemeClr val="accent1"/>
+          </a:effectRef>
+          <a:fontRef idx="minor">
+            <a:schemeClr val="tx1"/>
+          </a:fontRef>
+        </p:style>
+      </p:cxnSp>
+      <p:cxnSp>
+        <p:nvCxnSpPr>
+          <p:cNvPr id="34" name="Straight Arrow Connector 33">
+            <a:extLst>
+              <a:ext uri="{FF2B5EF4-FFF2-40B4-BE49-F238E27FC236}">
+                <a16:creationId xmlns:a16="http://schemas.microsoft.com/office/drawing/2014/main" id="{DFF5A7DC-C967-A738-C314-7ADCA1679CE5}"/>
+              </a:ext>
+            </a:extLst>
+          </p:cNvPr>
+          <p:cNvCxnSpPr>
+            <a:cxnSpLocks/>
+          </p:cNvCxnSpPr>
+          <p:nvPr/>
+        </p:nvCxnSpPr>
+        <p:spPr>
+          <a:xfrm>
+            <a:off x="2500950" y="3658100"/>
+            <a:ext cx="0" cy="303250"/>
+          </a:xfrm>
+          <a:prstGeom prst="straightConnector1">
+            <a:avLst/>
+          </a:prstGeom>
+          <a:ln w="19050">
+            <a:headEnd type="triangle"/>
+            <a:tailEnd type="triangle"/>
+          </a:ln>
+        </p:spPr>
+        <p:style>
+          <a:lnRef idx="1">
+            <a:schemeClr val="accent1"/>
+          </a:lnRef>
+          <a:fillRef idx="0">
+            <a:schemeClr val="accent1"/>
+          </a:fillRef>
+          <a:effectRef idx="0">
+            <a:schemeClr val="accent1"/>
+          </a:effectRef>
+          <a:fontRef idx="minor">
+            <a:schemeClr val="tx1"/>
+          </a:fontRef>
+        </p:style>
+      </p:cxnSp>
+      <p:cxnSp>
+        <p:nvCxnSpPr>
+          <p:cNvPr id="36" name="Straight Arrow Connector 35">
+            <a:extLst>
+              <a:ext uri="{FF2B5EF4-FFF2-40B4-BE49-F238E27FC236}">
+                <a16:creationId xmlns:a16="http://schemas.microsoft.com/office/drawing/2014/main" id="{3ECCE72C-B3D0-9AC9-1E42-C08BF79BD906}"/>
+              </a:ext>
+            </a:extLst>
+          </p:cNvPr>
+          <p:cNvCxnSpPr>
+            <a:cxnSpLocks/>
+          </p:cNvCxnSpPr>
+          <p:nvPr/>
+        </p:nvCxnSpPr>
+        <p:spPr>
+          <a:xfrm>
+            <a:off x="6836582" y="4058330"/>
+            <a:ext cx="485780" cy="0"/>
+          </a:xfrm>
+          <a:prstGeom prst="straightConnector1">
+            <a:avLst/>
+          </a:prstGeom>
+          <a:ln w="19050">
+            <a:headEnd type="triangle"/>
+            <a:tailEnd type="triangle"/>
+          </a:ln>
+        </p:spPr>
+        <p:style>
+          <a:lnRef idx="1">
+            <a:schemeClr val="accent1"/>
+          </a:lnRef>
+          <a:fillRef idx="0">
+            <a:schemeClr val="accent1"/>
+          </a:fillRef>
+          <a:effectRef idx="0">
+            <a:schemeClr val="accent1"/>
+          </a:effectRef>
+          <a:fontRef idx="minor">
+            <a:schemeClr val="tx1"/>
+          </a:fontRef>
+        </p:style>
+      </p:cxnSp>
+      <p:sp>
+        <p:nvSpPr>
+          <p:cNvPr id="37" name="TextBox 36">
+            <a:extLst>
+              <a:ext uri="{FF2B5EF4-FFF2-40B4-BE49-F238E27FC236}">
+                <a16:creationId xmlns:a16="http://schemas.microsoft.com/office/drawing/2014/main" id="{F87DA5CC-5A8D-4176-557E-04AA838D3D25}"/>
+              </a:ext>
+            </a:extLst>
+          </p:cNvPr>
+          <p:cNvSpPr txBox="1"/>
+          <p:nvPr/>
+        </p:nvSpPr>
+        <p:spPr>
+          <a:xfrm>
+            <a:off x="6872512" y="3579308"/>
+            <a:ext cx="956227" cy="276999"/>
+          </a:xfrm>
+          <a:prstGeom prst="rect">
+            <a:avLst/>
+          </a:prstGeom>
+          <a:noFill/>
+        </p:spPr>
+        <p:txBody>
+          <a:bodyPr wrap="square" rtlCol="0">
+            <a:spAutoFit/>
+          </a:bodyPr>
+          <a:lstStyle/>
+          <a:p>
+            <a:r>
+              <a:rPr lang="en-US" sz="1200" b="1" dirty="0"/>
+              <a:t>Public User</a:t>
+            </a:r>
+            <a:endParaRPr lang="en-SG" sz="1200" dirty="0"/>
           </a:p>
         </p:txBody>
       </p:sp>
       <p:sp>
         <p:nvSpPr>
-          <p:cNvPr id="77" name="Rectangle: Rounded Corners 76">
-            <a:extLst>
-              <a:ext uri="{FF2B5EF4-FFF2-40B4-BE49-F238E27FC236}">
-                <a16:creationId xmlns:a16="http://schemas.microsoft.com/office/drawing/2014/main" id="{DFDA798A-F031-4AD0-9151-FF011A0E5B9A}"/>
+          <p:cNvPr id="38" name="Rectangle 37">
+            <a:extLst>
+              <a:ext uri="{FF2B5EF4-FFF2-40B4-BE49-F238E27FC236}">
+                <a16:creationId xmlns:a16="http://schemas.microsoft.com/office/drawing/2014/main" id="{E3970C5A-09A0-2D8F-F378-1F85C8EF60D0}"/>
               </a:ext>
             </a:extLst>
           </p:cNvPr>
@@ -22657,37 +21926,36 @@
         </p:nvSpPr>
         <p:spPr>
           <a:xfrm>
-            <a:off x="5584618" y="3621035"/>
-            <a:ext cx="2219538" cy="833492"/>
-          </a:xfrm>
-          <a:prstGeom prst="roundRect">
+            <a:off x="4350645" y="1894595"/>
+            <a:ext cx="2485938" cy="1094090"/>
+          </a:xfrm>
+          <a:prstGeom prst="rect">
             <a:avLst/>
           </a:prstGeom>
           <a:noFill/>
-          <a:ln w="19050" cap="flat" cmpd="sng" algn="ctr">
+          <a:ln w="12700">
             <a:solidFill>
-              <a:schemeClr val="accent1">
+              <a:schemeClr val="accent6">
                 <a:lumMod val="75000"/>
               </a:schemeClr>
             </a:solidFill>
             <a:prstDash val="sysDash"/>
-            <a:round/>
-            <a:headEnd type="none" w="med" len="med"/>
-            <a:tailEnd type="none" w="med" len="med"/>
           </a:ln>
         </p:spPr>
         <p:style>
-          <a:lnRef idx="0">
-            <a:scrgbClr r="0" g="0" b="0"/>
+          <a:lnRef idx="2">
+            <a:schemeClr val="accent1">
+              <a:shade val="15000"/>
+            </a:schemeClr>
           </a:lnRef>
-          <a:fillRef idx="0">
-            <a:scrgbClr r="0" g="0" b="0"/>
+          <a:fillRef idx="1">
+            <a:schemeClr val="accent1"/>
           </a:fillRef>
           <a:effectRef idx="0">
-            <a:scrgbClr r="0" g="0" b="0"/>
+            <a:schemeClr val="accent1"/>
           </a:effectRef>
           <a:fontRef idx="minor">
-            <a:schemeClr val="accent2"/>
+            <a:schemeClr val="lt1"/>
           </a:fontRef>
         </p:style>
         <p:txBody>
@@ -22695,18 +21963,412 @@
           <a:lstStyle/>
           <a:p>
             <a:pPr algn="ctr"/>
-            <a:endParaRPr lang="en-SG" sz="1200" b="1" dirty="0">
+            <a:endParaRPr lang="en-SG" dirty="0"/>
+          </a:p>
+        </p:txBody>
+      </p:sp>
+      <p:pic>
+        <p:nvPicPr>
+          <p:cNvPr id="39" name="Picture 4">
+            <a:extLst>
+              <a:ext uri="{FF2B5EF4-FFF2-40B4-BE49-F238E27FC236}">
+                <a16:creationId xmlns:a16="http://schemas.microsoft.com/office/drawing/2014/main" id="{F311212F-4D00-2DFF-0C21-4FEFD6A24BE3}"/>
+              </a:ext>
+            </a:extLst>
+          </p:cNvPr>
+          <p:cNvPicPr>
+            <a:picLocks noChangeAspect="1" noChangeArrowheads="1"/>
+          </p:cNvPicPr>
+          <p:nvPr/>
+        </p:nvPicPr>
+        <p:blipFill>
+          <a:blip r:embed="rId2">
+            <a:extLst>
+              <a:ext uri="{28A0092B-C50C-407E-A947-70E740481C1C}">
+                <a14:useLocalDpi xmlns:a14="http://schemas.microsoft.com/office/drawing/2010/main" val="0"/>
+              </a:ext>
+            </a:extLst>
+          </a:blip>
+          <a:srcRect/>
+          <a:stretch>
+            <a:fillRect/>
+          </a:stretch>
+        </p:blipFill>
+        <p:spPr bwMode="auto">
+          <a:xfrm>
+            <a:off x="7308098" y="2271378"/>
+            <a:ext cx="340524" cy="340524"/>
+          </a:xfrm>
+          <a:prstGeom prst="rect">
+            <a:avLst/>
+          </a:prstGeom>
+          <a:noFill/>
+          <a:extLst>
+            <a:ext uri="{909E8E84-426E-40DD-AFC4-6F175D3DCCD1}">
+              <a14:hiddenFill xmlns:a14="http://schemas.microsoft.com/office/drawing/2010/main">
+                <a:solidFill>
+                  <a:srgbClr val="FFFFFF"/>
+                </a:solidFill>
+              </a14:hiddenFill>
+            </a:ext>
+          </a:extLst>
+        </p:spPr>
+      </p:pic>
+      <p:cxnSp>
+        <p:nvCxnSpPr>
+          <p:cNvPr id="40" name="Straight Arrow Connector 39">
+            <a:extLst>
+              <a:ext uri="{FF2B5EF4-FFF2-40B4-BE49-F238E27FC236}">
+                <a16:creationId xmlns:a16="http://schemas.microsoft.com/office/drawing/2014/main" id="{D3D5EF24-987E-80F2-45FD-FCB843489832}"/>
+              </a:ext>
+            </a:extLst>
+          </p:cNvPr>
+          <p:cNvCxnSpPr>
+            <a:cxnSpLocks/>
+          </p:cNvCxnSpPr>
+          <p:nvPr/>
+        </p:nvCxnSpPr>
+        <p:spPr>
+          <a:xfrm>
+            <a:off x="6702357" y="2441640"/>
+            <a:ext cx="620005" cy="0"/>
+          </a:xfrm>
+          <a:prstGeom prst="straightConnector1">
+            <a:avLst/>
+          </a:prstGeom>
+          <a:ln w="19050">
+            <a:headEnd type="triangle"/>
+            <a:tailEnd type="triangle"/>
+          </a:ln>
+        </p:spPr>
+        <p:style>
+          <a:lnRef idx="1">
+            <a:schemeClr val="accent1"/>
+          </a:lnRef>
+          <a:fillRef idx="0">
+            <a:schemeClr val="accent1"/>
+          </a:fillRef>
+          <a:effectRef idx="0">
+            <a:schemeClr val="accent1"/>
+          </a:effectRef>
+          <a:fontRef idx="minor">
+            <a:schemeClr val="tx1"/>
+          </a:fontRef>
+        </p:style>
+      </p:cxnSp>
+      <p:sp>
+        <p:nvSpPr>
+          <p:cNvPr id="42" name="Rectangle 41">
+            <a:extLst>
+              <a:ext uri="{FF2B5EF4-FFF2-40B4-BE49-F238E27FC236}">
+                <a16:creationId xmlns:a16="http://schemas.microsoft.com/office/drawing/2014/main" id="{94A7397B-2FBF-FC45-ADA9-A61FF4699D50}"/>
+              </a:ext>
+            </a:extLst>
+          </p:cNvPr>
+          <p:cNvSpPr/>
+          <p:nvPr/>
+        </p:nvSpPr>
+        <p:spPr>
+          <a:xfrm>
+            <a:off x="4532101" y="1947280"/>
+            <a:ext cx="1563899" cy="777695"/>
+          </a:xfrm>
+          <a:prstGeom prst="rect">
+            <a:avLst/>
+          </a:prstGeom>
+          <a:solidFill>
+            <a:schemeClr val="accent1">
+              <a:lumMod val="60000"/>
+              <a:lumOff val="40000"/>
+            </a:schemeClr>
+          </a:solidFill>
+        </p:spPr>
+        <p:style>
+          <a:lnRef idx="2">
+            <a:schemeClr val="accent1">
+              <a:shade val="15000"/>
+            </a:schemeClr>
+          </a:lnRef>
+          <a:fillRef idx="1">
+            <a:schemeClr val="accent1"/>
+          </a:fillRef>
+          <a:effectRef idx="0">
+            <a:schemeClr val="accent1"/>
+          </a:effectRef>
+          <a:fontRef idx="minor">
+            <a:schemeClr val="lt1"/>
+          </a:fontRef>
+        </p:style>
+        <p:txBody>
+          <a:bodyPr rtlCol="0" anchor="ctr"/>
+          <a:lstStyle/>
+          <a:p>
+            <a:r>
+              <a:rPr lang="en-SG" sz="1200" b="1" dirty="0">
+                <a:solidFill>
+                  <a:schemeClr val="tx1"/>
+                </a:solidFill>
+              </a:rPr>
+              <a:t>Cluster User Emulation System Monitor Hub [distributed ]</a:t>
+            </a:r>
+          </a:p>
+        </p:txBody>
+      </p:sp>
+      <p:pic>
+        <p:nvPicPr>
+          <p:cNvPr id="41" name="Picture 40" descr="A screenshot of a computer&#10;&#10;Description automatically generated">
+            <a:extLst>
+              <a:ext uri="{FF2B5EF4-FFF2-40B4-BE49-F238E27FC236}">
+                <a16:creationId xmlns:a16="http://schemas.microsoft.com/office/drawing/2014/main" id="{B419361E-8A22-ECF0-7FEE-58FAB04750DE}"/>
+              </a:ext>
+            </a:extLst>
+          </p:cNvPr>
+          <p:cNvPicPr>
+            <a:picLocks noChangeAspect="1"/>
+          </p:cNvPicPr>
+          <p:nvPr/>
+        </p:nvPicPr>
+        <p:blipFill rotWithShape="1">
+          <a:blip r:embed="rId4">
+            <a:extLst>
+              <a:ext uri="{28A0092B-C50C-407E-A947-70E740481C1C}">
+                <a14:useLocalDpi xmlns:a14="http://schemas.microsoft.com/office/drawing/2010/main" val="0"/>
+              </a:ext>
+            </a:extLst>
+          </a:blip>
+          <a:srcRect b="5440"/>
+          <a:stretch/>
+        </p:blipFill>
+        <p:spPr>
+          <a:xfrm>
+            <a:off x="5550447" y="2336128"/>
+            <a:ext cx="1151910" cy="612703"/>
+          </a:xfrm>
+          <a:prstGeom prst="rect">
+            <a:avLst/>
+          </a:prstGeom>
+          <a:ln w="3175">
+            <a:solidFill>
+              <a:schemeClr val="tx1"/>
+            </a:solidFill>
+          </a:ln>
+        </p:spPr>
+      </p:pic>
+      <p:cxnSp>
+        <p:nvCxnSpPr>
+          <p:cNvPr id="43" name="Straight Arrow Connector 42">
+            <a:extLst>
+              <a:ext uri="{FF2B5EF4-FFF2-40B4-BE49-F238E27FC236}">
+                <a16:creationId xmlns:a16="http://schemas.microsoft.com/office/drawing/2014/main" id="{11C2E924-E8F1-09F5-6C4E-734A906A6985}"/>
+              </a:ext>
+            </a:extLst>
+          </p:cNvPr>
+          <p:cNvCxnSpPr>
+            <a:cxnSpLocks/>
+            <a:stCxn id="10" idx="3"/>
+          </p:cNvCxnSpPr>
+          <p:nvPr/>
+        </p:nvCxnSpPr>
+        <p:spPr>
+          <a:xfrm>
+            <a:off x="2886074" y="2411906"/>
+            <a:ext cx="1605602" cy="0"/>
+          </a:xfrm>
+          <a:prstGeom prst="straightConnector1">
+            <a:avLst/>
+          </a:prstGeom>
+          <a:ln w="19050">
+            <a:headEnd type="triangle"/>
+            <a:tailEnd type="triangle"/>
+          </a:ln>
+        </p:spPr>
+        <p:style>
+          <a:lnRef idx="1">
+            <a:schemeClr val="accent1"/>
+          </a:lnRef>
+          <a:fillRef idx="0">
+            <a:schemeClr val="accent1"/>
+          </a:fillRef>
+          <a:effectRef idx="0">
+            <a:schemeClr val="accent1"/>
+          </a:effectRef>
+          <a:fontRef idx="minor">
+            <a:schemeClr val="tx1"/>
+          </a:fontRef>
+        </p:style>
+      </p:cxnSp>
+      <p:sp>
+        <p:nvSpPr>
+          <p:cNvPr id="49" name="TextBox 48">
+            <a:extLst>
+              <a:ext uri="{FF2B5EF4-FFF2-40B4-BE49-F238E27FC236}">
+                <a16:creationId xmlns:a16="http://schemas.microsoft.com/office/drawing/2014/main" id="{FEA2F0A1-606E-363D-39C0-88A6FCC0AC2C}"/>
+              </a:ext>
+            </a:extLst>
+          </p:cNvPr>
+          <p:cNvSpPr txBox="1"/>
+          <p:nvPr/>
+        </p:nvSpPr>
+        <p:spPr>
+          <a:xfrm>
+            <a:off x="4212543" y="1583724"/>
+            <a:ext cx="2203014" cy="307777"/>
+          </a:xfrm>
+          <a:prstGeom prst="rect">
+            <a:avLst/>
+          </a:prstGeom>
+          <a:noFill/>
+        </p:spPr>
+        <p:txBody>
+          <a:bodyPr wrap="square" rtlCol="0">
+            <a:spAutoFit/>
+          </a:bodyPr>
+          <a:lstStyle/>
+          <a:p>
+            <a:r>
+              <a:rPr lang="en-US" sz="1400" b="1" dirty="0">
+                <a:solidFill>
+                  <a:schemeClr val="accent6">
+                    <a:lumMod val="75000"/>
+                  </a:schemeClr>
+                </a:solidFill>
+              </a:rPr>
+              <a:t>Local environment access</a:t>
+            </a:r>
+            <a:endParaRPr lang="en-SG" sz="1400" b="1" dirty="0">
               <a:solidFill>
-                <a:schemeClr val="tx1"/>
+                <a:schemeClr val="accent6">
+                  <a:lumMod val="75000"/>
+                </a:schemeClr>
               </a:solidFill>
             </a:endParaRPr>
+          </a:p>
+        </p:txBody>
+      </p:sp>
+      <p:sp>
+        <p:nvSpPr>
+          <p:cNvPr id="50" name="TextBox 49">
+            <a:extLst>
+              <a:ext uri="{FF2B5EF4-FFF2-40B4-BE49-F238E27FC236}">
+                <a16:creationId xmlns:a16="http://schemas.microsoft.com/office/drawing/2014/main" id="{F547DA80-864D-F11C-E29B-513EB12FFEA4}"/>
+              </a:ext>
+            </a:extLst>
+          </p:cNvPr>
+          <p:cNvSpPr txBox="1"/>
+          <p:nvPr/>
+        </p:nvSpPr>
+        <p:spPr>
+          <a:xfrm>
+            <a:off x="4314714" y="2950316"/>
+            <a:ext cx="2203014" cy="307777"/>
+          </a:xfrm>
+          <a:prstGeom prst="rect">
+            <a:avLst/>
+          </a:prstGeom>
+          <a:noFill/>
+        </p:spPr>
+        <p:txBody>
+          <a:bodyPr wrap="square" rtlCol="0">
+            <a:spAutoFit/>
+          </a:bodyPr>
+          <a:lstStyle/>
+          <a:p>
+            <a:r>
+              <a:rPr lang="en-US" sz="1400" b="1" dirty="0">
+                <a:solidFill>
+                  <a:schemeClr val="accent6">
+                    <a:lumMod val="75000"/>
+                  </a:schemeClr>
+                </a:solidFill>
+              </a:rPr>
+              <a:t>Public environment access</a:t>
+            </a:r>
+            <a:endParaRPr lang="en-SG" sz="1400" b="1" dirty="0">
+              <a:solidFill>
+                <a:schemeClr val="accent6">
+                  <a:lumMod val="75000"/>
+                </a:schemeClr>
+              </a:solidFill>
+            </a:endParaRPr>
+          </a:p>
+        </p:txBody>
+      </p:sp>
+      <p:sp>
+        <p:nvSpPr>
+          <p:cNvPr id="54" name="TextBox 53">
+            <a:extLst>
+              <a:ext uri="{FF2B5EF4-FFF2-40B4-BE49-F238E27FC236}">
+                <a16:creationId xmlns:a16="http://schemas.microsoft.com/office/drawing/2014/main" id="{96FC4408-0E05-EC90-02D3-E9D0C5C39815}"/>
+              </a:ext>
+            </a:extLst>
+          </p:cNvPr>
+          <p:cNvSpPr txBox="1"/>
+          <p:nvPr/>
+        </p:nvSpPr>
+        <p:spPr>
+          <a:xfrm>
+            <a:off x="2652565" y="3820668"/>
+            <a:ext cx="956227" cy="461665"/>
+          </a:xfrm>
+          <a:prstGeom prst="rect">
+            <a:avLst/>
+          </a:prstGeom>
+          <a:noFill/>
+        </p:spPr>
+        <p:txBody>
+          <a:bodyPr wrap="square" rtlCol="0">
+            <a:spAutoFit/>
+          </a:bodyPr>
+          <a:lstStyle/>
+          <a:p>
+            <a:r>
+              <a:rPr lang="en-US" sz="1200" b="1" dirty="0"/>
+              <a:t>Internal User</a:t>
+            </a:r>
+            <a:endParaRPr lang="en-SG" sz="1200" dirty="0"/>
+          </a:p>
+        </p:txBody>
+      </p:sp>
+      <p:sp>
+        <p:nvSpPr>
+          <p:cNvPr id="55" name="TextBox 54">
+            <a:extLst>
+              <a:ext uri="{FF2B5EF4-FFF2-40B4-BE49-F238E27FC236}">
+                <a16:creationId xmlns:a16="http://schemas.microsoft.com/office/drawing/2014/main" id="{5BAA0095-4C50-E55E-9C62-DBADFED97520}"/>
+              </a:ext>
+            </a:extLst>
+          </p:cNvPr>
+          <p:cNvSpPr txBox="1"/>
+          <p:nvPr/>
+        </p:nvSpPr>
+        <p:spPr>
+          <a:xfrm>
+            <a:off x="6836582" y="1992307"/>
+            <a:ext cx="1083855" cy="276999"/>
+          </a:xfrm>
+          <a:prstGeom prst="rect">
+            <a:avLst/>
+          </a:prstGeom>
+          <a:noFill/>
+        </p:spPr>
+        <p:txBody>
+          <a:bodyPr wrap="square" rtlCol="0">
+            <a:spAutoFit/>
+          </a:bodyPr>
+          <a:lstStyle/>
+          <a:p>
+            <a:r>
+              <a:rPr lang="en-US" sz="1200" b="1" dirty="0"/>
+              <a:t>Specific User</a:t>
+            </a:r>
+            <a:endParaRPr lang="en-SG" sz="1200" dirty="0"/>
           </a:p>
         </p:txBody>
       </p:sp>
     </p:spTree>
     <p:extLst>
       <p:ext uri="{BB962C8B-B14F-4D97-AF65-F5344CB8AC3E}">
-        <p14:creationId xmlns:p14="http://schemas.microsoft.com/office/powerpoint/2010/main" val="3271524681"/>
+        <p14:creationId xmlns:p14="http://schemas.microsoft.com/office/powerpoint/2010/main" val="907395175"/>
       </p:ext>
     </p:extLst>
   </p:cSld>
@@ -22733,52 +22395,6 @@
           <a:chExt cx="0" cy="0"/>
         </a:xfrm>
       </p:grpSpPr>
-      <p:sp>
-        <p:nvSpPr>
-          <p:cNvPr id="4" name="Rectangle 3">
-            <a:extLst>
-              <a:ext uri="{FF2B5EF4-FFF2-40B4-BE49-F238E27FC236}">
-                <a16:creationId xmlns:a16="http://schemas.microsoft.com/office/drawing/2014/main" id="{D8DD1451-AD91-CBFA-00B1-D1B8F3614AB8}"/>
-              </a:ext>
-            </a:extLst>
-          </p:cNvPr>
-          <p:cNvSpPr/>
-          <p:nvPr/>
-        </p:nvSpPr>
-        <p:spPr>
-          <a:xfrm>
-            <a:off x="2451941" y="2121011"/>
-            <a:ext cx="2613835" cy="997093"/>
-          </a:xfrm>
-          <a:prstGeom prst="rect">
-            <a:avLst/>
-          </a:prstGeom>
-          <a:ln w="19050">
-            <a:prstDash val="sysDash"/>
-          </a:ln>
-        </p:spPr>
-        <p:style>
-          <a:lnRef idx="2">
-            <a:schemeClr val="accent6"/>
-          </a:lnRef>
-          <a:fillRef idx="1">
-            <a:schemeClr val="lt1"/>
-          </a:fillRef>
-          <a:effectRef idx="0">
-            <a:schemeClr val="accent6"/>
-          </a:effectRef>
-          <a:fontRef idx="minor">
-            <a:schemeClr val="dk1"/>
-          </a:fontRef>
-        </p:style>
-        <p:txBody>
-          <a:bodyPr rtlCol="0" anchor="ctr"/>
-          <a:lstStyle/>
-          <a:p>
-            <a:endParaRPr lang="en-SG" b="1" dirty="0"/>
-          </a:p>
-        </p:txBody>
-      </p:sp>
       <p:pic>
         <p:nvPicPr>
           <p:cNvPr id="5" name="Picture 4">
@@ -23133,6 +22749,106 @@
           </a:p>
         </p:txBody>
       </p:sp>
+      <p:pic>
+        <p:nvPicPr>
+          <p:cNvPr id="15" name="Picture 14">
+            <a:extLst>
+              <a:ext uri="{FF2B5EF4-FFF2-40B4-BE49-F238E27FC236}">
+                <a16:creationId xmlns:a16="http://schemas.microsoft.com/office/drawing/2014/main" id="{31903FAE-4C93-BE80-BE5F-CCCA24A302EB}"/>
+              </a:ext>
+            </a:extLst>
+          </p:cNvPr>
+          <p:cNvPicPr>
+            <a:picLocks noChangeAspect="1"/>
+          </p:cNvPicPr>
+          <p:nvPr/>
+        </p:nvPicPr>
+        <p:blipFill>
+          <a:blip r:embed="rId3"/>
+          <a:stretch>
+            <a:fillRect/>
+          </a:stretch>
+        </p:blipFill>
+        <p:spPr>
+          <a:xfrm>
+            <a:off x="3054269" y="2219989"/>
+            <a:ext cx="176680" cy="175361"/>
+          </a:xfrm>
+          <a:prstGeom prst="rect">
+            <a:avLst/>
+          </a:prstGeom>
+        </p:spPr>
+      </p:pic>
+      <p:pic>
+        <p:nvPicPr>
+          <p:cNvPr id="16" name="Picture 15">
+            <a:extLst>
+              <a:ext uri="{FF2B5EF4-FFF2-40B4-BE49-F238E27FC236}">
+                <a16:creationId xmlns:a16="http://schemas.microsoft.com/office/drawing/2014/main" id="{CFB0B42E-0474-0A00-DED9-C376516F462E}"/>
+              </a:ext>
+            </a:extLst>
+          </p:cNvPr>
+          <p:cNvPicPr>
+            <a:picLocks noChangeAspect="1"/>
+          </p:cNvPicPr>
+          <p:nvPr/>
+        </p:nvPicPr>
+        <p:blipFill>
+          <a:blip r:embed="rId4"/>
+          <a:stretch>
+            <a:fillRect/>
+          </a:stretch>
+        </p:blipFill>
+        <p:spPr>
+          <a:xfrm>
+            <a:off x="3844234" y="2255533"/>
+            <a:ext cx="202752" cy="199446"/>
+          </a:xfrm>
+          <a:prstGeom prst="rect">
+            <a:avLst/>
+          </a:prstGeom>
+          <a:ln w="6350">
+            <a:solidFill>
+              <a:schemeClr val="tx1"/>
+            </a:solidFill>
+          </a:ln>
+        </p:spPr>
+      </p:pic>
+      <p:pic>
+        <p:nvPicPr>
+          <p:cNvPr id="17" name="Picture 16">
+            <a:extLst>
+              <a:ext uri="{FF2B5EF4-FFF2-40B4-BE49-F238E27FC236}">
+                <a16:creationId xmlns:a16="http://schemas.microsoft.com/office/drawing/2014/main" id="{ED2FF56A-2562-0469-6275-E7A5C4269DAA}"/>
+              </a:ext>
+            </a:extLst>
+          </p:cNvPr>
+          <p:cNvPicPr>
+            <a:picLocks noChangeAspect="1"/>
+          </p:cNvPicPr>
+          <p:nvPr/>
+        </p:nvPicPr>
+        <p:blipFill>
+          <a:blip r:embed="rId5"/>
+          <a:stretch>
+            <a:fillRect/>
+          </a:stretch>
+        </p:blipFill>
+        <p:spPr>
+          <a:xfrm>
+            <a:off x="4660271" y="2285946"/>
+            <a:ext cx="162449" cy="171619"/>
+          </a:xfrm>
+          <a:prstGeom prst="rect">
+            <a:avLst/>
+          </a:prstGeom>
+          <a:ln w="9525">
+            <a:solidFill>
+              <a:schemeClr val="tx1"/>
+            </a:solidFill>
+          </a:ln>
+        </p:spPr>
+      </p:pic>
       <p:sp>
         <p:nvSpPr>
           <p:cNvPr id="18" name="Arrow: Left-Right 17">
@@ -23202,7 +22918,7 @@
           <p:nvPr/>
         </p:nvPicPr>
         <p:blipFill>
-          <a:blip r:embed="rId3"/>
+          <a:blip r:embed="rId6"/>
           <a:stretch>
             <a:fillRect/>
           </a:stretch>
@@ -23364,52 +23080,6 @@
       </p:sp>
       <p:sp>
         <p:nvSpPr>
-          <p:cNvPr id="28" name="Rectangle 27">
-            <a:extLst>
-              <a:ext uri="{FF2B5EF4-FFF2-40B4-BE49-F238E27FC236}">
-                <a16:creationId xmlns:a16="http://schemas.microsoft.com/office/drawing/2014/main" id="{C1955375-D852-FF24-7492-DE192609D050}"/>
-              </a:ext>
-            </a:extLst>
-          </p:cNvPr>
-          <p:cNvSpPr/>
-          <p:nvPr/>
-        </p:nvSpPr>
-        <p:spPr>
-          <a:xfrm>
-            <a:off x="5579748" y="3680879"/>
-            <a:ext cx="2369995" cy="750371"/>
-          </a:xfrm>
-          <a:prstGeom prst="rect">
-            <a:avLst/>
-          </a:prstGeom>
-          <a:ln w="19050">
-            <a:prstDash val="sysDash"/>
-          </a:ln>
-        </p:spPr>
-        <p:style>
-          <a:lnRef idx="2">
-            <a:schemeClr val="accent6"/>
-          </a:lnRef>
-          <a:fillRef idx="1">
-            <a:schemeClr val="lt1"/>
-          </a:fillRef>
-          <a:effectRef idx="0">
-            <a:schemeClr val="accent6"/>
-          </a:effectRef>
-          <a:fontRef idx="minor">
-            <a:schemeClr val="dk1"/>
-          </a:fontRef>
-        </p:style>
-        <p:txBody>
-          <a:bodyPr rtlCol="0" anchor="ctr"/>
-          <a:lstStyle/>
-          <a:p>
-            <a:endParaRPr lang="en-SG" b="1" dirty="0"/>
-          </a:p>
-        </p:txBody>
-      </p:sp>
-      <p:sp>
-        <p:nvSpPr>
           <p:cNvPr id="29" name="Arrow: Right 28">
             <a:extLst>
               <a:ext uri="{FF2B5EF4-FFF2-40B4-BE49-F238E27FC236}">
@@ -23458,6 +23128,216 @@
           </a:p>
         </p:txBody>
       </p:sp>
+      <p:pic>
+        <p:nvPicPr>
+          <p:cNvPr id="30" name="Picture 29">
+            <a:extLst>
+              <a:ext uri="{FF2B5EF4-FFF2-40B4-BE49-F238E27FC236}">
+                <a16:creationId xmlns:a16="http://schemas.microsoft.com/office/drawing/2014/main" id="{EBC8FC24-5B02-77B7-95E2-6BB2BEC0280A}"/>
+              </a:ext>
+            </a:extLst>
+          </p:cNvPr>
+          <p:cNvPicPr>
+            <a:picLocks noChangeAspect="1"/>
+          </p:cNvPicPr>
+          <p:nvPr/>
+        </p:nvPicPr>
+        <p:blipFill>
+          <a:blip r:embed="rId7"/>
+          <a:stretch>
+            <a:fillRect/>
+          </a:stretch>
+        </p:blipFill>
+        <p:spPr>
+          <a:xfrm>
+            <a:off x="5779574" y="3857873"/>
+            <a:ext cx="407652" cy="317063"/>
+          </a:xfrm>
+          <a:prstGeom prst="rect">
+            <a:avLst/>
+          </a:prstGeom>
+          <a:ln w="3175">
+            <a:solidFill>
+              <a:schemeClr val="tx1"/>
+            </a:solidFill>
+          </a:ln>
+        </p:spPr>
+      </p:pic>
+      <p:pic>
+        <p:nvPicPr>
+          <p:cNvPr id="31" name="Picture 30">
+            <a:extLst>
+              <a:ext uri="{FF2B5EF4-FFF2-40B4-BE49-F238E27FC236}">
+                <a16:creationId xmlns:a16="http://schemas.microsoft.com/office/drawing/2014/main" id="{2DE7B82E-7132-8EFA-F467-300276E246C5}"/>
+              </a:ext>
+            </a:extLst>
+          </p:cNvPr>
+          <p:cNvPicPr>
+            <a:picLocks noChangeAspect="1"/>
+          </p:cNvPicPr>
+          <p:nvPr/>
+        </p:nvPicPr>
+        <p:blipFill>
+          <a:blip r:embed="rId7"/>
+          <a:stretch>
+            <a:fillRect/>
+          </a:stretch>
+        </p:blipFill>
+        <p:spPr>
+          <a:xfrm>
+            <a:off x="6363529" y="3874057"/>
+            <a:ext cx="407652" cy="317063"/>
+          </a:xfrm>
+          <a:prstGeom prst="rect">
+            <a:avLst/>
+          </a:prstGeom>
+          <a:ln w="3175">
+            <a:solidFill>
+              <a:schemeClr val="tx1"/>
+            </a:solidFill>
+          </a:ln>
+        </p:spPr>
+      </p:pic>
+      <p:pic>
+        <p:nvPicPr>
+          <p:cNvPr id="32" name="Picture 31">
+            <a:extLst>
+              <a:ext uri="{FF2B5EF4-FFF2-40B4-BE49-F238E27FC236}">
+                <a16:creationId xmlns:a16="http://schemas.microsoft.com/office/drawing/2014/main" id="{97BEEEB7-387A-B905-069B-CA1F1B143D63}"/>
+              </a:ext>
+            </a:extLst>
+          </p:cNvPr>
+          <p:cNvPicPr>
+            <a:picLocks noChangeAspect="1"/>
+          </p:cNvPicPr>
+          <p:nvPr/>
+        </p:nvPicPr>
+        <p:blipFill>
+          <a:blip r:embed="rId7"/>
+          <a:stretch>
+            <a:fillRect/>
+          </a:stretch>
+        </p:blipFill>
+        <p:spPr>
+          <a:xfrm>
+            <a:off x="7014888" y="3778607"/>
+            <a:ext cx="407652" cy="317063"/>
+          </a:xfrm>
+          <a:prstGeom prst="rect">
+            <a:avLst/>
+          </a:prstGeom>
+          <a:ln w="3175">
+            <a:solidFill>
+              <a:schemeClr val="tx1"/>
+            </a:solidFill>
+          </a:ln>
+        </p:spPr>
+      </p:pic>
+      <p:pic>
+        <p:nvPicPr>
+          <p:cNvPr id="33" name="Picture 32">
+            <a:extLst>
+              <a:ext uri="{FF2B5EF4-FFF2-40B4-BE49-F238E27FC236}">
+                <a16:creationId xmlns:a16="http://schemas.microsoft.com/office/drawing/2014/main" id="{C78F167F-45BF-F55B-1A72-AE9668C145DC}"/>
+              </a:ext>
+            </a:extLst>
+          </p:cNvPr>
+          <p:cNvPicPr>
+            <a:picLocks noChangeAspect="1"/>
+          </p:cNvPicPr>
+          <p:nvPr/>
+        </p:nvPicPr>
+        <p:blipFill>
+          <a:blip r:embed="rId7"/>
+          <a:stretch>
+            <a:fillRect/>
+          </a:stretch>
+        </p:blipFill>
+        <p:spPr>
+          <a:xfrm>
+            <a:off x="6935126" y="3953456"/>
+            <a:ext cx="407652" cy="317063"/>
+          </a:xfrm>
+          <a:prstGeom prst="rect">
+            <a:avLst/>
+          </a:prstGeom>
+          <a:ln w="3175">
+            <a:solidFill>
+              <a:schemeClr val="tx1"/>
+            </a:solidFill>
+          </a:ln>
+        </p:spPr>
+      </p:pic>
+      <p:pic>
+        <p:nvPicPr>
+          <p:cNvPr id="34" name="Picture 33">
+            <a:extLst>
+              <a:ext uri="{FF2B5EF4-FFF2-40B4-BE49-F238E27FC236}">
+                <a16:creationId xmlns:a16="http://schemas.microsoft.com/office/drawing/2014/main" id="{664B94CC-6E35-311D-AF4D-369EA658F89D}"/>
+              </a:ext>
+            </a:extLst>
+          </p:cNvPr>
+          <p:cNvPicPr>
+            <a:picLocks noChangeAspect="1"/>
+          </p:cNvPicPr>
+          <p:nvPr/>
+        </p:nvPicPr>
+        <p:blipFill>
+          <a:blip r:embed="rId3"/>
+          <a:stretch>
+            <a:fillRect/>
+          </a:stretch>
+        </p:blipFill>
+        <p:spPr>
+          <a:xfrm>
+            <a:off x="6565410" y="3969496"/>
+            <a:ext cx="176680" cy="175361"/>
+          </a:xfrm>
+          <a:prstGeom prst="rect">
+            <a:avLst/>
+          </a:prstGeom>
+          <a:ln w="6350">
+            <a:solidFill>
+              <a:schemeClr val="tx1"/>
+            </a:solidFill>
+          </a:ln>
+        </p:spPr>
+      </p:pic>
+      <p:pic>
+        <p:nvPicPr>
+          <p:cNvPr id="35" name="Picture 34">
+            <a:extLst>
+              <a:ext uri="{FF2B5EF4-FFF2-40B4-BE49-F238E27FC236}">
+                <a16:creationId xmlns:a16="http://schemas.microsoft.com/office/drawing/2014/main" id="{07D65D5E-95C1-E69F-D35E-D927C8D20761}"/>
+              </a:ext>
+            </a:extLst>
+          </p:cNvPr>
+          <p:cNvPicPr>
+            <a:picLocks noChangeAspect="1"/>
+          </p:cNvPicPr>
+          <p:nvPr/>
+        </p:nvPicPr>
+        <p:blipFill>
+          <a:blip r:embed="rId4"/>
+          <a:stretch>
+            <a:fillRect/>
+          </a:stretch>
+        </p:blipFill>
+        <p:spPr>
+          <a:xfrm>
+            <a:off x="7140026" y="4029043"/>
+            <a:ext cx="202752" cy="199446"/>
+          </a:xfrm>
+          <a:prstGeom prst="rect">
+            <a:avLst/>
+          </a:prstGeom>
+          <a:ln w="6350">
+            <a:solidFill>
+              <a:schemeClr val="tx1"/>
+            </a:solidFill>
+          </a:ln>
+        </p:spPr>
+      </p:pic>
       <p:sp>
         <p:nvSpPr>
           <p:cNvPr id="38" name="TextBox 37">
@@ -23545,6 +23425,7 @@
           </p:cNvPr>
           <p:cNvCxnSpPr>
             <a:cxnSpLocks/>
+            <a:endCxn id="32" idx="1"/>
           </p:cNvCxnSpPr>
           <p:nvPr/>
         </p:nvCxnSpPr>
@@ -23785,6 +23666,1503 @@
                   <a:schemeClr val="tx1"/>
                 </a:solidFill>
               </a:rPr>
+              <a:t>Scheduler Monitor Hub [SMU] </a:t>
+            </a:r>
+          </a:p>
+        </p:txBody>
+      </p:sp>
+      <p:cxnSp>
+        <p:nvCxnSpPr>
+          <p:cNvPr id="57" name="Straight Arrow Connector 56">
+            <a:extLst>
+              <a:ext uri="{FF2B5EF4-FFF2-40B4-BE49-F238E27FC236}">
+                <a16:creationId xmlns:a16="http://schemas.microsoft.com/office/drawing/2014/main" id="{E3B95400-44E6-45D0-782B-A0A7510EBF69}"/>
+              </a:ext>
+            </a:extLst>
+          </p:cNvPr>
+          <p:cNvCxnSpPr/>
+          <p:nvPr/>
+        </p:nvCxnSpPr>
+        <p:spPr>
+          <a:xfrm>
+            <a:off x="6096000" y="2960738"/>
+            <a:ext cx="0" cy="846682"/>
+          </a:xfrm>
+          <a:prstGeom prst="straightConnector1">
+            <a:avLst/>
+          </a:prstGeom>
+          <a:ln>
+            <a:headEnd type="triangle"/>
+            <a:tailEnd type="triangle"/>
+          </a:ln>
+        </p:spPr>
+        <p:style>
+          <a:lnRef idx="1">
+            <a:schemeClr val="accent1"/>
+          </a:lnRef>
+          <a:fillRef idx="0">
+            <a:schemeClr val="accent1"/>
+          </a:fillRef>
+          <a:effectRef idx="0">
+            <a:schemeClr val="accent1"/>
+          </a:effectRef>
+          <a:fontRef idx="minor">
+            <a:schemeClr val="tx1"/>
+          </a:fontRef>
+        </p:style>
+      </p:cxnSp>
+      <p:cxnSp>
+        <p:nvCxnSpPr>
+          <p:cNvPr id="62" name="Straight Arrow Connector 61">
+            <a:extLst>
+              <a:ext uri="{FF2B5EF4-FFF2-40B4-BE49-F238E27FC236}">
+                <a16:creationId xmlns:a16="http://schemas.microsoft.com/office/drawing/2014/main" id="{685B7E69-2D21-2396-8F2F-03A86443E0D8}"/>
+              </a:ext>
+            </a:extLst>
+          </p:cNvPr>
+          <p:cNvCxnSpPr/>
+          <p:nvPr/>
+        </p:nvCxnSpPr>
+        <p:spPr>
+          <a:xfrm>
+            <a:off x="6579821" y="2960738"/>
+            <a:ext cx="0" cy="846682"/>
+          </a:xfrm>
+          <a:prstGeom prst="straightConnector1">
+            <a:avLst/>
+          </a:prstGeom>
+          <a:ln>
+            <a:headEnd type="triangle"/>
+            <a:tailEnd type="triangle"/>
+          </a:ln>
+        </p:spPr>
+        <p:style>
+          <a:lnRef idx="1">
+            <a:schemeClr val="accent1"/>
+          </a:lnRef>
+          <a:fillRef idx="0">
+            <a:schemeClr val="accent1"/>
+          </a:fillRef>
+          <a:effectRef idx="0">
+            <a:schemeClr val="accent1"/>
+          </a:effectRef>
+          <a:fontRef idx="minor">
+            <a:schemeClr val="tx1"/>
+          </a:fontRef>
+        </p:style>
+      </p:cxnSp>
+      <p:cxnSp>
+        <p:nvCxnSpPr>
+          <p:cNvPr id="63" name="Straight Arrow Connector 62">
+            <a:extLst>
+              <a:ext uri="{FF2B5EF4-FFF2-40B4-BE49-F238E27FC236}">
+                <a16:creationId xmlns:a16="http://schemas.microsoft.com/office/drawing/2014/main" id="{119582EB-2F9C-B593-E3AF-930F9DC4E54D}"/>
+              </a:ext>
+            </a:extLst>
+          </p:cNvPr>
+          <p:cNvCxnSpPr>
+            <a:cxnSpLocks/>
+          </p:cNvCxnSpPr>
+          <p:nvPr/>
+        </p:nvCxnSpPr>
+        <p:spPr>
+          <a:xfrm>
+            <a:off x="7185589" y="2961980"/>
+            <a:ext cx="0" cy="769032"/>
+          </a:xfrm>
+          <a:prstGeom prst="straightConnector1">
+            <a:avLst/>
+          </a:prstGeom>
+          <a:ln>
+            <a:headEnd type="triangle"/>
+            <a:tailEnd type="triangle"/>
+          </a:ln>
+        </p:spPr>
+        <p:style>
+          <a:lnRef idx="1">
+            <a:schemeClr val="accent1"/>
+          </a:lnRef>
+          <a:fillRef idx="0">
+            <a:schemeClr val="accent1"/>
+          </a:fillRef>
+          <a:effectRef idx="0">
+            <a:schemeClr val="accent1"/>
+          </a:effectRef>
+          <a:fontRef idx="minor">
+            <a:schemeClr val="tx1"/>
+          </a:fontRef>
+        </p:style>
+      </p:cxnSp>
+      <p:cxnSp>
+        <p:nvCxnSpPr>
+          <p:cNvPr id="65" name="Straight Arrow Connector 64">
+            <a:extLst>
+              <a:ext uri="{FF2B5EF4-FFF2-40B4-BE49-F238E27FC236}">
+                <a16:creationId xmlns:a16="http://schemas.microsoft.com/office/drawing/2014/main" id="{28F8EF49-A405-035B-39E6-FEB7730F8573}"/>
+              </a:ext>
+            </a:extLst>
+          </p:cNvPr>
+          <p:cNvCxnSpPr>
+            <a:cxnSpLocks/>
+          </p:cNvCxnSpPr>
+          <p:nvPr/>
+        </p:nvCxnSpPr>
+        <p:spPr>
+          <a:xfrm>
+            <a:off x="7121984" y="2961980"/>
+            <a:ext cx="0" cy="769032"/>
+          </a:xfrm>
+          <a:prstGeom prst="straightConnector1">
+            <a:avLst/>
+          </a:prstGeom>
+          <a:ln>
+            <a:headEnd type="triangle"/>
+            <a:tailEnd type="triangle"/>
+          </a:ln>
+        </p:spPr>
+        <p:style>
+          <a:lnRef idx="1">
+            <a:schemeClr val="accent1"/>
+          </a:lnRef>
+          <a:fillRef idx="0">
+            <a:schemeClr val="accent1"/>
+          </a:fillRef>
+          <a:effectRef idx="0">
+            <a:schemeClr val="accent1"/>
+          </a:effectRef>
+          <a:fontRef idx="minor">
+            <a:schemeClr val="tx1"/>
+          </a:fontRef>
+        </p:style>
+      </p:cxnSp>
+      <p:pic>
+        <p:nvPicPr>
+          <p:cNvPr id="67" name="Picture 4">
+            <a:extLst>
+              <a:ext uri="{FF2B5EF4-FFF2-40B4-BE49-F238E27FC236}">
+                <a16:creationId xmlns:a16="http://schemas.microsoft.com/office/drawing/2014/main" id="{8E89A05D-5CFE-7DA8-87DC-B9312D615034}"/>
+              </a:ext>
+            </a:extLst>
+          </p:cNvPr>
+          <p:cNvPicPr>
+            <a:picLocks noChangeAspect="1" noChangeArrowheads="1"/>
+          </p:cNvPicPr>
+          <p:nvPr/>
+        </p:nvPicPr>
+        <p:blipFill>
+          <a:blip r:embed="rId8">
+            <a:extLst>
+              <a:ext uri="{28A0092B-C50C-407E-A947-70E740481C1C}">
+                <a14:useLocalDpi xmlns:a14="http://schemas.microsoft.com/office/drawing/2010/main" val="0"/>
+              </a:ext>
+            </a:extLst>
+          </a:blip>
+          <a:srcRect/>
+          <a:stretch>
+            <a:fillRect/>
+          </a:stretch>
+        </p:blipFill>
+        <p:spPr bwMode="auto">
+          <a:xfrm>
+            <a:off x="8220536" y="2435079"/>
+            <a:ext cx="382345" cy="382345"/>
+          </a:xfrm>
+          <a:prstGeom prst="rect">
+            <a:avLst/>
+          </a:prstGeom>
+          <a:noFill/>
+          <a:extLst>
+            <a:ext uri="{909E8E84-426E-40DD-AFC4-6F175D3DCCD1}">
+              <a14:hiddenFill xmlns:a14="http://schemas.microsoft.com/office/drawing/2010/main">
+                <a:solidFill>
+                  <a:srgbClr val="FFFFFF"/>
+                </a:solidFill>
+              </a14:hiddenFill>
+            </a:ext>
+          </a:extLst>
+        </p:spPr>
+      </p:pic>
+      <p:sp>
+        <p:nvSpPr>
+          <p:cNvPr id="69" name="TextBox 68">
+            <a:extLst>
+              <a:ext uri="{FF2B5EF4-FFF2-40B4-BE49-F238E27FC236}">
+                <a16:creationId xmlns:a16="http://schemas.microsoft.com/office/drawing/2014/main" id="{263D8DD6-59FF-D830-DEF4-93B0A27B58C1}"/>
+              </a:ext>
+            </a:extLst>
+          </p:cNvPr>
+          <p:cNvSpPr txBox="1"/>
+          <p:nvPr/>
+        </p:nvSpPr>
+        <p:spPr>
+          <a:xfrm>
+            <a:off x="8220536" y="2773367"/>
+            <a:ext cx="956227" cy="276999"/>
+          </a:xfrm>
+          <a:prstGeom prst="rect">
+            <a:avLst/>
+          </a:prstGeom>
+          <a:noFill/>
+        </p:spPr>
+        <p:txBody>
+          <a:bodyPr wrap="square" rtlCol="0">
+            <a:spAutoFit/>
+          </a:bodyPr>
+          <a:lstStyle/>
+          <a:p>
+            <a:r>
+              <a:rPr lang="en-US" sz="1200" b="1" dirty="0"/>
+              <a:t>User</a:t>
+            </a:r>
+            <a:endParaRPr lang="en-SG" sz="1200" dirty="0"/>
+          </a:p>
+        </p:txBody>
+      </p:sp>
+      <p:cxnSp>
+        <p:nvCxnSpPr>
+          <p:cNvPr id="70" name="Straight Arrow Connector 69">
+            <a:extLst>
+              <a:ext uri="{FF2B5EF4-FFF2-40B4-BE49-F238E27FC236}">
+                <a16:creationId xmlns:a16="http://schemas.microsoft.com/office/drawing/2014/main" id="{1419F927-2C0D-4EAA-31CD-04AF40F81590}"/>
+              </a:ext>
+            </a:extLst>
+          </p:cNvPr>
+          <p:cNvCxnSpPr>
+            <a:cxnSpLocks/>
+            <a:stCxn id="67" idx="1"/>
+            <a:endCxn id="53" idx="3"/>
+          </p:cNvCxnSpPr>
+          <p:nvPr/>
+        </p:nvCxnSpPr>
+        <p:spPr>
+          <a:xfrm flipH="1">
+            <a:off x="7541825" y="2626252"/>
+            <a:ext cx="678711" cy="1"/>
+          </a:xfrm>
+          <a:prstGeom prst="straightConnector1">
+            <a:avLst/>
+          </a:prstGeom>
+          <a:ln w="19050">
+            <a:tailEnd type="triangle"/>
+          </a:ln>
+        </p:spPr>
+        <p:style>
+          <a:lnRef idx="1">
+            <a:schemeClr val="accent1"/>
+          </a:lnRef>
+          <a:fillRef idx="0">
+            <a:schemeClr val="accent1"/>
+          </a:fillRef>
+          <a:effectRef idx="0">
+            <a:schemeClr val="accent1"/>
+          </a:effectRef>
+          <a:fontRef idx="minor">
+            <a:schemeClr val="tx1"/>
+          </a:fontRef>
+        </p:style>
+      </p:cxnSp>
+      <p:sp>
+        <p:nvSpPr>
+          <p:cNvPr id="76" name="Rectangle: Rounded Corners 75">
+            <a:extLst>
+              <a:ext uri="{FF2B5EF4-FFF2-40B4-BE49-F238E27FC236}">
+                <a16:creationId xmlns:a16="http://schemas.microsoft.com/office/drawing/2014/main" id="{EFBE7E73-DC18-6A5C-6BCE-2ED75EB808BA}"/>
+              </a:ext>
+            </a:extLst>
+          </p:cNvPr>
+          <p:cNvSpPr/>
+          <p:nvPr/>
+        </p:nvSpPr>
+        <p:spPr>
+          <a:xfrm>
+            <a:off x="2568727" y="2158666"/>
+            <a:ext cx="2630988" cy="991812"/>
+          </a:xfrm>
+          <a:prstGeom prst="roundRect">
+            <a:avLst/>
+          </a:prstGeom>
+          <a:noFill/>
+          <a:ln w="19050" cap="flat" cmpd="sng" algn="ctr">
+            <a:solidFill>
+              <a:schemeClr val="accent1">
+                <a:lumMod val="75000"/>
+              </a:schemeClr>
+            </a:solidFill>
+            <a:prstDash val="sysDash"/>
+            <a:round/>
+            <a:headEnd type="none" w="med" len="med"/>
+            <a:tailEnd type="none" w="med" len="med"/>
+          </a:ln>
+        </p:spPr>
+        <p:style>
+          <a:lnRef idx="0">
+            <a:scrgbClr r="0" g="0" b="0"/>
+          </a:lnRef>
+          <a:fillRef idx="0">
+            <a:scrgbClr r="0" g="0" b="0"/>
+          </a:fillRef>
+          <a:effectRef idx="0">
+            <a:scrgbClr r="0" g="0" b="0"/>
+          </a:effectRef>
+          <a:fontRef idx="minor">
+            <a:schemeClr val="accent2"/>
+          </a:fontRef>
+        </p:style>
+        <p:txBody>
+          <a:bodyPr rtlCol="0" anchor="ctr"/>
+          <a:lstStyle/>
+          <a:p>
+            <a:pPr algn="ctr"/>
+            <a:endParaRPr lang="en-SG" sz="1200" b="1" dirty="0">
+              <a:solidFill>
+                <a:schemeClr val="tx1"/>
+              </a:solidFill>
+            </a:endParaRPr>
+          </a:p>
+        </p:txBody>
+      </p:sp>
+      <p:sp>
+        <p:nvSpPr>
+          <p:cNvPr id="77" name="Rectangle: Rounded Corners 76">
+            <a:extLst>
+              <a:ext uri="{FF2B5EF4-FFF2-40B4-BE49-F238E27FC236}">
+                <a16:creationId xmlns:a16="http://schemas.microsoft.com/office/drawing/2014/main" id="{DFDA798A-F031-4AD0-9151-FF011A0E5B9A}"/>
+              </a:ext>
+            </a:extLst>
+          </p:cNvPr>
+          <p:cNvSpPr/>
+          <p:nvPr/>
+        </p:nvSpPr>
+        <p:spPr>
+          <a:xfrm>
+            <a:off x="5584618" y="3621035"/>
+            <a:ext cx="2219538" cy="833492"/>
+          </a:xfrm>
+          <a:prstGeom prst="roundRect">
+            <a:avLst/>
+          </a:prstGeom>
+          <a:noFill/>
+          <a:ln w="19050" cap="flat" cmpd="sng" algn="ctr">
+            <a:solidFill>
+              <a:schemeClr val="accent1">
+                <a:lumMod val="75000"/>
+              </a:schemeClr>
+            </a:solidFill>
+            <a:prstDash val="sysDash"/>
+            <a:round/>
+            <a:headEnd type="none" w="med" len="med"/>
+            <a:tailEnd type="none" w="med" len="med"/>
+          </a:ln>
+        </p:spPr>
+        <p:style>
+          <a:lnRef idx="0">
+            <a:scrgbClr r="0" g="0" b="0"/>
+          </a:lnRef>
+          <a:fillRef idx="0">
+            <a:scrgbClr r="0" g="0" b="0"/>
+          </a:fillRef>
+          <a:effectRef idx="0">
+            <a:scrgbClr r="0" g="0" b="0"/>
+          </a:effectRef>
+          <a:fontRef idx="minor">
+            <a:schemeClr val="accent2"/>
+          </a:fontRef>
+        </p:style>
+        <p:txBody>
+          <a:bodyPr rtlCol="0" anchor="ctr"/>
+          <a:lstStyle/>
+          <a:p>
+            <a:pPr algn="ctr"/>
+            <a:endParaRPr lang="en-SG" sz="1200" b="1" dirty="0">
+              <a:solidFill>
+                <a:schemeClr val="tx1"/>
+              </a:solidFill>
+            </a:endParaRPr>
+          </a:p>
+        </p:txBody>
+      </p:sp>
+    </p:spTree>
+    <p:extLst>
+      <p:ext uri="{BB962C8B-B14F-4D97-AF65-F5344CB8AC3E}">
+        <p14:creationId xmlns:p14="http://schemas.microsoft.com/office/powerpoint/2010/main" val="3271524681"/>
+      </p:ext>
+    </p:extLst>
+  </p:cSld>
+  <p:clrMapOvr>
+    <a:masterClrMapping/>
+  </p:clrMapOvr>
+</p:sld>
+</file>
+
+<file path=ppt/slides/slide18.xml><?xml version="1.0" encoding="utf-8"?>
+<p:sld xmlns:a="http://schemas.openxmlformats.org/drawingml/2006/main" xmlns:r="http://schemas.openxmlformats.org/officeDocument/2006/relationships" xmlns:p="http://schemas.openxmlformats.org/presentationml/2006/main">
+  <p:cSld>
+    <p:spTree>
+      <p:nvGrpSpPr>
+        <p:cNvPr id="1" name=""/>
+        <p:cNvGrpSpPr/>
+        <p:nvPr/>
+      </p:nvGrpSpPr>
+      <p:grpSpPr>
+        <a:xfrm>
+          <a:off x="0" y="0"/>
+          <a:ext cx="0" cy="0"/>
+          <a:chOff x="0" y="0"/>
+          <a:chExt cx="0" cy="0"/>
+        </a:xfrm>
+      </p:grpSpPr>
+      <p:sp>
+        <p:nvSpPr>
+          <p:cNvPr id="4" name="Rectangle 3">
+            <a:extLst>
+              <a:ext uri="{FF2B5EF4-FFF2-40B4-BE49-F238E27FC236}">
+                <a16:creationId xmlns:a16="http://schemas.microsoft.com/office/drawing/2014/main" id="{D8DD1451-AD91-CBFA-00B1-D1B8F3614AB8}"/>
+              </a:ext>
+            </a:extLst>
+          </p:cNvPr>
+          <p:cNvSpPr/>
+          <p:nvPr/>
+        </p:nvSpPr>
+        <p:spPr>
+          <a:xfrm>
+            <a:off x="2451941" y="2121011"/>
+            <a:ext cx="2613835" cy="997093"/>
+          </a:xfrm>
+          <a:prstGeom prst="rect">
+            <a:avLst/>
+          </a:prstGeom>
+          <a:ln w="19050">
+            <a:prstDash val="sysDash"/>
+          </a:ln>
+        </p:spPr>
+        <p:style>
+          <a:lnRef idx="2">
+            <a:schemeClr val="accent6"/>
+          </a:lnRef>
+          <a:fillRef idx="1">
+            <a:schemeClr val="lt1"/>
+          </a:fillRef>
+          <a:effectRef idx="0">
+            <a:schemeClr val="accent6"/>
+          </a:effectRef>
+          <a:fontRef idx="minor">
+            <a:schemeClr val="dk1"/>
+          </a:fontRef>
+        </p:style>
+        <p:txBody>
+          <a:bodyPr rtlCol="0" anchor="ctr"/>
+          <a:lstStyle/>
+          <a:p>
+            <a:endParaRPr lang="en-SG" b="1" dirty="0"/>
+          </a:p>
+        </p:txBody>
+      </p:sp>
+      <p:pic>
+        <p:nvPicPr>
+          <p:cNvPr id="5" name="Picture 4">
+            <a:extLst>
+              <a:ext uri="{FF2B5EF4-FFF2-40B4-BE49-F238E27FC236}">
+                <a16:creationId xmlns:a16="http://schemas.microsoft.com/office/drawing/2014/main" id="{04F4D0BF-39B3-B798-ED1D-6A31064C07E8}"/>
+              </a:ext>
+            </a:extLst>
+          </p:cNvPr>
+          <p:cNvPicPr>
+            <a:picLocks noChangeAspect="1"/>
+          </p:cNvPicPr>
+          <p:nvPr/>
+        </p:nvPicPr>
+        <p:blipFill>
+          <a:blip r:embed="rId2"/>
+          <a:stretch>
+            <a:fillRect/>
+          </a:stretch>
+        </p:blipFill>
+        <p:spPr>
+          <a:xfrm>
+            <a:off x="3610268" y="2345385"/>
+            <a:ext cx="355832" cy="427982"/>
+          </a:xfrm>
+          <a:prstGeom prst="rect">
+            <a:avLst/>
+          </a:prstGeom>
+        </p:spPr>
+      </p:pic>
+      <p:sp>
+        <p:nvSpPr>
+          <p:cNvPr id="7" name="TextBox 6">
+            <a:extLst>
+              <a:ext uri="{FF2B5EF4-FFF2-40B4-BE49-F238E27FC236}">
+                <a16:creationId xmlns:a16="http://schemas.microsoft.com/office/drawing/2014/main" id="{31CEDEF5-2CAB-C993-6EC5-0C8CDC2F087D}"/>
+              </a:ext>
+            </a:extLst>
+          </p:cNvPr>
+          <p:cNvSpPr txBox="1"/>
+          <p:nvPr/>
+        </p:nvSpPr>
+        <p:spPr>
+          <a:xfrm>
+            <a:off x="2291072" y="1825973"/>
+            <a:ext cx="2638392" cy="276999"/>
+          </a:xfrm>
+          <a:prstGeom prst="rect">
+            <a:avLst/>
+          </a:prstGeom>
+          <a:noFill/>
+        </p:spPr>
+        <p:txBody>
+          <a:bodyPr wrap="square" rtlCol="0">
+            <a:spAutoFit/>
+          </a:bodyPr>
+          <a:lstStyle/>
+          <a:p>
+            <a:r>
+              <a:rPr lang="en-SG" sz="1200" b="1" dirty="0">
+                <a:effectLst/>
+                <a:ea typeface="Times New Roman" panose="02020603050405020304" pitchFamily="18" charset="0"/>
+              </a:rPr>
+              <a:t>User Action Agents [UAR</a:t>
+            </a:r>
+            <a:r>
+              <a:rPr lang="en-SG" sz="1200" b="1" dirty="0">
+                <a:ea typeface="Times New Roman" panose="02020603050405020304" pitchFamily="18" charset="0"/>
+              </a:rPr>
+              <a:t>]</a:t>
+            </a:r>
+            <a:r>
+              <a:rPr lang="en-SG" sz="1200" b="1" dirty="0">
+                <a:effectLst/>
+                <a:ea typeface="Times New Roman" panose="02020603050405020304" pitchFamily="18" charset="0"/>
+              </a:rPr>
+              <a:t> Repository </a:t>
+            </a:r>
+            <a:r>
+              <a:rPr lang="en-SG" sz="1200" b="1" u="sng" dirty="0">
+                <a:effectLst/>
+                <a:ea typeface="Times New Roman" panose="02020603050405020304" pitchFamily="18" charset="0"/>
+              </a:rPr>
+              <a:t> </a:t>
+            </a:r>
+            <a:endParaRPr lang="en-SG" sz="1200" dirty="0"/>
+          </a:p>
+        </p:txBody>
+      </p:sp>
+      <p:sp>
+        <p:nvSpPr>
+          <p:cNvPr id="8" name="TextBox 7">
+            <a:extLst>
+              <a:ext uri="{FF2B5EF4-FFF2-40B4-BE49-F238E27FC236}">
+                <a16:creationId xmlns:a16="http://schemas.microsoft.com/office/drawing/2014/main" id="{9F9E6393-1A43-DFA2-B110-974E61F17BBC}"/>
+              </a:ext>
+            </a:extLst>
+          </p:cNvPr>
+          <p:cNvSpPr txBox="1"/>
+          <p:nvPr/>
+        </p:nvSpPr>
+        <p:spPr>
+          <a:xfrm>
+            <a:off x="2555897" y="2763958"/>
+            <a:ext cx="896285" cy="246221"/>
+          </a:xfrm>
+          <a:prstGeom prst="rect">
+            <a:avLst/>
+          </a:prstGeom>
+          <a:noFill/>
+        </p:spPr>
+        <p:txBody>
+          <a:bodyPr wrap="square" rtlCol="0">
+            <a:spAutoFit/>
+          </a:bodyPr>
+          <a:lstStyle/>
+          <a:p>
+            <a:r>
+              <a:rPr lang="en-SG" sz="1000" dirty="0"/>
+              <a:t>UAR_[Web]</a:t>
+            </a:r>
+          </a:p>
+        </p:txBody>
+      </p:sp>
+      <p:sp>
+        <p:nvSpPr>
+          <p:cNvPr id="9" name="TextBox 8">
+            <a:extLst>
+              <a:ext uri="{FF2B5EF4-FFF2-40B4-BE49-F238E27FC236}">
+                <a16:creationId xmlns:a16="http://schemas.microsoft.com/office/drawing/2014/main" id="{08B77C9A-152A-D2CF-6431-57E09AC00FFB}"/>
+              </a:ext>
+            </a:extLst>
+          </p:cNvPr>
+          <p:cNvSpPr txBox="1"/>
+          <p:nvPr/>
+        </p:nvSpPr>
+        <p:spPr>
+          <a:xfrm>
+            <a:off x="3452182" y="2763656"/>
+            <a:ext cx="896285" cy="246221"/>
+          </a:xfrm>
+          <a:prstGeom prst="rect">
+            <a:avLst/>
+          </a:prstGeom>
+          <a:noFill/>
+        </p:spPr>
+        <p:txBody>
+          <a:bodyPr wrap="square" rtlCol="0">
+            <a:spAutoFit/>
+          </a:bodyPr>
+          <a:lstStyle/>
+          <a:p>
+            <a:r>
+              <a:rPr lang="en-SG" sz="1000" dirty="0"/>
+              <a:t>UAR_[HW]</a:t>
+            </a:r>
+          </a:p>
+        </p:txBody>
+      </p:sp>
+      <p:pic>
+        <p:nvPicPr>
+          <p:cNvPr id="10" name="Picture 9">
+            <a:extLst>
+              <a:ext uri="{FF2B5EF4-FFF2-40B4-BE49-F238E27FC236}">
+                <a16:creationId xmlns:a16="http://schemas.microsoft.com/office/drawing/2014/main" id="{5AC5431D-6ECD-2703-272B-F50C89818475}"/>
+              </a:ext>
+            </a:extLst>
+          </p:cNvPr>
+          <p:cNvPicPr>
+            <a:picLocks noChangeAspect="1"/>
+          </p:cNvPicPr>
+          <p:nvPr/>
+        </p:nvPicPr>
+        <p:blipFill>
+          <a:blip r:embed="rId2"/>
+          <a:stretch>
+            <a:fillRect/>
+          </a:stretch>
+        </p:blipFill>
+        <p:spPr>
+          <a:xfrm>
+            <a:off x="4417336" y="2345385"/>
+            <a:ext cx="355832" cy="427982"/>
+          </a:xfrm>
+          <a:prstGeom prst="rect">
+            <a:avLst/>
+          </a:prstGeom>
+        </p:spPr>
+      </p:pic>
+      <p:sp>
+        <p:nvSpPr>
+          <p:cNvPr id="11" name="TextBox 10">
+            <a:extLst>
+              <a:ext uri="{FF2B5EF4-FFF2-40B4-BE49-F238E27FC236}">
+                <a16:creationId xmlns:a16="http://schemas.microsoft.com/office/drawing/2014/main" id="{02D5F13F-492A-2B05-3CD3-5C074D9B67D3}"/>
+              </a:ext>
+            </a:extLst>
+          </p:cNvPr>
+          <p:cNvSpPr txBox="1"/>
+          <p:nvPr/>
+        </p:nvSpPr>
+        <p:spPr>
+          <a:xfrm>
+            <a:off x="4273255" y="2763354"/>
+            <a:ext cx="896285" cy="246221"/>
+          </a:xfrm>
+          <a:prstGeom prst="rect">
+            <a:avLst/>
+          </a:prstGeom>
+          <a:noFill/>
+        </p:spPr>
+        <p:txBody>
+          <a:bodyPr wrap="square" rtlCol="0">
+            <a:spAutoFit/>
+          </a:bodyPr>
+          <a:lstStyle/>
+          <a:p>
+            <a:r>
+              <a:rPr lang="en-SG" sz="1000" dirty="0"/>
+              <a:t>UAR_[App]</a:t>
+            </a:r>
+          </a:p>
+        </p:txBody>
+      </p:sp>
+      <p:sp>
+        <p:nvSpPr>
+          <p:cNvPr id="12" name="TextBox 11">
+            <a:extLst>
+              <a:ext uri="{FF2B5EF4-FFF2-40B4-BE49-F238E27FC236}">
+                <a16:creationId xmlns:a16="http://schemas.microsoft.com/office/drawing/2014/main" id="{AD662BE1-8C57-860E-1A1B-D3B71F2F4225}"/>
+              </a:ext>
+            </a:extLst>
+          </p:cNvPr>
+          <p:cNvSpPr txBox="1"/>
+          <p:nvPr/>
+        </p:nvSpPr>
+        <p:spPr>
+          <a:xfrm>
+            <a:off x="3170008" y="2494328"/>
+            <a:ext cx="347472" cy="369332"/>
+          </a:xfrm>
+          <a:prstGeom prst="rect">
+            <a:avLst/>
+          </a:prstGeom>
+          <a:noFill/>
+        </p:spPr>
+        <p:txBody>
+          <a:bodyPr wrap="square" rtlCol="0">
+            <a:spAutoFit/>
+          </a:bodyPr>
+          <a:lstStyle/>
+          <a:p>
+            <a:r>
+              <a:rPr lang="en-SG" dirty="0"/>
+              <a:t>…</a:t>
+            </a:r>
+          </a:p>
+        </p:txBody>
+      </p:sp>
+      <p:pic>
+        <p:nvPicPr>
+          <p:cNvPr id="13" name="Picture 12">
+            <a:extLst>
+              <a:ext uri="{FF2B5EF4-FFF2-40B4-BE49-F238E27FC236}">
+                <a16:creationId xmlns:a16="http://schemas.microsoft.com/office/drawing/2014/main" id="{CC77102F-8DC1-9BBB-31DE-3EE9B4B80E2E}"/>
+              </a:ext>
+            </a:extLst>
+          </p:cNvPr>
+          <p:cNvPicPr>
+            <a:picLocks noChangeAspect="1"/>
+          </p:cNvPicPr>
+          <p:nvPr/>
+        </p:nvPicPr>
+        <p:blipFill>
+          <a:blip r:embed="rId2"/>
+          <a:stretch>
+            <a:fillRect/>
+          </a:stretch>
+        </p:blipFill>
+        <p:spPr>
+          <a:xfrm>
+            <a:off x="2823235" y="2280337"/>
+            <a:ext cx="355832" cy="427982"/>
+          </a:xfrm>
+          <a:prstGeom prst="rect">
+            <a:avLst/>
+          </a:prstGeom>
+        </p:spPr>
+      </p:pic>
+      <p:pic>
+        <p:nvPicPr>
+          <p:cNvPr id="6" name="Picture 5">
+            <a:extLst>
+              <a:ext uri="{FF2B5EF4-FFF2-40B4-BE49-F238E27FC236}">
+                <a16:creationId xmlns:a16="http://schemas.microsoft.com/office/drawing/2014/main" id="{3DF9721C-5A0D-BD8F-BA65-3195D6B8A603}"/>
+              </a:ext>
+            </a:extLst>
+          </p:cNvPr>
+          <p:cNvPicPr>
+            <a:picLocks noChangeAspect="1"/>
+          </p:cNvPicPr>
+          <p:nvPr/>
+        </p:nvPicPr>
+        <p:blipFill>
+          <a:blip r:embed="rId2"/>
+          <a:stretch>
+            <a:fillRect/>
+          </a:stretch>
+        </p:blipFill>
+        <p:spPr>
+          <a:xfrm>
+            <a:off x="2710412" y="2327843"/>
+            <a:ext cx="355832" cy="427982"/>
+          </a:xfrm>
+          <a:prstGeom prst="rect">
+            <a:avLst/>
+          </a:prstGeom>
+        </p:spPr>
+      </p:pic>
+      <p:sp>
+        <p:nvSpPr>
+          <p:cNvPr id="14" name="TextBox 13">
+            <a:extLst>
+              <a:ext uri="{FF2B5EF4-FFF2-40B4-BE49-F238E27FC236}">
+                <a16:creationId xmlns:a16="http://schemas.microsoft.com/office/drawing/2014/main" id="{CFE70FE2-9D5B-4796-06C1-76C508A0051C}"/>
+              </a:ext>
+            </a:extLst>
+          </p:cNvPr>
+          <p:cNvSpPr txBox="1"/>
+          <p:nvPr/>
+        </p:nvSpPr>
+        <p:spPr>
+          <a:xfrm>
+            <a:off x="4020312" y="2503274"/>
+            <a:ext cx="347472" cy="369332"/>
+          </a:xfrm>
+          <a:prstGeom prst="rect">
+            <a:avLst/>
+          </a:prstGeom>
+          <a:noFill/>
+        </p:spPr>
+        <p:txBody>
+          <a:bodyPr wrap="square" rtlCol="0">
+            <a:spAutoFit/>
+          </a:bodyPr>
+          <a:lstStyle/>
+          <a:p>
+            <a:r>
+              <a:rPr lang="en-SG" dirty="0"/>
+              <a:t>…</a:t>
+            </a:r>
+          </a:p>
+        </p:txBody>
+      </p:sp>
+      <p:sp>
+        <p:nvSpPr>
+          <p:cNvPr id="18" name="Arrow: Left-Right 17">
+            <a:extLst>
+              <a:ext uri="{FF2B5EF4-FFF2-40B4-BE49-F238E27FC236}">
+                <a16:creationId xmlns:a16="http://schemas.microsoft.com/office/drawing/2014/main" id="{6136EF72-86D5-57AD-956B-4A92DA78D366}"/>
+              </a:ext>
+            </a:extLst>
+          </p:cNvPr>
+          <p:cNvSpPr/>
+          <p:nvPr/>
+        </p:nvSpPr>
+        <p:spPr>
+          <a:xfrm rot="5400000">
+            <a:off x="3583395" y="3410317"/>
+            <a:ext cx="520021" cy="121368"/>
+          </a:xfrm>
+          <a:prstGeom prst="leftRightArrow">
+            <a:avLst/>
+          </a:prstGeom>
+          <a:solidFill>
+            <a:schemeClr val="bg1"/>
+          </a:solidFill>
+          <a:ln w="19050"/>
+        </p:spPr>
+        <p:style>
+          <a:lnRef idx="2">
+            <a:schemeClr val="accent1">
+              <a:shade val="50000"/>
+            </a:schemeClr>
+          </a:lnRef>
+          <a:fillRef idx="1">
+            <a:schemeClr val="accent1"/>
+          </a:fillRef>
+          <a:effectRef idx="0">
+            <a:schemeClr val="accent1"/>
+          </a:effectRef>
+          <a:fontRef idx="minor">
+            <a:schemeClr val="lt1"/>
+          </a:fontRef>
+        </p:style>
+        <p:txBody>
+          <a:bodyPr rtlCol="0" anchor="ctr"/>
+          <a:lstStyle/>
+          <a:p>
+            <a:pPr algn="ctr"/>
+            <a:endParaRPr lang="en-SG" dirty="0">
+              <a:solidFill>
+                <a:schemeClr val="bg1"/>
+              </a:solidFill>
+            </a:endParaRPr>
+          </a:p>
+        </p:txBody>
+      </p:sp>
+      <p:pic>
+        <p:nvPicPr>
+          <p:cNvPr id="19" name="Picture 18">
+            <a:extLst>
+              <a:ext uri="{FF2B5EF4-FFF2-40B4-BE49-F238E27FC236}">
+                <a16:creationId xmlns:a16="http://schemas.microsoft.com/office/drawing/2014/main" id="{43DF75AF-53E9-8D1A-1078-3DD9BAACFA44}"/>
+              </a:ext>
+            </a:extLst>
+          </p:cNvPr>
+          <p:cNvPicPr>
+            <a:picLocks noChangeAspect="1"/>
+          </p:cNvPicPr>
+          <p:nvPr/>
+        </p:nvPicPr>
+        <p:blipFill>
+          <a:blip r:embed="rId3"/>
+          <a:stretch>
+            <a:fillRect/>
+          </a:stretch>
+        </p:blipFill>
+        <p:spPr>
+          <a:xfrm>
+            <a:off x="1492604" y="3898023"/>
+            <a:ext cx="411108" cy="424159"/>
+          </a:xfrm>
+          <a:prstGeom prst="rect">
+            <a:avLst/>
+          </a:prstGeom>
+          <a:ln w="3175">
+            <a:solidFill>
+              <a:schemeClr val="tx1"/>
+            </a:solidFill>
+          </a:ln>
+        </p:spPr>
+      </p:pic>
+      <p:sp>
+        <p:nvSpPr>
+          <p:cNvPr id="20" name="TextBox 19">
+            <a:extLst>
+              <a:ext uri="{FF2B5EF4-FFF2-40B4-BE49-F238E27FC236}">
+                <a16:creationId xmlns:a16="http://schemas.microsoft.com/office/drawing/2014/main" id="{5F5C525F-1342-C9DE-33E7-54A8C92CCD7B}"/>
+              </a:ext>
+            </a:extLst>
+          </p:cNvPr>
+          <p:cNvSpPr txBox="1"/>
+          <p:nvPr/>
+        </p:nvSpPr>
+        <p:spPr>
+          <a:xfrm>
+            <a:off x="1220044" y="3621034"/>
+            <a:ext cx="956227" cy="276999"/>
+          </a:xfrm>
+          <a:prstGeom prst="rect">
+            <a:avLst/>
+          </a:prstGeom>
+          <a:noFill/>
+        </p:spPr>
+        <p:txBody>
+          <a:bodyPr wrap="square" rtlCol="0">
+            <a:spAutoFit/>
+          </a:bodyPr>
+          <a:lstStyle/>
+          <a:p>
+            <a:r>
+              <a:rPr lang="en-US" sz="1200" b="1" dirty="0"/>
+              <a:t>User profile  </a:t>
+            </a:r>
+            <a:endParaRPr lang="en-SG" sz="1200" dirty="0"/>
+          </a:p>
+        </p:txBody>
+      </p:sp>
+      <p:cxnSp>
+        <p:nvCxnSpPr>
+          <p:cNvPr id="21" name="Straight Arrow Connector 20">
+            <a:extLst>
+              <a:ext uri="{FF2B5EF4-FFF2-40B4-BE49-F238E27FC236}">
+                <a16:creationId xmlns:a16="http://schemas.microsoft.com/office/drawing/2014/main" id="{73EBCA76-A48F-F890-2FC5-49BF0ADEC537}"/>
+              </a:ext>
+            </a:extLst>
+          </p:cNvPr>
+          <p:cNvCxnSpPr>
+            <a:cxnSpLocks/>
+          </p:cNvCxnSpPr>
+          <p:nvPr/>
+        </p:nvCxnSpPr>
+        <p:spPr>
+          <a:xfrm>
+            <a:off x="1998246" y="4110101"/>
+            <a:ext cx="1002905" cy="0"/>
+          </a:xfrm>
+          <a:prstGeom prst="straightConnector1">
+            <a:avLst/>
+          </a:prstGeom>
+          <a:ln w="19050">
+            <a:tailEnd type="triangle"/>
+          </a:ln>
+        </p:spPr>
+        <p:style>
+          <a:lnRef idx="1">
+            <a:schemeClr val="accent1"/>
+          </a:lnRef>
+          <a:fillRef idx="0">
+            <a:schemeClr val="accent1"/>
+          </a:fillRef>
+          <a:effectRef idx="0">
+            <a:schemeClr val="accent1"/>
+          </a:effectRef>
+          <a:fontRef idx="minor">
+            <a:schemeClr val="tx1"/>
+          </a:fontRef>
+        </p:style>
+      </p:cxnSp>
+      <p:sp>
+        <p:nvSpPr>
+          <p:cNvPr id="23" name="Rectangle: Rounded Corners 22">
+            <a:extLst>
+              <a:ext uri="{FF2B5EF4-FFF2-40B4-BE49-F238E27FC236}">
+                <a16:creationId xmlns:a16="http://schemas.microsoft.com/office/drawing/2014/main" id="{64F9C992-5B41-8D07-9793-289F939C8803}"/>
+              </a:ext>
+            </a:extLst>
+          </p:cNvPr>
+          <p:cNvSpPr/>
+          <p:nvPr/>
+        </p:nvSpPr>
+        <p:spPr>
+          <a:xfrm>
+            <a:off x="3054269" y="3791518"/>
+            <a:ext cx="1654976" cy="637167"/>
+          </a:xfrm>
+          <a:prstGeom prst="roundRect">
+            <a:avLst/>
+          </a:prstGeom>
+          <a:noFill/>
+          <a:ln w="19050" cap="flat" cmpd="sng" algn="ctr">
+            <a:solidFill>
+              <a:schemeClr val="accent1">
+                <a:lumMod val="75000"/>
+              </a:schemeClr>
+            </a:solidFill>
+            <a:prstDash val="solid"/>
+            <a:round/>
+            <a:headEnd type="none" w="med" len="med"/>
+            <a:tailEnd type="none" w="med" len="med"/>
+          </a:ln>
+        </p:spPr>
+        <p:style>
+          <a:lnRef idx="0">
+            <a:scrgbClr r="0" g="0" b="0"/>
+          </a:lnRef>
+          <a:fillRef idx="0">
+            <a:scrgbClr r="0" g="0" b="0"/>
+          </a:fillRef>
+          <a:effectRef idx="0">
+            <a:scrgbClr r="0" g="0" b="0"/>
+          </a:effectRef>
+          <a:fontRef idx="minor">
+            <a:schemeClr val="accent2"/>
+          </a:fontRef>
+        </p:style>
+        <p:txBody>
+          <a:bodyPr rtlCol="0" anchor="ctr"/>
+          <a:lstStyle/>
+          <a:p>
+            <a:pPr algn="ctr"/>
+            <a:r>
+              <a:rPr lang="en-SG" sz="1200" b="1" dirty="0">
+                <a:solidFill>
+                  <a:schemeClr val="tx1"/>
+                </a:solidFill>
+              </a:rPr>
+              <a:t>User Profile Emulator [UPE] </a:t>
+            </a:r>
+          </a:p>
+        </p:txBody>
+      </p:sp>
+      <p:sp>
+        <p:nvSpPr>
+          <p:cNvPr id="28" name="Rectangle 27">
+            <a:extLst>
+              <a:ext uri="{FF2B5EF4-FFF2-40B4-BE49-F238E27FC236}">
+                <a16:creationId xmlns:a16="http://schemas.microsoft.com/office/drawing/2014/main" id="{C1955375-D852-FF24-7492-DE192609D050}"/>
+              </a:ext>
+            </a:extLst>
+          </p:cNvPr>
+          <p:cNvSpPr/>
+          <p:nvPr/>
+        </p:nvSpPr>
+        <p:spPr>
+          <a:xfrm>
+            <a:off x="5579748" y="3680879"/>
+            <a:ext cx="2369995" cy="750371"/>
+          </a:xfrm>
+          <a:prstGeom prst="rect">
+            <a:avLst/>
+          </a:prstGeom>
+          <a:ln w="19050">
+            <a:prstDash val="sysDash"/>
+          </a:ln>
+        </p:spPr>
+        <p:style>
+          <a:lnRef idx="2">
+            <a:schemeClr val="accent6"/>
+          </a:lnRef>
+          <a:fillRef idx="1">
+            <a:schemeClr val="lt1"/>
+          </a:fillRef>
+          <a:effectRef idx="0">
+            <a:schemeClr val="accent6"/>
+          </a:effectRef>
+          <a:fontRef idx="minor">
+            <a:schemeClr val="dk1"/>
+          </a:fontRef>
+        </p:style>
+        <p:txBody>
+          <a:bodyPr rtlCol="0" anchor="ctr"/>
+          <a:lstStyle/>
+          <a:p>
+            <a:endParaRPr lang="en-SG" b="1" dirty="0"/>
+          </a:p>
+        </p:txBody>
+      </p:sp>
+      <p:sp>
+        <p:nvSpPr>
+          <p:cNvPr id="29" name="Arrow: Right 28">
+            <a:extLst>
+              <a:ext uri="{FF2B5EF4-FFF2-40B4-BE49-F238E27FC236}">
+                <a16:creationId xmlns:a16="http://schemas.microsoft.com/office/drawing/2014/main" id="{167339C1-602C-91B8-3CD4-86E66BAC2839}"/>
+              </a:ext>
+            </a:extLst>
+          </p:cNvPr>
+          <p:cNvSpPr/>
+          <p:nvPr/>
+        </p:nvSpPr>
+        <p:spPr>
+          <a:xfrm>
+            <a:off x="4801659" y="4014845"/>
+            <a:ext cx="691367" cy="120133"/>
+          </a:xfrm>
+          <a:prstGeom prst="rightArrow">
+            <a:avLst/>
+          </a:prstGeom>
+          <a:solidFill>
+            <a:schemeClr val="bg1"/>
+          </a:solidFill>
+          <a:ln w="19050"/>
+        </p:spPr>
+        <p:style>
+          <a:lnRef idx="2">
+            <a:schemeClr val="accent1">
+              <a:shade val="50000"/>
+            </a:schemeClr>
+          </a:lnRef>
+          <a:fillRef idx="1">
+            <a:schemeClr val="accent1"/>
+          </a:fillRef>
+          <a:effectRef idx="0">
+            <a:schemeClr val="accent1"/>
+          </a:effectRef>
+          <a:fontRef idx="minor">
+            <a:schemeClr val="lt1"/>
+          </a:fontRef>
+        </p:style>
+        <p:txBody>
+          <a:bodyPr rtlCol="0" anchor="ctr"/>
+          <a:lstStyle/>
+          <a:p>
+            <a:pPr algn="ctr"/>
+            <a:endParaRPr lang="en-SG" dirty="0"/>
+          </a:p>
+        </p:txBody>
+      </p:sp>
+      <p:sp>
+        <p:nvSpPr>
+          <p:cNvPr id="38" name="TextBox 37">
+            <a:extLst>
+              <a:ext uri="{FF2B5EF4-FFF2-40B4-BE49-F238E27FC236}">
+                <a16:creationId xmlns:a16="http://schemas.microsoft.com/office/drawing/2014/main" id="{872F52B7-AB8F-47B4-3D2C-91249D24784B}"/>
+              </a:ext>
+            </a:extLst>
+          </p:cNvPr>
+          <p:cNvSpPr txBox="1"/>
+          <p:nvPr/>
+        </p:nvSpPr>
+        <p:spPr>
+          <a:xfrm>
+            <a:off x="5579748" y="4208306"/>
+            <a:ext cx="1803521" cy="246221"/>
+          </a:xfrm>
+          <a:prstGeom prst="rect">
+            <a:avLst/>
+          </a:prstGeom>
+          <a:noFill/>
+        </p:spPr>
+        <p:txBody>
+          <a:bodyPr wrap="square" rtlCol="0">
+            <a:spAutoFit/>
+          </a:bodyPr>
+          <a:lstStyle/>
+          <a:p>
+            <a:r>
+              <a:rPr lang="en-SG" sz="1000" dirty="0"/>
+              <a:t>Automatic Actions Program</a:t>
+            </a:r>
+          </a:p>
+        </p:txBody>
+      </p:sp>
+      <p:cxnSp>
+        <p:nvCxnSpPr>
+          <p:cNvPr id="40" name="Straight Arrow Connector 39">
+            <a:extLst>
+              <a:ext uri="{FF2B5EF4-FFF2-40B4-BE49-F238E27FC236}">
+                <a16:creationId xmlns:a16="http://schemas.microsoft.com/office/drawing/2014/main" id="{4979912A-E255-C75F-CEF9-67C6E1999DEA}"/>
+              </a:ext>
+            </a:extLst>
+          </p:cNvPr>
+          <p:cNvCxnSpPr>
+            <a:cxnSpLocks/>
+          </p:cNvCxnSpPr>
+          <p:nvPr/>
+        </p:nvCxnSpPr>
+        <p:spPr>
+          <a:xfrm>
+            <a:off x="6187226" y="4043129"/>
+            <a:ext cx="186545" cy="0"/>
+          </a:xfrm>
+          <a:prstGeom prst="straightConnector1">
+            <a:avLst/>
+          </a:prstGeom>
+          <a:ln w="19050">
+            <a:tailEnd type="triangle"/>
+          </a:ln>
+        </p:spPr>
+        <p:style>
+          <a:lnRef idx="1">
+            <a:schemeClr val="dk1"/>
+          </a:lnRef>
+          <a:fillRef idx="0">
+            <a:schemeClr val="dk1"/>
+          </a:fillRef>
+          <a:effectRef idx="0">
+            <a:schemeClr val="dk1"/>
+          </a:effectRef>
+          <a:fontRef idx="minor">
+            <a:schemeClr val="tx1"/>
+          </a:fontRef>
+        </p:style>
+      </p:cxnSp>
+      <p:cxnSp>
+        <p:nvCxnSpPr>
+          <p:cNvPr id="43" name="Straight Arrow Connector 42">
+            <a:extLst>
+              <a:ext uri="{FF2B5EF4-FFF2-40B4-BE49-F238E27FC236}">
+                <a16:creationId xmlns:a16="http://schemas.microsoft.com/office/drawing/2014/main" id="{FF31F093-E2C1-E13A-5E65-7F08733FC59C}"/>
+              </a:ext>
+            </a:extLst>
+          </p:cNvPr>
+          <p:cNvCxnSpPr>
+            <a:cxnSpLocks/>
+          </p:cNvCxnSpPr>
+          <p:nvPr/>
+        </p:nvCxnSpPr>
+        <p:spPr>
+          <a:xfrm>
+            <a:off x="6771181" y="3901503"/>
+            <a:ext cx="243707" cy="0"/>
+          </a:xfrm>
+          <a:prstGeom prst="straightConnector1">
+            <a:avLst/>
+          </a:prstGeom>
+          <a:ln w="19050">
+            <a:tailEnd type="triangle"/>
+          </a:ln>
+        </p:spPr>
+        <p:style>
+          <a:lnRef idx="1">
+            <a:schemeClr val="dk1"/>
+          </a:lnRef>
+          <a:fillRef idx="0">
+            <a:schemeClr val="dk1"/>
+          </a:fillRef>
+          <a:effectRef idx="0">
+            <a:schemeClr val="dk1"/>
+          </a:effectRef>
+          <a:fontRef idx="minor">
+            <a:schemeClr val="tx1"/>
+          </a:fontRef>
+        </p:style>
+      </p:cxnSp>
+      <p:cxnSp>
+        <p:nvCxnSpPr>
+          <p:cNvPr id="47" name="Straight Arrow Connector 46">
+            <a:extLst>
+              <a:ext uri="{FF2B5EF4-FFF2-40B4-BE49-F238E27FC236}">
+                <a16:creationId xmlns:a16="http://schemas.microsoft.com/office/drawing/2014/main" id="{A65A17B2-19D7-FA6D-A338-A233275165D9}"/>
+              </a:ext>
+            </a:extLst>
+          </p:cNvPr>
+          <p:cNvCxnSpPr>
+            <a:cxnSpLocks/>
+          </p:cNvCxnSpPr>
+          <p:nvPr/>
+        </p:nvCxnSpPr>
+        <p:spPr>
+          <a:xfrm>
+            <a:off x="6771181" y="4083740"/>
+            <a:ext cx="163945" cy="0"/>
+          </a:xfrm>
+          <a:prstGeom prst="straightConnector1">
+            <a:avLst/>
+          </a:prstGeom>
+          <a:ln w="19050">
+            <a:tailEnd type="triangle"/>
+          </a:ln>
+        </p:spPr>
+        <p:style>
+          <a:lnRef idx="1">
+            <a:schemeClr val="dk1"/>
+          </a:lnRef>
+          <a:fillRef idx="0">
+            <a:schemeClr val="dk1"/>
+          </a:fillRef>
+          <a:effectRef idx="0">
+            <a:schemeClr val="dk1"/>
+          </a:effectRef>
+          <a:fontRef idx="minor">
+            <a:schemeClr val="tx1"/>
+          </a:fontRef>
+        </p:style>
+      </p:cxnSp>
+      <p:cxnSp>
+        <p:nvCxnSpPr>
+          <p:cNvPr id="50" name="Straight Arrow Connector 49">
+            <a:extLst>
+              <a:ext uri="{FF2B5EF4-FFF2-40B4-BE49-F238E27FC236}">
+                <a16:creationId xmlns:a16="http://schemas.microsoft.com/office/drawing/2014/main" id="{6625841B-FDB9-46CD-21C3-F8D75D7D7ACB}"/>
+              </a:ext>
+            </a:extLst>
+          </p:cNvPr>
+          <p:cNvCxnSpPr>
+            <a:cxnSpLocks/>
+          </p:cNvCxnSpPr>
+          <p:nvPr/>
+        </p:nvCxnSpPr>
+        <p:spPr>
+          <a:xfrm>
+            <a:off x="7342778" y="4128766"/>
+            <a:ext cx="163945" cy="0"/>
+          </a:xfrm>
+          <a:prstGeom prst="straightConnector1">
+            <a:avLst/>
+          </a:prstGeom>
+          <a:ln w="19050">
+            <a:tailEnd type="triangle"/>
+          </a:ln>
+        </p:spPr>
+        <p:style>
+          <a:lnRef idx="1">
+            <a:schemeClr val="dk1"/>
+          </a:lnRef>
+          <a:fillRef idx="0">
+            <a:schemeClr val="dk1"/>
+          </a:fillRef>
+          <a:effectRef idx="0">
+            <a:schemeClr val="dk1"/>
+          </a:effectRef>
+          <a:fontRef idx="minor">
+            <a:schemeClr val="tx1"/>
+          </a:fontRef>
+        </p:style>
+      </p:cxnSp>
+      <p:sp>
+        <p:nvSpPr>
+          <p:cNvPr id="51" name="TextBox 50">
+            <a:extLst>
+              <a:ext uri="{FF2B5EF4-FFF2-40B4-BE49-F238E27FC236}">
+                <a16:creationId xmlns:a16="http://schemas.microsoft.com/office/drawing/2014/main" id="{7AFE76E0-D685-F7CC-5E93-35053568B8BF}"/>
+              </a:ext>
+            </a:extLst>
+          </p:cNvPr>
+          <p:cNvSpPr txBox="1"/>
+          <p:nvPr/>
+        </p:nvSpPr>
+        <p:spPr>
+          <a:xfrm>
+            <a:off x="7492511" y="3943633"/>
+            <a:ext cx="347472" cy="369332"/>
+          </a:xfrm>
+          <a:prstGeom prst="rect">
+            <a:avLst/>
+          </a:prstGeom>
+          <a:noFill/>
+        </p:spPr>
+        <p:txBody>
+          <a:bodyPr wrap="square" rtlCol="0">
+            <a:spAutoFit/>
+          </a:bodyPr>
+          <a:lstStyle/>
+          <a:p>
+            <a:r>
+              <a:rPr lang="en-SG" dirty="0"/>
+              <a:t>…</a:t>
+            </a:r>
+          </a:p>
+        </p:txBody>
+      </p:sp>
+      <p:sp>
+        <p:nvSpPr>
+          <p:cNvPr id="52" name="TextBox 51">
+            <a:extLst>
+              <a:ext uri="{FF2B5EF4-FFF2-40B4-BE49-F238E27FC236}">
+                <a16:creationId xmlns:a16="http://schemas.microsoft.com/office/drawing/2014/main" id="{556D929D-D6DC-9D00-8A1C-D7FBFE824535}"/>
+              </a:ext>
+            </a:extLst>
+          </p:cNvPr>
+          <p:cNvSpPr txBox="1"/>
+          <p:nvPr/>
+        </p:nvSpPr>
+        <p:spPr>
+          <a:xfrm>
+            <a:off x="5476398" y="4417005"/>
+            <a:ext cx="2178024" cy="276999"/>
+          </a:xfrm>
+          <a:prstGeom prst="rect">
+            <a:avLst/>
+          </a:prstGeom>
+          <a:noFill/>
+        </p:spPr>
+        <p:txBody>
+          <a:bodyPr wrap="square" rtlCol="0">
+            <a:spAutoFit/>
+          </a:bodyPr>
+          <a:lstStyle/>
+          <a:p>
+            <a:r>
+              <a:rPr lang="en-SG" sz="1200" b="1" dirty="0"/>
+              <a:t>Modelled Actions Chain/Tree </a:t>
+            </a:r>
+          </a:p>
+        </p:txBody>
+      </p:sp>
+      <p:sp>
+        <p:nvSpPr>
+          <p:cNvPr id="53" name="Rectangle: Rounded Corners 52">
+            <a:extLst>
+              <a:ext uri="{FF2B5EF4-FFF2-40B4-BE49-F238E27FC236}">
+                <a16:creationId xmlns:a16="http://schemas.microsoft.com/office/drawing/2014/main" id="{E8C79FE5-052C-E398-4845-6CB49FDE4954}"/>
+              </a:ext>
+            </a:extLst>
+          </p:cNvPr>
+          <p:cNvSpPr/>
+          <p:nvPr/>
+        </p:nvSpPr>
+        <p:spPr>
+          <a:xfrm>
+            <a:off x="5886849" y="2307669"/>
+            <a:ext cx="1654976" cy="637167"/>
+          </a:xfrm>
+          <a:prstGeom prst="roundRect">
+            <a:avLst/>
+          </a:prstGeom>
+          <a:noFill/>
+          <a:ln w="19050" cap="flat" cmpd="sng" algn="ctr">
+            <a:solidFill>
+              <a:schemeClr val="accent1">
+                <a:lumMod val="75000"/>
+              </a:schemeClr>
+            </a:solidFill>
+            <a:prstDash val="solid"/>
+            <a:round/>
+            <a:headEnd type="none" w="med" len="med"/>
+            <a:tailEnd type="none" w="med" len="med"/>
+          </a:ln>
+        </p:spPr>
+        <p:style>
+          <a:lnRef idx="0">
+            <a:scrgbClr r="0" g="0" b="0"/>
+          </a:lnRef>
+          <a:fillRef idx="0">
+            <a:scrgbClr r="0" g="0" b="0"/>
+          </a:fillRef>
+          <a:effectRef idx="0">
+            <a:scrgbClr r="0" g="0" b="0"/>
+          </a:effectRef>
+          <a:fontRef idx="minor">
+            <a:schemeClr val="accent2"/>
+          </a:fontRef>
+        </p:style>
+        <p:txBody>
+          <a:bodyPr rtlCol="0" anchor="ctr"/>
+          <a:lstStyle/>
+          <a:p>
+            <a:pPr algn="ctr"/>
+            <a:r>
+              <a:rPr lang="en-SG" sz="1200" b="1" dirty="0">
+                <a:solidFill>
+                  <a:schemeClr val="tx1"/>
+                </a:solidFill>
+              </a:rPr>
               <a:t>Scheduler Monitor </a:t>
             </a:r>
             <a:r>
@@ -24226,7 +25604,7 @@
 </p:sld>
 </file>
 
-<file path=ppt/slides/slide18.xml><?xml version="1.0" encoding="utf-8"?>
+<file path=ppt/slides/slide19.xml><?xml version="1.0" encoding="utf-8"?>
 <p:sld xmlns:a="http://schemas.openxmlformats.org/drawingml/2006/main" xmlns:r="http://schemas.openxmlformats.org/officeDocument/2006/relationships" xmlns:p="http://schemas.openxmlformats.org/presentationml/2006/main">
   <p:cSld>
     <p:spTree>

</xml_diff>